<commit_message>
Fixed some typos; renamed files in slides
</commit_message>
<xml_diff>
--- a/Python/Cython/cython.pptx
+++ b/Python/Cython/cython.pptx
@@ -219,7 +219,7 @@
           <a:p>
             <a:fld id="{16B045E4-7DA3-41B9-B0DA-4BEE0876FA88}" type="datetimeFigureOut">
               <a:rPr lang="nl-BE" smtClean="0"/>
-              <a:t>27/01/2016</a:t>
+              <a:t>10/02/2016</a:t>
             </a:fld>
             <a:endParaRPr lang="nl-BE"/>
           </a:p>
@@ -668,7 +668,7 @@
           <a:p>
             <a:fld id="{53B2420D-148A-400F-B88D-527DF6E13622}" type="datetime1">
               <a:rPr lang="en-US" smtClean="0"/>
-              <a:t>2016-01-27</a:t>
+              <a:t>2016-02-10</a:t>
             </a:fld>
             <a:endParaRPr lang="en-US"/>
           </a:p>
@@ -834,7 +834,7 @@
           <a:p>
             <a:fld id="{52A01B9A-6787-4B63-BAEF-E3CF67589D82}" type="datetime1">
               <a:rPr lang="en-US" smtClean="0"/>
-              <a:t>2016-01-27</a:t>
+              <a:t>2016-02-10</a:t>
             </a:fld>
             <a:endParaRPr lang="en-US"/>
           </a:p>
@@ -1010,7 +1010,7 @@
           <a:p>
             <a:fld id="{6E982D42-2071-4A3D-B614-2380183202E1}" type="datetime1">
               <a:rPr lang="en-US" smtClean="0"/>
-              <a:t>2016-01-27</a:t>
+              <a:t>2016-02-10</a:t>
             </a:fld>
             <a:endParaRPr lang="en-US"/>
           </a:p>
@@ -1176,7 +1176,7 @@
           <a:p>
             <a:fld id="{2E90E067-04B9-40C0-BFE6-53BAD2F7119C}" type="datetime1">
               <a:rPr lang="en-US" smtClean="0"/>
-              <a:t>2016-01-27</a:t>
+              <a:t>2016-02-10</a:t>
             </a:fld>
             <a:endParaRPr lang="en-US"/>
           </a:p>
@@ -1418,7 +1418,7 @@
           <a:p>
             <a:fld id="{D7CB2E72-949E-4479-B957-DBA32EC1FAB9}" type="datetime1">
               <a:rPr lang="en-US" smtClean="0"/>
-              <a:t>2016-01-27</a:t>
+              <a:t>2016-02-10</a:t>
             </a:fld>
             <a:endParaRPr lang="en-US"/>
           </a:p>
@@ -1702,7 +1702,7 @@
           <a:p>
             <a:fld id="{A06819D6-C5C8-405A-96EE-DAC9728267C0}" type="datetime1">
               <a:rPr lang="en-US" smtClean="0"/>
-              <a:t>2016-01-27</a:t>
+              <a:t>2016-02-10</a:t>
             </a:fld>
             <a:endParaRPr lang="en-US"/>
           </a:p>
@@ -2120,7 +2120,7 @@
           <a:p>
             <a:fld id="{476A766D-F1AD-47B2-B323-71C0AAEFC468}" type="datetime1">
               <a:rPr lang="en-US" smtClean="0"/>
-              <a:t>2016-01-27</a:t>
+              <a:t>2016-02-10</a:t>
             </a:fld>
             <a:endParaRPr lang="en-US"/>
           </a:p>
@@ -2234,7 +2234,7 @@
           <a:p>
             <a:fld id="{E8021487-0835-4E27-A96A-FE7FCF3265BD}" type="datetime1">
               <a:rPr lang="en-US" smtClean="0"/>
-              <a:t>2016-01-27</a:t>
+              <a:t>2016-02-10</a:t>
             </a:fld>
             <a:endParaRPr lang="en-US"/>
           </a:p>
@@ -2325,7 +2325,7 @@
           <a:p>
             <a:fld id="{D8423321-723F-439B-A2FC-3D1497BCF824}" type="datetime1">
               <a:rPr lang="en-US" smtClean="0"/>
-              <a:t>2016-01-27</a:t>
+              <a:t>2016-02-10</a:t>
             </a:fld>
             <a:endParaRPr lang="en-US"/>
           </a:p>
@@ -2598,7 +2598,7 @@
           <a:p>
             <a:fld id="{C23318F9-3CB8-42B9-8393-7570C1C1A70D}" type="datetime1">
               <a:rPr lang="en-US" smtClean="0"/>
-              <a:t>2016-01-27</a:t>
+              <a:t>2016-02-10</a:t>
             </a:fld>
             <a:endParaRPr lang="en-US"/>
           </a:p>
@@ -2847,7 +2847,7 @@
           <a:p>
             <a:fld id="{6867E127-D066-4A1C-B918-F70FF61E725D}" type="datetime1">
               <a:rPr lang="en-US" smtClean="0"/>
-              <a:t>2016-01-27</a:t>
+              <a:t>2016-02-10</a:t>
             </a:fld>
             <a:endParaRPr lang="en-US"/>
           </a:p>
@@ -3056,7 +3056,7 @@
           <a:p>
             <a:fld id="{E6FF7314-6885-4B6E-804E-F9FE9C155D78}" type="datetime1">
               <a:rPr lang="en-US" smtClean="0"/>
-              <a:t>2016-01-27</a:t>
+              <a:t>2016-02-10</a:t>
             </a:fld>
             <a:endParaRPr lang="en-US"/>
           </a:p>
@@ -4121,7 +4121,7 @@
         <p:spPr>
           <a:xfrm>
             <a:off x="533400" y="1676400"/>
-            <a:ext cx="6112571" cy="2862322"/>
+            <a:ext cx="5561138" cy="2862322"/>
           </a:xfrm>
           <a:prstGeom prst="rect">
             <a:avLst/>
@@ -4250,7 +4250,7 @@
                 <a:latin typeface="Courier New" panose="02070309020205020404" pitchFamily="49" charset="0"/>
                 <a:cs typeface="Courier New" panose="02070309020205020404" pitchFamily="49" charset="0"/>
               </a:rPr>
-              <a:t>primes_cython.primes</a:t>
+              <a:t>primes_c.primes</a:t>
             </a:r>
             <a:r>
               <a:rPr lang="nl-BE" dirty="0" smtClean="0">
@@ -4346,14 +4346,24 @@
               <a:t> </a:t>
             </a:r>
             <a:r>
-              <a:rPr lang="nl-BE" dirty="0" err="1">
+              <a:rPr lang="nl-BE" dirty="0" err="1" smtClean="0">
                 <a:solidFill>
                   <a:schemeClr val="bg1"/>
                 </a:solidFill>
                 <a:latin typeface="Courier New" panose="02070309020205020404" pitchFamily="49" charset="0"/>
                 <a:cs typeface="Courier New" panose="02070309020205020404" pitchFamily="49" charset="0"/>
               </a:rPr>
-              <a:t>primes_vanilla.primes</a:t>
+              <a:t>primes_p.primes</a:t>
+            </a:r>
+            <a:r>
+              <a:rPr lang="nl-BE" dirty="0" smtClean="0">
+                <a:solidFill>
+                  <a:schemeClr val="bg1"/>
+                </a:solidFill>
+                <a:latin typeface="Courier New" panose="02070309020205020404" pitchFamily="49" charset="0"/>
+                <a:cs typeface="Courier New" panose="02070309020205020404" pitchFamily="49" charset="0"/>
+              </a:rPr>
+              <a:t>(1000</a:t>
             </a:r>
             <a:r>
               <a:rPr lang="nl-BE" dirty="0">
@@ -4363,7 +4373,7 @@
                 <a:latin typeface="Courier New" panose="02070309020205020404" pitchFamily="49" charset="0"/>
                 <a:cs typeface="Courier New" panose="02070309020205020404" pitchFamily="49" charset="0"/>
               </a:rPr>
-              <a:t>(1000)</a:t>
+              <a:t>)</a:t>
             </a:r>
           </a:p>
           <a:p>
@@ -4588,11 +4598,15 @@
             </a:r>
             <a:r>
               <a:rPr lang="en-US" sz="2400" dirty="0" err="1" smtClean="0"/>
-              <a:t>compiliated</a:t>
+              <a:t>compilicated</a:t>
             </a:r>
             <a:r>
               <a:rPr lang="en-US" sz="2400" dirty="0" smtClean="0"/>
-              <a:t> is it?</a:t>
+              <a:t> </a:t>
+            </a:r>
+            <a:r>
+              <a:rPr lang="en-US" sz="2400" dirty="0" smtClean="0"/>
+              <a:t>is it?</a:t>
             </a:r>
             <a:endParaRPr lang="nl-BE" sz="2400" dirty="0"/>
           </a:p>
@@ -5166,8 +5180,8 @@
           </p:nvSpPr>
           <p:spPr>
             <a:xfrm>
-              <a:off x="3360773" y="6021077"/>
-              <a:ext cx="830227" cy="369332"/>
+              <a:off x="2766764" y="6021077"/>
+              <a:ext cx="1424236" cy="369332"/>
             </a:xfrm>
             <a:prstGeom prst="rect">
               <a:avLst/>
@@ -5187,7 +5201,7 @@
             <a:p>
               <a:r>
                 <a:rPr lang="en-US" dirty="0" err="1" smtClean="0"/>
-                <a:t>cython</a:t>
+                <a:t>primes_c.pyx</a:t>
               </a:r>
               <a:endParaRPr lang="nl-BE" dirty="0"/>
             </a:p>
@@ -5203,9 +5217,9 @@
         <p:grpSpPr>
           <a:xfrm>
             <a:off x="4951597" y="1371600"/>
-            <a:ext cx="3889713" cy="5017532"/>
+            <a:ext cx="3887603" cy="5017532"/>
             <a:chOff x="4951597" y="1371600"/>
-            <a:chExt cx="3889713" cy="5017532"/>
+            <a:chExt cx="3887603" cy="5017532"/>
           </a:xfrm>
         </p:grpSpPr>
         <p:sp>
@@ -5647,8 +5661,8 @@
           </p:nvSpPr>
           <p:spPr>
             <a:xfrm>
-              <a:off x="7988191" y="6019800"/>
-              <a:ext cx="853119" cy="369332"/>
+              <a:off x="7490305" y="6019800"/>
+              <a:ext cx="1348895" cy="369332"/>
             </a:xfrm>
             <a:prstGeom prst="rect">
               <a:avLst/>
@@ -5667,12 +5681,8 @@
             <a:lstStyle/>
             <a:p>
               <a:r>
-                <a:rPr lang="en-US" dirty="0"/>
-                <a:t>p</a:t>
-              </a:r>
-              <a:r>
                 <a:rPr lang="en-US" dirty="0" smtClean="0"/>
-                <a:t>ython</a:t>
+                <a:t>primes_p.py</a:t>
               </a:r>
               <a:endParaRPr lang="nl-BE" dirty="0"/>
             </a:p>
@@ -5774,9 +5784,9 @@
         <p:grpSpPr>
           <a:xfrm>
             <a:off x="538298" y="1676400"/>
-            <a:ext cx="5862502" cy="1817132"/>
+            <a:ext cx="5863144" cy="1817132"/>
             <a:chOff x="304800" y="1371600"/>
-            <a:chExt cx="5862502" cy="1817132"/>
+            <a:chExt cx="5863144" cy="1817132"/>
           </a:xfrm>
         </p:grpSpPr>
         <p:sp>
@@ -5788,7 +5798,7 @@
           <p:spPr>
             <a:xfrm>
               <a:off x="304800" y="1371600"/>
-              <a:ext cx="5862502" cy="1815882"/>
+              <a:ext cx="5863144" cy="1815882"/>
             </a:xfrm>
             <a:prstGeom prst="rect">
               <a:avLst/>
@@ -5801,7 +5811,7 @@
             </a:ln>
           </p:spPr>
           <p:txBody>
-            <a:bodyPr wrap="none" rtlCol="0">
+            <a:bodyPr wrap="square" rtlCol="0">
               <a:spAutoFit/>
             </a:bodyPr>
             <a:lstStyle/>
@@ -5900,47 +5910,51 @@
                 <a:t>    </a:t>
               </a:r>
               <a:r>
-                <a:rPr lang="nl-BE" sz="1600" dirty="0" err="1">
+                <a:rPr lang="nl-BE" sz="1600" dirty="0" err="1" smtClean="0">
                   <a:latin typeface="Courier New" panose="02070309020205020404" pitchFamily="49" charset="0"/>
                   <a:cs typeface="Courier New" panose="02070309020205020404" pitchFamily="49" charset="0"/>
                 </a:rPr>
                 <a:t>ext_modules</a:t>
               </a:r>
               <a:r>
-                <a:rPr lang="nl-BE" sz="1600" dirty="0">
+                <a:rPr lang="nl-BE" sz="1600" dirty="0" smtClean="0">
                   <a:latin typeface="Courier New" panose="02070309020205020404" pitchFamily="49" charset="0"/>
                   <a:cs typeface="Courier New" panose="02070309020205020404" pitchFamily="49" charset="0"/>
                 </a:rPr>
                 <a:t>=</a:t>
               </a:r>
               <a:r>
-                <a:rPr lang="nl-BE" sz="1600" dirty="0" err="1">
+                <a:rPr lang="nl-BE" sz="1600" dirty="0" err="1" smtClean="0">
                   <a:latin typeface="Courier New" panose="02070309020205020404" pitchFamily="49" charset="0"/>
                   <a:cs typeface="Courier New" panose="02070309020205020404" pitchFamily="49" charset="0"/>
                 </a:rPr>
                 <a:t>cythonize</a:t>
               </a:r>
               <a:r>
-                <a:rPr lang="nl-BE" sz="1600" dirty="0">
-                  <a:latin typeface="Courier New" panose="02070309020205020404" pitchFamily="49" charset="0"/>
-                  <a:cs typeface="Courier New" panose="02070309020205020404" pitchFamily="49" charset="0"/>
-                </a:rPr>
-                <a:t>("</a:t>
+                <a:rPr lang="nl-BE" sz="1600" dirty="0" smtClean="0">
+                  <a:latin typeface="Courier New" panose="02070309020205020404" pitchFamily="49" charset="0"/>
+                  <a:cs typeface="Courier New" panose="02070309020205020404" pitchFamily="49" charset="0"/>
+                </a:rPr>
+                <a:t>('</a:t>
               </a:r>
               <a:r>
                 <a:rPr lang="nl-BE" sz="1600" dirty="0" err="1" smtClean="0">
                   <a:latin typeface="Courier New" panose="02070309020205020404" pitchFamily="49" charset="0"/>
                   <a:cs typeface="Courier New" panose="02070309020205020404" pitchFamily="49" charset="0"/>
                 </a:rPr>
-                <a:t>primes_cython.pyx</a:t>
-              </a:r>
-              <a:r>
-                <a:rPr lang="nl-BE" sz="1600" dirty="0">
-                  <a:latin typeface="Courier New" panose="02070309020205020404" pitchFamily="49" charset="0"/>
-                  <a:cs typeface="Courier New" panose="02070309020205020404" pitchFamily="49" charset="0"/>
-                </a:rPr>
-                <a:t>")</a:t>
-              </a:r>
+                <a:t>primes_c.pyx</a:t>
+              </a:r>
+              <a:r>
+                <a:rPr lang="nl-BE" sz="1600" dirty="0" smtClean="0">
+                  <a:latin typeface="Courier New" panose="02070309020205020404" pitchFamily="49" charset="0"/>
+                  <a:cs typeface="Courier New" panose="02070309020205020404" pitchFamily="49" charset="0"/>
+                </a:rPr>
+                <a:t>')</a:t>
+              </a:r>
+              <a:endParaRPr lang="nl-BE" sz="1600" dirty="0">
+                <a:latin typeface="Courier New" panose="02070309020205020404" pitchFamily="49" charset="0"/>
+                <a:cs typeface="Courier New" panose="02070309020205020404" pitchFamily="49" charset="0"/>
+              </a:endParaRPr>
             </a:p>
             <a:p>
               <a:r>
@@ -6241,7 +6255,7 @@
                   <a:latin typeface="Courier New" panose="02070309020205020404" pitchFamily="49" charset="0"/>
                   <a:cs typeface="Courier New" panose="02070309020205020404" pitchFamily="49" charset="0"/>
                 </a:rPr>
-                <a:t>primes_cython</a:t>
+                <a:t>primes_c</a:t>
               </a:r>
               <a:r>
                 <a:rPr lang="nl-BE" sz="1600" dirty="0" smtClean="0">

</xml_diff>

<commit_message>
Added first slides on types
</commit_message>
<xml_diff>
--- a/Python/Cython/cython.pptx
+++ b/Python/Cython/cython.pptx
@@ -5,7 +5,7 @@
     <p:sldMasterId id="2147483648" r:id="rId1"/>
   </p:sldMasterIdLst>
   <p:notesMasterIdLst>
-    <p:notesMasterId r:id="rId9"/>
+    <p:notesMasterId r:id="rId12"/>
   </p:notesMasterIdLst>
   <p:sldIdLst>
     <p:sldId id="256" r:id="rId2"/>
@@ -15,6 +15,9 @@
     <p:sldId id="260" r:id="rId6"/>
     <p:sldId id="259" r:id="rId7"/>
     <p:sldId id="261" r:id="rId8"/>
+    <p:sldId id="263" r:id="rId9"/>
+    <p:sldId id="264" r:id="rId10"/>
+    <p:sldId id="265" r:id="rId11"/>
   </p:sldIdLst>
   <p:sldSz cx="9144000" cy="6858000" type="screen4x3"/>
   <p:notesSz cx="6858000" cy="9144000"/>
@@ -129,9 +132,26 @@
             <p14:sldId id="260"/>
             <p14:sldId id="259"/>
             <p14:sldId id="261"/>
+            <p14:sldId id="263"/>
+            <p14:sldId id="264"/>
+            <p14:sldId id="265"/>
           </p14:sldIdLst>
         </p14:section>
       </p14:sectionLst>
+    </p:ext>
+    <p:ext uri="{EFAFB233-063F-42B5-8137-9DF3F51BA10A}">
+      <p15:sldGuideLst xmlns:p15="http://schemas.microsoft.com/office/powerpoint/2012/main">
+        <p15:guide id="1" orient="horz" pos="2160">
+          <p15:clr>
+            <a:srgbClr val="A4A3A4"/>
+          </p15:clr>
+        </p15:guide>
+        <p15:guide id="2" pos="2880">
+          <p15:clr>
+            <a:srgbClr val="A4A3A4"/>
+          </p15:clr>
+        </p15:guide>
+      </p15:sldGuideLst>
     </p:ext>
   </p:extLst>
 </p:presentation>
@@ -219,7 +239,7 @@
           <a:p>
             <a:fld id="{16B045E4-7DA3-41B9-B0DA-4BEE0876FA88}" type="datetimeFigureOut">
               <a:rPr lang="nl-BE" smtClean="0"/>
-              <a:t>10/02/2016</a:t>
+              <a:t>2016-02-11</a:t>
             </a:fld>
             <a:endParaRPr lang="nl-BE"/>
           </a:p>
@@ -668,7 +688,7 @@
           <a:p>
             <a:fld id="{53B2420D-148A-400F-B88D-527DF6E13622}" type="datetime1">
               <a:rPr lang="en-US" smtClean="0"/>
-              <a:t>2016-02-10</a:t>
+              <a:t>2/11/2016</a:t>
             </a:fld>
             <a:endParaRPr lang="en-US"/>
           </a:p>
@@ -834,7 +854,7 @@
           <a:p>
             <a:fld id="{52A01B9A-6787-4B63-BAEF-E3CF67589D82}" type="datetime1">
               <a:rPr lang="en-US" smtClean="0"/>
-              <a:t>2016-02-10</a:t>
+              <a:t>2/11/2016</a:t>
             </a:fld>
             <a:endParaRPr lang="en-US"/>
           </a:p>
@@ -1010,7 +1030,7 @@
           <a:p>
             <a:fld id="{6E982D42-2071-4A3D-B614-2380183202E1}" type="datetime1">
               <a:rPr lang="en-US" smtClean="0"/>
-              <a:t>2016-02-10</a:t>
+              <a:t>2/11/2016</a:t>
             </a:fld>
             <a:endParaRPr lang="en-US"/>
           </a:p>
@@ -1176,7 +1196,7 @@
           <a:p>
             <a:fld id="{2E90E067-04B9-40C0-BFE6-53BAD2F7119C}" type="datetime1">
               <a:rPr lang="en-US" smtClean="0"/>
-              <a:t>2016-02-10</a:t>
+              <a:t>2/11/2016</a:t>
             </a:fld>
             <a:endParaRPr lang="en-US"/>
           </a:p>
@@ -1418,7 +1438,7 @@
           <a:p>
             <a:fld id="{D7CB2E72-949E-4479-B957-DBA32EC1FAB9}" type="datetime1">
               <a:rPr lang="en-US" smtClean="0"/>
-              <a:t>2016-02-10</a:t>
+              <a:t>2/11/2016</a:t>
             </a:fld>
             <a:endParaRPr lang="en-US"/>
           </a:p>
@@ -1702,7 +1722,7 @@
           <a:p>
             <a:fld id="{A06819D6-C5C8-405A-96EE-DAC9728267C0}" type="datetime1">
               <a:rPr lang="en-US" smtClean="0"/>
-              <a:t>2016-02-10</a:t>
+              <a:t>2/11/2016</a:t>
             </a:fld>
             <a:endParaRPr lang="en-US"/>
           </a:p>
@@ -2120,7 +2140,7 @@
           <a:p>
             <a:fld id="{476A766D-F1AD-47B2-B323-71C0AAEFC468}" type="datetime1">
               <a:rPr lang="en-US" smtClean="0"/>
-              <a:t>2016-02-10</a:t>
+              <a:t>2/11/2016</a:t>
             </a:fld>
             <a:endParaRPr lang="en-US"/>
           </a:p>
@@ -2234,7 +2254,7 @@
           <a:p>
             <a:fld id="{E8021487-0835-4E27-A96A-FE7FCF3265BD}" type="datetime1">
               <a:rPr lang="en-US" smtClean="0"/>
-              <a:t>2016-02-10</a:t>
+              <a:t>2/11/2016</a:t>
             </a:fld>
             <a:endParaRPr lang="en-US"/>
           </a:p>
@@ -2325,7 +2345,7 @@
           <a:p>
             <a:fld id="{D8423321-723F-439B-A2FC-3D1497BCF824}" type="datetime1">
               <a:rPr lang="en-US" smtClean="0"/>
-              <a:t>2016-02-10</a:t>
+              <a:t>2/11/2016</a:t>
             </a:fld>
             <a:endParaRPr lang="en-US"/>
           </a:p>
@@ -2598,7 +2618,7 @@
           <a:p>
             <a:fld id="{C23318F9-3CB8-42B9-8393-7570C1C1A70D}" type="datetime1">
               <a:rPr lang="en-US" smtClean="0"/>
-              <a:t>2016-02-10</a:t>
+              <a:t>2/11/2016</a:t>
             </a:fld>
             <a:endParaRPr lang="en-US"/>
           </a:p>
@@ -2847,7 +2867,7 @@
           <a:p>
             <a:fld id="{6867E127-D066-4A1C-B918-F70FF61E725D}" type="datetime1">
               <a:rPr lang="en-US" smtClean="0"/>
-              <a:t>2016-02-10</a:t>
+              <a:t>2/11/2016</a:t>
             </a:fld>
             <a:endParaRPr lang="en-US"/>
           </a:p>
@@ -3056,7 +3076,7 @@
           <a:p>
             <a:fld id="{E6FF7314-6885-4B6E-804E-F9FE9C155D78}" type="datetime1">
               <a:rPr lang="en-US" smtClean="0"/>
-              <a:t>2016-02-10</a:t>
+              <a:t>2/11/2016</a:t>
             </a:fld>
             <a:endParaRPr lang="en-US"/>
           </a:p>
@@ -3527,6 +3547,222 @@
 </p:sld>
 </file>
 
+<file path=ppt/slides/slide10.xml><?xml version="1.0" encoding="utf-8"?>
+<p:sld xmlns:a="http://schemas.openxmlformats.org/drawingml/2006/main" xmlns:r="http://schemas.openxmlformats.org/officeDocument/2006/relationships" xmlns:p="http://schemas.openxmlformats.org/presentationml/2006/main">
+  <p:cSld>
+    <p:spTree>
+      <p:nvGrpSpPr>
+        <p:cNvPr id="1" name=""/>
+        <p:cNvGrpSpPr/>
+        <p:nvPr/>
+      </p:nvGrpSpPr>
+      <p:grpSpPr>
+        <a:xfrm>
+          <a:off x="0" y="0"/>
+          <a:ext cx="0" cy="0"/>
+          <a:chOff x="0" y="0"/>
+          <a:chExt cx="0" cy="0"/>
+        </a:xfrm>
+      </p:grpSpPr>
+      <p:sp>
+        <p:nvSpPr>
+          <p:cNvPr id="2" name="Title 1"/>
+          <p:cNvSpPr>
+            <a:spLocks noGrp="1"/>
+          </p:cNvSpPr>
+          <p:nvPr>
+            <p:ph type="title"/>
+          </p:nvPr>
+        </p:nvSpPr>
+        <p:spPr/>
+        <p:txBody>
+          <a:bodyPr/>
+          <a:lstStyle/>
+          <a:p>
+            <a:r>
+              <a:rPr lang="en-US" dirty="0" smtClean="0"/>
+              <a:t>C type declarations</a:t>
+            </a:r>
+            <a:endParaRPr lang="nl-BE" dirty="0"/>
+          </a:p>
+        </p:txBody>
+      </p:sp>
+      <p:sp>
+        <p:nvSpPr>
+          <p:cNvPr id="3" name="Content Placeholder 2"/>
+          <p:cNvSpPr>
+            <a:spLocks noGrp="1"/>
+          </p:cNvSpPr>
+          <p:nvPr>
+            <p:ph idx="1"/>
+          </p:nvPr>
+        </p:nvSpPr>
+        <p:spPr/>
+        <p:txBody>
+          <a:bodyPr/>
+          <a:lstStyle/>
+          <a:p>
+            <a:r>
+              <a:rPr lang="en-US" dirty="0" smtClean="0"/>
+              <a:t>Statically defined type: used at compile time</a:t>
+            </a:r>
+          </a:p>
+          <a:p>
+            <a:r>
+              <a:rPr lang="en-US" dirty="0" smtClean="0"/>
+              <a:t>Use </a:t>
+            </a:r>
+            <a:r>
+              <a:rPr lang="en-US" dirty="0" err="1" smtClean="0">
+                <a:latin typeface="Courier New" panose="02070309020205020404" pitchFamily="49" charset="0"/>
+                <a:cs typeface="Courier New" panose="02070309020205020404" pitchFamily="49" charset="0"/>
+              </a:rPr>
+              <a:t>cdef</a:t>
+            </a:r>
+            <a:r>
+              <a:rPr lang="en-US" dirty="0" smtClean="0"/>
+              <a:t> </a:t>
+            </a:r>
+            <a:r>
+              <a:rPr lang="en-US" dirty="0" err="1" smtClean="0"/>
+              <a:t>Cython</a:t>
+            </a:r>
+            <a:r>
+              <a:rPr lang="en-US" dirty="0" smtClean="0"/>
+              <a:t> keyword for declaration</a:t>
+            </a:r>
+          </a:p>
+          <a:p>
+            <a:r>
+              <a:rPr lang="en-US" dirty="0" smtClean="0"/>
+              <a:t>E.g.,</a:t>
+            </a:r>
+          </a:p>
+          <a:p>
+            <a:endParaRPr lang="en-US" dirty="0"/>
+          </a:p>
+          <a:p>
+            <a:endParaRPr lang="en-US" dirty="0" smtClean="0"/>
+          </a:p>
+          <a:p>
+            <a:r>
+              <a:rPr lang="en-US" dirty="0" smtClean="0"/>
+              <a:t>Python types with C implementation</a:t>
+            </a:r>
+            <a:endParaRPr lang="nl-BE" dirty="0"/>
+          </a:p>
+        </p:txBody>
+      </p:sp>
+      <p:sp>
+        <p:nvSpPr>
+          <p:cNvPr id="4" name="Slide Number Placeholder 3"/>
+          <p:cNvSpPr>
+            <a:spLocks noGrp="1"/>
+          </p:cNvSpPr>
+          <p:nvPr>
+            <p:ph type="sldNum" sz="quarter" idx="12"/>
+          </p:nvPr>
+        </p:nvSpPr>
+        <p:spPr/>
+        <p:txBody>
+          <a:bodyPr/>
+          <a:lstStyle/>
+          <a:p>
+            <a:fld id="{B6F15528-21DE-4FAA-801E-634DDDAF4B2B}" type="slidenum">
+              <a:rPr lang="en-US" smtClean="0"/>
+              <a:pPr/>
+              <a:t>10</a:t>
+            </a:fld>
+            <a:endParaRPr lang="en-US"/>
+          </a:p>
+        </p:txBody>
+      </p:sp>
+      <p:sp>
+        <p:nvSpPr>
+          <p:cNvPr id="6" name="TextBox 5"/>
+          <p:cNvSpPr txBox="1"/>
+          <p:nvPr/>
+        </p:nvSpPr>
+        <p:spPr>
+          <a:xfrm>
+            <a:off x="1675214" y="3429000"/>
+            <a:ext cx="1961947" cy="646331"/>
+          </a:xfrm>
+          <a:prstGeom prst="rect">
+            <a:avLst/>
+          </a:prstGeom>
+          <a:solidFill>
+            <a:schemeClr val="bg1">
+              <a:lumMod val="85000"/>
+            </a:schemeClr>
+          </a:solidFill>
+          <a:ln>
+            <a:solidFill>
+              <a:schemeClr val="tx1"/>
+            </a:solidFill>
+          </a:ln>
+        </p:spPr>
+        <p:txBody>
+          <a:bodyPr wrap="none" rtlCol="0">
+            <a:spAutoFit/>
+          </a:bodyPr>
+          <a:lstStyle/>
+          <a:p>
+            <a:r>
+              <a:rPr lang="en-US" dirty="0" err="1" smtClean="0"/>
+              <a:t>cdef</a:t>
+            </a:r>
+            <a:r>
+              <a:rPr lang="en-US" dirty="0" smtClean="0"/>
+              <a:t> </a:t>
+            </a:r>
+            <a:r>
+              <a:rPr lang="en-US" dirty="0" err="1" smtClean="0"/>
+              <a:t>int</a:t>
+            </a:r>
+            <a:r>
+              <a:rPr lang="en-US" dirty="0" smtClean="0"/>
+              <a:t> </a:t>
+            </a:r>
+            <a:r>
+              <a:rPr lang="en-US" dirty="0" err="1" smtClean="0"/>
+              <a:t>i</a:t>
+            </a:r>
+            <a:r>
+              <a:rPr lang="en-US" dirty="0" smtClean="0"/>
+              <a:t>, j</a:t>
+            </a:r>
+          </a:p>
+          <a:p>
+            <a:r>
+              <a:rPr lang="en-US" dirty="0" err="1"/>
+              <a:t>c</a:t>
+            </a:r>
+            <a:r>
+              <a:rPr lang="en-US" dirty="0" err="1" smtClean="0"/>
+              <a:t>def</a:t>
+            </a:r>
+            <a:r>
+              <a:rPr lang="en-US" dirty="0" smtClean="0"/>
+              <a:t> double x = 0.0</a:t>
+            </a:r>
+            <a:endParaRPr lang="nl-BE" dirty="0"/>
+          </a:p>
+        </p:txBody>
+      </p:sp>
+    </p:spTree>
+    <p:extLst>
+      <p:ext uri="{BB962C8B-B14F-4D97-AF65-F5344CB8AC3E}">
+        <p14:creationId xmlns:p14="http://schemas.microsoft.com/office/powerpoint/2010/main" val="236179416"/>
+      </p:ext>
+    </p:extLst>
+  </p:cSld>
+  <p:clrMapOvr>
+    <a:masterClrMapping/>
+  </p:clrMapOvr>
+</p:sld>
+</file>
+
 <file path=ppt/slides/slide2.xml><?xml version="1.0" encoding="utf-8"?>
 <p:sld xmlns:a="http://schemas.openxmlformats.org/drawingml/2006/main" xmlns:r="http://schemas.openxmlformats.org/officeDocument/2006/relationships" xmlns:p="http://schemas.openxmlformats.org/presentationml/2006/main">
   <p:cSld>
@@ -4137,17 +4373,27 @@
           <a:lstStyle/>
           <a:p>
             <a:r>
-              <a:rPr lang="nl-BE" dirty="0">
+              <a:rPr lang="nl-BE" b="1" dirty="0">
+                <a:solidFill>
+                  <a:srgbClr val="00B050"/>
+                </a:solidFill>
+                <a:latin typeface="Courier New" panose="02070309020205020404" pitchFamily="49" charset="0"/>
+                <a:cs typeface="Courier New" panose="02070309020205020404" pitchFamily="49" charset="0"/>
+              </a:rPr>
+              <a:t>In [1]:</a:t>
+            </a:r>
+            <a:r>
+              <a:rPr lang="nl-BE" b="1" dirty="0">
                 <a:solidFill>
                   <a:schemeClr val="bg1"/>
                 </a:solidFill>
                 <a:latin typeface="Courier New" panose="02070309020205020404" pitchFamily="49" charset="0"/>
                 <a:cs typeface="Courier New" panose="02070309020205020404" pitchFamily="49" charset="0"/>
               </a:rPr>
-              <a:t>In [1]: import </a:t>
-            </a:r>
-            <a:r>
-              <a:rPr lang="nl-BE" dirty="0" err="1">
+              <a:t> import </a:t>
+            </a:r>
+            <a:r>
+              <a:rPr lang="nl-BE" b="1" dirty="0" err="1">
                 <a:solidFill>
                   <a:schemeClr val="bg1"/>
                 </a:solidFill>
@@ -4156,7 +4402,7 @@
               </a:rPr>
               <a:t>primes_vanilla</a:t>
             </a:r>
-            <a:endParaRPr lang="nl-BE" dirty="0">
+            <a:endParaRPr lang="nl-BE" b="1" dirty="0">
               <a:solidFill>
                 <a:schemeClr val="bg1"/>
               </a:solidFill>
@@ -4165,7 +4411,7 @@
             </a:endParaRPr>
           </a:p>
           <a:p>
-            <a:endParaRPr lang="nl-BE" dirty="0">
+            <a:endParaRPr lang="nl-BE" b="1" dirty="0">
               <a:solidFill>
                 <a:schemeClr val="bg1"/>
               </a:solidFill>
@@ -4175,17 +4421,27 @@
           </a:p>
           <a:p>
             <a:r>
-              <a:rPr lang="nl-BE" dirty="0">
+              <a:rPr lang="nl-BE" b="1" dirty="0">
+                <a:solidFill>
+                  <a:srgbClr val="00B050"/>
+                </a:solidFill>
+                <a:latin typeface="Courier New" panose="02070309020205020404" pitchFamily="49" charset="0"/>
+                <a:cs typeface="Courier New" panose="02070309020205020404" pitchFamily="49" charset="0"/>
+              </a:rPr>
+              <a:t>In [2]:</a:t>
+            </a:r>
+            <a:r>
+              <a:rPr lang="nl-BE" b="1" dirty="0">
                 <a:solidFill>
                   <a:schemeClr val="bg1"/>
                 </a:solidFill>
                 <a:latin typeface="Courier New" panose="02070309020205020404" pitchFamily="49" charset="0"/>
                 <a:cs typeface="Courier New" panose="02070309020205020404" pitchFamily="49" charset="0"/>
               </a:rPr>
-              <a:t>In [2]: import </a:t>
-            </a:r>
-            <a:r>
-              <a:rPr lang="nl-BE" dirty="0" err="1" smtClean="0">
+              <a:t> import </a:t>
+            </a:r>
+            <a:r>
+              <a:rPr lang="nl-BE" b="1" dirty="0" err="1" smtClean="0">
                 <a:solidFill>
                   <a:schemeClr val="bg1"/>
                 </a:solidFill>
@@ -4194,7 +4450,7 @@
               </a:rPr>
               <a:t>primes_cython</a:t>
             </a:r>
-            <a:endParaRPr lang="nl-BE" dirty="0">
+            <a:endParaRPr lang="nl-BE" b="1" dirty="0">
               <a:solidFill>
                 <a:schemeClr val="bg1"/>
               </a:solidFill>
@@ -4203,7 +4459,7 @@
             </a:endParaRPr>
           </a:p>
           <a:p>
-            <a:endParaRPr lang="nl-BE" dirty="0">
+            <a:endParaRPr lang="nl-BE" b="1" dirty="0">
               <a:solidFill>
                 <a:schemeClr val="bg1"/>
               </a:solidFill>
@@ -4213,17 +4469,27 @@
           </a:p>
           <a:p>
             <a:r>
-              <a:rPr lang="nl-BE" dirty="0">
+              <a:rPr lang="nl-BE" b="1" dirty="0">
+                <a:solidFill>
+                  <a:srgbClr val="00B050"/>
+                </a:solidFill>
+                <a:latin typeface="Courier New" panose="02070309020205020404" pitchFamily="49" charset="0"/>
+                <a:cs typeface="Courier New" panose="02070309020205020404" pitchFamily="49" charset="0"/>
+              </a:rPr>
+              <a:t>In [3]:</a:t>
+            </a:r>
+            <a:r>
+              <a:rPr lang="nl-BE" b="1" dirty="0">
                 <a:solidFill>
                   <a:schemeClr val="bg1"/>
                 </a:solidFill>
                 <a:latin typeface="Courier New" panose="02070309020205020404" pitchFamily="49" charset="0"/>
                 <a:cs typeface="Courier New" panose="02070309020205020404" pitchFamily="49" charset="0"/>
               </a:rPr>
-              <a:t>In [3]: %</a:t>
-            </a:r>
-            <a:r>
-              <a:rPr lang="nl-BE" dirty="0" err="1">
+              <a:t> %</a:t>
+            </a:r>
+            <a:r>
+              <a:rPr lang="nl-BE" b="1" dirty="0" err="1">
                 <a:solidFill>
                   <a:schemeClr val="bg1"/>
                 </a:solidFill>
@@ -4233,7 +4499,7 @@
               <a:t>timeit</a:t>
             </a:r>
             <a:r>
-              <a:rPr lang="nl-BE" dirty="0">
+              <a:rPr lang="nl-BE" b="1" dirty="0">
                 <a:solidFill>
                   <a:schemeClr val="bg1"/>
                 </a:solidFill>
@@ -4243,7 +4509,7 @@
               <a:t> </a:t>
             </a:r>
             <a:r>
-              <a:rPr lang="nl-BE" dirty="0" err="1" smtClean="0">
+              <a:rPr lang="nl-BE" b="1" dirty="0" err="1" smtClean="0">
                 <a:solidFill>
                   <a:schemeClr val="bg1"/>
                 </a:solidFill>
@@ -4253,7 +4519,7 @@
               <a:t>primes_c.primes</a:t>
             </a:r>
             <a:r>
-              <a:rPr lang="nl-BE" dirty="0" smtClean="0">
+              <a:rPr lang="nl-BE" b="1" dirty="0" smtClean="0">
                 <a:solidFill>
                   <a:schemeClr val="bg1"/>
                 </a:solidFill>
@@ -4263,7 +4529,7 @@
               <a:t>(1000</a:t>
             </a:r>
             <a:r>
-              <a:rPr lang="nl-BE" dirty="0">
+              <a:rPr lang="nl-BE" b="1" dirty="0">
                 <a:solidFill>
                   <a:schemeClr val="bg1"/>
                 </a:solidFill>
@@ -4275,7 +4541,7 @@
           </a:p>
           <a:p>
             <a:r>
-              <a:rPr lang="nl-BE" dirty="0">
+              <a:rPr lang="nl-BE" b="1" dirty="0">
                 <a:solidFill>
                   <a:schemeClr val="bg1"/>
                 </a:solidFill>
@@ -4285,7 +4551,7 @@
               <a:t>100 loops, best of 3: </a:t>
             </a:r>
             <a:r>
-              <a:rPr lang="nl-BE" dirty="0">
+              <a:rPr lang="nl-BE" b="1" dirty="0">
                 <a:solidFill>
                   <a:srgbClr val="FF0000"/>
                 </a:solidFill>
@@ -4295,7 +4561,7 @@
               <a:t>4.89 ms</a:t>
             </a:r>
             <a:r>
-              <a:rPr lang="nl-BE" dirty="0">
+              <a:rPr lang="nl-BE" b="1" dirty="0">
                 <a:solidFill>
                   <a:schemeClr val="bg1"/>
                 </a:solidFill>
@@ -4306,7 +4572,7 @@
             </a:r>
           </a:p>
           <a:p>
-            <a:endParaRPr lang="nl-BE" dirty="0">
+            <a:endParaRPr lang="nl-BE" b="1" dirty="0">
               <a:solidFill>
                 <a:schemeClr val="bg1"/>
               </a:solidFill>
@@ -4316,17 +4582,27 @@
           </a:p>
           <a:p>
             <a:r>
-              <a:rPr lang="nl-BE" dirty="0">
+              <a:rPr lang="nl-BE" b="1" dirty="0">
+                <a:solidFill>
+                  <a:srgbClr val="00B050"/>
+                </a:solidFill>
+                <a:latin typeface="Courier New" panose="02070309020205020404" pitchFamily="49" charset="0"/>
+                <a:cs typeface="Courier New" panose="02070309020205020404" pitchFamily="49" charset="0"/>
+              </a:rPr>
+              <a:t>In [4]:</a:t>
+            </a:r>
+            <a:r>
+              <a:rPr lang="nl-BE" b="1" dirty="0">
                 <a:solidFill>
                   <a:schemeClr val="bg1"/>
                 </a:solidFill>
                 <a:latin typeface="Courier New" panose="02070309020205020404" pitchFamily="49" charset="0"/>
                 <a:cs typeface="Courier New" panose="02070309020205020404" pitchFamily="49" charset="0"/>
               </a:rPr>
-              <a:t>In [4]: %</a:t>
-            </a:r>
-            <a:r>
-              <a:rPr lang="nl-BE" dirty="0" err="1">
+              <a:t> %</a:t>
+            </a:r>
+            <a:r>
+              <a:rPr lang="nl-BE" b="1" dirty="0" err="1">
                 <a:solidFill>
                   <a:schemeClr val="bg1"/>
                 </a:solidFill>
@@ -4336,7 +4612,7 @@
               <a:t>timeit</a:t>
             </a:r>
             <a:r>
-              <a:rPr lang="nl-BE" dirty="0">
+              <a:rPr lang="nl-BE" b="1" dirty="0">
                 <a:solidFill>
                   <a:schemeClr val="bg1"/>
                 </a:solidFill>
@@ -4346,7 +4622,7 @@
               <a:t> </a:t>
             </a:r>
             <a:r>
-              <a:rPr lang="nl-BE" dirty="0" err="1" smtClean="0">
+              <a:rPr lang="nl-BE" b="1" dirty="0" err="1" smtClean="0">
                 <a:solidFill>
                   <a:schemeClr val="bg1"/>
                 </a:solidFill>
@@ -4356,7 +4632,7 @@
               <a:t>primes_p.primes</a:t>
             </a:r>
             <a:r>
-              <a:rPr lang="nl-BE" dirty="0" smtClean="0">
+              <a:rPr lang="nl-BE" b="1" dirty="0" smtClean="0">
                 <a:solidFill>
                   <a:schemeClr val="bg1"/>
                 </a:solidFill>
@@ -4366,7 +4642,7 @@
               <a:t>(1000</a:t>
             </a:r>
             <a:r>
-              <a:rPr lang="nl-BE" dirty="0">
+              <a:rPr lang="nl-BE" b="1" dirty="0">
                 <a:solidFill>
                   <a:schemeClr val="bg1"/>
                 </a:solidFill>
@@ -4378,7 +4654,7 @@
           </a:p>
           <a:p>
             <a:r>
-              <a:rPr lang="nl-BE" dirty="0">
+              <a:rPr lang="nl-BE" b="1" dirty="0">
                 <a:solidFill>
                   <a:schemeClr val="bg1"/>
                 </a:solidFill>
@@ -4388,7 +4664,7 @@
               <a:t>1 loops, best of 3: </a:t>
             </a:r>
             <a:r>
-              <a:rPr lang="nl-BE" dirty="0">
+              <a:rPr lang="nl-BE" b="1" dirty="0">
                 <a:solidFill>
                   <a:srgbClr val="FF0000"/>
                 </a:solidFill>
@@ -4398,7 +4674,7 @@
               <a:t>356 ms</a:t>
             </a:r>
             <a:r>
-              <a:rPr lang="nl-BE" dirty="0">
+              <a:rPr lang="nl-BE" b="1" dirty="0">
                 <a:solidFill>
                   <a:schemeClr val="bg1"/>
                 </a:solidFill>
@@ -4409,7 +4685,7 @@
             </a:r>
           </a:p>
           <a:p>
-            <a:endParaRPr lang="nl-BE" dirty="0">
+            <a:endParaRPr lang="nl-BE" b="1" dirty="0">
               <a:solidFill>
                 <a:schemeClr val="bg1"/>
               </a:solidFill>
@@ -4602,11 +4878,7 @@
             </a:r>
             <a:r>
               <a:rPr lang="en-US" sz="2400" dirty="0" smtClean="0"/>
-              <a:t> </a:t>
-            </a:r>
-            <a:r>
-              <a:rPr lang="en-US" sz="2400" dirty="0" smtClean="0"/>
-              <a:t>is it?</a:t>
+              <a:t> is it?</a:t>
             </a:r>
             <a:endParaRPr lang="nl-BE" sz="2400" dirty="0"/>
           </a:p>
@@ -4702,6 +4974,11 @@
             <a:chOff x="304800" y="1371600"/>
             <a:chExt cx="3887603" cy="5018809"/>
           </a:xfrm>
+          <a:solidFill>
+            <a:schemeClr val="bg1">
+              <a:lumMod val="85000"/>
+            </a:schemeClr>
+          </a:solidFill>
         </p:grpSpPr>
         <p:sp>
           <p:nvSpPr>
@@ -4717,7 +4994,7 @@
             <a:prstGeom prst="rect">
               <a:avLst/>
             </a:prstGeom>
-            <a:noFill/>
+            <a:grpFill/>
             <a:ln>
               <a:solidFill>
                 <a:schemeClr val="tx1"/>
@@ -5186,7 +5463,7 @@
             <a:prstGeom prst="rect">
               <a:avLst/>
             </a:prstGeom>
-            <a:noFill/>
+            <a:grpFill/>
             <a:ln>
               <a:solidFill>
                 <a:schemeClr val="tx1"/>
@@ -5221,6 +5498,11 @@
             <a:chOff x="4951597" y="1371600"/>
             <a:chExt cx="3887603" cy="5017532"/>
           </a:xfrm>
+          <a:solidFill>
+            <a:schemeClr val="bg1">
+              <a:lumMod val="85000"/>
+            </a:schemeClr>
+          </a:solidFill>
         </p:grpSpPr>
         <p:sp>
           <p:nvSpPr>
@@ -5236,7 +5518,7 @@
             <a:prstGeom prst="rect">
               <a:avLst/>
             </a:prstGeom>
-            <a:noFill/>
+            <a:grpFill/>
             <a:ln>
               <a:solidFill>
                 <a:schemeClr val="tx1"/>
@@ -5667,7 +5949,7 @@
             <a:prstGeom prst="rect">
               <a:avLst/>
             </a:prstGeom>
-            <a:noFill/>
+            <a:grpFill/>
             <a:ln>
               <a:solidFill>
                 <a:schemeClr val="tx1"/>
@@ -5788,6 +6070,11 @@
             <a:chOff x="304800" y="1371600"/>
             <a:chExt cx="5863144" cy="1817132"/>
           </a:xfrm>
+          <a:solidFill>
+            <a:schemeClr val="bg1">
+              <a:lumMod val="85000"/>
+            </a:schemeClr>
+          </a:solidFill>
         </p:grpSpPr>
         <p:sp>
           <p:nvSpPr>
@@ -5803,7 +6090,7 @@
             <a:prstGeom prst="rect">
               <a:avLst/>
             </a:prstGeom>
-            <a:noFill/>
+            <a:grpFill/>
             <a:ln>
               <a:solidFill>
                 <a:schemeClr val="tx1"/>
@@ -5987,7 +6274,7 @@
             <a:prstGeom prst="rect">
               <a:avLst/>
             </a:prstGeom>
-            <a:noFill/>
+            <a:grpFill/>
             <a:ln>
               <a:solidFill>
                 <a:schemeClr val="tx1"/>
@@ -6034,7 +6321,7 @@
           <a:lstStyle/>
           <a:p>
             <a:r>
-              <a:rPr lang="nl-BE" dirty="0">
+              <a:rPr lang="nl-BE" b="1" dirty="0">
                 <a:solidFill>
                   <a:schemeClr val="bg1"/>
                 </a:solidFill>
@@ -6044,7 +6331,7 @@
               <a:t>$  </a:t>
             </a:r>
             <a:r>
-              <a:rPr lang="nl-BE" dirty="0" smtClean="0">
+              <a:rPr lang="nl-BE" b="1" dirty="0" smtClean="0">
                 <a:solidFill>
                   <a:schemeClr val="bg1"/>
                 </a:solidFill>
@@ -6054,7 +6341,7 @@
               <a:t>python  setup.py  </a:t>
             </a:r>
             <a:r>
-              <a:rPr lang="nl-BE" dirty="0" err="1">
+              <a:rPr lang="nl-BE" b="1" dirty="0" err="1">
                 <a:solidFill>
                   <a:schemeClr val="bg1"/>
                 </a:solidFill>
@@ -6064,7 +6351,7 @@
               <a:t>build_ext</a:t>
             </a:r>
             <a:r>
-              <a:rPr lang="nl-BE" dirty="0">
+              <a:rPr lang="nl-BE" b="1" dirty="0">
                 <a:solidFill>
                   <a:schemeClr val="bg1"/>
                 </a:solidFill>
@@ -6074,7 +6361,7 @@
               <a:t> </a:t>
             </a:r>
             <a:r>
-              <a:rPr lang="nl-BE" dirty="0" smtClean="0">
+              <a:rPr lang="nl-BE" b="1" dirty="0" smtClean="0">
                 <a:solidFill>
                   <a:schemeClr val="bg1"/>
                 </a:solidFill>
@@ -6084,7 +6371,7 @@
               <a:t> --</a:t>
             </a:r>
             <a:r>
-              <a:rPr lang="nl-BE" dirty="0" err="1">
+              <a:rPr lang="nl-BE" b="1" dirty="0" err="1">
                 <a:solidFill>
                   <a:schemeClr val="bg1"/>
                 </a:solidFill>
@@ -6093,7 +6380,7 @@
               </a:rPr>
               <a:t>inplace</a:t>
             </a:r>
-            <a:endParaRPr lang="nl-BE" dirty="0">
+            <a:endParaRPr lang="nl-BE" b="1" dirty="0">
               <a:solidFill>
                 <a:schemeClr val="bg1"/>
               </a:solidFill>
@@ -6165,6 +6452,11 @@
             <a:chOff x="304800" y="1371600"/>
             <a:chExt cx="5868042" cy="1817132"/>
           </a:xfrm>
+          <a:solidFill>
+            <a:schemeClr val="bg1">
+              <a:lumMod val="85000"/>
+            </a:schemeClr>
+          </a:solidFill>
         </p:grpSpPr>
         <p:sp>
           <p:nvSpPr>
@@ -6180,7 +6472,7 @@
             <a:prstGeom prst="rect">
               <a:avLst/>
             </a:prstGeom>
-            <a:noFill/>
+            <a:grpFill/>
             <a:ln>
               <a:solidFill>
                 <a:schemeClr val="tx1"/>
@@ -6399,7 +6691,7 @@
             <a:prstGeom prst="rect">
               <a:avLst/>
             </a:prstGeom>
-            <a:noFill/>
+            <a:grpFill/>
             <a:ln>
               <a:solidFill>
                 <a:schemeClr val="tx1"/>
@@ -6425,6 +6717,687 @@
     <p:extLst>
       <p:ext uri="{BB962C8B-B14F-4D97-AF65-F5344CB8AC3E}">
         <p14:creationId xmlns:p14="http://schemas.microsoft.com/office/powerpoint/2010/main" val="1616982279"/>
+      </p:ext>
+    </p:extLst>
+  </p:cSld>
+  <p:clrMapOvr>
+    <a:masterClrMapping/>
+  </p:clrMapOvr>
+</p:sld>
+</file>
+
+<file path=ppt/slides/slide8.xml><?xml version="1.0" encoding="utf-8"?>
+<p:sld xmlns:a="http://schemas.openxmlformats.org/drawingml/2006/main" xmlns:r="http://schemas.openxmlformats.org/officeDocument/2006/relationships" xmlns:p="http://schemas.openxmlformats.org/presentationml/2006/main">
+  <p:cSld>
+    <p:spTree>
+      <p:nvGrpSpPr>
+        <p:cNvPr id="1" name=""/>
+        <p:cNvGrpSpPr/>
+        <p:nvPr/>
+      </p:nvGrpSpPr>
+      <p:grpSpPr>
+        <a:xfrm>
+          <a:off x="0" y="0"/>
+          <a:ext cx="0" cy="0"/>
+          <a:chOff x="0" y="0"/>
+          <a:chExt cx="0" cy="0"/>
+        </a:xfrm>
+      </p:grpSpPr>
+      <p:sp>
+        <p:nvSpPr>
+          <p:cNvPr id="2" name="Title 1"/>
+          <p:cNvSpPr>
+            <a:spLocks noGrp="1"/>
+          </p:cNvSpPr>
+          <p:nvPr>
+            <p:ph type="title"/>
+          </p:nvPr>
+        </p:nvSpPr>
+        <p:spPr/>
+        <p:txBody>
+          <a:bodyPr/>
+          <a:lstStyle/>
+          <a:p>
+            <a:r>
+              <a:rPr lang="en-US" dirty="0" smtClean="0"/>
+              <a:t>Types</a:t>
+            </a:r>
+            <a:endParaRPr lang="nl-BE" dirty="0"/>
+          </a:p>
+        </p:txBody>
+      </p:sp>
+      <p:sp>
+        <p:nvSpPr>
+          <p:cNvPr id="3" name="Text Placeholder 2"/>
+          <p:cNvSpPr>
+            <a:spLocks noGrp="1"/>
+          </p:cNvSpPr>
+          <p:nvPr>
+            <p:ph type="body" idx="1"/>
+          </p:nvPr>
+        </p:nvSpPr>
+        <p:spPr/>
+        <p:txBody>
+          <a:bodyPr/>
+          <a:lstStyle/>
+          <a:p>
+            <a:endParaRPr lang="nl-BE"/>
+          </a:p>
+        </p:txBody>
+      </p:sp>
+      <p:sp>
+        <p:nvSpPr>
+          <p:cNvPr id="4" name="Slide Number Placeholder 3"/>
+          <p:cNvSpPr>
+            <a:spLocks noGrp="1"/>
+          </p:cNvSpPr>
+          <p:nvPr>
+            <p:ph type="sldNum" sz="quarter" idx="12"/>
+          </p:nvPr>
+        </p:nvSpPr>
+        <p:spPr/>
+        <p:txBody>
+          <a:bodyPr/>
+          <a:lstStyle/>
+          <a:p>
+            <a:fld id="{B6F15528-21DE-4FAA-801E-634DDDAF4B2B}" type="slidenum">
+              <a:rPr lang="en-US" smtClean="0"/>
+              <a:pPr/>
+              <a:t>8</a:t>
+            </a:fld>
+            <a:endParaRPr lang="en-US"/>
+          </a:p>
+        </p:txBody>
+      </p:sp>
+    </p:spTree>
+    <p:extLst>
+      <p:ext uri="{BB962C8B-B14F-4D97-AF65-F5344CB8AC3E}">
+        <p14:creationId xmlns:p14="http://schemas.microsoft.com/office/powerpoint/2010/main" val="408471009"/>
+      </p:ext>
+    </p:extLst>
+  </p:cSld>
+  <p:clrMapOvr>
+    <a:masterClrMapping/>
+  </p:clrMapOvr>
+</p:sld>
+</file>
+
+<file path=ppt/slides/slide9.xml><?xml version="1.0" encoding="utf-8"?>
+<p:sld xmlns:a="http://schemas.openxmlformats.org/drawingml/2006/main" xmlns:r="http://schemas.openxmlformats.org/officeDocument/2006/relationships" xmlns:p="http://schemas.openxmlformats.org/presentationml/2006/main">
+  <p:cSld>
+    <p:spTree>
+      <p:nvGrpSpPr>
+        <p:cNvPr id="1" name=""/>
+        <p:cNvGrpSpPr/>
+        <p:nvPr/>
+      </p:nvGrpSpPr>
+      <p:grpSpPr>
+        <a:xfrm>
+          <a:off x="0" y="0"/>
+          <a:ext cx="0" cy="0"/>
+          <a:chOff x="0" y="0"/>
+          <a:chExt cx="0" cy="0"/>
+        </a:xfrm>
+      </p:grpSpPr>
+      <p:sp>
+        <p:nvSpPr>
+          <p:cNvPr id="2" name="Title 1"/>
+          <p:cNvSpPr>
+            <a:spLocks noGrp="1"/>
+          </p:cNvSpPr>
+          <p:nvPr>
+            <p:ph type="title"/>
+          </p:nvPr>
+        </p:nvSpPr>
+        <p:spPr/>
+        <p:txBody>
+          <a:bodyPr/>
+          <a:lstStyle/>
+          <a:p>
+            <a:r>
+              <a:rPr lang="en-US" dirty="0" smtClean="0"/>
+              <a:t>Type mapping</a:t>
+            </a:r>
+            <a:endParaRPr lang="nl-BE" dirty="0"/>
+          </a:p>
+        </p:txBody>
+      </p:sp>
+      <p:graphicFrame>
+        <p:nvGraphicFramePr>
+          <p:cNvPr id="5" name="Content Placeholder 4"/>
+          <p:cNvGraphicFramePr>
+            <a:graphicFrameLocks noGrp="1"/>
+          </p:cNvGraphicFramePr>
+          <p:nvPr>
+            <p:ph idx="1"/>
+            <p:extLst>
+              <p:ext uri="{D42A27DB-BD31-4B8C-83A1-F6EECF244321}">
+                <p14:modId xmlns:p14="http://schemas.microsoft.com/office/powerpoint/2010/main" val="1954278469"/>
+              </p:ext>
+            </p:extLst>
+          </p:nvPr>
+        </p:nvGraphicFramePr>
+        <p:xfrm>
+          <a:off x="457200" y="1600200"/>
+          <a:ext cx="8229600" cy="3134360"/>
+        </p:xfrm>
+        <a:graphic>
+          <a:graphicData uri="http://schemas.openxmlformats.org/drawingml/2006/table">
+            <a:tbl>
+              <a:tblPr firstRow="1" bandRow="1">
+                <a:tableStyleId>{5C22544A-7EE6-4342-B048-85BDC9FD1C3A}</a:tableStyleId>
+              </a:tblPr>
+              <a:tblGrid>
+                <a:gridCol w="4114800"/>
+                <a:gridCol w="4114800"/>
+              </a:tblGrid>
+              <a:tr h="370840">
+                <a:tc>
+                  <a:txBody>
+                    <a:bodyPr/>
+                    <a:lstStyle/>
+                    <a:p>
+                      <a:r>
+                        <a:rPr lang="en-US" dirty="0" smtClean="0"/>
+                        <a:t>Python type</a:t>
+                      </a:r>
+                      <a:endParaRPr lang="nl-BE" dirty="0"/>
+                    </a:p>
+                  </a:txBody>
+                  <a:tcPr/>
+                </a:tc>
+                <a:tc>
+                  <a:txBody>
+                    <a:bodyPr/>
+                    <a:lstStyle/>
+                    <a:p>
+                      <a:r>
+                        <a:rPr lang="en-US" dirty="0" smtClean="0"/>
+                        <a:t>C/C++ type</a:t>
+                      </a:r>
+                      <a:endParaRPr lang="nl-BE" dirty="0"/>
+                    </a:p>
+                  </a:txBody>
+                  <a:tcPr/>
+                </a:tc>
+              </a:tr>
+              <a:tr h="370840">
+                <a:tc>
+                  <a:txBody>
+                    <a:bodyPr/>
+                    <a:lstStyle/>
+                    <a:p>
+                      <a:r>
+                        <a:rPr lang="en-US" dirty="0" smtClean="0">
+                          <a:latin typeface="Courier New" panose="02070309020205020404" pitchFamily="49" charset="0"/>
+                          <a:cs typeface="Courier New" panose="02070309020205020404" pitchFamily="49" charset="0"/>
+                        </a:rPr>
+                        <a:t>bool</a:t>
+                      </a:r>
+                      <a:endParaRPr lang="nl-BE" dirty="0">
+                        <a:latin typeface="Courier New" panose="02070309020205020404" pitchFamily="49" charset="0"/>
+                        <a:cs typeface="Courier New" panose="02070309020205020404" pitchFamily="49" charset="0"/>
+                      </a:endParaRPr>
+                    </a:p>
+                  </a:txBody>
+                  <a:tcPr/>
+                </a:tc>
+                <a:tc>
+                  <a:txBody>
+                    <a:bodyPr/>
+                    <a:lstStyle/>
+                    <a:p>
+                      <a:r>
+                        <a:rPr lang="en-US" dirty="0" err="1" smtClean="0">
+                          <a:latin typeface="Courier New" panose="02070309020205020404" pitchFamily="49" charset="0"/>
+                          <a:cs typeface="Courier New" panose="02070309020205020404" pitchFamily="49" charset="0"/>
+                        </a:rPr>
+                        <a:t>bint</a:t>
+                      </a:r>
+                      <a:endParaRPr lang="nl-BE" dirty="0">
+                        <a:latin typeface="Courier New" panose="02070309020205020404" pitchFamily="49" charset="0"/>
+                        <a:cs typeface="Courier New" panose="02070309020205020404" pitchFamily="49" charset="0"/>
+                      </a:endParaRPr>
+                    </a:p>
+                  </a:txBody>
+                  <a:tcPr/>
+                </a:tc>
+              </a:tr>
+              <a:tr h="370840">
+                <a:tc>
+                  <a:txBody>
+                    <a:bodyPr/>
+                    <a:lstStyle/>
+                    <a:p>
+                      <a:r>
+                        <a:rPr lang="en-US" dirty="0" err="1" smtClean="0">
+                          <a:latin typeface="Courier New" panose="02070309020205020404" pitchFamily="49" charset="0"/>
+                          <a:cs typeface="Courier New" panose="02070309020205020404" pitchFamily="49" charset="0"/>
+                        </a:rPr>
+                        <a:t>int</a:t>
+                      </a:r>
+                      <a:endParaRPr lang="nl-BE" dirty="0">
+                        <a:latin typeface="Courier New" panose="02070309020205020404" pitchFamily="49" charset="0"/>
+                        <a:cs typeface="Courier New" panose="02070309020205020404" pitchFamily="49" charset="0"/>
+                      </a:endParaRPr>
+                    </a:p>
+                  </a:txBody>
+                  <a:tcPr/>
+                </a:tc>
+                <a:tc>
+                  <a:txBody>
+                    <a:bodyPr/>
+                    <a:lstStyle/>
+                    <a:p>
+                      <a:r>
+                        <a:rPr lang="en-US" dirty="0" smtClean="0">
+                          <a:latin typeface="Courier New" panose="02070309020205020404" pitchFamily="49" charset="0"/>
+                          <a:cs typeface="Courier New" panose="02070309020205020404" pitchFamily="49" charset="0"/>
+                        </a:rPr>
+                        <a:t>[unsigned]</a:t>
+                      </a:r>
+                      <a:r>
+                        <a:rPr lang="en-US" baseline="0" dirty="0" smtClean="0">
+                          <a:latin typeface="Courier New" panose="02070309020205020404" pitchFamily="49" charset="0"/>
+                          <a:cs typeface="Courier New" panose="02070309020205020404" pitchFamily="49" charset="0"/>
+                        </a:rPr>
+                        <a:t> short</a:t>
+                      </a:r>
+                      <a:r>
+                        <a:rPr lang="en-US" baseline="0" dirty="0" smtClean="0">
+                          <a:latin typeface="+mn-lt"/>
+                          <a:cs typeface="Courier New" panose="02070309020205020404" pitchFamily="49" charset="0"/>
+                        </a:rPr>
+                        <a:t>, </a:t>
+                      </a:r>
+                      <a:r>
+                        <a:rPr lang="en-US" baseline="0" dirty="0" err="1" smtClean="0">
+                          <a:latin typeface="Courier New" panose="02070309020205020404" pitchFamily="49" charset="0"/>
+                          <a:cs typeface="Courier New" panose="02070309020205020404" pitchFamily="49" charset="0"/>
+                        </a:rPr>
+                        <a:t>int</a:t>
+                      </a:r>
+                      <a:r>
+                        <a:rPr lang="en-US" baseline="0" dirty="0" smtClean="0">
+                          <a:latin typeface="+mn-lt"/>
+                          <a:cs typeface="Courier New" panose="02070309020205020404" pitchFamily="49" charset="0"/>
+                        </a:rPr>
+                        <a:t>, </a:t>
+                      </a:r>
+                      <a:r>
+                        <a:rPr lang="en-US" baseline="0" dirty="0" smtClean="0">
+                          <a:latin typeface="Courier New" panose="02070309020205020404" pitchFamily="49" charset="0"/>
+                          <a:cs typeface="Courier New" panose="02070309020205020404" pitchFamily="49" charset="0"/>
+                        </a:rPr>
+                        <a:t>long</a:t>
+                      </a:r>
+                      <a:r>
+                        <a:rPr lang="en-US" baseline="0" dirty="0" smtClean="0">
+                          <a:latin typeface="+mn-lt"/>
+                          <a:cs typeface="Courier New" panose="02070309020205020404" pitchFamily="49" charset="0"/>
+                        </a:rPr>
+                        <a:t>,</a:t>
+                      </a:r>
+                      <a:r>
+                        <a:rPr lang="en-US" baseline="0" dirty="0" smtClean="0">
+                          <a:latin typeface="Courier New" panose="02070309020205020404" pitchFamily="49" charset="0"/>
+                          <a:cs typeface="Courier New" panose="02070309020205020404" pitchFamily="49" charset="0"/>
+                        </a:rPr>
+                        <a:t> long </a:t>
+                      </a:r>
+                      <a:r>
+                        <a:rPr lang="en-US" baseline="0" dirty="0" err="1" smtClean="0">
+                          <a:latin typeface="Courier New" panose="02070309020205020404" pitchFamily="49" charset="0"/>
+                          <a:cs typeface="Courier New" panose="02070309020205020404" pitchFamily="49" charset="0"/>
+                        </a:rPr>
+                        <a:t>long</a:t>
+                      </a:r>
+                      <a:endParaRPr lang="nl-BE" dirty="0">
+                        <a:latin typeface="Courier New" panose="02070309020205020404" pitchFamily="49" charset="0"/>
+                        <a:cs typeface="Courier New" panose="02070309020205020404" pitchFamily="49" charset="0"/>
+                      </a:endParaRPr>
+                    </a:p>
+                  </a:txBody>
+                  <a:tcPr/>
+                </a:tc>
+              </a:tr>
+              <a:tr h="370840">
+                <a:tc>
+                  <a:txBody>
+                    <a:bodyPr/>
+                    <a:lstStyle/>
+                    <a:p>
+                      <a:r>
+                        <a:rPr lang="en-US" dirty="0" smtClean="0">
+                          <a:latin typeface="Courier New" panose="02070309020205020404" pitchFamily="49" charset="0"/>
+                          <a:cs typeface="Courier New" panose="02070309020205020404" pitchFamily="49" charset="0"/>
+                        </a:rPr>
+                        <a:t>float</a:t>
+                      </a:r>
+                      <a:endParaRPr lang="nl-BE" dirty="0">
+                        <a:latin typeface="Courier New" panose="02070309020205020404" pitchFamily="49" charset="0"/>
+                        <a:cs typeface="Courier New" panose="02070309020205020404" pitchFamily="49" charset="0"/>
+                      </a:endParaRPr>
+                    </a:p>
+                  </a:txBody>
+                  <a:tcPr/>
+                </a:tc>
+                <a:tc>
+                  <a:txBody>
+                    <a:bodyPr/>
+                    <a:lstStyle/>
+                    <a:p>
+                      <a:r>
+                        <a:rPr lang="en-US" dirty="0" smtClean="0">
+                          <a:latin typeface="Courier New" panose="02070309020205020404" pitchFamily="49" charset="0"/>
+                          <a:cs typeface="Courier New" panose="02070309020205020404" pitchFamily="49" charset="0"/>
+                        </a:rPr>
+                        <a:t>float</a:t>
+                      </a:r>
+                      <a:r>
+                        <a:rPr lang="en-US" dirty="0" smtClean="0">
+                          <a:latin typeface="+mn-lt"/>
+                          <a:cs typeface="Courier New" panose="02070309020205020404" pitchFamily="49" charset="0"/>
+                        </a:rPr>
+                        <a:t>, </a:t>
+                      </a:r>
+                      <a:r>
+                        <a:rPr lang="en-US" dirty="0" smtClean="0">
+                          <a:latin typeface="Courier New" panose="02070309020205020404" pitchFamily="49" charset="0"/>
+                          <a:cs typeface="Courier New" panose="02070309020205020404" pitchFamily="49" charset="0"/>
+                        </a:rPr>
+                        <a:t>double</a:t>
+                      </a:r>
+                      <a:endParaRPr lang="nl-BE" dirty="0">
+                        <a:latin typeface="Courier New" panose="02070309020205020404" pitchFamily="49" charset="0"/>
+                        <a:cs typeface="Courier New" panose="02070309020205020404" pitchFamily="49" charset="0"/>
+                      </a:endParaRPr>
+                    </a:p>
+                  </a:txBody>
+                  <a:tcPr/>
+                </a:tc>
+              </a:tr>
+              <a:tr h="370840">
+                <a:tc>
+                  <a:txBody>
+                    <a:bodyPr/>
+                    <a:lstStyle/>
+                    <a:p>
+                      <a:r>
+                        <a:rPr lang="en-US" dirty="0" smtClean="0">
+                          <a:latin typeface="Courier New" panose="02070309020205020404" pitchFamily="49" charset="0"/>
+                          <a:cs typeface="Courier New" panose="02070309020205020404" pitchFamily="49" charset="0"/>
+                        </a:rPr>
+                        <a:t>complex</a:t>
+                      </a:r>
+                      <a:endParaRPr lang="nl-BE" dirty="0">
+                        <a:latin typeface="Courier New" panose="02070309020205020404" pitchFamily="49" charset="0"/>
+                        <a:cs typeface="Courier New" panose="02070309020205020404" pitchFamily="49" charset="0"/>
+                      </a:endParaRPr>
+                    </a:p>
+                  </a:txBody>
+                  <a:tcPr/>
+                </a:tc>
+                <a:tc>
+                  <a:txBody>
+                    <a:bodyPr/>
+                    <a:lstStyle/>
+                    <a:p>
+                      <a:r>
+                        <a:rPr lang="en-US" dirty="0" smtClean="0">
+                          <a:latin typeface="Courier New" panose="02070309020205020404" pitchFamily="49" charset="0"/>
+                          <a:cs typeface="Courier New" panose="02070309020205020404" pitchFamily="49" charset="0"/>
+                        </a:rPr>
+                        <a:t>float complex</a:t>
+                      </a:r>
+                      <a:r>
+                        <a:rPr lang="en-US" dirty="0" smtClean="0">
+                          <a:latin typeface="+mn-lt"/>
+                          <a:cs typeface="Courier New" panose="02070309020205020404" pitchFamily="49" charset="0"/>
+                        </a:rPr>
+                        <a:t>, </a:t>
+                      </a:r>
+                      <a:r>
+                        <a:rPr lang="en-US" dirty="0" smtClean="0">
+                          <a:latin typeface="Courier New" panose="02070309020205020404" pitchFamily="49" charset="0"/>
+                          <a:cs typeface="Courier New" panose="02070309020205020404" pitchFamily="49" charset="0"/>
+                        </a:rPr>
+                        <a:t>double complex</a:t>
+                      </a:r>
+                      <a:r>
+                        <a:rPr lang="en-US" dirty="0" smtClean="0">
+                          <a:latin typeface="+mn-lt"/>
+                          <a:cs typeface="Courier New" panose="02070309020205020404" pitchFamily="49" charset="0"/>
+                        </a:rPr>
+                        <a:t> (represented as C </a:t>
+                      </a:r>
+                      <a:r>
+                        <a:rPr lang="en-US" dirty="0" err="1" smtClean="0">
+                          <a:latin typeface="Courier New" panose="02070309020205020404" pitchFamily="49" charset="0"/>
+                          <a:cs typeface="Courier New" panose="02070309020205020404" pitchFamily="49" charset="0"/>
+                        </a:rPr>
+                        <a:t>struct</a:t>
+                      </a:r>
+                      <a:r>
+                        <a:rPr lang="en-US" dirty="0" smtClean="0">
+                          <a:latin typeface="+mn-lt"/>
+                          <a:cs typeface="Courier New" panose="02070309020205020404" pitchFamily="49" charset="0"/>
+                        </a:rPr>
+                        <a:t>)</a:t>
+                      </a:r>
+                      <a:endParaRPr lang="nl-BE" dirty="0">
+                        <a:latin typeface="+mn-lt"/>
+                        <a:cs typeface="Courier New" panose="02070309020205020404" pitchFamily="49" charset="0"/>
+                      </a:endParaRPr>
+                    </a:p>
+                  </a:txBody>
+                  <a:tcPr/>
+                </a:tc>
+              </a:tr>
+              <a:tr h="370840">
+                <a:tc>
+                  <a:txBody>
+                    <a:bodyPr/>
+                    <a:lstStyle/>
+                    <a:p>
+                      <a:r>
+                        <a:rPr lang="en-US" dirty="0" smtClean="0">
+                          <a:latin typeface="Courier New" panose="02070309020205020404" pitchFamily="49" charset="0"/>
+                          <a:cs typeface="Courier New" panose="02070309020205020404" pitchFamily="49" charset="0"/>
+                        </a:rPr>
+                        <a:t>bytes</a:t>
+                      </a:r>
+                      <a:r>
+                        <a:rPr lang="en-US" dirty="0" smtClean="0">
+                          <a:latin typeface="+mn-lt"/>
+                          <a:cs typeface="Courier New" panose="02070309020205020404" pitchFamily="49" charset="0"/>
+                        </a:rPr>
+                        <a:t>, </a:t>
+                      </a:r>
+                      <a:r>
+                        <a:rPr lang="en-US" dirty="0" err="1" smtClean="0">
+                          <a:latin typeface="Courier New" panose="02070309020205020404" pitchFamily="49" charset="0"/>
+                          <a:cs typeface="Courier New" panose="02070309020205020404" pitchFamily="49" charset="0"/>
+                        </a:rPr>
+                        <a:t>str</a:t>
+                      </a:r>
+                      <a:endParaRPr lang="nl-BE" dirty="0">
+                        <a:latin typeface="Courier New" panose="02070309020205020404" pitchFamily="49" charset="0"/>
+                        <a:cs typeface="Courier New" panose="02070309020205020404" pitchFamily="49" charset="0"/>
+                      </a:endParaRPr>
+                    </a:p>
+                  </a:txBody>
+                  <a:tcPr/>
+                </a:tc>
+                <a:tc>
+                  <a:txBody>
+                    <a:bodyPr/>
+                    <a:lstStyle/>
+                    <a:p>
+                      <a:r>
+                        <a:rPr lang="en-US" dirty="0" smtClean="0">
+                          <a:latin typeface="Courier New" panose="02070309020205020404" pitchFamily="49" charset="0"/>
+                          <a:cs typeface="Courier New" panose="02070309020205020404" pitchFamily="49" charset="0"/>
+                        </a:rPr>
+                        <a:t>char</a:t>
+                      </a:r>
+                      <a:r>
+                        <a:rPr lang="en-US" dirty="0" smtClean="0">
+                          <a:latin typeface="+mn-lt"/>
+                          <a:cs typeface="Courier New" panose="02070309020205020404" pitchFamily="49" charset="0"/>
+                        </a:rPr>
+                        <a:t>, </a:t>
+                      </a:r>
+                      <a:r>
+                        <a:rPr lang="en-US" dirty="0" err="1" smtClean="0">
+                          <a:latin typeface="Courier New" panose="02070309020205020404" pitchFamily="49" charset="0"/>
+                          <a:cs typeface="Courier New" panose="02070309020205020404" pitchFamily="49" charset="0"/>
+                        </a:rPr>
+                        <a:t>std</a:t>
+                      </a:r>
+                      <a:r>
+                        <a:rPr lang="en-US" dirty="0" smtClean="0">
+                          <a:latin typeface="Courier New" panose="02070309020205020404" pitchFamily="49" charset="0"/>
+                          <a:cs typeface="Courier New" panose="02070309020205020404" pitchFamily="49" charset="0"/>
+                        </a:rPr>
+                        <a:t>::string </a:t>
+                      </a:r>
+                      <a:r>
+                        <a:rPr lang="en-US" dirty="0" smtClean="0">
+                          <a:latin typeface="+mn-lt"/>
+                          <a:cs typeface="Courier New" panose="02070309020205020404" pitchFamily="49" charset="0"/>
+                        </a:rPr>
+                        <a:t>(C++)</a:t>
+                      </a:r>
+                      <a:endParaRPr lang="nl-BE" dirty="0">
+                        <a:latin typeface="+mn-lt"/>
+                        <a:cs typeface="Courier New" panose="02070309020205020404" pitchFamily="49" charset="0"/>
+                      </a:endParaRPr>
+                    </a:p>
+                  </a:txBody>
+                  <a:tcPr/>
+                </a:tc>
+              </a:tr>
+              <a:tr h="370840">
+                <a:tc>
+                  <a:txBody>
+                    <a:bodyPr/>
+                    <a:lstStyle/>
+                    <a:p>
+                      <a:r>
+                        <a:rPr lang="en-US" dirty="0" err="1" smtClean="0">
+                          <a:latin typeface="Courier New" panose="02070309020205020404" pitchFamily="49" charset="0"/>
+                          <a:cs typeface="Courier New" panose="02070309020205020404" pitchFamily="49" charset="0"/>
+                        </a:rPr>
+                        <a:t>dict</a:t>
+                      </a:r>
+                      <a:endParaRPr lang="nl-BE" dirty="0">
+                        <a:latin typeface="Courier New" panose="02070309020205020404" pitchFamily="49" charset="0"/>
+                        <a:cs typeface="Courier New" panose="02070309020205020404" pitchFamily="49" charset="0"/>
+                      </a:endParaRPr>
+                    </a:p>
+                  </a:txBody>
+                  <a:tcPr/>
+                </a:tc>
+                <a:tc>
+                  <a:txBody>
+                    <a:bodyPr/>
+                    <a:lstStyle/>
+                    <a:p>
+                      <a:r>
+                        <a:rPr lang="en-US" dirty="0" err="1" smtClean="0">
+                          <a:latin typeface="Courier New" panose="02070309020205020404" pitchFamily="49" charset="0"/>
+                          <a:cs typeface="Courier New" panose="02070309020205020404" pitchFamily="49" charset="0"/>
+                        </a:rPr>
+                        <a:t>struct</a:t>
+                      </a:r>
+                      <a:endParaRPr lang="nl-BE" dirty="0">
+                        <a:latin typeface="Courier New" panose="02070309020205020404" pitchFamily="49" charset="0"/>
+                        <a:cs typeface="Courier New" panose="02070309020205020404" pitchFamily="49" charset="0"/>
+                      </a:endParaRPr>
+                    </a:p>
+                  </a:txBody>
+                  <a:tcPr/>
+                </a:tc>
+              </a:tr>
+            </a:tbl>
+          </a:graphicData>
+        </a:graphic>
+      </p:graphicFrame>
+      <p:sp>
+        <p:nvSpPr>
+          <p:cNvPr id="4" name="Slide Number Placeholder 3"/>
+          <p:cNvSpPr>
+            <a:spLocks noGrp="1"/>
+          </p:cNvSpPr>
+          <p:nvPr>
+            <p:ph type="sldNum" sz="quarter" idx="12"/>
+          </p:nvPr>
+        </p:nvSpPr>
+        <p:spPr/>
+        <p:txBody>
+          <a:bodyPr/>
+          <a:lstStyle/>
+          <a:p>
+            <a:fld id="{B6F15528-21DE-4FAA-801E-634DDDAF4B2B}" type="slidenum">
+              <a:rPr lang="en-US" smtClean="0"/>
+              <a:pPr/>
+              <a:t>9</a:t>
+            </a:fld>
+            <a:endParaRPr lang="en-US"/>
+          </a:p>
+        </p:txBody>
+      </p:sp>
+      <p:sp>
+        <p:nvSpPr>
+          <p:cNvPr id="6" name="TextBox 5"/>
+          <p:cNvSpPr txBox="1"/>
+          <p:nvPr/>
+        </p:nvSpPr>
+        <p:spPr>
+          <a:xfrm>
+            <a:off x="533400" y="5029200"/>
+            <a:ext cx="5424755" cy="369332"/>
+          </a:xfrm>
+          <a:prstGeom prst="rect">
+            <a:avLst/>
+          </a:prstGeom>
+          <a:noFill/>
+          <a:ln>
+            <a:solidFill>
+              <a:schemeClr val="tx1"/>
+            </a:solidFill>
+          </a:ln>
+        </p:spPr>
+        <p:txBody>
+          <a:bodyPr wrap="none" rtlCol="0">
+            <a:spAutoFit/>
+          </a:bodyPr>
+          <a:lstStyle/>
+          <a:p>
+            <a:r>
+              <a:rPr lang="en-US" dirty="0" smtClean="0"/>
+              <a:t>Note: no maximum </a:t>
+            </a:r>
+            <a:r>
+              <a:rPr lang="en-US" dirty="0" err="1" smtClean="0">
+                <a:latin typeface="Courier New" panose="02070309020205020404" pitchFamily="49" charset="0"/>
+                <a:cs typeface="Courier New" panose="02070309020205020404" pitchFamily="49" charset="0"/>
+              </a:rPr>
+              <a:t>int</a:t>
+            </a:r>
+            <a:r>
+              <a:rPr lang="en-US" dirty="0" smtClean="0"/>
+              <a:t> in Python, C/C++ can overflow!</a:t>
+            </a:r>
+            <a:endParaRPr lang="nl-BE" dirty="0"/>
+          </a:p>
+        </p:txBody>
+      </p:sp>
+    </p:spTree>
+    <p:extLst>
+      <p:ext uri="{BB962C8B-B14F-4D97-AF65-F5344CB8AC3E}">
+        <p14:creationId xmlns:p14="http://schemas.microsoft.com/office/powerpoint/2010/main" val="2102716602"/>
       </p:ext>
     </p:extLst>
   </p:cSld>

</xml_diff>

<commit_message>
Added buffer protocol slides
</commit_message>
<xml_diff>
--- a/Python/Cython/cython.pptx
+++ b/Python/Cython/cython.pptx
@@ -18,7 +18,7 @@
     <p:sldId id="263" r:id="rId9"/>
     <p:sldId id="265" r:id="rId10"/>
     <p:sldId id="264" r:id="rId11"/>
-    <p:sldId id="266" r:id="rId12"/>
+    <p:sldId id="268" r:id="rId12"/>
     <p:sldId id="267" r:id="rId13"/>
   </p:sldIdLst>
   <p:sldSz cx="9144000" cy="6858000" type="screen4x3"/>
@@ -137,7 +137,7 @@
             <p14:sldId id="263"/>
             <p14:sldId id="265"/>
             <p14:sldId id="264"/>
-            <p14:sldId id="266"/>
+            <p14:sldId id="268"/>
             <p14:sldId id="267"/>
           </p14:sldIdLst>
         </p14:section>
@@ -243,7 +243,7 @@
           <a:p>
             <a:fld id="{16B045E4-7DA3-41B9-B0DA-4BEE0876FA88}" type="datetimeFigureOut">
               <a:rPr lang="nl-BE" smtClean="0"/>
-              <a:t>2016-02-15</a:t>
+              <a:t>2016-02-18</a:t>
             </a:fld>
             <a:endParaRPr lang="nl-BE"/>
           </a:p>
@@ -692,7 +692,7 @@
           <a:p>
             <a:fld id="{53B2420D-148A-400F-B88D-527DF6E13622}" type="datetime1">
               <a:rPr lang="en-US" smtClean="0"/>
-              <a:t>2/15/2016</a:t>
+              <a:t>2/18/2016</a:t>
             </a:fld>
             <a:endParaRPr lang="en-US"/>
           </a:p>
@@ -858,7 +858,7 @@
           <a:p>
             <a:fld id="{52A01B9A-6787-4B63-BAEF-E3CF67589D82}" type="datetime1">
               <a:rPr lang="en-US" smtClean="0"/>
-              <a:t>2/15/2016</a:t>
+              <a:t>2/18/2016</a:t>
             </a:fld>
             <a:endParaRPr lang="en-US"/>
           </a:p>
@@ -1034,7 +1034,7 @@
           <a:p>
             <a:fld id="{6E982D42-2071-4A3D-B614-2380183202E1}" type="datetime1">
               <a:rPr lang="en-US" smtClean="0"/>
-              <a:t>2/15/2016</a:t>
+              <a:t>2/18/2016</a:t>
             </a:fld>
             <a:endParaRPr lang="en-US"/>
           </a:p>
@@ -1200,7 +1200,7 @@
           <a:p>
             <a:fld id="{2E90E067-04B9-40C0-BFE6-53BAD2F7119C}" type="datetime1">
               <a:rPr lang="en-US" smtClean="0"/>
-              <a:t>2/15/2016</a:t>
+              <a:t>2/18/2016</a:t>
             </a:fld>
             <a:endParaRPr lang="en-US"/>
           </a:p>
@@ -1442,7 +1442,7 @@
           <a:p>
             <a:fld id="{D7CB2E72-949E-4479-B957-DBA32EC1FAB9}" type="datetime1">
               <a:rPr lang="en-US" smtClean="0"/>
-              <a:t>2/15/2016</a:t>
+              <a:t>2/18/2016</a:t>
             </a:fld>
             <a:endParaRPr lang="en-US"/>
           </a:p>
@@ -1726,7 +1726,7 @@
           <a:p>
             <a:fld id="{A06819D6-C5C8-405A-96EE-DAC9728267C0}" type="datetime1">
               <a:rPr lang="en-US" smtClean="0"/>
-              <a:t>2/15/2016</a:t>
+              <a:t>2/18/2016</a:t>
             </a:fld>
             <a:endParaRPr lang="en-US"/>
           </a:p>
@@ -2144,7 +2144,7 @@
           <a:p>
             <a:fld id="{476A766D-F1AD-47B2-B323-71C0AAEFC468}" type="datetime1">
               <a:rPr lang="en-US" smtClean="0"/>
-              <a:t>2/15/2016</a:t>
+              <a:t>2/18/2016</a:t>
             </a:fld>
             <a:endParaRPr lang="en-US"/>
           </a:p>
@@ -2258,7 +2258,7 @@
           <a:p>
             <a:fld id="{E8021487-0835-4E27-A96A-FE7FCF3265BD}" type="datetime1">
               <a:rPr lang="en-US" smtClean="0"/>
-              <a:t>2/15/2016</a:t>
+              <a:t>2/18/2016</a:t>
             </a:fld>
             <a:endParaRPr lang="en-US"/>
           </a:p>
@@ -2349,7 +2349,7 @@
           <a:p>
             <a:fld id="{D8423321-723F-439B-A2FC-3D1497BCF824}" type="datetime1">
               <a:rPr lang="en-US" smtClean="0"/>
-              <a:t>2/15/2016</a:t>
+              <a:t>2/18/2016</a:t>
             </a:fld>
             <a:endParaRPr lang="en-US"/>
           </a:p>
@@ -2622,7 +2622,7 @@
           <a:p>
             <a:fld id="{C23318F9-3CB8-42B9-8393-7570C1C1A70D}" type="datetime1">
               <a:rPr lang="en-US" smtClean="0"/>
-              <a:t>2/15/2016</a:t>
+              <a:t>2/18/2016</a:t>
             </a:fld>
             <a:endParaRPr lang="en-US"/>
           </a:p>
@@ -2871,7 +2871,7 @@
           <a:p>
             <a:fld id="{6867E127-D066-4A1C-B918-F70FF61E725D}" type="datetime1">
               <a:rPr lang="en-US" smtClean="0"/>
-              <a:t>2/15/2016</a:t>
+              <a:t>2/18/2016</a:t>
             </a:fld>
             <a:endParaRPr lang="en-US"/>
           </a:p>
@@ -3080,7 +3080,7 @@
           <a:p>
             <a:fld id="{E6FF7314-6885-4B6E-804E-F9FE9C155D78}" type="datetime1">
               <a:rPr lang="en-US" smtClean="0"/>
-              <a:t>2/15/2016</a:t>
+              <a:t>2/18/2016</a:t>
             </a:fld>
             <a:endParaRPr lang="en-US"/>
           </a:p>
@@ -4169,12 +4169,8 @@
           <a:lstStyle/>
           <a:p>
             <a:r>
-              <a:rPr lang="en-US" dirty="0" err="1" smtClean="0"/>
-              <a:t>Numpy</a:t>
-            </a:r>
-            <a:r>
               <a:rPr lang="en-US" dirty="0" smtClean="0"/>
-              <a:t> arrays</a:t>
+              <a:t>Buffer protocol</a:t>
             </a:r>
             <a:endParaRPr lang="nl-BE" dirty="0"/>
           </a:p>
@@ -4182,12 +4178,12 @@
       </p:sp>
       <p:sp>
         <p:nvSpPr>
-          <p:cNvPr id="3" name="Text Placeholder 2"/>
-          <p:cNvSpPr>
-            <a:spLocks noGrp="1"/>
-          </p:cNvSpPr>
-          <p:nvPr>
-            <p:ph type="body" idx="1"/>
+          <p:cNvPr id="3" name="Content Placeholder 2"/>
+          <p:cNvSpPr>
+            <a:spLocks noGrp="1"/>
+          </p:cNvSpPr>
+          <p:nvPr>
+            <p:ph idx="1"/>
           </p:nvPr>
         </p:nvSpPr>
         <p:spPr/>
@@ -4195,7 +4191,75 @@
           <a:bodyPr/>
           <a:lstStyle/>
           <a:p>
-            <a:endParaRPr lang="nl-BE"/>
+            <a:r>
+              <a:rPr lang="en-US" dirty="0" smtClean="0"/>
+              <a:t>Some Python objects expose internal data through buffer protocol</a:t>
+            </a:r>
+          </a:p>
+          <a:p>
+            <a:pPr lvl="1"/>
+            <a:r>
+              <a:rPr lang="en-US" dirty="0" smtClean="0"/>
+              <a:t>E.g., </a:t>
+            </a:r>
+            <a:r>
+              <a:rPr lang="en-US" dirty="0" smtClean="0">
+                <a:latin typeface="Courier New" panose="02070309020205020404" pitchFamily="49" charset="0"/>
+                <a:cs typeface="Courier New" panose="02070309020205020404" pitchFamily="49" charset="0"/>
+              </a:rPr>
+              <a:t>bytes</a:t>
+            </a:r>
+            <a:r>
+              <a:rPr lang="en-US" dirty="0" smtClean="0"/>
+              <a:t>, </a:t>
+            </a:r>
+            <a:r>
+              <a:rPr lang="en-US" dirty="0" err="1" smtClean="0">
+                <a:latin typeface="Courier New" panose="02070309020205020404" pitchFamily="49" charset="0"/>
+                <a:cs typeface="Courier New" panose="02070309020205020404" pitchFamily="49" charset="0"/>
+              </a:rPr>
+              <a:t>bytearray</a:t>
+            </a:r>
+            <a:r>
+              <a:rPr lang="en-US" dirty="0" smtClean="0"/>
+              <a:t>, </a:t>
+            </a:r>
+            <a:r>
+              <a:rPr lang="en-US" dirty="0" err="1" smtClean="0">
+                <a:latin typeface="Courier New" panose="02070309020205020404" pitchFamily="49" charset="0"/>
+                <a:cs typeface="Courier New" panose="02070309020205020404" pitchFamily="49" charset="0"/>
+              </a:rPr>
+              <a:t>array.array</a:t>
+            </a:r>
+            <a:endParaRPr lang="en-US" dirty="0" smtClean="0">
+              <a:latin typeface="Courier New" panose="02070309020205020404" pitchFamily="49" charset="0"/>
+              <a:cs typeface="Courier New" panose="02070309020205020404" pitchFamily="49" charset="0"/>
+            </a:endParaRPr>
+          </a:p>
+          <a:p>
+            <a:r>
+              <a:rPr lang="en-US" dirty="0" smtClean="0"/>
+              <a:t>For direct access, wrap in </a:t>
+            </a:r>
+            <a:r>
+              <a:rPr lang="en-US" dirty="0" err="1" smtClean="0">
+                <a:latin typeface="Courier New" panose="02070309020205020404" pitchFamily="49" charset="0"/>
+                <a:cs typeface="Courier New" panose="02070309020205020404" pitchFamily="49" charset="0"/>
+              </a:rPr>
+              <a:t>memoryview</a:t>
+            </a:r>
+            <a:endParaRPr lang="en-US" dirty="0" smtClean="0">
+              <a:latin typeface="Courier New" panose="02070309020205020404" pitchFamily="49" charset="0"/>
+              <a:cs typeface="Courier New" panose="02070309020205020404" pitchFamily="49" charset="0"/>
+            </a:endParaRPr>
+          </a:p>
+          <a:p>
+            <a:pPr lvl="1"/>
+            <a:r>
+              <a:rPr lang="en-US" dirty="0" smtClean="0"/>
+              <a:t>Delivers fast direct access from generated C code to Python data</a:t>
+            </a:r>
+            <a:endParaRPr lang="nl-BE" dirty="0"/>
           </a:p>
         </p:txBody>
       </p:sp>
@@ -4223,10 +4287,405 @@
           </a:p>
         </p:txBody>
       </p:sp>
+      <p:grpSp>
+        <p:nvGrpSpPr>
+          <p:cNvPr id="7" name="Group 6"/>
+          <p:cNvGrpSpPr/>
+          <p:nvPr/>
+        </p:nvGrpSpPr>
+        <p:grpSpPr>
+          <a:xfrm>
+            <a:off x="152400" y="4800600"/>
+            <a:ext cx="5009705" cy="1477328"/>
+            <a:chOff x="304800" y="4800600"/>
+            <a:chExt cx="5009705" cy="1477328"/>
+          </a:xfrm>
+        </p:grpSpPr>
+        <p:sp>
+          <p:nvSpPr>
+            <p:cNvPr id="5" name="TextBox 4"/>
+            <p:cNvSpPr txBox="1"/>
+            <p:nvPr/>
+          </p:nvSpPr>
+          <p:spPr>
+            <a:xfrm>
+              <a:off x="304800" y="4800600"/>
+              <a:ext cx="5009705" cy="1477328"/>
+            </a:xfrm>
+            <a:prstGeom prst="rect">
+              <a:avLst/>
+            </a:prstGeom>
+            <a:solidFill>
+              <a:schemeClr val="bg1">
+                <a:lumMod val="85000"/>
+              </a:schemeClr>
+            </a:solidFill>
+            <a:ln>
+              <a:solidFill>
+                <a:schemeClr val="tx1"/>
+              </a:solidFill>
+            </a:ln>
+          </p:spPr>
+          <p:txBody>
+            <a:bodyPr wrap="none" rtlCol="0">
+              <a:spAutoFit/>
+            </a:bodyPr>
+            <a:lstStyle/>
+            <a:p>
+              <a:r>
+                <a:rPr lang="en-US" dirty="0" smtClean="0">
+                  <a:latin typeface="Courier New" panose="02070309020205020404" pitchFamily="49" charset="0"/>
+                  <a:cs typeface="Courier New" panose="02070309020205020404" pitchFamily="49" charset="0"/>
+                </a:rPr>
+                <a:t>…</a:t>
+              </a:r>
+            </a:p>
+            <a:p>
+              <a:r>
+                <a:rPr lang="en-US" dirty="0" smtClean="0">
+                  <a:latin typeface="Courier New" panose="02070309020205020404" pitchFamily="49" charset="0"/>
+                  <a:cs typeface="Courier New" panose="02070309020205020404" pitchFamily="49" charset="0"/>
+                </a:rPr>
+                <a:t>data = </a:t>
+              </a:r>
+              <a:r>
+                <a:rPr lang="en-US" dirty="0" err="1" smtClean="0">
+                  <a:latin typeface="Courier New" panose="02070309020205020404" pitchFamily="49" charset="0"/>
+                  <a:cs typeface="Courier New" panose="02070309020205020404" pitchFamily="49" charset="0"/>
+                </a:rPr>
+                <a:t>array.array</a:t>
+              </a:r>
+              <a:r>
+                <a:rPr lang="en-US" dirty="0" smtClean="0">
+                  <a:latin typeface="Courier New" panose="02070309020205020404" pitchFamily="49" charset="0"/>
+                  <a:cs typeface="Courier New" panose="02070309020205020404" pitchFamily="49" charset="0"/>
+                </a:rPr>
+                <a:t>('d', [0.0]*1000)</a:t>
+              </a:r>
+            </a:p>
+            <a:p>
+              <a:r>
+                <a:rPr lang="en-US" dirty="0" smtClean="0">
+                  <a:latin typeface="Courier New" panose="02070309020205020404" pitchFamily="49" charset="0"/>
+                  <a:cs typeface="Courier New" panose="02070309020205020404" pitchFamily="49" charset="0"/>
+                </a:rPr>
+                <a:t>…</a:t>
+              </a:r>
+            </a:p>
+            <a:p>
+              <a:r>
+                <a:rPr lang="en-US" dirty="0">
+                  <a:latin typeface="Courier New" panose="02070309020205020404" pitchFamily="49" charset="0"/>
+                  <a:cs typeface="Courier New" panose="02070309020205020404" pitchFamily="49" charset="0"/>
+                </a:rPr>
+                <a:t>r</a:t>
+              </a:r>
+              <a:r>
+                <a:rPr lang="en-US" dirty="0" smtClean="0">
+                  <a:latin typeface="Courier New" panose="02070309020205020404" pitchFamily="49" charset="0"/>
+                  <a:cs typeface="Courier New" panose="02070309020205020404" pitchFamily="49" charset="0"/>
+                </a:rPr>
+                <a:t>esult = compute(</a:t>
+              </a:r>
+              <a:r>
+                <a:rPr lang="en-US" b="1" dirty="0" err="1" smtClean="0">
+                  <a:latin typeface="Courier New" panose="02070309020205020404" pitchFamily="49" charset="0"/>
+                  <a:cs typeface="Courier New" panose="02070309020205020404" pitchFamily="49" charset="0"/>
+                </a:rPr>
+                <a:t>memoryview</a:t>
+              </a:r>
+              <a:r>
+                <a:rPr lang="en-US" dirty="0" smtClean="0">
+                  <a:latin typeface="Courier New" panose="02070309020205020404" pitchFamily="49" charset="0"/>
+                  <a:cs typeface="Courier New" panose="02070309020205020404" pitchFamily="49" charset="0"/>
+                </a:rPr>
+                <a:t>(data))</a:t>
+              </a:r>
+            </a:p>
+            <a:p>
+              <a:r>
+                <a:rPr lang="en-US" dirty="0" smtClean="0">
+                  <a:latin typeface="Courier New" panose="02070309020205020404" pitchFamily="49" charset="0"/>
+                  <a:cs typeface="Courier New" panose="02070309020205020404" pitchFamily="49" charset="0"/>
+                </a:rPr>
+                <a:t>…</a:t>
+              </a:r>
+            </a:p>
+          </p:txBody>
+        </p:sp>
+        <p:sp>
+          <p:nvSpPr>
+            <p:cNvPr id="6" name="TextBox 5"/>
+            <p:cNvSpPr txBox="1"/>
+            <p:nvPr/>
+          </p:nvSpPr>
+          <p:spPr>
+            <a:xfrm>
+              <a:off x="4505595" y="5969478"/>
+              <a:ext cx="802527" cy="307777"/>
+            </a:xfrm>
+            <a:prstGeom prst="rect">
+              <a:avLst/>
+            </a:prstGeom>
+            <a:solidFill>
+              <a:schemeClr val="bg1"/>
+            </a:solidFill>
+            <a:ln>
+              <a:solidFill>
+                <a:schemeClr val="tx1"/>
+              </a:solidFill>
+            </a:ln>
+          </p:spPr>
+          <p:txBody>
+            <a:bodyPr wrap="none" rtlCol="0">
+              <a:spAutoFit/>
+            </a:bodyPr>
+            <a:lstStyle/>
+            <a:p>
+              <a:r>
+                <a:rPr lang="en-US" sz="1400" dirty="0" smtClean="0"/>
+                <a:t>some.py</a:t>
+              </a:r>
+              <a:endParaRPr lang="nl-BE" sz="1400" dirty="0"/>
+            </a:p>
+          </p:txBody>
+        </p:sp>
+      </p:grpSp>
+      <p:grpSp>
+        <p:nvGrpSpPr>
+          <p:cNvPr id="8" name="Group 7"/>
+          <p:cNvGrpSpPr/>
+          <p:nvPr/>
+        </p:nvGrpSpPr>
+        <p:grpSpPr>
+          <a:xfrm>
+            <a:off x="5638800" y="4800600"/>
+            <a:ext cx="3217547" cy="1482304"/>
+            <a:chOff x="304800" y="4800600"/>
+            <a:chExt cx="3217547" cy="1482304"/>
+          </a:xfrm>
+        </p:grpSpPr>
+        <p:sp>
+          <p:nvSpPr>
+            <p:cNvPr id="9" name="TextBox 8"/>
+            <p:cNvSpPr txBox="1"/>
+            <p:nvPr/>
+          </p:nvSpPr>
+          <p:spPr>
+            <a:xfrm>
+              <a:off x="304800" y="4800600"/>
+              <a:ext cx="3217547" cy="1477328"/>
+            </a:xfrm>
+            <a:prstGeom prst="rect">
+              <a:avLst/>
+            </a:prstGeom>
+            <a:solidFill>
+              <a:schemeClr val="bg1">
+                <a:lumMod val="85000"/>
+              </a:schemeClr>
+            </a:solidFill>
+            <a:ln>
+              <a:solidFill>
+                <a:schemeClr val="tx1"/>
+              </a:solidFill>
+            </a:ln>
+          </p:spPr>
+          <p:txBody>
+            <a:bodyPr wrap="none" rtlCol="0">
+              <a:spAutoFit/>
+            </a:bodyPr>
+            <a:lstStyle/>
+            <a:p>
+              <a:r>
+                <a:rPr lang="en-US" dirty="0" err="1" smtClean="0">
+                  <a:latin typeface="Courier New" panose="02070309020205020404" pitchFamily="49" charset="0"/>
+                  <a:cs typeface="Courier New" panose="02070309020205020404" pitchFamily="49" charset="0"/>
+                </a:rPr>
+                <a:t>def</a:t>
+              </a:r>
+              <a:r>
+                <a:rPr lang="en-US" dirty="0" smtClean="0">
+                  <a:latin typeface="Courier New" panose="02070309020205020404" pitchFamily="49" charset="0"/>
+                  <a:cs typeface="Courier New" panose="02070309020205020404" pitchFamily="49" charset="0"/>
+                </a:rPr>
+                <a:t> compute(array)</a:t>
+              </a:r>
+            </a:p>
+            <a:p>
+              <a:r>
+                <a:rPr lang="en-US" dirty="0" smtClean="0">
+                  <a:latin typeface="Courier New" panose="02070309020205020404" pitchFamily="49" charset="0"/>
+                  <a:cs typeface="Courier New" panose="02070309020205020404" pitchFamily="49" charset="0"/>
+                </a:rPr>
+                <a:t>    </a:t>
+              </a:r>
+              <a:r>
+                <a:rPr lang="en-US" dirty="0" err="1" smtClean="0">
+                  <a:latin typeface="Courier New" panose="02070309020205020404" pitchFamily="49" charset="0"/>
+                  <a:cs typeface="Courier New" panose="02070309020205020404" pitchFamily="49" charset="0"/>
+                </a:rPr>
+                <a:t>cdef</a:t>
+              </a:r>
+              <a:r>
+                <a:rPr lang="en-US" dirty="0" smtClean="0">
+                  <a:latin typeface="Courier New" panose="02070309020205020404" pitchFamily="49" charset="0"/>
+                  <a:cs typeface="Courier New" panose="02070309020205020404" pitchFamily="49" charset="0"/>
+                </a:rPr>
+                <a:t> </a:t>
+              </a:r>
+              <a:r>
+                <a:rPr lang="en-US" dirty="0" err="1" smtClean="0">
+                  <a:latin typeface="Courier New" panose="02070309020205020404" pitchFamily="49" charset="0"/>
+                  <a:cs typeface="Courier New" panose="02070309020205020404" pitchFamily="49" charset="0"/>
+                </a:rPr>
+                <a:t>int</a:t>
+              </a:r>
+              <a:r>
+                <a:rPr lang="en-US" dirty="0" smtClean="0">
+                  <a:latin typeface="Courier New" panose="02070309020205020404" pitchFamily="49" charset="0"/>
+                  <a:cs typeface="Courier New" panose="02070309020205020404" pitchFamily="49" charset="0"/>
+                </a:rPr>
+                <a:t> n, </a:t>
+              </a:r>
+              <a:r>
+                <a:rPr lang="en-US" dirty="0" err="1" smtClean="0">
+                  <a:latin typeface="Courier New" panose="02070309020205020404" pitchFamily="49" charset="0"/>
+                  <a:cs typeface="Courier New" panose="02070309020205020404" pitchFamily="49" charset="0"/>
+                </a:rPr>
+                <a:t>i</a:t>
+              </a:r>
+              <a:endParaRPr lang="en-US" dirty="0" smtClean="0">
+                <a:latin typeface="Courier New" panose="02070309020205020404" pitchFamily="49" charset="0"/>
+                <a:cs typeface="Courier New" panose="02070309020205020404" pitchFamily="49" charset="0"/>
+              </a:endParaRPr>
+            </a:p>
+            <a:p>
+              <a:r>
+                <a:rPr lang="en-US" dirty="0">
+                  <a:latin typeface="Courier New" panose="02070309020205020404" pitchFamily="49" charset="0"/>
+                  <a:cs typeface="Courier New" panose="02070309020205020404" pitchFamily="49" charset="0"/>
+                </a:rPr>
+                <a:t> </a:t>
+              </a:r>
+              <a:r>
+                <a:rPr lang="en-US" dirty="0" smtClean="0">
+                  <a:latin typeface="Courier New" panose="02070309020205020404" pitchFamily="49" charset="0"/>
+                  <a:cs typeface="Courier New" panose="02070309020205020404" pitchFamily="49" charset="0"/>
+                </a:rPr>
+                <a:t>   n = </a:t>
+              </a:r>
+              <a:r>
+                <a:rPr lang="en-US" dirty="0" err="1" smtClean="0">
+                  <a:latin typeface="Courier New" panose="02070309020205020404" pitchFamily="49" charset="0"/>
+                  <a:cs typeface="Courier New" panose="02070309020205020404" pitchFamily="49" charset="0"/>
+                </a:rPr>
+                <a:t>array.shape</a:t>
+              </a:r>
+              <a:r>
+                <a:rPr lang="en-US" dirty="0" smtClean="0">
+                  <a:latin typeface="Courier New" panose="02070309020205020404" pitchFamily="49" charset="0"/>
+                  <a:cs typeface="Courier New" panose="02070309020205020404" pitchFamily="49" charset="0"/>
+                </a:rPr>
+                <a:t>[0]</a:t>
+              </a:r>
+            </a:p>
+            <a:p>
+              <a:r>
+                <a:rPr lang="en-US" dirty="0">
+                  <a:latin typeface="Courier New" panose="02070309020205020404" pitchFamily="49" charset="0"/>
+                  <a:cs typeface="Courier New" panose="02070309020205020404" pitchFamily="49" charset="0"/>
+                </a:rPr>
+                <a:t> </a:t>
+              </a:r>
+              <a:r>
+                <a:rPr lang="en-US" dirty="0" smtClean="0">
+                  <a:latin typeface="Courier New" panose="02070309020205020404" pitchFamily="49" charset="0"/>
+                  <a:cs typeface="Courier New" panose="02070309020205020404" pitchFamily="49" charset="0"/>
+                </a:rPr>
+                <a:t>   for </a:t>
+              </a:r>
+              <a:r>
+                <a:rPr lang="en-US" dirty="0" err="1" smtClean="0">
+                  <a:latin typeface="Courier New" panose="02070309020205020404" pitchFamily="49" charset="0"/>
+                  <a:cs typeface="Courier New" panose="02070309020205020404" pitchFamily="49" charset="0"/>
+                </a:rPr>
+                <a:t>i</a:t>
+              </a:r>
+              <a:r>
+                <a:rPr lang="en-US" dirty="0" smtClean="0">
+                  <a:latin typeface="Courier New" panose="02070309020205020404" pitchFamily="49" charset="0"/>
+                  <a:cs typeface="Courier New" panose="02070309020205020404" pitchFamily="49" charset="0"/>
+                </a:rPr>
+                <a:t> in range(n):</a:t>
+              </a:r>
+            </a:p>
+            <a:p>
+              <a:r>
+                <a:rPr lang="en-US" dirty="0" smtClean="0">
+                  <a:latin typeface="Courier New" panose="02070309020205020404" pitchFamily="49" charset="0"/>
+                  <a:cs typeface="Courier New" panose="02070309020205020404" pitchFamily="49" charset="0"/>
+                </a:rPr>
+                <a:t>        … array[</a:t>
+              </a:r>
+              <a:r>
+                <a:rPr lang="en-US" dirty="0" err="1" smtClean="0">
+                  <a:latin typeface="Courier New" panose="02070309020205020404" pitchFamily="49" charset="0"/>
+                  <a:cs typeface="Courier New" panose="02070309020205020404" pitchFamily="49" charset="0"/>
+                </a:rPr>
+                <a:t>i</a:t>
+              </a:r>
+              <a:r>
+                <a:rPr lang="en-US" dirty="0" smtClean="0">
+                  <a:latin typeface="Courier New" panose="02070309020205020404" pitchFamily="49" charset="0"/>
+                  <a:cs typeface="Courier New" panose="02070309020205020404" pitchFamily="49" charset="0"/>
+                </a:rPr>
+                <a:t>] …</a:t>
+              </a:r>
+            </a:p>
+          </p:txBody>
+        </p:sp>
+        <p:sp>
+          <p:nvSpPr>
+            <p:cNvPr id="10" name="TextBox 9"/>
+            <p:cNvSpPr txBox="1"/>
+            <p:nvPr/>
+          </p:nvSpPr>
+          <p:spPr>
+            <a:xfrm>
+              <a:off x="304800" y="5975127"/>
+              <a:ext cx="867802" cy="307777"/>
+            </a:xfrm>
+            <a:prstGeom prst="rect">
+              <a:avLst/>
+            </a:prstGeom>
+            <a:solidFill>
+              <a:schemeClr val="bg1"/>
+            </a:solidFill>
+            <a:ln>
+              <a:solidFill>
+                <a:schemeClr val="tx1"/>
+              </a:solidFill>
+            </a:ln>
+          </p:spPr>
+          <p:txBody>
+            <a:bodyPr wrap="none" rtlCol="0">
+              <a:spAutoFit/>
+            </a:bodyPr>
+            <a:lstStyle/>
+            <a:p>
+              <a:r>
+                <a:rPr lang="en-US" sz="1400" dirty="0" err="1" smtClean="0"/>
+                <a:t>other.pyx</a:t>
+              </a:r>
+              <a:endParaRPr lang="nl-BE" sz="1400" dirty="0"/>
+            </a:p>
+          </p:txBody>
+        </p:sp>
+      </p:grpSp>
     </p:spTree>
     <p:extLst>
       <p:ext uri="{BB962C8B-B14F-4D97-AF65-F5344CB8AC3E}">
-        <p14:creationId xmlns:p14="http://schemas.microsoft.com/office/powerpoint/2010/main" val="3720520904"/>
+        <p14:creationId xmlns:p14="http://schemas.microsoft.com/office/powerpoint/2010/main" val="134795012"/>
       </p:ext>
     </p:extLst>
   </p:cSld>
@@ -4269,12 +4728,20 @@
           <a:lstStyle/>
           <a:p>
             <a:r>
+              <a:rPr lang="en-US" dirty="0" err="1"/>
+              <a:t>n</a:t>
+            </a:r>
+            <a:r>
               <a:rPr lang="en-US" dirty="0" err="1" smtClean="0"/>
-              <a:t>Numpy</a:t>
+              <a:t>umpy</a:t>
             </a:r>
             <a:r>
               <a:rPr lang="en-US" dirty="0" smtClean="0"/>
-              <a:t> arrays &amp; </a:t>
+              <a:t> </a:t>
+            </a:r>
+            <a:r>
+              <a:rPr lang="en-US" dirty="0" smtClean="0"/>
+              <a:t>arrays &amp; </a:t>
             </a:r>
             <a:r>
               <a:rPr lang="en-US" dirty="0" err="1" smtClean="0"/>
@@ -4299,7 +4766,15 @@
           <a:bodyPr/>
           <a:lstStyle/>
           <a:p>
-            <a:endParaRPr lang="nl-BE"/>
+            <a:r>
+              <a:rPr lang="en-US" dirty="0" err="1" smtClean="0"/>
+              <a:t>numpy</a:t>
+            </a:r>
+            <a:r>
+              <a:rPr lang="en-US" dirty="0" smtClean="0"/>
+              <a:t> arrays support the buffer protocol!</a:t>
+            </a:r>
+            <a:endParaRPr lang="nl-BE" dirty="0"/>
           </a:p>
         </p:txBody>
       </p:sp>
@@ -4324,6 +4799,527 @@
               <a:t>12</a:t>
             </a:fld>
             <a:endParaRPr lang="en-US"/>
+          </a:p>
+        </p:txBody>
+      </p:sp>
+      <p:grpSp>
+        <p:nvGrpSpPr>
+          <p:cNvPr id="5" name="Group 4"/>
+          <p:cNvGrpSpPr/>
+          <p:nvPr/>
+        </p:nvGrpSpPr>
+        <p:grpSpPr>
+          <a:xfrm>
+            <a:off x="618226" y="2362200"/>
+            <a:ext cx="5121915" cy="3539430"/>
+            <a:chOff x="304800" y="1371600"/>
+            <a:chExt cx="5121915" cy="3539430"/>
+          </a:xfrm>
+          <a:solidFill>
+            <a:schemeClr val="bg1">
+              <a:lumMod val="85000"/>
+            </a:schemeClr>
+          </a:solidFill>
+        </p:grpSpPr>
+        <p:sp>
+          <p:nvSpPr>
+            <p:cNvPr id="6" name="TextBox 5"/>
+            <p:cNvSpPr txBox="1"/>
+            <p:nvPr/>
+          </p:nvSpPr>
+          <p:spPr>
+            <a:xfrm>
+              <a:off x="304800" y="1371600"/>
+              <a:ext cx="5121915" cy="3539430"/>
+            </a:xfrm>
+            <a:prstGeom prst="rect">
+              <a:avLst/>
+            </a:prstGeom>
+            <a:grpFill/>
+            <a:ln>
+              <a:solidFill>
+                <a:schemeClr val="tx1"/>
+              </a:solidFill>
+            </a:ln>
+          </p:spPr>
+          <p:txBody>
+            <a:bodyPr wrap="none" rtlCol="0">
+              <a:spAutoFit/>
+            </a:bodyPr>
+            <a:lstStyle/>
+            <a:p>
+              <a:r>
+                <a:rPr lang="nl-BE" sz="1600" dirty="0" err="1">
+                  <a:latin typeface="Courier New" panose="02070309020205020404" pitchFamily="49" charset="0"/>
+                  <a:cs typeface="Courier New" panose="02070309020205020404" pitchFamily="49" charset="0"/>
+                </a:rPr>
+                <a:t>def</a:t>
+              </a:r>
+              <a:r>
+                <a:rPr lang="nl-BE" sz="1600" dirty="0">
+                  <a:latin typeface="Courier New" panose="02070309020205020404" pitchFamily="49" charset="0"/>
+                  <a:cs typeface="Courier New" panose="02070309020205020404" pitchFamily="49" charset="0"/>
+                </a:rPr>
+                <a:t> </a:t>
+              </a:r>
+              <a:r>
+                <a:rPr lang="nl-BE" sz="1600" dirty="0" err="1">
+                  <a:latin typeface="Courier New" panose="02070309020205020404" pitchFamily="49" charset="0"/>
+                  <a:cs typeface="Courier New" panose="02070309020205020404" pitchFamily="49" charset="0"/>
+                </a:rPr>
+                <a:t>array_sum</a:t>
+              </a:r>
+              <a:r>
+                <a:rPr lang="nl-BE" sz="1600" dirty="0">
+                  <a:latin typeface="Courier New" panose="02070309020205020404" pitchFamily="49" charset="0"/>
+                  <a:cs typeface="Courier New" panose="02070309020205020404" pitchFamily="49" charset="0"/>
+                </a:rPr>
+                <a:t>(a):</a:t>
+              </a:r>
+            </a:p>
+            <a:p>
+              <a:r>
+                <a:rPr lang="nl-BE" sz="1600" dirty="0">
+                  <a:latin typeface="Courier New" panose="02070309020205020404" pitchFamily="49" charset="0"/>
+                  <a:cs typeface="Courier New" panose="02070309020205020404" pitchFamily="49" charset="0"/>
+                </a:rPr>
+                <a:t>    return _</a:t>
+              </a:r>
+              <a:r>
+                <a:rPr lang="nl-BE" sz="1600" dirty="0" err="1">
+                  <a:latin typeface="Courier New" panose="02070309020205020404" pitchFamily="49" charset="0"/>
+                  <a:cs typeface="Courier New" panose="02070309020205020404" pitchFamily="49" charset="0"/>
+                </a:rPr>
+                <a:t>array_sum</a:t>
+              </a:r>
+              <a:r>
+                <a:rPr lang="nl-BE" sz="1600" dirty="0">
+                  <a:latin typeface="Courier New" panose="02070309020205020404" pitchFamily="49" charset="0"/>
+                  <a:cs typeface="Courier New" panose="02070309020205020404" pitchFamily="49" charset="0"/>
+                </a:rPr>
+                <a:t>(memoryview(a))</a:t>
+              </a:r>
+            </a:p>
+            <a:p>
+              <a:endParaRPr lang="nl-BE" sz="1600" dirty="0">
+                <a:latin typeface="Courier New" panose="02070309020205020404" pitchFamily="49" charset="0"/>
+                <a:cs typeface="Courier New" panose="02070309020205020404" pitchFamily="49" charset="0"/>
+              </a:endParaRPr>
+            </a:p>
+            <a:p>
+              <a:endParaRPr lang="nl-BE" sz="1600" dirty="0">
+                <a:latin typeface="Courier New" panose="02070309020205020404" pitchFamily="49" charset="0"/>
+                <a:cs typeface="Courier New" panose="02070309020205020404" pitchFamily="49" charset="0"/>
+              </a:endParaRPr>
+            </a:p>
+            <a:p>
+              <a:r>
+                <a:rPr lang="nl-BE" sz="1600" dirty="0" err="1">
+                  <a:latin typeface="Courier New" panose="02070309020205020404" pitchFamily="49" charset="0"/>
+                  <a:cs typeface="Courier New" panose="02070309020205020404" pitchFamily="49" charset="0"/>
+                </a:rPr>
+                <a:t>cdef</a:t>
+              </a:r>
+              <a:r>
+                <a:rPr lang="nl-BE" sz="1600" dirty="0">
+                  <a:latin typeface="Courier New" panose="02070309020205020404" pitchFamily="49" charset="0"/>
+                  <a:cs typeface="Courier New" panose="02070309020205020404" pitchFamily="49" charset="0"/>
+                </a:rPr>
+                <a:t> _</a:t>
+              </a:r>
+              <a:r>
+                <a:rPr lang="nl-BE" sz="1600" dirty="0" err="1">
+                  <a:latin typeface="Courier New" panose="02070309020205020404" pitchFamily="49" charset="0"/>
+                  <a:cs typeface="Courier New" panose="02070309020205020404" pitchFamily="49" charset="0"/>
+                </a:rPr>
+                <a:t>array_sum</a:t>
+              </a:r>
+              <a:r>
+                <a:rPr lang="nl-BE" sz="1600" dirty="0">
+                  <a:latin typeface="Courier New" panose="02070309020205020404" pitchFamily="49" charset="0"/>
+                  <a:cs typeface="Courier New" panose="02070309020205020404" pitchFamily="49" charset="0"/>
+                </a:rPr>
+                <a:t>(double[:,::1] </a:t>
+              </a:r>
+              <a:r>
+                <a:rPr lang="nl-BE" sz="1600" dirty="0" err="1">
+                  <a:latin typeface="Courier New" panose="02070309020205020404" pitchFamily="49" charset="0"/>
+                  <a:cs typeface="Courier New" panose="02070309020205020404" pitchFamily="49" charset="0"/>
+                </a:rPr>
+                <a:t>mem_view</a:t>
+              </a:r>
+              <a:r>
+                <a:rPr lang="nl-BE" sz="1600" dirty="0">
+                  <a:latin typeface="Courier New" panose="02070309020205020404" pitchFamily="49" charset="0"/>
+                  <a:cs typeface="Courier New" panose="02070309020205020404" pitchFamily="49" charset="0"/>
+                </a:rPr>
+                <a:t>):</a:t>
+              </a:r>
+            </a:p>
+            <a:p>
+              <a:r>
+                <a:rPr lang="nl-BE" sz="1600" dirty="0">
+                  <a:latin typeface="Courier New" panose="02070309020205020404" pitchFamily="49" charset="0"/>
+                  <a:cs typeface="Courier New" panose="02070309020205020404" pitchFamily="49" charset="0"/>
+                </a:rPr>
+                <a:t>    </a:t>
+              </a:r>
+              <a:r>
+                <a:rPr lang="nl-BE" sz="1600" dirty="0" err="1">
+                  <a:latin typeface="Courier New" panose="02070309020205020404" pitchFamily="49" charset="0"/>
+                  <a:cs typeface="Courier New" panose="02070309020205020404" pitchFamily="49" charset="0"/>
+                </a:rPr>
+                <a:t>cdef</a:t>
+              </a:r>
+              <a:r>
+                <a:rPr lang="nl-BE" sz="1600" dirty="0">
+                  <a:latin typeface="Courier New" panose="02070309020205020404" pitchFamily="49" charset="0"/>
+                  <a:cs typeface="Courier New" panose="02070309020205020404" pitchFamily="49" charset="0"/>
+                </a:rPr>
+                <a:t> double </a:t>
+              </a:r>
+              <a:r>
+                <a:rPr lang="nl-BE" sz="1600" dirty="0" err="1">
+                  <a:latin typeface="Courier New" panose="02070309020205020404" pitchFamily="49" charset="0"/>
+                  <a:cs typeface="Courier New" panose="02070309020205020404" pitchFamily="49" charset="0"/>
+                </a:rPr>
+                <a:t>total</a:t>
+              </a:r>
+              <a:r>
+                <a:rPr lang="nl-BE" sz="1600" dirty="0">
+                  <a:latin typeface="Courier New" panose="02070309020205020404" pitchFamily="49" charset="0"/>
+                  <a:cs typeface="Courier New" panose="02070309020205020404" pitchFamily="49" charset="0"/>
+                </a:rPr>
+                <a:t> = 0.0</a:t>
+              </a:r>
+            </a:p>
+            <a:p>
+              <a:r>
+                <a:rPr lang="nl-BE" sz="1600" dirty="0">
+                  <a:latin typeface="Courier New" panose="02070309020205020404" pitchFamily="49" charset="0"/>
+                  <a:cs typeface="Courier New" panose="02070309020205020404" pitchFamily="49" charset="0"/>
+                </a:rPr>
+                <a:t>    </a:t>
+              </a:r>
+              <a:r>
+                <a:rPr lang="nl-BE" sz="1600" dirty="0" err="1">
+                  <a:latin typeface="Courier New" panose="02070309020205020404" pitchFamily="49" charset="0"/>
+                  <a:cs typeface="Courier New" panose="02070309020205020404" pitchFamily="49" charset="0"/>
+                </a:rPr>
+                <a:t>cdef</a:t>
+              </a:r>
+              <a:r>
+                <a:rPr lang="nl-BE" sz="1600" dirty="0">
+                  <a:latin typeface="Courier New" panose="02070309020205020404" pitchFamily="49" charset="0"/>
+                  <a:cs typeface="Courier New" panose="02070309020205020404" pitchFamily="49" charset="0"/>
+                </a:rPr>
+                <a:t> m = </a:t>
+              </a:r>
+              <a:r>
+                <a:rPr lang="nl-BE" sz="1600" dirty="0" err="1">
+                  <a:latin typeface="Courier New" panose="02070309020205020404" pitchFamily="49" charset="0"/>
+                  <a:cs typeface="Courier New" panose="02070309020205020404" pitchFamily="49" charset="0"/>
+                </a:rPr>
+                <a:t>mem_view.shape</a:t>
+              </a:r>
+              <a:r>
+                <a:rPr lang="nl-BE" sz="1600" dirty="0">
+                  <a:latin typeface="Courier New" panose="02070309020205020404" pitchFamily="49" charset="0"/>
+                  <a:cs typeface="Courier New" panose="02070309020205020404" pitchFamily="49" charset="0"/>
+                </a:rPr>
+                <a:t>[0]</a:t>
+              </a:r>
+            </a:p>
+            <a:p>
+              <a:r>
+                <a:rPr lang="nl-BE" sz="1600" dirty="0">
+                  <a:latin typeface="Courier New" panose="02070309020205020404" pitchFamily="49" charset="0"/>
+                  <a:cs typeface="Courier New" panose="02070309020205020404" pitchFamily="49" charset="0"/>
+                </a:rPr>
+                <a:t>    </a:t>
+              </a:r>
+              <a:r>
+                <a:rPr lang="nl-BE" sz="1600" dirty="0" err="1">
+                  <a:latin typeface="Courier New" panose="02070309020205020404" pitchFamily="49" charset="0"/>
+                  <a:cs typeface="Courier New" panose="02070309020205020404" pitchFamily="49" charset="0"/>
+                </a:rPr>
+                <a:t>cdef</a:t>
+              </a:r>
+              <a:r>
+                <a:rPr lang="nl-BE" sz="1600" dirty="0">
+                  <a:latin typeface="Courier New" panose="02070309020205020404" pitchFamily="49" charset="0"/>
+                  <a:cs typeface="Courier New" panose="02070309020205020404" pitchFamily="49" charset="0"/>
+                </a:rPr>
+                <a:t> n = </a:t>
+              </a:r>
+              <a:r>
+                <a:rPr lang="nl-BE" sz="1600" dirty="0" err="1">
+                  <a:latin typeface="Courier New" panose="02070309020205020404" pitchFamily="49" charset="0"/>
+                  <a:cs typeface="Courier New" panose="02070309020205020404" pitchFamily="49" charset="0"/>
+                </a:rPr>
+                <a:t>mem_view.shape</a:t>
+              </a:r>
+              <a:r>
+                <a:rPr lang="nl-BE" sz="1600" dirty="0">
+                  <a:latin typeface="Courier New" panose="02070309020205020404" pitchFamily="49" charset="0"/>
+                  <a:cs typeface="Courier New" panose="02070309020205020404" pitchFamily="49" charset="0"/>
+                </a:rPr>
+                <a:t>[1]</a:t>
+              </a:r>
+            </a:p>
+            <a:p>
+              <a:r>
+                <a:rPr lang="nl-BE" sz="1600" dirty="0">
+                  <a:latin typeface="Courier New" panose="02070309020205020404" pitchFamily="49" charset="0"/>
+                  <a:cs typeface="Courier New" panose="02070309020205020404" pitchFamily="49" charset="0"/>
+                </a:rPr>
+                <a:t>    </a:t>
+              </a:r>
+              <a:r>
+                <a:rPr lang="nl-BE" sz="1600" dirty="0" err="1">
+                  <a:latin typeface="Courier New" panose="02070309020205020404" pitchFamily="49" charset="0"/>
+                  <a:cs typeface="Courier New" panose="02070309020205020404" pitchFamily="49" charset="0"/>
+                </a:rPr>
+                <a:t>cdef</a:t>
+              </a:r>
+              <a:r>
+                <a:rPr lang="nl-BE" sz="1600" dirty="0">
+                  <a:latin typeface="Courier New" panose="02070309020205020404" pitchFamily="49" charset="0"/>
+                  <a:cs typeface="Courier New" panose="02070309020205020404" pitchFamily="49" charset="0"/>
+                </a:rPr>
+                <a:t> int i, j</a:t>
+              </a:r>
+            </a:p>
+            <a:p>
+              <a:r>
+                <a:rPr lang="nl-BE" sz="1600" dirty="0" smtClean="0">
+                  <a:latin typeface="Courier New" panose="02070309020205020404" pitchFamily="49" charset="0"/>
+                  <a:cs typeface="Courier New" panose="02070309020205020404" pitchFamily="49" charset="0"/>
+                </a:rPr>
+                <a:t>    </a:t>
+              </a:r>
+              <a:r>
+                <a:rPr lang="nl-BE" sz="1600" dirty="0" err="1" smtClean="0">
+                  <a:latin typeface="Courier New" panose="02070309020205020404" pitchFamily="49" charset="0"/>
+                  <a:cs typeface="Courier New" panose="02070309020205020404" pitchFamily="49" charset="0"/>
+                </a:rPr>
+                <a:t>for</a:t>
+              </a:r>
+              <a:r>
+                <a:rPr lang="nl-BE" sz="1600" dirty="0" smtClean="0">
+                  <a:latin typeface="Courier New" panose="02070309020205020404" pitchFamily="49" charset="0"/>
+                  <a:cs typeface="Courier New" panose="02070309020205020404" pitchFamily="49" charset="0"/>
+                </a:rPr>
+                <a:t> </a:t>
+              </a:r>
+              <a:r>
+                <a:rPr lang="nl-BE" sz="1600" dirty="0">
+                  <a:latin typeface="Courier New" panose="02070309020205020404" pitchFamily="49" charset="0"/>
+                  <a:cs typeface="Courier New" panose="02070309020205020404" pitchFamily="49" charset="0"/>
+                </a:rPr>
+                <a:t>i in range(m):</a:t>
+              </a:r>
+            </a:p>
+            <a:p>
+              <a:r>
+                <a:rPr lang="nl-BE" sz="1600" dirty="0">
+                  <a:latin typeface="Courier New" panose="02070309020205020404" pitchFamily="49" charset="0"/>
+                  <a:cs typeface="Courier New" panose="02070309020205020404" pitchFamily="49" charset="0"/>
+                </a:rPr>
+                <a:t>    </a:t>
+              </a:r>
+              <a:r>
+                <a:rPr lang="nl-BE" sz="1600" dirty="0" smtClean="0">
+                  <a:latin typeface="Courier New" panose="02070309020205020404" pitchFamily="49" charset="0"/>
+                  <a:cs typeface="Courier New" panose="02070309020205020404" pitchFamily="49" charset="0"/>
+                </a:rPr>
+                <a:t>    </a:t>
+              </a:r>
+              <a:r>
+                <a:rPr lang="nl-BE" sz="1600" dirty="0" err="1">
+                  <a:latin typeface="Courier New" panose="02070309020205020404" pitchFamily="49" charset="0"/>
+                  <a:cs typeface="Courier New" panose="02070309020205020404" pitchFamily="49" charset="0"/>
+                </a:rPr>
+                <a:t>for</a:t>
+              </a:r>
+              <a:r>
+                <a:rPr lang="nl-BE" sz="1600" dirty="0">
+                  <a:latin typeface="Courier New" panose="02070309020205020404" pitchFamily="49" charset="0"/>
+                  <a:cs typeface="Courier New" panose="02070309020205020404" pitchFamily="49" charset="0"/>
+                </a:rPr>
+                <a:t> j in range(n):</a:t>
+              </a:r>
+            </a:p>
+            <a:p>
+              <a:r>
+                <a:rPr lang="nl-BE" sz="1600" dirty="0">
+                  <a:latin typeface="Courier New" panose="02070309020205020404" pitchFamily="49" charset="0"/>
+                  <a:cs typeface="Courier New" panose="02070309020205020404" pitchFamily="49" charset="0"/>
+                </a:rPr>
+                <a:t>    </a:t>
+              </a:r>
+              <a:r>
+                <a:rPr lang="nl-BE" sz="1600" dirty="0" smtClean="0">
+                  <a:latin typeface="Courier New" panose="02070309020205020404" pitchFamily="49" charset="0"/>
+                  <a:cs typeface="Courier New" panose="02070309020205020404" pitchFamily="49" charset="0"/>
+                </a:rPr>
+                <a:t>        </a:t>
+              </a:r>
+              <a:r>
+                <a:rPr lang="nl-BE" sz="1600" dirty="0" err="1">
+                  <a:latin typeface="Courier New" panose="02070309020205020404" pitchFamily="49" charset="0"/>
+                  <a:cs typeface="Courier New" panose="02070309020205020404" pitchFamily="49" charset="0"/>
+                </a:rPr>
+                <a:t>total</a:t>
+              </a:r>
+              <a:r>
+                <a:rPr lang="nl-BE" sz="1600" dirty="0">
+                  <a:latin typeface="Courier New" panose="02070309020205020404" pitchFamily="49" charset="0"/>
+                  <a:cs typeface="Courier New" panose="02070309020205020404" pitchFamily="49" charset="0"/>
+                </a:rPr>
+                <a:t> += </a:t>
+              </a:r>
+              <a:r>
+                <a:rPr lang="nl-BE" sz="1600" dirty="0" err="1">
+                  <a:latin typeface="Courier New" panose="02070309020205020404" pitchFamily="49" charset="0"/>
+                  <a:cs typeface="Courier New" panose="02070309020205020404" pitchFamily="49" charset="0"/>
+                </a:rPr>
+                <a:t>mem_view</a:t>
+              </a:r>
+              <a:r>
+                <a:rPr lang="nl-BE" sz="1600" dirty="0">
+                  <a:latin typeface="Courier New" panose="02070309020205020404" pitchFamily="49" charset="0"/>
+                  <a:cs typeface="Courier New" panose="02070309020205020404" pitchFamily="49" charset="0"/>
+                </a:rPr>
+                <a:t>[i, j]</a:t>
+              </a:r>
+            </a:p>
+            <a:p>
+              <a:r>
+                <a:rPr lang="nl-BE" sz="1600" dirty="0">
+                  <a:latin typeface="Courier New" panose="02070309020205020404" pitchFamily="49" charset="0"/>
+                  <a:cs typeface="Courier New" panose="02070309020205020404" pitchFamily="49" charset="0"/>
+                </a:rPr>
+                <a:t>    return </a:t>
+              </a:r>
+              <a:r>
+                <a:rPr lang="nl-BE" sz="1600" dirty="0" err="1" smtClean="0">
+                  <a:latin typeface="Courier New" panose="02070309020205020404" pitchFamily="49" charset="0"/>
+                  <a:cs typeface="Courier New" panose="02070309020205020404" pitchFamily="49" charset="0"/>
+                </a:rPr>
+                <a:t>total</a:t>
+              </a:r>
+              <a:endParaRPr lang="nl-BE" sz="1600" dirty="0" smtClean="0">
+                <a:latin typeface="Courier New" panose="02070309020205020404" pitchFamily="49" charset="0"/>
+                <a:cs typeface="Courier New" panose="02070309020205020404" pitchFamily="49" charset="0"/>
+              </a:endParaRPr>
+            </a:p>
+            <a:p>
+              <a:endParaRPr lang="nl-BE" sz="1600" dirty="0">
+                <a:latin typeface="Courier New" panose="02070309020205020404" pitchFamily="49" charset="0"/>
+                <a:cs typeface="Courier New" panose="02070309020205020404" pitchFamily="49" charset="0"/>
+              </a:endParaRPr>
+            </a:p>
+          </p:txBody>
+        </p:sp>
+        <p:sp>
+          <p:nvSpPr>
+            <p:cNvPr id="7" name="TextBox 6"/>
+            <p:cNvSpPr txBox="1"/>
+            <p:nvPr/>
+          </p:nvSpPr>
+          <p:spPr>
+            <a:xfrm>
+              <a:off x="4164828" y="4597878"/>
+              <a:ext cx="1253998" cy="307777"/>
+            </a:xfrm>
+            <a:prstGeom prst="rect">
+              <a:avLst/>
+            </a:prstGeom>
+            <a:solidFill>
+              <a:schemeClr val="bg1"/>
+            </a:solidFill>
+            <a:ln>
+              <a:solidFill>
+                <a:schemeClr val="tx1"/>
+              </a:solidFill>
+            </a:ln>
+          </p:spPr>
+          <p:txBody>
+            <a:bodyPr wrap="none" rtlCol="0">
+              <a:spAutoFit/>
+            </a:bodyPr>
+            <a:lstStyle/>
+            <a:p>
+              <a:r>
+                <a:rPr lang="en-US" sz="1400" dirty="0" err="1" smtClean="0"/>
+                <a:t>array_sum</a:t>
+              </a:r>
+              <a:r>
+                <a:rPr lang="en-US" sz="1400" dirty="0" err="1" smtClean="0"/>
+                <a:t>.pyx</a:t>
+              </a:r>
+              <a:endParaRPr lang="nl-BE" sz="1400" dirty="0"/>
+            </a:p>
+          </p:txBody>
+        </p:sp>
+      </p:grpSp>
+      <p:sp>
+        <p:nvSpPr>
+          <p:cNvPr id="8" name="TextBox 7"/>
+          <p:cNvSpPr txBox="1"/>
+          <p:nvPr/>
+        </p:nvSpPr>
+        <p:spPr>
+          <a:xfrm>
+            <a:off x="6232233" y="3864114"/>
+            <a:ext cx="1921167" cy="707886"/>
+          </a:xfrm>
+          <a:prstGeom prst="rect">
+            <a:avLst/>
+          </a:prstGeom>
+          <a:noFill/>
+          <a:ln>
+            <a:solidFill>
+              <a:schemeClr val="tx1"/>
+            </a:solidFill>
+          </a:ln>
+        </p:spPr>
+        <p:txBody>
+          <a:bodyPr wrap="none" rtlCol="0">
+            <a:spAutoFit/>
+          </a:bodyPr>
+          <a:lstStyle/>
+          <a:p>
+            <a:r>
+              <a:rPr lang="en-US" sz="2000" dirty="0" smtClean="0"/>
+              <a:t>Almost as fast as</a:t>
+            </a:r>
+            <a:r>
+              <a:rPr lang="nl-BE" sz="2000" dirty="0" smtClean="0"/>
+              <a:t/>
+            </a:r>
+            <a:br>
+              <a:rPr lang="nl-BE" sz="2000" dirty="0" smtClean="0"/>
+            </a:br>
+            <a:r>
+              <a:rPr lang="nl-BE" sz="2000" dirty="0" err="1" smtClean="0">
+                <a:latin typeface="Courier New" panose="02070309020205020404" pitchFamily="49" charset="0"/>
+                <a:cs typeface="Courier New" panose="02070309020205020404" pitchFamily="49" charset="0"/>
+              </a:rPr>
+              <a:t>np.sum</a:t>
+            </a:r>
+            <a:r>
+              <a:rPr lang="nl-BE" sz="2000" dirty="0" smtClean="0">
+                <a:latin typeface="Courier New" panose="02070309020205020404" pitchFamily="49" charset="0"/>
+                <a:cs typeface="Courier New" panose="02070309020205020404" pitchFamily="49" charset="0"/>
+              </a:rPr>
+              <a:t>(a)</a:t>
+            </a:r>
+            <a:endParaRPr lang="en-US" sz="2000" dirty="0" smtClean="0">
+              <a:latin typeface="Courier New" panose="02070309020205020404" pitchFamily="49" charset="0"/>
+              <a:cs typeface="Courier New" panose="02070309020205020404" pitchFamily="49" charset="0"/>
+            </a:endParaRPr>
           </a:p>
         </p:txBody>
       </p:sp>
@@ -5547,9 +6543,9 @@
         <p:grpSpPr>
           <a:xfrm>
             <a:off x="304800" y="1371600"/>
-            <a:ext cx="3887603" cy="5018809"/>
+            <a:ext cx="3887603" cy="5020574"/>
             <a:chOff x="304800" y="1371600"/>
-            <a:chExt cx="3887603" cy="5018809"/>
+            <a:chExt cx="3887603" cy="5020574"/>
           </a:xfrm>
           <a:solidFill>
             <a:schemeClr val="bg1">
@@ -6034,13 +7030,15 @@
           </p:nvSpPr>
           <p:spPr>
             <a:xfrm>
-              <a:off x="2766764" y="6021077"/>
-              <a:ext cx="1424236" cy="369332"/>
+              <a:off x="3040620" y="6084397"/>
+              <a:ext cx="1150380" cy="307777"/>
             </a:xfrm>
             <a:prstGeom prst="rect">
               <a:avLst/>
             </a:prstGeom>
-            <a:grpFill/>
+            <a:solidFill>
+              <a:schemeClr val="bg1"/>
+            </a:solidFill>
             <a:ln>
               <a:solidFill>
                 <a:schemeClr val="tx1"/>
@@ -6054,10 +7052,10 @@
             <a:lstStyle/>
             <a:p>
               <a:r>
-                <a:rPr lang="en-US" dirty="0" err="1" smtClean="0"/>
+                <a:rPr lang="en-US" sz="1400" dirty="0" err="1" smtClean="0"/>
                 <a:t>primes_c.pyx</a:t>
               </a:r>
-              <a:endParaRPr lang="nl-BE" dirty="0"/>
+              <a:endParaRPr lang="nl-BE" sz="1400" dirty="0"/>
             </a:p>
           </p:txBody>
         </p:sp>
@@ -6071,9 +7069,9 @@
         <p:grpSpPr>
           <a:xfrm>
             <a:off x="4951597" y="1371600"/>
-            <a:ext cx="3887603" cy="5017532"/>
+            <a:ext cx="3887603" cy="5020574"/>
             <a:chOff x="4951597" y="1371600"/>
-            <a:chExt cx="3887603" cy="5017532"/>
+            <a:chExt cx="3887603" cy="5020574"/>
           </a:xfrm>
           <a:solidFill>
             <a:schemeClr val="bg1">
@@ -6520,13 +7518,15 @@
           </p:nvSpPr>
           <p:spPr>
             <a:xfrm>
-              <a:off x="7490305" y="6019800"/>
-              <a:ext cx="1348895" cy="369332"/>
+              <a:off x="7748132" y="6084397"/>
+              <a:ext cx="1091068" cy="307777"/>
             </a:xfrm>
             <a:prstGeom prst="rect">
               <a:avLst/>
             </a:prstGeom>
-            <a:grpFill/>
+            <a:solidFill>
+              <a:schemeClr val="bg1"/>
+            </a:solidFill>
             <a:ln>
               <a:solidFill>
                 <a:schemeClr val="tx1"/>
@@ -6540,10 +7540,10 @@
             <a:lstStyle/>
             <a:p>
               <a:r>
-                <a:rPr lang="en-US" dirty="0" smtClean="0"/>
+                <a:rPr lang="en-US" sz="1400" dirty="0" smtClean="0"/>
                 <a:t>primes_p.py</a:t>
               </a:r>
-              <a:endParaRPr lang="nl-BE" dirty="0"/>
+              <a:endParaRPr lang="nl-BE" sz="1400" dirty="0"/>
             </a:p>
           </p:txBody>
         </p:sp>
@@ -6643,9 +7643,9 @@
         <p:grpSpPr>
           <a:xfrm>
             <a:off x="538298" y="1676400"/>
-            <a:ext cx="5863144" cy="1817132"/>
+            <a:ext cx="5863144" cy="1820174"/>
             <a:chOff x="304800" y="1371600"/>
-            <a:chExt cx="5863144" cy="1817132"/>
+            <a:chExt cx="5863144" cy="1820174"/>
           </a:xfrm>
           <a:solidFill>
             <a:schemeClr val="bg1">
@@ -6845,13 +7845,15 @@
           </p:nvSpPr>
           <p:spPr>
             <a:xfrm>
-              <a:off x="5175492" y="2819400"/>
-              <a:ext cx="991810" cy="369332"/>
+              <a:off x="5352912" y="2883997"/>
+              <a:ext cx="814390" cy="307777"/>
             </a:xfrm>
             <a:prstGeom prst="rect">
               <a:avLst/>
             </a:prstGeom>
-            <a:grpFill/>
+            <a:solidFill>
+              <a:schemeClr val="bg1"/>
+            </a:solidFill>
             <a:ln>
               <a:solidFill>
                 <a:schemeClr val="tx1"/>
@@ -6865,10 +7867,10 @@
             <a:lstStyle/>
             <a:p>
               <a:r>
-                <a:rPr lang="en-US" dirty="0" smtClean="0"/>
+                <a:rPr lang="en-US" sz="1400" dirty="0" smtClean="0"/>
                 <a:t>setup.py</a:t>
               </a:r>
-              <a:endParaRPr lang="nl-BE" dirty="0"/>
+              <a:endParaRPr lang="nl-BE" sz="1400" dirty="0"/>
             </a:p>
           </p:txBody>
         </p:sp>
@@ -7262,13 +8264,15 @@
           </p:nvSpPr>
           <p:spPr>
             <a:xfrm>
-              <a:off x="5061191" y="2819400"/>
-              <a:ext cx="1111651" cy="369332"/>
+              <a:off x="5265477" y="2880955"/>
+              <a:ext cx="906723" cy="307777"/>
             </a:xfrm>
             <a:prstGeom prst="rect">
               <a:avLst/>
             </a:prstGeom>
-            <a:grpFill/>
+            <a:solidFill>
+              <a:schemeClr val="bg1"/>
+            </a:solidFill>
             <a:ln>
               <a:solidFill>
                 <a:schemeClr val="tx1"/>
@@ -7282,10 +8286,10 @@
             <a:lstStyle/>
             <a:p>
               <a:r>
-                <a:rPr lang="en-US" dirty="0" smtClean="0"/>
+                <a:rPr lang="en-US" sz="1400" dirty="0" smtClean="0"/>
                 <a:t>primes.py</a:t>
               </a:r>
-              <a:endParaRPr lang="nl-BE" dirty="0"/>
+              <a:endParaRPr lang="nl-BE" sz="1400" dirty="0"/>
             </a:p>
           </p:txBody>
         </p:sp>
@@ -7483,22 +8487,14 @@
             </a:r>
             <a:r>
               <a:rPr lang="en-US" dirty="0" smtClean="0"/>
-              <a:t> keyword for </a:t>
-            </a:r>
+              <a:t> keyword for declaration</a:t>
+            </a:r>
+          </a:p>
+          <a:p>
+            <a:pPr lvl="1"/>
             <a:r>
               <a:rPr lang="en-US" dirty="0" smtClean="0"/>
-              <a:t>declaration</a:t>
-            </a:r>
-          </a:p>
-          <a:p>
-            <a:pPr lvl="1"/>
-            <a:r>
-              <a:rPr lang="en-US" dirty="0" smtClean="0"/>
-              <a:t>Local variables</a:t>
-            </a:r>
-            <a:r>
-              <a:rPr lang="en-US" dirty="0" smtClean="0"/>
-              <a:t>, e.g.,</a:t>
+              <a:t>Local variables, e.g.,</a:t>
             </a:r>
           </a:p>
           <a:p>
@@ -7515,22 +8511,17 @@
               <a:rPr lang="en-US" dirty="0" smtClean="0"/>
               <a:t>Function parameters</a:t>
             </a:r>
+          </a:p>
+          <a:p>
+            <a:endParaRPr lang="en-US" dirty="0"/>
+          </a:p>
+          <a:p>
             <a:endParaRPr lang="en-US" dirty="0" smtClean="0"/>
           </a:p>
           <a:p>
-            <a:endParaRPr lang="en-US" dirty="0"/>
-          </a:p>
-          <a:p>
-            <a:endParaRPr lang="en-US" dirty="0" smtClean="0"/>
-          </a:p>
-          <a:p>
             <a:r>
               <a:rPr lang="en-US" dirty="0" smtClean="0"/>
-              <a:t>Python types with C </a:t>
-            </a:r>
-            <a:r>
-              <a:rPr lang="en-US" dirty="0" smtClean="0"/>
-              <a:t>implementation:</a:t>
+              <a:t>Python types with C implementation:</a:t>
             </a:r>
             <a:r>
               <a:rPr lang="nl-BE" dirty="0" smtClean="0"/>
@@ -7706,14 +8697,7 @@
                 <a:latin typeface="Courier New" panose="02070309020205020404" pitchFamily="49" charset="0"/>
                 <a:cs typeface="Courier New" panose="02070309020205020404" pitchFamily="49" charset="0"/>
               </a:rPr>
-              <a:t> double </a:t>
-            </a:r>
-            <a:r>
-              <a:rPr lang="en-US" dirty="0" smtClean="0">
-                <a:latin typeface="Courier New" panose="02070309020205020404" pitchFamily="49" charset="0"/>
-                <a:cs typeface="Courier New" panose="02070309020205020404" pitchFamily="49" charset="0"/>
-              </a:rPr>
-              <a:t>x[100]</a:t>
+              <a:t> double x[100]</a:t>
             </a:r>
             <a:endParaRPr lang="nl-BE" dirty="0">
               <a:latin typeface="Courier New" panose="02070309020205020404" pitchFamily="49" charset="0"/>
@@ -7781,10 +8765,6 @@
               </a:rPr>
               <a:t> k):</a:t>
             </a:r>
-            <a:endParaRPr lang="en-US" dirty="0" smtClean="0">
-              <a:latin typeface="Courier New" panose="02070309020205020404" pitchFamily="49" charset="0"/>
-              <a:cs typeface="Courier New" panose="02070309020205020404" pitchFamily="49" charset="0"/>
-            </a:endParaRPr>
           </a:p>
           <a:p>
             <a:r>
@@ -7844,14 +8824,7 @@
                 <a:latin typeface="Courier New" panose="02070309020205020404" pitchFamily="49" charset="0"/>
                 <a:cs typeface="Courier New" panose="02070309020205020404" pitchFamily="49" charset="0"/>
               </a:rPr>
-              <a:t> </a:t>
-            </a:r>
-            <a:r>
-              <a:rPr lang="en-US" dirty="0" smtClean="0">
-                <a:latin typeface="Courier New" panose="02070309020205020404" pitchFamily="49" charset="0"/>
-                <a:cs typeface="Courier New" panose="02070309020205020404" pitchFamily="49" charset="0"/>
-              </a:rPr>
-              <a:t>list results = []</a:t>
+              <a:t> list results = []</a:t>
             </a:r>
             <a:endParaRPr lang="nl-BE" dirty="0">
               <a:latin typeface="Courier New" panose="02070309020205020404" pitchFamily="49" charset="0"/>

</xml_diff>

<commit_message>
Added slide on structures in Cython
</commit_message>
<xml_diff>
--- a/Python/Cython/cython.pptx
+++ b/Python/Cython/cython.pptx
@@ -5,7 +5,7 @@
     <p:sldMasterId id="2147483648" r:id="rId1"/>
   </p:sldMasterIdLst>
   <p:notesMasterIdLst>
-    <p:notesMasterId r:id="rId19"/>
+    <p:notesMasterId r:id="rId22"/>
   </p:notesMasterIdLst>
   <p:sldIdLst>
     <p:sldId id="256" r:id="rId2"/>
@@ -18,13 +18,16 @@
     <p:sldId id="263" r:id="rId9"/>
     <p:sldId id="265" r:id="rId10"/>
     <p:sldId id="264" r:id="rId11"/>
-    <p:sldId id="268" r:id="rId12"/>
-    <p:sldId id="267" r:id="rId13"/>
-    <p:sldId id="272" r:id="rId14"/>
-    <p:sldId id="269" r:id="rId15"/>
-    <p:sldId id="270" r:id="rId16"/>
-    <p:sldId id="271" r:id="rId17"/>
-    <p:sldId id="273" r:id="rId18"/>
+    <p:sldId id="276" r:id="rId12"/>
+    <p:sldId id="268" r:id="rId13"/>
+    <p:sldId id="267" r:id="rId14"/>
+    <p:sldId id="272" r:id="rId15"/>
+    <p:sldId id="269" r:id="rId16"/>
+    <p:sldId id="270" r:id="rId17"/>
+    <p:sldId id="271" r:id="rId18"/>
+    <p:sldId id="273" r:id="rId19"/>
+    <p:sldId id="274" r:id="rId20"/>
+    <p:sldId id="275" r:id="rId21"/>
   </p:sldIdLst>
   <p:sldSz cx="9144000" cy="6858000" type="screen4x3"/>
   <p:notesSz cx="6858000" cy="9144000"/>
@@ -142,6 +145,7 @@
             <p14:sldId id="263"/>
             <p14:sldId id="265"/>
             <p14:sldId id="264"/>
+            <p14:sldId id="276"/>
             <p14:sldId id="268"/>
             <p14:sldId id="267"/>
             <p14:sldId id="272"/>
@@ -149,12 +153,14 @@
             <p14:sldId id="270"/>
             <p14:sldId id="271"/>
             <p14:sldId id="273"/>
+            <p14:sldId id="274"/>
+            <p14:sldId id="275"/>
           </p14:sldIdLst>
         </p14:section>
       </p14:sectionLst>
     </p:ext>
     <p:ext uri="{EFAFB233-063F-42B5-8137-9DF3F51BA10A}">
-      <p15:sldGuideLst xmlns:p15="http://schemas.microsoft.com/office/powerpoint/2012/main" xmlns="">
+      <p15:sldGuideLst xmlns:p15="http://schemas.microsoft.com/office/powerpoint/2012/main">
         <p15:guide id="1" orient="horz" pos="2160">
           <p15:clr>
             <a:srgbClr val="A4A3A4"/>
@@ -253,7 +259,7 @@
           <a:p>
             <a:fld id="{16B045E4-7DA3-41B9-B0DA-4BEE0876FA88}" type="datetimeFigureOut">
               <a:rPr lang="nl-BE" smtClean="0"/>
-              <a:t>23/02/2016</a:t>
+              <a:t>2016-02-23</a:t>
             </a:fld>
             <a:endParaRPr lang="nl-BE"/>
           </a:p>
@@ -702,7 +708,7 @@
           <a:p>
             <a:fld id="{53B2420D-148A-400F-B88D-527DF6E13622}" type="datetime1">
               <a:rPr lang="en-US" smtClean="0"/>
-              <a:t>2016-02-23</a:t>
+              <a:t>2/23/2016</a:t>
             </a:fld>
             <a:endParaRPr lang="en-US"/>
           </a:p>
@@ -868,7 +874,7 @@
           <a:p>
             <a:fld id="{52A01B9A-6787-4B63-BAEF-E3CF67589D82}" type="datetime1">
               <a:rPr lang="en-US" smtClean="0"/>
-              <a:t>2016-02-23</a:t>
+              <a:t>2/23/2016</a:t>
             </a:fld>
             <a:endParaRPr lang="en-US"/>
           </a:p>
@@ -1044,7 +1050,7 @@
           <a:p>
             <a:fld id="{6E982D42-2071-4A3D-B614-2380183202E1}" type="datetime1">
               <a:rPr lang="en-US" smtClean="0"/>
-              <a:t>2016-02-23</a:t>
+              <a:t>2/23/2016</a:t>
             </a:fld>
             <a:endParaRPr lang="en-US"/>
           </a:p>
@@ -1210,7 +1216,7 @@
           <a:p>
             <a:fld id="{2E90E067-04B9-40C0-BFE6-53BAD2F7119C}" type="datetime1">
               <a:rPr lang="en-US" smtClean="0"/>
-              <a:t>2016-02-23</a:t>
+              <a:t>2/23/2016</a:t>
             </a:fld>
             <a:endParaRPr lang="en-US"/>
           </a:p>
@@ -1452,7 +1458,7 @@
           <a:p>
             <a:fld id="{D7CB2E72-949E-4479-B957-DBA32EC1FAB9}" type="datetime1">
               <a:rPr lang="en-US" smtClean="0"/>
-              <a:t>2016-02-23</a:t>
+              <a:t>2/23/2016</a:t>
             </a:fld>
             <a:endParaRPr lang="en-US"/>
           </a:p>
@@ -1736,7 +1742,7 @@
           <a:p>
             <a:fld id="{A06819D6-C5C8-405A-96EE-DAC9728267C0}" type="datetime1">
               <a:rPr lang="en-US" smtClean="0"/>
-              <a:t>2016-02-23</a:t>
+              <a:t>2/23/2016</a:t>
             </a:fld>
             <a:endParaRPr lang="en-US"/>
           </a:p>
@@ -2154,7 +2160,7 @@
           <a:p>
             <a:fld id="{476A766D-F1AD-47B2-B323-71C0AAEFC468}" type="datetime1">
               <a:rPr lang="en-US" smtClean="0"/>
-              <a:t>2016-02-23</a:t>
+              <a:t>2/23/2016</a:t>
             </a:fld>
             <a:endParaRPr lang="en-US"/>
           </a:p>
@@ -2268,7 +2274,7 @@
           <a:p>
             <a:fld id="{E8021487-0835-4E27-A96A-FE7FCF3265BD}" type="datetime1">
               <a:rPr lang="en-US" smtClean="0"/>
-              <a:t>2016-02-23</a:t>
+              <a:t>2/23/2016</a:t>
             </a:fld>
             <a:endParaRPr lang="en-US"/>
           </a:p>
@@ -2359,7 +2365,7 @@
           <a:p>
             <a:fld id="{D8423321-723F-439B-A2FC-3D1497BCF824}" type="datetime1">
               <a:rPr lang="en-US" smtClean="0"/>
-              <a:t>2016-02-23</a:t>
+              <a:t>2/23/2016</a:t>
             </a:fld>
             <a:endParaRPr lang="en-US"/>
           </a:p>
@@ -2632,7 +2638,7 @@
           <a:p>
             <a:fld id="{C23318F9-3CB8-42B9-8393-7570C1C1A70D}" type="datetime1">
               <a:rPr lang="en-US" smtClean="0"/>
-              <a:t>2016-02-23</a:t>
+              <a:t>2/23/2016</a:t>
             </a:fld>
             <a:endParaRPr lang="en-US"/>
           </a:p>
@@ -2881,7 +2887,7 @@
           <a:p>
             <a:fld id="{6867E127-D066-4A1C-B918-F70FF61E725D}" type="datetime1">
               <a:rPr lang="en-US" smtClean="0"/>
-              <a:t>2016-02-23</a:t>
+              <a:t>2/23/2016</a:t>
             </a:fld>
             <a:endParaRPr lang="en-US"/>
           </a:p>
@@ -3090,7 +3096,7 @@
           <a:p>
             <a:fld id="{E6FF7314-6885-4B6E-804E-F9FE9C155D78}" type="datetime1">
               <a:rPr lang="en-US" smtClean="0"/>
-              <a:t>2016-02-23</a:t>
+              <a:t>2/23/2016</a:t>
             </a:fld>
             <a:endParaRPr lang="en-US"/>
           </a:p>
@@ -4257,8 +4263,12 @@
           <a:lstStyle/>
           <a:p>
             <a:r>
+              <a:rPr lang="en-US" dirty="0"/>
+              <a:t>S</a:t>
+            </a:r>
+            <a:r>
               <a:rPr lang="en-US" dirty="0" smtClean="0"/>
-              <a:t>Buffer protocol</a:t>
+              <a:t>tructures</a:t>
             </a:r>
             <a:endParaRPr lang="nl-BE" dirty="0"/>
           </a:p>
@@ -4281,43 +4291,22 @@
           <a:p>
             <a:r>
               <a:rPr lang="en-US" dirty="0" smtClean="0"/>
-              <a:t>Some Python objects expose internal data through buffer protocol</a:t>
-            </a:r>
-          </a:p>
-          <a:p>
-            <a:pPr lvl="1"/>
+              <a:t>Define </a:t>
+            </a:r>
+            <a:r>
+              <a:rPr lang="en-US" dirty="0" err="1" smtClean="0"/>
+              <a:t>struct</a:t>
+            </a:r>
             <a:r>
               <a:rPr lang="en-US" dirty="0" smtClean="0"/>
-              <a:t>E.g., </a:t>
-            </a:r>
-            <a:r>
-              <a:rPr lang="en-US" dirty="0" smtClean="0">
-                <a:latin typeface="Courier New" panose="02070309020205020404" pitchFamily="49" charset="0"/>
-                <a:cs typeface="Courier New" panose="02070309020205020404" pitchFamily="49" charset="0"/>
-              </a:rPr>
-              <a:t>bytes</a:t>
-            </a:r>
-            <a:r>
-              <a:rPr lang="en-US" dirty="0" smtClean="0"/>
-              <a:t>, </a:t>
+              <a:t> type in </a:t>
             </a:r>
             <a:r>
               <a:rPr lang="en-US" dirty="0" err="1" smtClean="0">
                 <a:latin typeface="Courier New" panose="02070309020205020404" pitchFamily="49" charset="0"/>
                 <a:cs typeface="Courier New" panose="02070309020205020404" pitchFamily="49" charset="0"/>
               </a:rPr>
-              <a:t>bytearray</a:t>
-            </a:r>
-            <a:r>
-              <a:rPr lang="en-US" dirty="0" smtClean="0"/>
-              <a:t>, </a:t>
-            </a:r>
-            <a:r>
-              <a:rPr lang="en-US" dirty="0" err="1" smtClean="0">
-                <a:latin typeface="Courier New" panose="02070309020205020404" pitchFamily="49" charset="0"/>
-                <a:cs typeface="Courier New" panose="02070309020205020404" pitchFamily="49" charset="0"/>
-              </a:rPr>
-              <a:t>array.array</a:t>
+              <a:t>point.pyx</a:t>
             </a:r>
             <a:endParaRPr lang="en-US" dirty="0" smtClean="0">
               <a:latin typeface="Courier New" panose="02070309020205020404" pitchFamily="49" charset="0"/>
@@ -4325,16 +4314,25 @@
             </a:endParaRPr>
           </a:p>
           <a:p>
+            <a:endParaRPr lang="en-US" dirty="0"/>
+          </a:p>
+          <a:p>
+            <a:pPr marL="0" indent="0">
+              <a:buNone/>
+            </a:pPr>
+            <a:endParaRPr lang="en-US" dirty="0"/>
+          </a:p>
+          <a:p>
             <a:r>
               <a:rPr lang="en-US" dirty="0" smtClean="0"/>
-              <a:t>For direct access, wrap in </a:t>
+              <a:t>Declare and use variables in </a:t>
             </a:r>
             <a:r>
               <a:rPr lang="en-US" dirty="0" err="1" smtClean="0">
                 <a:latin typeface="Courier New" panose="02070309020205020404" pitchFamily="49" charset="0"/>
                 <a:cs typeface="Courier New" panose="02070309020205020404" pitchFamily="49" charset="0"/>
               </a:rPr>
-              <a:t>memoryview</a:t>
+              <a:t>point.pyx</a:t>
             </a:r>
             <a:endParaRPr lang="en-US" dirty="0" smtClean="0">
               <a:latin typeface="Courier New" panose="02070309020205020404" pitchFamily="49" charset="0"/>
@@ -4342,10 +4340,12 @@
             </a:endParaRPr>
           </a:p>
           <a:p>
-            <a:pPr lvl="1"/>
+            <a:endParaRPr lang="en-US" dirty="0"/>
+          </a:p>
+          <a:p>
             <a:r>
               <a:rPr lang="en-US" dirty="0" smtClean="0"/>
-              <a:t>Delivers fast direct access from generated C code to Python data</a:t>
+              <a:t>Use variables in Python</a:t>
             </a:r>
             <a:endParaRPr lang="nl-BE" dirty="0"/>
           </a:p>
@@ -4370,6 +4370,1226 @@
               <a:rPr lang="en-US" smtClean="0"/>
               <a:pPr/>
               <a:t>11</a:t>
+            </a:fld>
+            <a:endParaRPr lang="en-US"/>
+          </a:p>
+        </p:txBody>
+      </p:sp>
+      <p:sp>
+        <p:nvSpPr>
+          <p:cNvPr id="5" name="TextBox 4"/>
+          <p:cNvSpPr txBox="1"/>
+          <p:nvPr/>
+        </p:nvSpPr>
+        <p:spPr>
+          <a:xfrm>
+            <a:off x="1066800" y="2209800"/>
+            <a:ext cx="2666114" cy="1200329"/>
+          </a:xfrm>
+          <a:prstGeom prst="rect">
+            <a:avLst/>
+          </a:prstGeom>
+          <a:solidFill>
+            <a:schemeClr val="bg1">
+              <a:lumMod val="85000"/>
+            </a:schemeClr>
+          </a:solidFill>
+          <a:ln>
+            <a:solidFill>
+              <a:schemeClr val="tx1"/>
+            </a:solidFill>
+          </a:ln>
+        </p:spPr>
+        <p:txBody>
+          <a:bodyPr wrap="none" rtlCol="0">
+            <a:spAutoFit/>
+          </a:bodyPr>
+          <a:lstStyle/>
+          <a:p>
+            <a:r>
+              <a:rPr lang="en-US" dirty="0" err="1" smtClean="0">
+                <a:latin typeface="Courier New" panose="02070309020205020404" pitchFamily="49" charset="0"/>
+                <a:cs typeface="Courier New" panose="02070309020205020404" pitchFamily="49" charset="0"/>
+              </a:rPr>
+              <a:t>cdef</a:t>
+            </a:r>
+            <a:r>
+              <a:rPr lang="en-US" dirty="0" smtClean="0">
+                <a:latin typeface="Courier New" panose="02070309020205020404" pitchFamily="49" charset="0"/>
+                <a:cs typeface="Courier New" panose="02070309020205020404" pitchFamily="49" charset="0"/>
+              </a:rPr>
+              <a:t> </a:t>
+            </a:r>
+            <a:r>
+              <a:rPr lang="en-US" dirty="0" err="1" smtClean="0">
+                <a:latin typeface="Courier New" panose="02070309020205020404" pitchFamily="49" charset="0"/>
+                <a:cs typeface="Courier New" panose="02070309020205020404" pitchFamily="49" charset="0"/>
+              </a:rPr>
+              <a:t>struct</a:t>
+            </a:r>
+            <a:r>
+              <a:rPr lang="en-US" dirty="0" smtClean="0">
+                <a:latin typeface="Courier New" panose="02070309020205020404" pitchFamily="49" charset="0"/>
+                <a:cs typeface="Courier New" panose="02070309020205020404" pitchFamily="49" charset="0"/>
+              </a:rPr>
+              <a:t> Point:</a:t>
+            </a:r>
+            <a:br>
+              <a:rPr lang="en-US" dirty="0" smtClean="0">
+                <a:latin typeface="Courier New" panose="02070309020205020404" pitchFamily="49" charset="0"/>
+                <a:cs typeface="Courier New" panose="02070309020205020404" pitchFamily="49" charset="0"/>
+              </a:rPr>
+            </a:br>
+            <a:r>
+              <a:rPr lang="en-US" dirty="0" smtClean="0">
+                <a:latin typeface="Courier New" panose="02070309020205020404" pitchFamily="49" charset="0"/>
+                <a:cs typeface="Courier New" panose="02070309020205020404" pitchFamily="49" charset="0"/>
+              </a:rPr>
+              <a:t>    double x</a:t>
+            </a:r>
+          </a:p>
+          <a:p>
+            <a:r>
+              <a:rPr lang="en-US" dirty="0">
+                <a:latin typeface="Courier New" panose="02070309020205020404" pitchFamily="49" charset="0"/>
+                <a:cs typeface="Courier New" panose="02070309020205020404" pitchFamily="49" charset="0"/>
+              </a:rPr>
+              <a:t> </a:t>
+            </a:r>
+            <a:r>
+              <a:rPr lang="en-US" dirty="0" smtClean="0">
+                <a:latin typeface="Courier New" panose="02070309020205020404" pitchFamily="49" charset="0"/>
+                <a:cs typeface="Courier New" panose="02070309020205020404" pitchFamily="49" charset="0"/>
+              </a:rPr>
+              <a:t>   double </a:t>
+            </a:r>
+            <a:r>
+              <a:rPr lang="en-US" dirty="0" smtClean="0">
+                <a:latin typeface="Courier New" panose="02070309020205020404" pitchFamily="49" charset="0"/>
+                <a:cs typeface="Courier New" panose="02070309020205020404" pitchFamily="49" charset="0"/>
+              </a:rPr>
+              <a:t>y</a:t>
+            </a:r>
+            <a:br>
+              <a:rPr lang="en-US" dirty="0" smtClean="0">
+                <a:latin typeface="Courier New" panose="02070309020205020404" pitchFamily="49" charset="0"/>
+                <a:cs typeface="Courier New" panose="02070309020205020404" pitchFamily="49" charset="0"/>
+              </a:rPr>
+            </a:br>
+            <a:r>
+              <a:rPr lang="en-US" dirty="0" smtClean="0">
+                <a:latin typeface="Courier New" panose="02070309020205020404" pitchFamily="49" charset="0"/>
+                <a:cs typeface="Courier New" panose="02070309020205020404" pitchFamily="49" charset="0"/>
+              </a:rPr>
+              <a:t>    </a:t>
+            </a:r>
+            <a:r>
+              <a:rPr lang="en-US" dirty="0" err="1" smtClean="0">
+                <a:latin typeface="Courier New" panose="02070309020205020404" pitchFamily="49" charset="0"/>
+                <a:cs typeface="Courier New" panose="02070309020205020404" pitchFamily="49" charset="0"/>
+              </a:rPr>
+              <a:t>int</a:t>
+            </a:r>
+            <a:r>
+              <a:rPr lang="en-US" dirty="0" smtClean="0">
+                <a:latin typeface="Courier New" panose="02070309020205020404" pitchFamily="49" charset="0"/>
+                <a:cs typeface="Courier New" panose="02070309020205020404" pitchFamily="49" charset="0"/>
+              </a:rPr>
+              <a:t> id</a:t>
+            </a:r>
+            <a:endParaRPr lang="en-US" dirty="0" smtClean="0">
+              <a:latin typeface="Courier New" panose="02070309020205020404" pitchFamily="49" charset="0"/>
+              <a:cs typeface="Courier New" panose="02070309020205020404" pitchFamily="49" charset="0"/>
+            </a:endParaRPr>
+          </a:p>
+        </p:txBody>
+      </p:sp>
+      <p:grpSp>
+        <p:nvGrpSpPr>
+          <p:cNvPr id="6" name="Group 5"/>
+          <p:cNvGrpSpPr/>
+          <p:nvPr/>
+        </p:nvGrpSpPr>
+        <p:grpSpPr>
+          <a:xfrm>
+            <a:off x="3519975" y="2269004"/>
+            <a:ext cx="4303852" cy="369332"/>
+            <a:chOff x="4264642" y="3245348"/>
+            <a:chExt cx="4303852" cy="369332"/>
+          </a:xfrm>
+        </p:grpSpPr>
+        <p:sp>
+          <p:nvSpPr>
+            <p:cNvPr id="7" name="TextBox 6"/>
+            <p:cNvSpPr txBox="1"/>
+            <p:nvPr/>
+          </p:nvSpPr>
+          <p:spPr>
+            <a:xfrm>
+              <a:off x="5238928" y="3245348"/>
+              <a:ext cx="3329566" cy="369332"/>
+            </a:xfrm>
+            <a:prstGeom prst="rect">
+              <a:avLst/>
+            </a:prstGeom>
+            <a:noFill/>
+            <a:ln>
+              <a:solidFill>
+                <a:schemeClr val="tx1"/>
+              </a:solidFill>
+            </a:ln>
+          </p:spPr>
+          <p:txBody>
+            <a:bodyPr wrap="none" rtlCol="0">
+              <a:spAutoFit/>
+            </a:bodyPr>
+            <a:lstStyle/>
+            <a:p>
+              <a:r>
+                <a:rPr lang="en-US" dirty="0"/>
+                <a:t>Note: </a:t>
+              </a:r>
+              <a:r>
+                <a:rPr lang="en-US" dirty="0" smtClean="0"/>
+                <a:t>Python-like </a:t>
+              </a:r>
+              <a:r>
+                <a:rPr lang="en-US" dirty="0"/>
+                <a:t>block structure</a:t>
+              </a:r>
+              <a:endParaRPr lang="nl-BE" dirty="0"/>
+            </a:p>
+          </p:txBody>
+        </p:sp>
+        <p:cxnSp>
+          <p:nvCxnSpPr>
+            <p:cNvPr id="8" name="Straight Arrow Connector 7"/>
+            <p:cNvCxnSpPr>
+              <a:stCxn id="7" idx="1"/>
+            </p:cNvCxnSpPr>
+            <p:nvPr/>
+          </p:nvCxnSpPr>
+          <p:spPr>
+            <a:xfrm flipH="1">
+              <a:off x="4264642" y="3430014"/>
+              <a:ext cx="974286" cy="68927"/>
+            </a:xfrm>
+            <a:prstGeom prst="straightConnector1">
+              <a:avLst/>
+            </a:prstGeom>
+            <a:ln w="19050">
+              <a:solidFill>
+                <a:schemeClr val="tx1"/>
+              </a:solidFill>
+              <a:tailEnd type="stealth" w="lg" len="lg"/>
+            </a:ln>
+          </p:spPr>
+          <p:style>
+            <a:lnRef idx="1">
+              <a:schemeClr val="accent1"/>
+            </a:lnRef>
+            <a:fillRef idx="0">
+              <a:schemeClr val="accent1"/>
+            </a:fillRef>
+            <a:effectRef idx="0">
+              <a:schemeClr val="accent1"/>
+            </a:effectRef>
+            <a:fontRef idx="minor">
+              <a:schemeClr val="tx1"/>
+            </a:fontRef>
+          </p:style>
+        </p:cxnSp>
+      </p:grpSp>
+      <p:sp>
+        <p:nvSpPr>
+          <p:cNvPr id="9" name="TextBox 8"/>
+          <p:cNvSpPr txBox="1"/>
+          <p:nvPr/>
+        </p:nvSpPr>
+        <p:spPr>
+          <a:xfrm>
+            <a:off x="1067686" y="3886200"/>
+            <a:ext cx="6388287" cy="646331"/>
+          </a:xfrm>
+          <a:prstGeom prst="rect">
+            <a:avLst/>
+          </a:prstGeom>
+          <a:solidFill>
+            <a:schemeClr val="bg1">
+              <a:lumMod val="85000"/>
+            </a:schemeClr>
+          </a:solidFill>
+          <a:ln>
+            <a:solidFill>
+              <a:schemeClr val="tx1"/>
+            </a:solidFill>
+          </a:ln>
+        </p:spPr>
+        <p:txBody>
+          <a:bodyPr wrap="none" rtlCol="0">
+            <a:spAutoFit/>
+          </a:bodyPr>
+          <a:lstStyle/>
+          <a:p>
+            <a:r>
+              <a:rPr lang="en-US" dirty="0" err="1">
+                <a:latin typeface="Courier New" panose="02070309020205020404" pitchFamily="49" charset="0"/>
+                <a:cs typeface="Courier New" panose="02070309020205020404" pitchFamily="49" charset="0"/>
+              </a:rPr>
+              <a:t>def</a:t>
+            </a:r>
+            <a:r>
+              <a:rPr lang="en-US" dirty="0">
+                <a:latin typeface="Courier New" panose="02070309020205020404" pitchFamily="49" charset="0"/>
+                <a:cs typeface="Courier New" panose="02070309020205020404" pitchFamily="49" charset="0"/>
+              </a:rPr>
+              <a:t> radius(Point point):</a:t>
+            </a:r>
+          </a:p>
+          <a:p>
+            <a:r>
+              <a:rPr lang="en-US" dirty="0">
+                <a:latin typeface="Courier New" panose="02070309020205020404" pitchFamily="49" charset="0"/>
+                <a:cs typeface="Courier New" panose="02070309020205020404" pitchFamily="49" charset="0"/>
+              </a:rPr>
+              <a:t>    return </a:t>
+            </a:r>
+            <a:r>
+              <a:rPr lang="en-US" dirty="0" err="1">
+                <a:latin typeface="Courier New" panose="02070309020205020404" pitchFamily="49" charset="0"/>
+                <a:cs typeface="Courier New" panose="02070309020205020404" pitchFamily="49" charset="0"/>
+              </a:rPr>
+              <a:t>math.sqrt</a:t>
+            </a:r>
+            <a:r>
+              <a:rPr lang="en-US" dirty="0">
+                <a:latin typeface="Courier New" panose="02070309020205020404" pitchFamily="49" charset="0"/>
+                <a:cs typeface="Courier New" panose="02070309020205020404" pitchFamily="49" charset="0"/>
+              </a:rPr>
+              <a:t>(</a:t>
+            </a:r>
+            <a:r>
+              <a:rPr lang="en-US" dirty="0" err="1">
+                <a:latin typeface="Courier New" panose="02070309020205020404" pitchFamily="49" charset="0"/>
+                <a:cs typeface="Courier New" panose="02070309020205020404" pitchFamily="49" charset="0"/>
+              </a:rPr>
+              <a:t>point.x</a:t>
+            </a:r>
+            <a:r>
+              <a:rPr lang="en-US" dirty="0">
+                <a:latin typeface="Courier New" panose="02070309020205020404" pitchFamily="49" charset="0"/>
+                <a:cs typeface="Courier New" panose="02070309020205020404" pitchFamily="49" charset="0"/>
+              </a:rPr>
+              <a:t>**2 + </a:t>
+            </a:r>
+            <a:r>
+              <a:rPr lang="en-US" dirty="0" err="1">
+                <a:latin typeface="Courier New" panose="02070309020205020404" pitchFamily="49" charset="0"/>
+                <a:cs typeface="Courier New" panose="02070309020205020404" pitchFamily="49" charset="0"/>
+              </a:rPr>
+              <a:t>point.y</a:t>
+            </a:r>
+            <a:r>
+              <a:rPr lang="en-US" dirty="0">
+                <a:latin typeface="Courier New" panose="02070309020205020404" pitchFamily="49" charset="0"/>
+                <a:cs typeface="Courier New" panose="02070309020205020404" pitchFamily="49" charset="0"/>
+              </a:rPr>
+              <a:t>**2)</a:t>
+            </a:r>
+          </a:p>
+        </p:txBody>
+      </p:sp>
+      <p:grpSp>
+        <p:nvGrpSpPr>
+          <p:cNvPr id="17" name="Group 16"/>
+          <p:cNvGrpSpPr/>
+          <p:nvPr/>
+        </p:nvGrpSpPr>
+        <p:grpSpPr>
+          <a:xfrm>
+            <a:off x="2971800" y="2606402"/>
+            <a:ext cx="3352800" cy="659202"/>
+            <a:chOff x="2971800" y="2606402"/>
+            <a:chExt cx="3352800" cy="659202"/>
+          </a:xfrm>
+        </p:grpSpPr>
+        <p:grpSp>
+          <p:nvGrpSpPr>
+            <p:cNvPr id="10" name="Group 9"/>
+            <p:cNvGrpSpPr/>
+            <p:nvPr/>
+          </p:nvGrpSpPr>
+          <p:grpSpPr>
+            <a:xfrm>
+              <a:off x="3139767" y="2751826"/>
+              <a:ext cx="3184833" cy="369332"/>
+              <a:chOff x="3886200" y="2743200"/>
+              <a:chExt cx="3184833" cy="369332"/>
+            </a:xfrm>
+          </p:grpSpPr>
+          <p:sp>
+            <p:nvSpPr>
+              <p:cNvPr id="11" name="TextBox 10"/>
+              <p:cNvSpPr txBox="1"/>
+              <p:nvPr/>
+            </p:nvSpPr>
+            <p:spPr>
+              <a:xfrm>
+                <a:off x="5238928" y="2743200"/>
+                <a:ext cx="1832105" cy="369332"/>
+              </a:xfrm>
+              <a:prstGeom prst="rect">
+                <a:avLst/>
+              </a:prstGeom>
+              <a:noFill/>
+              <a:ln>
+                <a:solidFill>
+                  <a:schemeClr val="tx1"/>
+                </a:solidFill>
+              </a:ln>
+            </p:spPr>
+            <p:txBody>
+              <a:bodyPr wrap="none" rtlCol="0">
+                <a:spAutoFit/>
+              </a:bodyPr>
+              <a:lstStyle/>
+              <a:p>
+                <a:r>
+                  <a:rPr lang="en-US" dirty="0" smtClean="0"/>
+                  <a:t>Field declarations</a:t>
+                </a:r>
+                <a:endParaRPr lang="nl-BE" dirty="0"/>
+              </a:p>
+            </p:txBody>
+          </p:sp>
+          <p:cxnSp>
+            <p:nvCxnSpPr>
+              <p:cNvPr id="12" name="Straight Arrow Connector 11"/>
+              <p:cNvCxnSpPr>
+                <a:stCxn id="11" idx="1"/>
+              </p:cNvCxnSpPr>
+              <p:nvPr/>
+            </p:nvCxnSpPr>
+            <p:spPr>
+              <a:xfrm flipH="1">
+                <a:off x="3886200" y="2927866"/>
+                <a:ext cx="1352728" cy="0"/>
+              </a:xfrm>
+              <a:prstGeom prst="straightConnector1">
+                <a:avLst/>
+              </a:prstGeom>
+              <a:ln w="19050">
+                <a:solidFill>
+                  <a:schemeClr val="tx1"/>
+                </a:solidFill>
+                <a:tailEnd type="stealth" w="lg" len="lg"/>
+              </a:ln>
+            </p:spPr>
+            <p:style>
+              <a:lnRef idx="1">
+                <a:schemeClr val="accent1"/>
+              </a:lnRef>
+              <a:fillRef idx="0">
+                <a:schemeClr val="accent1"/>
+              </a:fillRef>
+              <a:effectRef idx="0">
+                <a:schemeClr val="accent1"/>
+              </a:effectRef>
+              <a:fontRef idx="minor">
+                <a:schemeClr val="tx1"/>
+              </a:fontRef>
+            </p:style>
+          </p:cxnSp>
+        </p:grpSp>
+        <p:sp>
+          <p:nvSpPr>
+            <p:cNvPr id="15" name="Right Brace 14"/>
+            <p:cNvSpPr/>
+            <p:nvPr/>
+          </p:nvSpPr>
+          <p:spPr>
+            <a:xfrm>
+              <a:off x="2971800" y="2606402"/>
+              <a:ext cx="152400" cy="659202"/>
+            </a:xfrm>
+            <a:prstGeom prst="rightBrace">
+              <a:avLst/>
+            </a:prstGeom>
+            <a:ln w="19050">
+              <a:solidFill>
+                <a:schemeClr val="tx1"/>
+              </a:solidFill>
+            </a:ln>
+          </p:spPr>
+          <p:style>
+            <a:lnRef idx="1">
+              <a:schemeClr val="accent1"/>
+            </a:lnRef>
+            <a:fillRef idx="0">
+              <a:schemeClr val="accent1"/>
+            </a:fillRef>
+            <a:effectRef idx="0">
+              <a:schemeClr val="accent1"/>
+            </a:effectRef>
+            <a:fontRef idx="minor">
+              <a:schemeClr val="tx1"/>
+            </a:fontRef>
+          </p:style>
+          <p:txBody>
+            <a:bodyPr rtlCol="0" anchor="ctr"/>
+            <a:lstStyle/>
+            <a:p>
+              <a:pPr algn="ctr"/>
+              <a:endParaRPr lang="nl-BE"/>
+            </a:p>
+          </p:txBody>
+        </p:sp>
+      </p:grpSp>
+      <p:grpSp>
+        <p:nvGrpSpPr>
+          <p:cNvPr id="18" name="Group 17"/>
+          <p:cNvGrpSpPr/>
+          <p:nvPr/>
+        </p:nvGrpSpPr>
+        <p:grpSpPr>
+          <a:xfrm>
+            <a:off x="3352800" y="4095929"/>
+            <a:ext cx="5029200" cy="819352"/>
+            <a:chOff x="3091992" y="2293180"/>
+            <a:chExt cx="5029200" cy="819352"/>
+          </a:xfrm>
+        </p:grpSpPr>
+        <p:sp>
+          <p:nvSpPr>
+            <p:cNvPr id="19" name="TextBox 18"/>
+            <p:cNvSpPr txBox="1"/>
+            <p:nvPr/>
+          </p:nvSpPr>
+          <p:spPr>
+            <a:xfrm>
+              <a:off x="5238928" y="2743200"/>
+              <a:ext cx="2882264" cy="369332"/>
+            </a:xfrm>
+            <a:prstGeom prst="rect">
+              <a:avLst/>
+            </a:prstGeom>
+            <a:noFill/>
+            <a:ln>
+              <a:solidFill>
+                <a:schemeClr val="tx1"/>
+              </a:solidFill>
+            </a:ln>
+          </p:spPr>
+          <p:txBody>
+            <a:bodyPr wrap="none" rtlCol="0">
+              <a:spAutoFit/>
+            </a:bodyPr>
+            <a:lstStyle/>
+            <a:p>
+              <a:r>
+                <a:rPr lang="en-US" dirty="0"/>
+                <a:t>Note: </a:t>
+              </a:r>
+              <a:r>
+                <a:rPr lang="en-US" dirty="0" smtClean="0"/>
+                <a:t>no </a:t>
+              </a:r>
+              <a:r>
+                <a:rPr lang="en-US" dirty="0" err="1" smtClean="0"/>
+                <a:t>struct</a:t>
+              </a:r>
+              <a:r>
+                <a:rPr lang="en-US" dirty="0" smtClean="0"/>
+                <a:t> in type name</a:t>
+              </a:r>
+              <a:endParaRPr lang="nl-BE" dirty="0"/>
+            </a:p>
+          </p:txBody>
+        </p:sp>
+        <p:cxnSp>
+          <p:nvCxnSpPr>
+            <p:cNvPr id="20" name="Straight Arrow Connector 19"/>
+            <p:cNvCxnSpPr>
+              <a:stCxn id="19" idx="1"/>
+            </p:cNvCxnSpPr>
+            <p:nvPr/>
+          </p:nvCxnSpPr>
+          <p:spPr>
+            <a:xfrm flipH="1" flipV="1">
+              <a:off x="3091992" y="2293180"/>
+              <a:ext cx="2146936" cy="634686"/>
+            </a:xfrm>
+            <a:prstGeom prst="straightConnector1">
+              <a:avLst/>
+            </a:prstGeom>
+            <a:ln w="19050">
+              <a:solidFill>
+                <a:schemeClr val="tx1"/>
+              </a:solidFill>
+              <a:tailEnd type="stealth" w="lg" len="lg"/>
+            </a:ln>
+          </p:spPr>
+          <p:style>
+            <a:lnRef idx="1">
+              <a:schemeClr val="accent1"/>
+            </a:lnRef>
+            <a:fillRef idx="0">
+              <a:schemeClr val="accent1"/>
+            </a:fillRef>
+            <a:effectRef idx="0">
+              <a:schemeClr val="accent1"/>
+            </a:effectRef>
+            <a:fontRef idx="minor">
+              <a:schemeClr val="tx1"/>
+            </a:fontRef>
+          </p:style>
+        </p:cxnSp>
+      </p:grpSp>
+      <p:sp>
+        <p:nvSpPr>
+          <p:cNvPr id="24" name="TextBox 23"/>
+          <p:cNvSpPr txBox="1"/>
+          <p:nvPr/>
+        </p:nvSpPr>
+        <p:spPr>
+          <a:xfrm>
+            <a:off x="1066800" y="5105400"/>
+            <a:ext cx="4871847" cy="923330"/>
+          </a:xfrm>
+          <a:prstGeom prst="rect">
+            <a:avLst/>
+          </a:prstGeom>
+          <a:solidFill>
+            <a:schemeClr val="bg1">
+              <a:lumMod val="85000"/>
+            </a:schemeClr>
+          </a:solidFill>
+          <a:ln>
+            <a:solidFill>
+              <a:schemeClr val="tx1"/>
+            </a:solidFill>
+          </a:ln>
+        </p:spPr>
+        <p:txBody>
+          <a:bodyPr wrap="none" rtlCol="0">
+            <a:spAutoFit/>
+          </a:bodyPr>
+          <a:lstStyle/>
+          <a:p>
+            <a:r>
+              <a:rPr lang="en-US" dirty="0">
+                <a:latin typeface="Courier New" panose="02070309020205020404" pitchFamily="49" charset="0"/>
+                <a:cs typeface="Courier New" panose="02070309020205020404" pitchFamily="49" charset="0"/>
+              </a:rPr>
+              <a:t>i</a:t>
+            </a:r>
+            <a:r>
+              <a:rPr lang="en-US" dirty="0" smtClean="0">
+                <a:latin typeface="Courier New" panose="02070309020205020404" pitchFamily="49" charset="0"/>
+                <a:cs typeface="Courier New" panose="02070309020205020404" pitchFamily="49" charset="0"/>
+              </a:rPr>
+              <a:t>mport point</a:t>
+            </a:r>
+          </a:p>
+          <a:p>
+            <a:r>
+              <a:rPr lang="en-US" dirty="0" smtClean="0">
+                <a:latin typeface="Courier New" panose="02070309020205020404" pitchFamily="49" charset="0"/>
+                <a:cs typeface="Courier New" panose="02070309020205020404" pitchFamily="49" charset="0"/>
+              </a:rPr>
+              <a:t>p = {'x': 1.0, 'y': -2.3, 'id': 1}</a:t>
+            </a:r>
+          </a:p>
+          <a:p>
+            <a:r>
+              <a:rPr lang="en-US" dirty="0" smtClean="0">
+                <a:latin typeface="Courier New" panose="02070309020205020404" pitchFamily="49" charset="0"/>
+                <a:cs typeface="Courier New" panose="02070309020205020404" pitchFamily="49" charset="0"/>
+              </a:rPr>
+              <a:t>print(</a:t>
+            </a:r>
+            <a:r>
+              <a:rPr lang="en-US" dirty="0" err="1" smtClean="0">
+                <a:latin typeface="Courier New" panose="02070309020205020404" pitchFamily="49" charset="0"/>
+                <a:cs typeface="Courier New" panose="02070309020205020404" pitchFamily="49" charset="0"/>
+              </a:rPr>
+              <a:t>point.radius</a:t>
+            </a:r>
+            <a:r>
+              <a:rPr lang="en-US" dirty="0" smtClean="0">
+                <a:latin typeface="Courier New" panose="02070309020205020404" pitchFamily="49" charset="0"/>
+                <a:cs typeface="Courier New" panose="02070309020205020404" pitchFamily="49" charset="0"/>
+              </a:rPr>
+              <a:t>(p))</a:t>
+            </a:r>
+            <a:endParaRPr lang="en-US" dirty="0" smtClean="0">
+              <a:latin typeface="Courier New" panose="02070309020205020404" pitchFamily="49" charset="0"/>
+              <a:cs typeface="Courier New" panose="02070309020205020404" pitchFamily="49" charset="0"/>
+            </a:endParaRPr>
+          </a:p>
+        </p:txBody>
+      </p:sp>
+    </p:spTree>
+    <p:extLst>
+      <p:ext uri="{BB962C8B-B14F-4D97-AF65-F5344CB8AC3E}">
+        <p14:creationId xmlns:p14="http://schemas.microsoft.com/office/powerpoint/2010/main" val="1989476146"/>
+      </p:ext>
+    </p:extLst>
+  </p:cSld>
+  <p:clrMapOvr>
+    <a:masterClrMapping/>
+  </p:clrMapOvr>
+  <p:timing>
+    <p:tnLst>
+      <p:par>
+        <p:cTn id="1" dur="indefinite" restart="never" nodeType="tmRoot">
+          <p:childTnLst>
+            <p:seq concurrent="1" nextAc="seek">
+              <p:cTn id="2" dur="indefinite" nodeType="mainSeq">
+                <p:childTnLst>
+                  <p:par>
+                    <p:cTn id="3" fill="hold">
+                      <p:stCondLst>
+                        <p:cond delay="indefinite"/>
+                        <p:cond evt="onBegin" delay="0">
+                          <p:tn val="2"/>
+                        </p:cond>
+                      </p:stCondLst>
+                      <p:childTnLst>
+                        <p:par>
+                          <p:cTn id="4" fill="hold">
+                            <p:stCondLst>
+                              <p:cond delay="0"/>
+                            </p:stCondLst>
+                            <p:childTnLst>
+                              <p:par>
+                                <p:cTn id="5" presetID="1" presetClass="entr" presetSubtype="0" fill="hold" grpId="0" nodeType="withEffect">
+                                  <p:stCondLst>
+                                    <p:cond delay="0"/>
+                                  </p:stCondLst>
+                                  <p:childTnLst>
+                                    <p:set>
+                                      <p:cBhvr>
+                                        <p:cTn id="6" dur="1" fill="hold">
+                                          <p:stCondLst>
+                                            <p:cond delay="0"/>
+                                          </p:stCondLst>
+                                        </p:cTn>
+                                        <p:tgtEl>
+                                          <p:spTgt spid="3">
+                                            <p:txEl>
+                                              <p:pRg st="0" end="0"/>
+                                            </p:txEl>
+                                          </p:spTgt>
+                                        </p:tgtEl>
+                                        <p:attrNameLst>
+                                          <p:attrName>style.visibility</p:attrName>
+                                        </p:attrNameLst>
+                                      </p:cBhvr>
+                                      <p:to>
+                                        <p:strVal val="visible"/>
+                                      </p:to>
+                                    </p:set>
+                                  </p:childTnLst>
+                                </p:cTn>
+                              </p:par>
+                              <p:par>
+                                <p:cTn id="7" presetID="1" presetClass="entr" presetSubtype="0" fill="hold" grpId="0" nodeType="withEffect">
+                                  <p:stCondLst>
+                                    <p:cond delay="0"/>
+                                  </p:stCondLst>
+                                  <p:childTnLst>
+                                    <p:set>
+                                      <p:cBhvr>
+                                        <p:cTn id="8" dur="1" fill="hold">
+                                          <p:stCondLst>
+                                            <p:cond delay="0"/>
+                                          </p:stCondLst>
+                                        </p:cTn>
+                                        <p:tgtEl>
+                                          <p:spTgt spid="5"/>
+                                        </p:tgtEl>
+                                        <p:attrNameLst>
+                                          <p:attrName>style.visibility</p:attrName>
+                                        </p:attrNameLst>
+                                      </p:cBhvr>
+                                      <p:to>
+                                        <p:strVal val="visible"/>
+                                      </p:to>
+                                    </p:set>
+                                  </p:childTnLst>
+                                </p:cTn>
+                              </p:par>
+                            </p:childTnLst>
+                          </p:cTn>
+                        </p:par>
+                      </p:childTnLst>
+                    </p:cTn>
+                  </p:par>
+                  <p:par>
+                    <p:cTn id="9" fill="hold">
+                      <p:stCondLst>
+                        <p:cond delay="indefinite"/>
+                      </p:stCondLst>
+                      <p:childTnLst>
+                        <p:par>
+                          <p:cTn id="10" fill="hold">
+                            <p:stCondLst>
+                              <p:cond delay="0"/>
+                            </p:stCondLst>
+                            <p:childTnLst>
+                              <p:par>
+                                <p:cTn id="11" presetID="1" presetClass="entr" presetSubtype="0" fill="hold" nodeType="clickEffect">
+                                  <p:stCondLst>
+                                    <p:cond delay="0"/>
+                                  </p:stCondLst>
+                                  <p:childTnLst>
+                                    <p:set>
+                                      <p:cBhvr>
+                                        <p:cTn id="12" dur="1" fill="hold">
+                                          <p:stCondLst>
+                                            <p:cond delay="0"/>
+                                          </p:stCondLst>
+                                        </p:cTn>
+                                        <p:tgtEl>
+                                          <p:spTgt spid="17"/>
+                                        </p:tgtEl>
+                                        <p:attrNameLst>
+                                          <p:attrName>style.visibility</p:attrName>
+                                        </p:attrNameLst>
+                                      </p:cBhvr>
+                                      <p:to>
+                                        <p:strVal val="visible"/>
+                                      </p:to>
+                                    </p:set>
+                                  </p:childTnLst>
+                                </p:cTn>
+                              </p:par>
+                            </p:childTnLst>
+                          </p:cTn>
+                        </p:par>
+                      </p:childTnLst>
+                    </p:cTn>
+                  </p:par>
+                  <p:par>
+                    <p:cTn id="13" fill="hold">
+                      <p:stCondLst>
+                        <p:cond delay="indefinite"/>
+                      </p:stCondLst>
+                      <p:childTnLst>
+                        <p:par>
+                          <p:cTn id="14" fill="hold">
+                            <p:stCondLst>
+                              <p:cond delay="0"/>
+                            </p:stCondLst>
+                            <p:childTnLst>
+                              <p:par>
+                                <p:cTn id="15" presetID="1" presetClass="entr" presetSubtype="0" fill="hold" nodeType="clickEffect">
+                                  <p:stCondLst>
+                                    <p:cond delay="0"/>
+                                  </p:stCondLst>
+                                  <p:childTnLst>
+                                    <p:set>
+                                      <p:cBhvr>
+                                        <p:cTn id="16" dur="1" fill="hold">
+                                          <p:stCondLst>
+                                            <p:cond delay="0"/>
+                                          </p:stCondLst>
+                                        </p:cTn>
+                                        <p:tgtEl>
+                                          <p:spTgt spid="6"/>
+                                        </p:tgtEl>
+                                        <p:attrNameLst>
+                                          <p:attrName>style.visibility</p:attrName>
+                                        </p:attrNameLst>
+                                      </p:cBhvr>
+                                      <p:to>
+                                        <p:strVal val="visible"/>
+                                      </p:to>
+                                    </p:set>
+                                  </p:childTnLst>
+                                </p:cTn>
+                              </p:par>
+                            </p:childTnLst>
+                          </p:cTn>
+                        </p:par>
+                      </p:childTnLst>
+                    </p:cTn>
+                  </p:par>
+                  <p:par>
+                    <p:cTn id="17" fill="hold">
+                      <p:stCondLst>
+                        <p:cond delay="indefinite"/>
+                      </p:stCondLst>
+                      <p:childTnLst>
+                        <p:par>
+                          <p:cTn id="18" fill="hold">
+                            <p:stCondLst>
+                              <p:cond delay="0"/>
+                            </p:stCondLst>
+                            <p:childTnLst>
+                              <p:par>
+                                <p:cTn id="19" presetID="1" presetClass="entr" presetSubtype="0" fill="hold" grpId="0" nodeType="clickEffect">
+                                  <p:stCondLst>
+                                    <p:cond delay="0"/>
+                                  </p:stCondLst>
+                                  <p:childTnLst>
+                                    <p:set>
+                                      <p:cBhvr>
+                                        <p:cTn id="20" dur="1" fill="hold">
+                                          <p:stCondLst>
+                                            <p:cond delay="0"/>
+                                          </p:stCondLst>
+                                        </p:cTn>
+                                        <p:tgtEl>
+                                          <p:spTgt spid="3">
+                                            <p:txEl>
+                                              <p:pRg st="3" end="3"/>
+                                            </p:txEl>
+                                          </p:spTgt>
+                                        </p:tgtEl>
+                                        <p:attrNameLst>
+                                          <p:attrName>style.visibility</p:attrName>
+                                        </p:attrNameLst>
+                                      </p:cBhvr>
+                                      <p:to>
+                                        <p:strVal val="visible"/>
+                                      </p:to>
+                                    </p:set>
+                                  </p:childTnLst>
+                                </p:cTn>
+                              </p:par>
+                            </p:childTnLst>
+                          </p:cTn>
+                        </p:par>
+                      </p:childTnLst>
+                    </p:cTn>
+                  </p:par>
+                  <p:par>
+                    <p:cTn id="21" fill="hold">
+                      <p:stCondLst>
+                        <p:cond delay="indefinite"/>
+                      </p:stCondLst>
+                      <p:childTnLst>
+                        <p:par>
+                          <p:cTn id="22" fill="hold">
+                            <p:stCondLst>
+                              <p:cond delay="0"/>
+                            </p:stCondLst>
+                            <p:childTnLst>
+                              <p:par>
+                                <p:cTn id="23" presetID="1" presetClass="entr" presetSubtype="0" fill="hold" grpId="0" nodeType="clickEffect">
+                                  <p:stCondLst>
+                                    <p:cond delay="0"/>
+                                  </p:stCondLst>
+                                  <p:childTnLst>
+                                    <p:set>
+                                      <p:cBhvr>
+                                        <p:cTn id="24" dur="1" fill="hold">
+                                          <p:stCondLst>
+                                            <p:cond delay="0"/>
+                                          </p:stCondLst>
+                                        </p:cTn>
+                                        <p:tgtEl>
+                                          <p:spTgt spid="3">
+                                            <p:txEl>
+                                              <p:pRg st="5" end="5"/>
+                                            </p:txEl>
+                                          </p:spTgt>
+                                        </p:tgtEl>
+                                        <p:attrNameLst>
+                                          <p:attrName>style.visibility</p:attrName>
+                                        </p:attrNameLst>
+                                      </p:cBhvr>
+                                      <p:to>
+                                        <p:strVal val="visible"/>
+                                      </p:to>
+                                    </p:set>
+                                  </p:childTnLst>
+                                </p:cTn>
+                              </p:par>
+                              <p:par>
+                                <p:cTn id="25" presetID="1" presetClass="entr" presetSubtype="0" fill="hold" grpId="0" nodeType="withEffect">
+                                  <p:stCondLst>
+                                    <p:cond delay="0"/>
+                                  </p:stCondLst>
+                                  <p:childTnLst>
+                                    <p:set>
+                                      <p:cBhvr>
+                                        <p:cTn id="26" dur="1" fill="hold">
+                                          <p:stCondLst>
+                                            <p:cond delay="0"/>
+                                          </p:stCondLst>
+                                        </p:cTn>
+                                        <p:tgtEl>
+                                          <p:spTgt spid="9"/>
+                                        </p:tgtEl>
+                                        <p:attrNameLst>
+                                          <p:attrName>style.visibility</p:attrName>
+                                        </p:attrNameLst>
+                                      </p:cBhvr>
+                                      <p:to>
+                                        <p:strVal val="visible"/>
+                                      </p:to>
+                                    </p:set>
+                                  </p:childTnLst>
+                                </p:cTn>
+                              </p:par>
+                            </p:childTnLst>
+                          </p:cTn>
+                        </p:par>
+                      </p:childTnLst>
+                    </p:cTn>
+                  </p:par>
+                  <p:par>
+                    <p:cTn id="27" fill="hold">
+                      <p:stCondLst>
+                        <p:cond delay="indefinite"/>
+                      </p:stCondLst>
+                      <p:childTnLst>
+                        <p:par>
+                          <p:cTn id="28" fill="hold">
+                            <p:stCondLst>
+                              <p:cond delay="0"/>
+                            </p:stCondLst>
+                            <p:childTnLst>
+                              <p:par>
+                                <p:cTn id="29" presetID="1" presetClass="entr" presetSubtype="0" fill="hold" nodeType="clickEffect">
+                                  <p:stCondLst>
+                                    <p:cond delay="0"/>
+                                  </p:stCondLst>
+                                  <p:childTnLst>
+                                    <p:set>
+                                      <p:cBhvr>
+                                        <p:cTn id="30" dur="1" fill="hold">
+                                          <p:stCondLst>
+                                            <p:cond delay="0"/>
+                                          </p:stCondLst>
+                                        </p:cTn>
+                                        <p:tgtEl>
+                                          <p:spTgt spid="18"/>
+                                        </p:tgtEl>
+                                        <p:attrNameLst>
+                                          <p:attrName>style.visibility</p:attrName>
+                                        </p:attrNameLst>
+                                      </p:cBhvr>
+                                      <p:to>
+                                        <p:strVal val="visible"/>
+                                      </p:to>
+                                    </p:set>
+                                  </p:childTnLst>
+                                </p:cTn>
+                              </p:par>
+                              <p:par>
+                                <p:cTn id="31" presetID="1" presetClass="entr" presetSubtype="0" fill="hold" grpId="0" nodeType="withEffect">
+                                  <p:stCondLst>
+                                    <p:cond delay="0"/>
+                                  </p:stCondLst>
+                                  <p:childTnLst>
+                                    <p:set>
+                                      <p:cBhvr>
+                                        <p:cTn id="32" dur="1" fill="hold">
+                                          <p:stCondLst>
+                                            <p:cond delay="0"/>
+                                          </p:stCondLst>
+                                        </p:cTn>
+                                        <p:tgtEl>
+                                          <p:spTgt spid="24"/>
+                                        </p:tgtEl>
+                                        <p:attrNameLst>
+                                          <p:attrName>style.visibility</p:attrName>
+                                        </p:attrNameLst>
+                                      </p:cBhvr>
+                                      <p:to>
+                                        <p:strVal val="visible"/>
+                                      </p:to>
+                                    </p:set>
+                                  </p:childTnLst>
+                                </p:cTn>
+                              </p:par>
+                            </p:childTnLst>
+                          </p:cTn>
+                        </p:par>
+                      </p:childTnLst>
+                    </p:cTn>
+                  </p:par>
+                </p:childTnLst>
+              </p:cTn>
+              <p:prevCondLst>
+                <p:cond evt="onPrev" delay="0">
+                  <p:tgtEl>
+                    <p:sldTgt/>
+                  </p:tgtEl>
+                </p:cond>
+              </p:prevCondLst>
+              <p:nextCondLst>
+                <p:cond evt="onNext" delay="0">
+                  <p:tgtEl>
+                    <p:sldTgt/>
+                  </p:tgtEl>
+                </p:cond>
+              </p:nextCondLst>
+            </p:seq>
+          </p:childTnLst>
+        </p:cTn>
+      </p:par>
+    </p:tnLst>
+    <p:bldLst>
+      <p:bldP spid="3" grpId="0" uiExpand="1" build="p"/>
+      <p:bldP spid="5" grpId="0" animBg="1"/>
+      <p:bldP spid="9" grpId="0" animBg="1"/>
+      <p:bldP spid="24" grpId="0" animBg="1"/>
+    </p:bldLst>
+  </p:timing>
+</p:sld>
+</file>
+
+<file path=ppt/slides/slide12.xml><?xml version="1.0" encoding="utf-8"?>
+<p:sld xmlns:a="http://schemas.openxmlformats.org/drawingml/2006/main" xmlns:r="http://schemas.openxmlformats.org/officeDocument/2006/relationships" xmlns:p="http://schemas.openxmlformats.org/presentationml/2006/main">
+  <p:cSld>
+    <p:spTree>
+      <p:nvGrpSpPr>
+        <p:cNvPr id="1" name=""/>
+        <p:cNvGrpSpPr/>
+        <p:nvPr/>
+      </p:nvGrpSpPr>
+      <p:grpSpPr>
+        <a:xfrm>
+          <a:off x="0" y="0"/>
+          <a:ext cx="0" cy="0"/>
+          <a:chOff x="0" y="0"/>
+          <a:chExt cx="0" cy="0"/>
+        </a:xfrm>
+      </p:grpSpPr>
+      <p:sp>
+        <p:nvSpPr>
+          <p:cNvPr id="2" name="Title 1"/>
+          <p:cNvSpPr>
+            <a:spLocks noGrp="1"/>
+          </p:cNvSpPr>
+          <p:nvPr>
+            <p:ph type="title"/>
+          </p:nvPr>
+        </p:nvSpPr>
+        <p:spPr/>
+        <p:txBody>
+          <a:bodyPr/>
+          <a:lstStyle/>
+          <a:p>
+            <a:r>
+              <a:rPr lang="en-US" dirty="0" smtClean="0"/>
+              <a:t>Buffer protocol</a:t>
+            </a:r>
+            <a:endParaRPr lang="nl-BE" dirty="0"/>
+          </a:p>
+        </p:txBody>
+      </p:sp>
+      <p:sp>
+        <p:nvSpPr>
+          <p:cNvPr id="3" name="Content Placeholder 2"/>
+          <p:cNvSpPr>
+            <a:spLocks noGrp="1"/>
+          </p:cNvSpPr>
+          <p:nvPr>
+            <p:ph idx="1"/>
+          </p:nvPr>
+        </p:nvSpPr>
+        <p:spPr/>
+        <p:txBody>
+          <a:bodyPr/>
+          <a:lstStyle/>
+          <a:p>
+            <a:r>
+              <a:rPr lang="en-US" dirty="0" smtClean="0"/>
+              <a:t>Some Python objects expose internal data through buffer protocol</a:t>
+            </a:r>
+          </a:p>
+          <a:p>
+            <a:pPr lvl="1"/>
+            <a:r>
+              <a:rPr lang="en-US" dirty="0" smtClean="0"/>
+              <a:t>E.g., </a:t>
+            </a:r>
+            <a:r>
+              <a:rPr lang="en-US" dirty="0" smtClean="0">
+                <a:latin typeface="Courier New" panose="02070309020205020404" pitchFamily="49" charset="0"/>
+                <a:cs typeface="Courier New" panose="02070309020205020404" pitchFamily="49" charset="0"/>
+              </a:rPr>
+              <a:t>bytes</a:t>
+            </a:r>
+            <a:r>
+              <a:rPr lang="en-US" dirty="0" smtClean="0"/>
+              <a:t>, </a:t>
+            </a:r>
+            <a:r>
+              <a:rPr lang="en-US" dirty="0" err="1" smtClean="0">
+                <a:latin typeface="Courier New" panose="02070309020205020404" pitchFamily="49" charset="0"/>
+                <a:cs typeface="Courier New" panose="02070309020205020404" pitchFamily="49" charset="0"/>
+              </a:rPr>
+              <a:t>bytearray</a:t>
+            </a:r>
+            <a:r>
+              <a:rPr lang="en-US" dirty="0" smtClean="0"/>
+              <a:t>, </a:t>
+            </a:r>
+            <a:r>
+              <a:rPr lang="en-US" dirty="0" err="1" smtClean="0">
+                <a:latin typeface="Courier New" panose="02070309020205020404" pitchFamily="49" charset="0"/>
+                <a:cs typeface="Courier New" panose="02070309020205020404" pitchFamily="49" charset="0"/>
+              </a:rPr>
+              <a:t>array.array</a:t>
+            </a:r>
+            <a:endParaRPr lang="en-US" dirty="0" smtClean="0">
+              <a:latin typeface="Courier New" panose="02070309020205020404" pitchFamily="49" charset="0"/>
+              <a:cs typeface="Courier New" panose="02070309020205020404" pitchFamily="49" charset="0"/>
+            </a:endParaRPr>
+          </a:p>
+          <a:p>
+            <a:r>
+              <a:rPr lang="en-US" dirty="0" smtClean="0"/>
+              <a:t>For direct access, wrap in </a:t>
+            </a:r>
+            <a:r>
+              <a:rPr lang="en-US" dirty="0" err="1" smtClean="0">
+                <a:latin typeface="Courier New" panose="02070309020205020404" pitchFamily="49" charset="0"/>
+                <a:cs typeface="Courier New" panose="02070309020205020404" pitchFamily="49" charset="0"/>
+              </a:rPr>
+              <a:t>memoryview</a:t>
+            </a:r>
+            <a:endParaRPr lang="en-US" dirty="0" smtClean="0">
+              <a:latin typeface="Courier New" panose="02070309020205020404" pitchFamily="49" charset="0"/>
+              <a:cs typeface="Courier New" panose="02070309020205020404" pitchFamily="49" charset="0"/>
+            </a:endParaRPr>
+          </a:p>
+          <a:p>
+            <a:pPr lvl="1"/>
+            <a:r>
+              <a:rPr lang="en-US" dirty="0" smtClean="0"/>
+              <a:t>Delivers fast direct access from generated C code to Python data</a:t>
+            </a:r>
+            <a:endParaRPr lang="nl-BE" dirty="0"/>
+          </a:p>
+        </p:txBody>
+      </p:sp>
+      <p:sp>
+        <p:nvSpPr>
+          <p:cNvPr id="4" name="Slide Number Placeholder 3"/>
+          <p:cNvSpPr>
+            <a:spLocks noGrp="1"/>
+          </p:cNvSpPr>
+          <p:nvPr>
+            <p:ph type="sldNum" sz="quarter" idx="12"/>
+          </p:nvPr>
+        </p:nvSpPr>
+        <p:spPr/>
+        <p:txBody>
+          <a:bodyPr/>
+          <a:lstStyle/>
+          <a:p>
+            <a:fld id="{B6F15528-21DE-4FAA-801E-634DDDAF4B2B}" type="slidenum">
+              <a:rPr lang="en-US" smtClean="0"/>
+              <a:pPr/>
+              <a:t>12</a:t>
             </a:fld>
             <a:endParaRPr lang="en-US"/>
           </a:p>
@@ -5033,7 +6253,7 @@
 </p:sld>
 </file>
 
-<file path=ppt/slides/slide12.xml><?xml version="1.0" encoding="utf-8"?>
+<file path=ppt/slides/slide13.xml><?xml version="1.0" encoding="utf-8"?>
 <p:sld xmlns:a="http://schemas.openxmlformats.org/drawingml/2006/main" xmlns:r="http://schemas.openxmlformats.org/officeDocument/2006/relationships" xmlns:p="http://schemas.openxmlformats.org/presentationml/2006/main">
   <p:cSld>
     <p:spTree>
@@ -5126,7 +6346,7 @@
             <a:fld id="{B6F15528-21DE-4FAA-801E-634DDDAF4B2B}" type="slidenum">
               <a:rPr lang="en-US" smtClean="0"/>
               <a:pPr/>
-              <a:t>12</a:t>
+              <a:t>13</a:t>
             </a:fld>
             <a:endParaRPr lang="en-US"/>
           </a:p>
@@ -5795,7 +7015,7 @@
 </p:sld>
 </file>
 
-<file path=ppt/slides/slide13.xml><?xml version="1.0" encoding="utf-8"?>
+<file path=ppt/slides/slide14.xml><?xml version="1.0" encoding="utf-8"?>
 <p:sld xmlns:a="http://schemas.openxmlformats.org/drawingml/2006/main" xmlns:r="http://schemas.openxmlformats.org/officeDocument/2006/relationships" xmlns:p="http://schemas.openxmlformats.org/presentationml/2006/main">
   <p:cSld>
     <p:spTree>
@@ -6002,7 +7222,7 @@
             <a:fld id="{B6F15528-21DE-4FAA-801E-634DDDAF4B2B}" type="slidenum">
               <a:rPr lang="en-US" smtClean="0"/>
               <a:pPr/>
-              <a:t>13</a:t>
+              <a:t>14</a:t>
             </a:fld>
             <a:endParaRPr lang="en-US"/>
           </a:p>
@@ -6488,109 +7708,6 @@
 </p:sld>
 </file>
 
-<file path=ppt/slides/slide14.xml><?xml version="1.0" encoding="utf-8"?>
-<p:sld xmlns:a="http://schemas.openxmlformats.org/drawingml/2006/main" xmlns:r="http://schemas.openxmlformats.org/officeDocument/2006/relationships" xmlns:p="http://schemas.openxmlformats.org/presentationml/2006/main">
-  <p:cSld>
-    <p:spTree>
-      <p:nvGrpSpPr>
-        <p:cNvPr id="1" name=""/>
-        <p:cNvGrpSpPr/>
-        <p:nvPr/>
-      </p:nvGrpSpPr>
-      <p:grpSpPr>
-        <a:xfrm>
-          <a:off x="0" y="0"/>
-          <a:ext cx="0" cy="0"/>
-          <a:chOff x="0" y="0"/>
-          <a:chExt cx="0" cy="0"/>
-        </a:xfrm>
-      </p:grpSpPr>
-      <p:sp>
-        <p:nvSpPr>
-          <p:cNvPr id="2" name="Title 1"/>
-          <p:cNvSpPr>
-            <a:spLocks noGrp="1"/>
-          </p:cNvSpPr>
-          <p:nvPr>
-            <p:ph type="title"/>
-          </p:nvPr>
-        </p:nvSpPr>
-        <p:spPr/>
-        <p:txBody>
-          <a:bodyPr/>
-          <a:lstStyle/>
-          <a:p>
-            <a:r>
-              <a:rPr lang="en-US" dirty="0" smtClean="0"/>
-              <a:t>Functions</a:t>
-            </a:r>
-            <a:endParaRPr lang="nl-BE" dirty="0"/>
-          </a:p>
-        </p:txBody>
-      </p:sp>
-      <p:sp>
-        <p:nvSpPr>
-          <p:cNvPr id="3" name="Text Placeholder 2"/>
-          <p:cNvSpPr>
-            <a:spLocks noGrp="1"/>
-          </p:cNvSpPr>
-          <p:nvPr>
-            <p:ph type="body" idx="1"/>
-          </p:nvPr>
-        </p:nvSpPr>
-        <p:spPr/>
-        <p:txBody>
-          <a:bodyPr/>
-          <a:lstStyle/>
-          <a:p>
-            <a:endParaRPr lang="nl-BE"/>
-          </a:p>
-        </p:txBody>
-      </p:sp>
-      <p:sp>
-        <p:nvSpPr>
-          <p:cNvPr id="4" name="Slide Number Placeholder 3"/>
-          <p:cNvSpPr>
-            <a:spLocks noGrp="1"/>
-          </p:cNvSpPr>
-          <p:nvPr>
-            <p:ph type="sldNum" sz="quarter" idx="12"/>
-          </p:nvPr>
-        </p:nvSpPr>
-        <p:spPr/>
-        <p:txBody>
-          <a:bodyPr/>
-          <a:lstStyle/>
-          <a:p>
-            <a:fld id="{B6F15528-21DE-4FAA-801E-634DDDAF4B2B}" type="slidenum">
-              <a:rPr lang="en-US" smtClean="0"/>
-              <a:pPr/>
-              <a:t>14</a:t>
-            </a:fld>
-            <a:endParaRPr lang="en-US"/>
-          </a:p>
-        </p:txBody>
-      </p:sp>
-    </p:spTree>
-    <p:extLst>
-      <p:ext uri="{BB962C8B-B14F-4D97-AF65-F5344CB8AC3E}">
-        <p14:creationId xmlns:p14="http://schemas.microsoft.com/office/powerpoint/2010/main" val="2592723755"/>
-      </p:ext>
-    </p:extLst>
-  </p:cSld>
-  <p:clrMapOvr>
-    <a:masterClrMapping/>
-  </p:clrMapOvr>
-  <p:timing>
-    <p:tnLst>
-      <p:par>
-        <p:cTn id="1" dur="indefinite" restart="never" nodeType="tmRoot"/>
-      </p:par>
-    </p:tnLst>
-  </p:timing>
-</p:sld>
-</file>
-
 <file path=ppt/slides/slide15.xml><?xml version="1.0" encoding="utf-8"?>
 <p:sld xmlns:a="http://schemas.openxmlformats.org/drawingml/2006/main" xmlns:r="http://schemas.openxmlformats.org/officeDocument/2006/relationships" xmlns:p="http://schemas.openxmlformats.org/presentationml/2006/main">
   <p:cSld>
@@ -6625,6 +7742,109 @@
           <a:p>
             <a:r>
               <a:rPr lang="en-US" dirty="0" smtClean="0"/>
+              <a:t>Functions</a:t>
+            </a:r>
+            <a:endParaRPr lang="nl-BE" dirty="0"/>
+          </a:p>
+        </p:txBody>
+      </p:sp>
+      <p:sp>
+        <p:nvSpPr>
+          <p:cNvPr id="3" name="Text Placeholder 2"/>
+          <p:cNvSpPr>
+            <a:spLocks noGrp="1"/>
+          </p:cNvSpPr>
+          <p:nvPr>
+            <p:ph type="body" idx="1"/>
+          </p:nvPr>
+        </p:nvSpPr>
+        <p:spPr/>
+        <p:txBody>
+          <a:bodyPr/>
+          <a:lstStyle/>
+          <a:p>
+            <a:endParaRPr lang="nl-BE"/>
+          </a:p>
+        </p:txBody>
+      </p:sp>
+      <p:sp>
+        <p:nvSpPr>
+          <p:cNvPr id="4" name="Slide Number Placeholder 3"/>
+          <p:cNvSpPr>
+            <a:spLocks noGrp="1"/>
+          </p:cNvSpPr>
+          <p:nvPr>
+            <p:ph type="sldNum" sz="quarter" idx="12"/>
+          </p:nvPr>
+        </p:nvSpPr>
+        <p:spPr/>
+        <p:txBody>
+          <a:bodyPr/>
+          <a:lstStyle/>
+          <a:p>
+            <a:fld id="{B6F15528-21DE-4FAA-801E-634DDDAF4B2B}" type="slidenum">
+              <a:rPr lang="en-US" smtClean="0"/>
+              <a:pPr/>
+              <a:t>15</a:t>
+            </a:fld>
+            <a:endParaRPr lang="en-US"/>
+          </a:p>
+        </p:txBody>
+      </p:sp>
+    </p:spTree>
+    <p:extLst>
+      <p:ext uri="{BB962C8B-B14F-4D97-AF65-F5344CB8AC3E}">
+        <p14:creationId xmlns:p14="http://schemas.microsoft.com/office/powerpoint/2010/main" val="2592723755"/>
+      </p:ext>
+    </p:extLst>
+  </p:cSld>
+  <p:clrMapOvr>
+    <a:masterClrMapping/>
+  </p:clrMapOvr>
+  <p:timing>
+    <p:tnLst>
+      <p:par>
+        <p:cTn id="1" dur="indefinite" restart="never" nodeType="tmRoot"/>
+      </p:par>
+    </p:tnLst>
+  </p:timing>
+</p:sld>
+</file>
+
+<file path=ppt/slides/slide16.xml><?xml version="1.0" encoding="utf-8"?>
+<p:sld xmlns:a="http://schemas.openxmlformats.org/drawingml/2006/main" xmlns:r="http://schemas.openxmlformats.org/officeDocument/2006/relationships" xmlns:p="http://schemas.openxmlformats.org/presentationml/2006/main">
+  <p:cSld>
+    <p:spTree>
+      <p:nvGrpSpPr>
+        <p:cNvPr id="1" name=""/>
+        <p:cNvGrpSpPr/>
+        <p:nvPr/>
+      </p:nvGrpSpPr>
+      <p:grpSpPr>
+        <a:xfrm>
+          <a:off x="0" y="0"/>
+          <a:ext cx="0" cy="0"/>
+          <a:chOff x="0" y="0"/>
+          <a:chExt cx="0" cy="0"/>
+        </a:xfrm>
+      </p:grpSpPr>
+      <p:sp>
+        <p:nvSpPr>
+          <p:cNvPr id="2" name="Title 1"/>
+          <p:cNvSpPr>
+            <a:spLocks noGrp="1"/>
+          </p:cNvSpPr>
+          <p:nvPr>
+            <p:ph type="title"/>
+          </p:nvPr>
+        </p:nvSpPr>
+        <p:spPr/>
+        <p:txBody>
+          <a:bodyPr/>
+          <a:lstStyle/>
+          <a:p>
+            <a:r>
+              <a:rPr lang="en-US" dirty="0" smtClean="0"/>
               <a:t>Three types of functions</a:t>
             </a:r>
             <a:endParaRPr lang="nl-BE" dirty="0"/>
@@ -6748,7 +7968,7 @@
             <a:fld id="{B6F15528-21DE-4FAA-801E-634DDDAF4B2B}" type="slidenum">
               <a:rPr lang="en-US" smtClean="0"/>
               <a:pPr/>
-              <a:t>15</a:t>
+              <a:t>16</a:t>
             </a:fld>
             <a:endParaRPr lang="en-US"/>
           </a:p>
@@ -7473,7 +8693,7 @@
 </p:sld>
 </file>
 
-<file path=ppt/slides/slide16.xml><?xml version="1.0" encoding="utf-8"?>
+<file path=ppt/slides/slide17.xml><?xml version="1.0" encoding="utf-8"?>
 <p:sld xmlns:a="http://schemas.openxmlformats.org/drawingml/2006/main" xmlns:r="http://schemas.openxmlformats.org/officeDocument/2006/relationships" xmlns:p="http://schemas.openxmlformats.org/presentationml/2006/main">
   <p:cSld>
     <p:spTree>
@@ -7599,7 +8819,7 @@
             <a:fld id="{B6F15528-21DE-4FAA-801E-634DDDAF4B2B}" type="slidenum">
               <a:rPr lang="en-US" smtClean="0"/>
               <a:pPr/>
-              <a:t>16</a:t>
+              <a:t>17</a:t>
             </a:fld>
             <a:endParaRPr lang="en-US"/>
           </a:p>
@@ -8452,7 +9672,7 @@
 </p:sld>
 </file>
 
-<file path=ppt/slides/slide17.xml><?xml version="1.0" encoding="utf-8"?>
+<file path=ppt/slides/slide18.xml><?xml version="1.0" encoding="utf-8"?>
 <p:sld xmlns:a="http://schemas.openxmlformats.org/drawingml/2006/main" xmlns:r="http://schemas.openxmlformats.org/officeDocument/2006/relationships" xmlns:p="http://schemas.openxmlformats.org/presentationml/2006/main">
   <p:cSld>
     <p:spTree>
@@ -8583,7 +9803,7 @@
             <a:fld id="{B6F15528-21DE-4FAA-801E-634DDDAF4B2B}" type="slidenum">
               <a:rPr lang="en-US" smtClean="0"/>
               <a:pPr/>
-              <a:t>17</a:t>
+              <a:t>18</a:t>
             </a:fld>
             <a:endParaRPr lang="en-US"/>
           </a:p>
@@ -9362,6 +10582,102 @@
 </p:sld>
 </file>
 
+<file path=ppt/slides/slide19.xml><?xml version="1.0" encoding="utf-8"?>
+<p:sld xmlns:a="http://schemas.openxmlformats.org/drawingml/2006/main" xmlns:r="http://schemas.openxmlformats.org/officeDocument/2006/relationships" xmlns:p="http://schemas.openxmlformats.org/presentationml/2006/main">
+  <p:cSld>
+    <p:spTree>
+      <p:nvGrpSpPr>
+        <p:cNvPr id="1" name=""/>
+        <p:cNvGrpSpPr/>
+        <p:nvPr/>
+      </p:nvGrpSpPr>
+      <p:grpSpPr>
+        <a:xfrm>
+          <a:off x="0" y="0"/>
+          <a:ext cx="0" cy="0"/>
+          <a:chOff x="0" y="0"/>
+          <a:chExt cx="0" cy="0"/>
+        </a:xfrm>
+      </p:grpSpPr>
+      <p:sp>
+        <p:nvSpPr>
+          <p:cNvPr id="2" name="Title 1"/>
+          <p:cNvSpPr>
+            <a:spLocks noGrp="1"/>
+          </p:cNvSpPr>
+          <p:nvPr>
+            <p:ph type="title"/>
+          </p:nvPr>
+        </p:nvSpPr>
+        <p:spPr/>
+        <p:txBody>
+          <a:bodyPr/>
+          <a:lstStyle/>
+          <a:p>
+            <a:r>
+              <a:rPr lang="en-US" dirty="0" smtClean="0"/>
+              <a:t>Pointers</a:t>
+            </a:r>
+            <a:endParaRPr lang="nl-BE" dirty="0"/>
+          </a:p>
+        </p:txBody>
+      </p:sp>
+      <p:sp>
+        <p:nvSpPr>
+          <p:cNvPr id="3" name="Text Placeholder 2"/>
+          <p:cNvSpPr>
+            <a:spLocks noGrp="1"/>
+          </p:cNvSpPr>
+          <p:nvPr>
+            <p:ph type="body" idx="1"/>
+          </p:nvPr>
+        </p:nvSpPr>
+        <p:spPr/>
+        <p:txBody>
+          <a:bodyPr/>
+          <a:lstStyle/>
+          <a:p>
+            <a:endParaRPr lang="nl-BE"/>
+          </a:p>
+        </p:txBody>
+      </p:sp>
+      <p:sp>
+        <p:nvSpPr>
+          <p:cNvPr id="4" name="Slide Number Placeholder 3"/>
+          <p:cNvSpPr>
+            <a:spLocks noGrp="1"/>
+          </p:cNvSpPr>
+          <p:nvPr>
+            <p:ph type="sldNum" sz="quarter" idx="12"/>
+          </p:nvPr>
+        </p:nvSpPr>
+        <p:spPr/>
+        <p:txBody>
+          <a:bodyPr/>
+          <a:lstStyle/>
+          <a:p>
+            <a:fld id="{B6F15528-21DE-4FAA-801E-634DDDAF4B2B}" type="slidenum">
+              <a:rPr lang="en-US" smtClean="0"/>
+              <a:pPr/>
+              <a:t>19</a:t>
+            </a:fld>
+            <a:endParaRPr lang="en-US"/>
+          </a:p>
+        </p:txBody>
+      </p:sp>
+    </p:spTree>
+    <p:extLst>
+      <p:ext uri="{BB962C8B-B14F-4D97-AF65-F5344CB8AC3E}">
+        <p14:creationId xmlns:p14="http://schemas.microsoft.com/office/powerpoint/2010/main" val="1498256543"/>
+      </p:ext>
+    </p:extLst>
+  </p:cSld>
+  <p:clrMapOvr>
+    <a:masterClrMapping/>
+  </p:clrMapOvr>
+</p:sld>
+</file>
+
 <file path=ppt/slides/slide2.xml><?xml version="1.0" encoding="utf-8"?>
 <p:sld xmlns:a="http://schemas.openxmlformats.org/drawingml/2006/main" xmlns:r="http://schemas.openxmlformats.org/officeDocument/2006/relationships" xmlns:p="http://schemas.openxmlformats.org/presentationml/2006/main">
   <p:cSld>
@@ -9462,6 +10778,102 @@
       </p:par>
     </p:tnLst>
   </p:timing>
+</p:sld>
+</file>
+
+<file path=ppt/slides/slide20.xml><?xml version="1.0" encoding="utf-8"?>
+<p:sld xmlns:a="http://schemas.openxmlformats.org/drawingml/2006/main" xmlns:r="http://schemas.openxmlformats.org/officeDocument/2006/relationships" xmlns:p="http://schemas.openxmlformats.org/presentationml/2006/main">
+  <p:cSld>
+    <p:spTree>
+      <p:nvGrpSpPr>
+        <p:cNvPr id="1" name=""/>
+        <p:cNvGrpSpPr/>
+        <p:nvPr/>
+      </p:nvGrpSpPr>
+      <p:grpSpPr>
+        <a:xfrm>
+          <a:off x="0" y="0"/>
+          <a:ext cx="0" cy="0"/>
+          <a:chOff x="0" y="0"/>
+          <a:chExt cx="0" cy="0"/>
+        </a:xfrm>
+      </p:grpSpPr>
+      <p:sp>
+        <p:nvSpPr>
+          <p:cNvPr id="2" name="Title 1"/>
+          <p:cNvSpPr>
+            <a:spLocks noGrp="1"/>
+          </p:cNvSpPr>
+          <p:nvPr>
+            <p:ph type="title"/>
+          </p:nvPr>
+        </p:nvSpPr>
+        <p:spPr/>
+        <p:txBody>
+          <a:bodyPr/>
+          <a:lstStyle/>
+          <a:p>
+            <a:r>
+              <a:rPr lang="en-US" dirty="0" smtClean="0"/>
+              <a:t>Classes</a:t>
+            </a:r>
+            <a:endParaRPr lang="nl-BE" dirty="0"/>
+          </a:p>
+        </p:txBody>
+      </p:sp>
+      <p:sp>
+        <p:nvSpPr>
+          <p:cNvPr id="3" name="Text Placeholder 2"/>
+          <p:cNvSpPr>
+            <a:spLocks noGrp="1"/>
+          </p:cNvSpPr>
+          <p:nvPr>
+            <p:ph type="body" idx="1"/>
+          </p:nvPr>
+        </p:nvSpPr>
+        <p:spPr/>
+        <p:txBody>
+          <a:bodyPr/>
+          <a:lstStyle/>
+          <a:p>
+            <a:endParaRPr lang="nl-BE"/>
+          </a:p>
+        </p:txBody>
+      </p:sp>
+      <p:sp>
+        <p:nvSpPr>
+          <p:cNvPr id="4" name="Slide Number Placeholder 3"/>
+          <p:cNvSpPr>
+            <a:spLocks noGrp="1"/>
+          </p:cNvSpPr>
+          <p:nvPr>
+            <p:ph type="sldNum" sz="quarter" idx="12"/>
+          </p:nvPr>
+        </p:nvSpPr>
+        <p:spPr/>
+        <p:txBody>
+          <a:bodyPr/>
+          <a:lstStyle/>
+          <a:p>
+            <a:fld id="{B6F15528-21DE-4FAA-801E-634DDDAF4B2B}" type="slidenum">
+              <a:rPr lang="en-US" smtClean="0"/>
+              <a:pPr/>
+              <a:t>20</a:t>
+            </a:fld>
+            <a:endParaRPr lang="en-US"/>
+          </a:p>
+        </p:txBody>
+      </p:sp>
+    </p:spTree>
+    <p:extLst>
+      <p:ext uri="{BB962C8B-B14F-4D97-AF65-F5344CB8AC3E}">
+        <p14:creationId xmlns:p14="http://schemas.microsoft.com/office/powerpoint/2010/main" val="2062493159"/>
+      </p:ext>
+    </p:extLst>
+  </p:cSld>
+  <p:clrMapOvr>
+    <a:masterClrMapping/>
+  </p:clrMapOvr>
 </p:sld>
 </file>
 

</xml_diff>

<commit_message>
Started on extension types
</commit_message>
<xml_diff>
--- a/Python/Cython/cython.pptx
+++ b/Python/Cython/cython.pptx
@@ -5,7 +5,7 @@
     <p:sldMasterId id="2147483648" r:id="rId1"/>
   </p:sldMasterIdLst>
   <p:notesMasterIdLst>
-    <p:notesMasterId r:id="rId22"/>
+    <p:notesMasterId r:id="rId23"/>
   </p:notesMasterIdLst>
   <p:sldIdLst>
     <p:sldId id="256" r:id="rId2"/>
@@ -28,6 +28,7 @@
     <p:sldId id="273" r:id="rId19"/>
     <p:sldId id="274" r:id="rId20"/>
     <p:sldId id="275" r:id="rId21"/>
+    <p:sldId id="277" r:id="rId22"/>
   </p:sldIdLst>
   <p:sldSz cx="9144000" cy="6858000" type="screen4x3"/>
   <p:notesSz cx="6858000" cy="9144000"/>
@@ -155,12 +156,13 @@
             <p14:sldId id="273"/>
             <p14:sldId id="274"/>
             <p14:sldId id="275"/>
+            <p14:sldId id="277"/>
           </p14:sldIdLst>
         </p14:section>
       </p14:sectionLst>
     </p:ext>
     <p:ext uri="{EFAFB233-063F-42B5-8137-9DF3F51BA10A}">
-      <p15:sldGuideLst xmlns:p15="http://schemas.microsoft.com/office/powerpoint/2012/main">
+      <p15:sldGuideLst xmlns:p15="http://schemas.microsoft.com/office/powerpoint/2012/main" xmlns="">
         <p15:guide id="1" orient="horz" pos="2160">
           <p15:clr>
             <a:srgbClr val="A4A3A4"/>
@@ -259,7 +261,7 @@
           <a:p>
             <a:fld id="{16B045E4-7DA3-41B9-B0DA-4BEE0876FA88}" type="datetimeFigureOut">
               <a:rPr lang="nl-BE" smtClean="0"/>
-              <a:t>2016-02-23</a:t>
+              <a:t>24/02/2016</a:t>
             </a:fld>
             <a:endParaRPr lang="nl-BE"/>
           </a:p>
@@ -708,7 +710,7 @@
           <a:p>
             <a:fld id="{53B2420D-148A-400F-B88D-527DF6E13622}" type="datetime1">
               <a:rPr lang="en-US" smtClean="0"/>
-              <a:t>2/23/2016</a:t>
+              <a:t>2016-02-24</a:t>
             </a:fld>
             <a:endParaRPr lang="en-US"/>
           </a:p>
@@ -874,7 +876,7 @@
           <a:p>
             <a:fld id="{52A01B9A-6787-4B63-BAEF-E3CF67589D82}" type="datetime1">
               <a:rPr lang="en-US" smtClean="0"/>
-              <a:t>2/23/2016</a:t>
+              <a:t>2016-02-24</a:t>
             </a:fld>
             <a:endParaRPr lang="en-US"/>
           </a:p>
@@ -1050,7 +1052,7 @@
           <a:p>
             <a:fld id="{6E982D42-2071-4A3D-B614-2380183202E1}" type="datetime1">
               <a:rPr lang="en-US" smtClean="0"/>
-              <a:t>2/23/2016</a:t>
+              <a:t>2016-02-24</a:t>
             </a:fld>
             <a:endParaRPr lang="en-US"/>
           </a:p>
@@ -1216,7 +1218,7 @@
           <a:p>
             <a:fld id="{2E90E067-04B9-40C0-BFE6-53BAD2F7119C}" type="datetime1">
               <a:rPr lang="en-US" smtClean="0"/>
-              <a:t>2/23/2016</a:t>
+              <a:t>2016-02-24</a:t>
             </a:fld>
             <a:endParaRPr lang="en-US"/>
           </a:p>
@@ -1458,7 +1460,7 @@
           <a:p>
             <a:fld id="{D7CB2E72-949E-4479-B957-DBA32EC1FAB9}" type="datetime1">
               <a:rPr lang="en-US" smtClean="0"/>
-              <a:t>2/23/2016</a:t>
+              <a:t>2016-02-24</a:t>
             </a:fld>
             <a:endParaRPr lang="en-US"/>
           </a:p>
@@ -1742,7 +1744,7 @@
           <a:p>
             <a:fld id="{A06819D6-C5C8-405A-96EE-DAC9728267C0}" type="datetime1">
               <a:rPr lang="en-US" smtClean="0"/>
-              <a:t>2/23/2016</a:t>
+              <a:t>2016-02-24</a:t>
             </a:fld>
             <a:endParaRPr lang="en-US"/>
           </a:p>
@@ -2160,7 +2162,7 @@
           <a:p>
             <a:fld id="{476A766D-F1AD-47B2-B323-71C0AAEFC468}" type="datetime1">
               <a:rPr lang="en-US" smtClean="0"/>
-              <a:t>2/23/2016</a:t>
+              <a:t>2016-02-24</a:t>
             </a:fld>
             <a:endParaRPr lang="en-US"/>
           </a:p>
@@ -2274,7 +2276,7 @@
           <a:p>
             <a:fld id="{E8021487-0835-4E27-A96A-FE7FCF3265BD}" type="datetime1">
               <a:rPr lang="en-US" smtClean="0"/>
-              <a:t>2/23/2016</a:t>
+              <a:t>2016-02-24</a:t>
             </a:fld>
             <a:endParaRPr lang="en-US"/>
           </a:p>
@@ -2365,7 +2367,7 @@
           <a:p>
             <a:fld id="{D8423321-723F-439B-A2FC-3D1497BCF824}" type="datetime1">
               <a:rPr lang="en-US" smtClean="0"/>
-              <a:t>2/23/2016</a:t>
+              <a:t>2016-02-24</a:t>
             </a:fld>
             <a:endParaRPr lang="en-US"/>
           </a:p>
@@ -2638,7 +2640,7 @@
           <a:p>
             <a:fld id="{C23318F9-3CB8-42B9-8393-7570C1C1A70D}" type="datetime1">
               <a:rPr lang="en-US" smtClean="0"/>
-              <a:t>2/23/2016</a:t>
+              <a:t>2016-02-24</a:t>
             </a:fld>
             <a:endParaRPr lang="en-US"/>
           </a:p>
@@ -2887,7 +2889,7 @@
           <a:p>
             <a:fld id="{6867E127-D066-4A1C-B918-F70FF61E725D}" type="datetime1">
               <a:rPr lang="en-US" smtClean="0"/>
-              <a:t>2/23/2016</a:t>
+              <a:t>2016-02-24</a:t>
             </a:fld>
             <a:endParaRPr lang="en-US"/>
           </a:p>
@@ -3096,7 +3098,7 @@
           <a:p>
             <a:fld id="{E6FF7314-6885-4B6E-804E-F9FE9C155D78}" type="datetime1">
               <a:rPr lang="en-US" smtClean="0"/>
-              <a:t>2/23/2016</a:t>
+              <a:t>2016-02-24</a:t>
             </a:fld>
             <a:endParaRPr lang="en-US"/>
           </a:p>
@@ -4306,7 +4308,7 @@
                 <a:latin typeface="Courier New" panose="02070309020205020404" pitchFamily="49" charset="0"/>
                 <a:cs typeface="Courier New" panose="02070309020205020404" pitchFamily="49" charset="0"/>
               </a:rPr>
-              <a:t>point.pyx</a:t>
+              <a:t>particle.pyx</a:t>
             </a:r>
             <a:endParaRPr lang="en-US" dirty="0" smtClean="0">
               <a:latin typeface="Courier New" panose="02070309020205020404" pitchFamily="49" charset="0"/>
@@ -4332,7 +4334,7 @@
                 <a:latin typeface="Courier New" panose="02070309020205020404" pitchFamily="49" charset="0"/>
                 <a:cs typeface="Courier New" panose="02070309020205020404" pitchFamily="49" charset="0"/>
               </a:rPr>
-              <a:t>point.pyx</a:t>
+              <a:t>particle.pyx</a:t>
             </a:r>
             <a:endParaRPr lang="en-US" dirty="0" smtClean="0">
               <a:latin typeface="Courier New" panose="02070309020205020404" pitchFamily="49" charset="0"/>
@@ -4384,7 +4386,7 @@
         <p:spPr>
           <a:xfrm>
             <a:off x="1066800" y="2209800"/>
-            <a:ext cx="2666114" cy="1200329"/>
+            <a:ext cx="3079689" cy="1200329"/>
           </a:xfrm>
           <a:prstGeom prst="rect">
             <a:avLst/>
@@ -4432,7 +4434,21 @@
                 <a:latin typeface="Courier New" panose="02070309020205020404" pitchFamily="49" charset="0"/>
                 <a:cs typeface="Courier New" panose="02070309020205020404" pitchFamily="49" charset="0"/>
               </a:rPr>
-              <a:t> Point:</a:t>
+              <a:t> </a:t>
+            </a:r>
+            <a:r>
+              <a:rPr lang="en-US" dirty="0" smtClean="0">
+                <a:latin typeface="Courier New" panose="02070309020205020404" pitchFamily="49" charset="0"/>
+                <a:cs typeface="Courier New" panose="02070309020205020404" pitchFamily="49" charset="0"/>
+              </a:rPr>
+              <a:t>Particle:</a:t>
+            </a:r>
+            <a:r>
+              <a:rPr lang="en-US" dirty="0" smtClean="0">
+                <a:latin typeface="Courier New" panose="02070309020205020404" pitchFamily="49" charset="0"/>
+                <a:cs typeface="Courier New" panose="02070309020205020404" pitchFamily="49" charset="0"/>
+              </a:rPr>
+              <a:t/>
             </a:r>
             <a:br>
               <a:rPr lang="en-US" dirty="0" smtClean="0">
@@ -4461,14 +4477,7 @@
                 <a:latin typeface="Courier New" panose="02070309020205020404" pitchFamily="49" charset="0"/>
                 <a:cs typeface="Courier New" panose="02070309020205020404" pitchFamily="49" charset="0"/>
               </a:rPr>
-              <a:t>   double </a:t>
-            </a:r>
-            <a:r>
-              <a:rPr lang="en-US" dirty="0" smtClean="0">
-                <a:latin typeface="Courier New" panose="02070309020205020404" pitchFamily="49" charset="0"/>
-                <a:cs typeface="Courier New" panose="02070309020205020404" pitchFamily="49" charset="0"/>
-              </a:rPr>
-              <a:t>y</a:t>
+              <a:t>   double y</a:t>
             </a:r>
             <a:br>
               <a:rPr lang="en-US" dirty="0" smtClean="0">
@@ -4495,7 +4504,7 @@
                 <a:latin typeface="Courier New" panose="02070309020205020404" pitchFamily="49" charset="0"/>
                 <a:cs typeface="Courier New" panose="02070309020205020404" pitchFamily="49" charset="0"/>
               </a:rPr>
-              <a:t> id</a:t>
+              <a:t> charge</a:t>
             </a:r>
             <a:endParaRPr lang="en-US" dirty="0" smtClean="0">
               <a:latin typeface="Courier New" panose="02070309020205020404" pitchFamily="49" charset="0"/>
@@ -4512,10 +4521,10 @@
         </p:nvGrpSpPr>
         <p:grpSpPr>
           <a:xfrm>
-            <a:off x="3519975" y="2269004"/>
-            <a:ext cx="4303852" cy="369332"/>
-            <a:chOff x="4264642" y="3245348"/>
-            <a:chExt cx="4303852" cy="369332"/>
+            <a:off x="4142727" y="2269004"/>
+            <a:ext cx="3816709" cy="369332"/>
+            <a:chOff x="4751785" y="3245348"/>
+            <a:chExt cx="3816709" cy="369332"/>
           </a:xfrm>
         </p:grpSpPr>
         <p:sp>
@@ -4571,8 +4580,8 @@
           </p:nvCxnSpPr>
           <p:spPr>
             <a:xfrm flipH="1">
-              <a:off x="4264642" y="3430014"/>
-              <a:ext cx="974286" cy="68927"/>
+              <a:off x="4751785" y="3430014"/>
+              <a:ext cx="487143" cy="184666"/>
             </a:xfrm>
             <a:prstGeom prst="straightConnector1">
               <a:avLst/>
@@ -4609,7 +4618,7 @@
         <p:spPr>
           <a:xfrm>
             <a:off x="1067686" y="3886200"/>
-            <a:ext cx="6388287" cy="646331"/>
+            <a:ext cx="5285421" cy="646331"/>
           </a:xfrm>
           <a:prstGeom prst="rect">
             <a:avLst/>
@@ -4643,8 +4652,33 @@
                 <a:latin typeface="Courier New" panose="02070309020205020404" pitchFamily="49" charset="0"/>
                 <a:cs typeface="Courier New" panose="02070309020205020404" pitchFamily="49" charset="0"/>
               </a:rPr>
-              <a:t> radius(Point point):</a:t>
-            </a:r>
+              <a:t> </a:t>
+            </a:r>
+            <a:r>
+              <a:rPr lang="en-US" dirty="0" smtClean="0">
+                <a:latin typeface="Courier New" panose="02070309020205020404" pitchFamily="49" charset="0"/>
+                <a:cs typeface="Courier New" panose="02070309020205020404" pitchFamily="49" charset="0"/>
+              </a:rPr>
+              <a:t>radius(Parti</a:t>
+            </a:r>
+            <a:r>
+              <a:rPr lang="en-US" dirty="0" smtClean="0">
+                <a:latin typeface="Courier New" panose="02070309020205020404" pitchFamily="49" charset="0"/>
+                <a:cs typeface="Courier New" panose="02070309020205020404" pitchFamily="49" charset="0"/>
+              </a:rPr>
+              <a:t>cle</a:t>
+            </a:r>
+            <a:r>
+              <a:rPr lang="en-US" dirty="0" smtClean="0">
+                <a:latin typeface="Courier New" panose="02070309020205020404" pitchFamily="49" charset="0"/>
+                <a:cs typeface="Courier New" panose="02070309020205020404" pitchFamily="49" charset="0"/>
+              </a:rPr>
+              <a:t> p):</a:t>
+            </a:r>
+            <a:endParaRPr lang="en-US" dirty="0">
+              <a:latin typeface="Courier New" panose="02070309020205020404" pitchFamily="49" charset="0"/>
+              <a:cs typeface="Courier New" panose="02070309020205020404" pitchFamily="49" charset="0"/>
+            </a:endParaRPr>
           </a:p>
           <a:p>
             <a:r>
@@ -4655,39 +4689,39 @@
               <a:t>    return </a:t>
             </a:r>
             <a:r>
-              <a:rPr lang="en-US" dirty="0" err="1">
+              <a:rPr lang="en-US" dirty="0" err="1" smtClean="0">
                 <a:latin typeface="Courier New" panose="02070309020205020404" pitchFamily="49" charset="0"/>
                 <a:cs typeface="Courier New" panose="02070309020205020404" pitchFamily="49" charset="0"/>
               </a:rPr>
               <a:t>math.sqrt</a:t>
             </a:r>
             <a:r>
+              <a:rPr lang="en-US" dirty="0" smtClean="0">
+                <a:latin typeface="Courier New" panose="02070309020205020404" pitchFamily="49" charset="0"/>
+                <a:cs typeface="Courier New" panose="02070309020205020404" pitchFamily="49" charset="0"/>
+              </a:rPr>
+              <a:t>(</a:t>
+            </a:r>
+            <a:r>
+              <a:rPr lang="en-US" dirty="0" err="1" smtClean="0">
+                <a:latin typeface="Courier New" panose="02070309020205020404" pitchFamily="49" charset="0"/>
+                <a:cs typeface="Courier New" panose="02070309020205020404" pitchFamily="49" charset="0"/>
+              </a:rPr>
+              <a:t>p.x</a:t>
+            </a:r>
+            <a:r>
               <a:rPr lang="en-US" dirty="0">
                 <a:latin typeface="Courier New" panose="02070309020205020404" pitchFamily="49" charset="0"/>
                 <a:cs typeface="Courier New" panose="02070309020205020404" pitchFamily="49" charset="0"/>
               </a:rPr>
-              <a:t>(</a:t>
-            </a:r>
-            <a:r>
-              <a:rPr lang="en-US" dirty="0" err="1">
-                <a:latin typeface="Courier New" panose="02070309020205020404" pitchFamily="49" charset="0"/>
-                <a:cs typeface="Courier New" panose="02070309020205020404" pitchFamily="49" charset="0"/>
-              </a:rPr>
-              <a:t>point.x</a:t>
-            </a:r>
-            <a:r>
-              <a:rPr lang="en-US" dirty="0">
-                <a:latin typeface="Courier New" panose="02070309020205020404" pitchFamily="49" charset="0"/>
-                <a:cs typeface="Courier New" panose="02070309020205020404" pitchFamily="49" charset="0"/>
-              </a:rPr>
               <a:t>**2 + </a:t>
             </a:r>
             <a:r>
-              <a:rPr lang="en-US" dirty="0" err="1">
-                <a:latin typeface="Courier New" panose="02070309020205020404" pitchFamily="49" charset="0"/>
-                <a:cs typeface="Courier New" panose="02070309020205020404" pitchFamily="49" charset="0"/>
-              </a:rPr>
-              <a:t>point.y</a:t>
+              <a:rPr lang="en-US" dirty="0" err="1" smtClean="0">
+                <a:latin typeface="Courier New" panose="02070309020205020404" pitchFamily="49" charset="0"/>
+                <a:cs typeface="Courier New" panose="02070309020205020404" pitchFamily="49" charset="0"/>
+              </a:rPr>
+              <a:t>p.y</a:t>
             </a:r>
             <a:r>
               <a:rPr lang="en-US" dirty="0">
@@ -4707,7 +4741,7 @@
         </p:nvGrpSpPr>
         <p:grpSpPr>
           <a:xfrm>
-            <a:off x="2971800" y="2606402"/>
+            <a:off x="3124200" y="2606402"/>
             <a:ext cx="3352800" cy="659202"/>
             <a:chOff x="2971800" y="2606402"/>
             <a:chExt cx="3352800" cy="659202"/>
@@ -4954,7 +4988,7 @@
         <p:spPr>
           <a:xfrm>
             <a:off x="1066800" y="5105400"/>
-            <a:ext cx="4871847" cy="923330"/>
+            <a:ext cx="5423280" cy="923330"/>
           </a:xfrm>
           <a:prstGeom prst="rect">
             <a:avLst/>
@@ -4988,44 +5022,72 @@
                 <a:latin typeface="Courier New" panose="02070309020205020404" pitchFamily="49" charset="0"/>
                 <a:cs typeface="Courier New" panose="02070309020205020404" pitchFamily="49" charset="0"/>
               </a:rPr>
-              <a:t>mport point</a:t>
-            </a:r>
-          </a:p>
-          <a:p>
+              <a:t>mport </a:t>
+            </a:r>
             <a:r>
               <a:rPr lang="en-US" dirty="0" smtClean="0">
                 <a:latin typeface="Courier New" panose="02070309020205020404" pitchFamily="49" charset="0"/>
                 <a:cs typeface="Courier New" panose="02070309020205020404" pitchFamily="49" charset="0"/>
               </a:rPr>
-              <a:t>p = {'x': 1.0, 'y': -2.3, 'id': 1}</a:t>
-            </a:r>
-          </a:p>
-          <a:p>
-            <a:r>
-              <a:rPr lang="en-US" dirty="0" smtClean="0">
-                <a:latin typeface="Courier New" panose="02070309020205020404" pitchFamily="49" charset="0"/>
-                <a:cs typeface="Courier New" panose="02070309020205020404" pitchFamily="49" charset="0"/>
-              </a:rPr>
-              <a:t>print(</a:t>
-            </a:r>
-            <a:r>
-              <a:rPr lang="en-US" dirty="0" err="1" smtClean="0">
-                <a:latin typeface="Courier New" panose="02070309020205020404" pitchFamily="49" charset="0"/>
-                <a:cs typeface="Courier New" panose="02070309020205020404" pitchFamily="49" charset="0"/>
-              </a:rPr>
-              <a:t>point.radius</a:t>
-            </a:r>
-            <a:r>
-              <a:rPr lang="en-US" dirty="0" smtClean="0">
-                <a:latin typeface="Courier New" panose="02070309020205020404" pitchFamily="49" charset="0"/>
-                <a:cs typeface="Courier New" panose="02070309020205020404" pitchFamily="49" charset="0"/>
-              </a:rPr>
-              <a:t>(p))</a:t>
+              <a:t>particle</a:t>
             </a:r>
             <a:endParaRPr lang="en-US" dirty="0" smtClean="0">
               <a:latin typeface="Courier New" panose="02070309020205020404" pitchFamily="49" charset="0"/>
               <a:cs typeface="Courier New" panose="02070309020205020404" pitchFamily="49" charset="0"/>
             </a:endParaRPr>
+          </a:p>
+          <a:p>
+            <a:r>
+              <a:rPr lang="en-US" dirty="0" smtClean="0">
+                <a:latin typeface="Courier New" panose="02070309020205020404" pitchFamily="49" charset="0"/>
+                <a:cs typeface="Courier New" panose="02070309020205020404" pitchFamily="49" charset="0"/>
+              </a:rPr>
+              <a:t>p = {'x': 1.0, 'y': -2.3, </a:t>
+            </a:r>
+            <a:r>
+              <a:rPr lang="en-US" dirty="0" smtClean="0">
+                <a:latin typeface="Courier New" panose="02070309020205020404" pitchFamily="49" charset="0"/>
+                <a:cs typeface="Courier New" panose="02070309020205020404" pitchFamily="49" charset="0"/>
+              </a:rPr>
+              <a:t>'charge': </a:t>
+            </a:r>
+            <a:r>
+              <a:rPr lang="en-US" dirty="0" smtClean="0">
+                <a:latin typeface="Courier New" panose="02070309020205020404" pitchFamily="49" charset="0"/>
+                <a:cs typeface="Courier New" panose="02070309020205020404" pitchFamily="49" charset="0"/>
+              </a:rPr>
+              <a:t>1}</a:t>
+            </a:r>
+          </a:p>
+          <a:p>
+            <a:r>
+              <a:rPr lang="en-US" dirty="0" smtClean="0">
+                <a:latin typeface="Courier New" panose="02070309020205020404" pitchFamily="49" charset="0"/>
+                <a:cs typeface="Courier New" panose="02070309020205020404" pitchFamily="49" charset="0"/>
+              </a:rPr>
+              <a:t>print(</a:t>
+            </a:r>
+            <a:r>
+              <a:rPr lang="en-US" dirty="0" err="1" smtClean="0">
+                <a:latin typeface="Courier New" panose="02070309020205020404" pitchFamily="49" charset="0"/>
+                <a:cs typeface="Courier New" panose="02070309020205020404" pitchFamily="49" charset="0"/>
+              </a:rPr>
+              <a:t>particle.radius</a:t>
+            </a:r>
+            <a:r>
+              <a:rPr lang="en-US" dirty="0" smtClean="0">
+                <a:latin typeface="Courier New" panose="02070309020205020404" pitchFamily="49" charset="0"/>
+                <a:cs typeface="Courier New" panose="02070309020205020404" pitchFamily="49" charset="0"/>
+              </a:rPr>
+              <a:t>(p</a:t>
+            </a:r>
+            <a:r>
+              <a:rPr lang="en-US" dirty="0" smtClean="0">
+                <a:latin typeface="Courier New" panose="02070309020205020404" pitchFamily="49" charset="0"/>
+                <a:cs typeface="Courier New" panose="02070309020205020404" pitchFamily="49" charset="0"/>
+              </a:rPr>
+              <a:t>))</a:t>
+            </a:r>
           </a:p>
         </p:txBody>
       </p:sp>
@@ -7073,7 +7135,7 @@
         </p:spPr>
         <p:txBody>
           <a:bodyPr>
-            <a:normAutofit/>
+            <a:normAutofit fontScale="92500" lnSpcReduction="10000"/>
           </a:bodyPr>
           <a:lstStyle/>
           <a:p>
@@ -7133,8 +7195,41 @@
                 <a:latin typeface="Courier New" panose="02070309020205020404" pitchFamily="49" charset="0"/>
                 <a:cs typeface="Courier New" panose="02070309020205020404" pitchFamily="49" charset="0"/>
               </a:rPr>
-              <a:t> == 'd'</a:t>
-            </a:r>
+              <a:t> == 'd</a:t>
+            </a:r>
+            <a:r>
+              <a:rPr lang="en-US" dirty="0" smtClean="0">
+                <a:latin typeface="Courier New" panose="02070309020205020404" pitchFamily="49" charset="0"/>
+                <a:cs typeface="Courier New" panose="02070309020205020404" pitchFamily="49" charset="0"/>
+              </a:rPr>
+              <a:t>'</a:t>
+            </a:r>
+          </a:p>
+          <a:p>
+            <a:r>
+              <a:rPr lang="en-US" dirty="0" smtClean="0">
+                <a:cs typeface="Courier New" panose="02070309020205020404" pitchFamily="49" charset="0"/>
+              </a:rPr>
+              <a:t>Data size: </a:t>
+            </a:r>
+            <a:r>
+              <a:rPr lang="en-US" dirty="0" err="1" smtClean="0">
+                <a:latin typeface="Courier New" panose="02070309020205020404" pitchFamily="49" charset="0"/>
+                <a:cs typeface="Courier New" panose="02070309020205020404" pitchFamily="49" charset="0"/>
+              </a:rPr>
+              <a:t>mv.itemsize</a:t>
+            </a:r>
+            <a:r>
+              <a:rPr lang="en-US" dirty="0" smtClean="0">
+                <a:latin typeface="Courier New" panose="02070309020205020404" pitchFamily="49" charset="0"/>
+                <a:cs typeface="Courier New" panose="02070309020205020404" pitchFamily="49" charset="0"/>
+              </a:rPr>
+              <a:t> == 8</a:t>
+            </a:r>
+            <a:endParaRPr lang="en-US" dirty="0" smtClean="0">
+              <a:latin typeface="Courier New" panose="02070309020205020404" pitchFamily="49" charset="0"/>
+              <a:cs typeface="Courier New" panose="02070309020205020404" pitchFamily="49" charset="0"/>
+            </a:endParaRPr>
           </a:p>
           <a:p>
             <a:r>
@@ -7659,6 +7754,55 @@
                                           <p:spTgt spid="3">
                                             <p:txEl>
                                               <p:pRg st="5" end="5"/>
+                                            </p:txEl>
+                                          </p:spTgt>
+                                        </p:tgtEl>
+                                        <p:attrNameLst>
+                                          <p:attrName>style.visibility</p:attrName>
+                                        </p:attrNameLst>
+                                      </p:cBhvr>
+                                      <p:to>
+                                        <p:strVal val="visible"/>
+                                      </p:to>
+                                    </p:set>
+                                  </p:childTnLst>
+                                </p:cTn>
+                              </p:par>
+                            </p:childTnLst>
+                          </p:cTn>
+                        </p:par>
+                      </p:childTnLst>
+                    </p:cTn>
+                  </p:par>
+                  <p:par>
+                    <p:cTn id="31" fill="hold">
+                      <p:stCondLst>
+                        <p:cond delay="indefinite"/>
+                      </p:stCondLst>
+                      <p:childTnLst>
+                        <p:par>
+                          <p:cTn id="32" fill="hold">
+                            <p:stCondLst>
+                              <p:cond delay="0"/>
+                            </p:stCondLst>
+                            <p:childTnLst>
+                              <p:par>
+                                <p:cTn id="33" presetID="1" presetClass="entr" presetSubtype="0" fill="hold" grpId="0" nodeType="clickEffect">
+                                  <p:stCondLst>
+                                    <p:cond delay="0"/>
+                                  </p:stCondLst>
+                                  <p:childTnLst>
+                                    <p:set>
+                                      <p:cBhvr>
+                                        <p:cTn id="34" dur="1" fill="hold">
+                                          <p:stCondLst>
+                                            <p:cond delay="0"/>
+                                          </p:stCondLst>
+                                        </p:cTn>
+                                        <p:tgtEl>
+                                          <p:spTgt spid="3">
+                                            <p:txEl>
+                                              <p:pRg st="6" end="6"/>
                                             </p:txEl>
                                           </p:spTgt>
                                         </p:tgtEl>
@@ -9135,7 +9279,21 @@
                 <a:latin typeface="Courier New" panose="02070309020205020404" pitchFamily="49" charset="0"/>
                 <a:cs typeface="Courier New" panose="02070309020205020404" pitchFamily="49" charset="0"/>
               </a:rPr>
-              <a:t> inline </a:t>
+              <a:t> </a:t>
+            </a:r>
+            <a:r>
+              <a:rPr lang="en-US" b="1" dirty="0" smtClean="0">
+                <a:latin typeface="Courier New" panose="02070309020205020404" pitchFamily="49" charset="0"/>
+                <a:cs typeface="Courier New" panose="02070309020205020404" pitchFamily="49" charset="0"/>
+              </a:rPr>
+              <a:t>inline</a:t>
+            </a:r>
+            <a:r>
+              <a:rPr lang="en-US" dirty="0" smtClean="0">
+                <a:latin typeface="Courier New" panose="02070309020205020404" pitchFamily="49" charset="0"/>
+                <a:cs typeface="Courier New" panose="02070309020205020404" pitchFamily="49" charset="0"/>
+              </a:rPr>
+              <a:t> </a:t>
             </a:r>
             <a:r>
               <a:rPr lang="en-US" dirty="0" err="1" smtClean="0">
@@ -9880,7 +10038,21 @@
                 <a:latin typeface="Courier New" panose="02070309020205020404" pitchFamily="49" charset="0"/>
                 <a:cs typeface="Courier New" panose="02070309020205020404" pitchFamily="49" charset="0"/>
               </a:rPr>
-              <a:t> n=-1) except? -1.0:</a:t>
+              <a:t> n=-1) </a:t>
+            </a:r>
+            <a:r>
+              <a:rPr lang="en-US" b="1" dirty="0">
+                <a:latin typeface="Courier New" panose="02070309020205020404" pitchFamily="49" charset="0"/>
+                <a:cs typeface="Courier New" panose="02070309020205020404" pitchFamily="49" charset="0"/>
+              </a:rPr>
+              <a:t>except?</a:t>
+            </a:r>
+            <a:r>
+              <a:rPr lang="en-US" dirty="0">
+                <a:latin typeface="Courier New" panose="02070309020205020404" pitchFamily="49" charset="0"/>
+                <a:cs typeface="Courier New" panose="02070309020205020404" pitchFamily="49" charset="0"/>
+              </a:rPr>
+              <a:t> -1.0:</a:t>
             </a:r>
           </a:p>
           <a:p>
@@ -10868,6 +11040,328 @@
     <p:extLst>
       <p:ext uri="{BB962C8B-B14F-4D97-AF65-F5344CB8AC3E}">
         <p14:creationId xmlns:p14="http://schemas.microsoft.com/office/powerpoint/2010/main" val="2062493159"/>
+      </p:ext>
+    </p:extLst>
+  </p:cSld>
+  <p:clrMapOvr>
+    <a:masterClrMapping/>
+  </p:clrMapOvr>
+</p:sld>
+</file>
+
+<file path=ppt/slides/slide21.xml><?xml version="1.0" encoding="utf-8"?>
+<p:sld xmlns:a="http://schemas.openxmlformats.org/drawingml/2006/main" xmlns:r="http://schemas.openxmlformats.org/officeDocument/2006/relationships" xmlns:p="http://schemas.openxmlformats.org/presentationml/2006/main">
+  <p:cSld>
+    <p:spTree>
+      <p:nvGrpSpPr>
+        <p:cNvPr id="1" name=""/>
+        <p:cNvGrpSpPr/>
+        <p:nvPr/>
+      </p:nvGrpSpPr>
+      <p:grpSpPr>
+        <a:xfrm>
+          <a:off x="0" y="0"/>
+          <a:ext cx="0" cy="0"/>
+          <a:chOff x="0" y="0"/>
+          <a:chExt cx="0" cy="0"/>
+        </a:xfrm>
+      </p:grpSpPr>
+      <p:sp>
+        <p:nvSpPr>
+          <p:cNvPr id="2" name="Title 1"/>
+          <p:cNvSpPr>
+            <a:spLocks noGrp="1"/>
+          </p:cNvSpPr>
+          <p:nvPr>
+            <p:ph type="title"/>
+          </p:nvPr>
+        </p:nvSpPr>
+        <p:spPr/>
+        <p:txBody>
+          <a:bodyPr/>
+          <a:lstStyle/>
+          <a:p>
+            <a:r>
+              <a:rPr lang="en-US" dirty="0" smtClean="0"/>
+              <a:t>Extension types</a:t>
+            </a:r>
+            <a:endParaRPr lang="nl-BE" dirty="0"/>
+          </a:p>
+        </p:txBody>
+      </p:sp>
+      <p:sp>
+        <p:nvSpPr>
+          <p:cNvPr id="4" name="Slide Number Placeholder 3"/>
+          <p:cNvSpPr>
+            <a:spLocks noGrp="1"/>
+          </p:cNvSpPr>
+          <p:nvPr>
+            <p:ph type="sldNum" sz="quarter" idx="12"/>
+          </p:nvPr>
+        </p:nvSpPr>
+        <p:spPr/>
+        <p:txBody>
+          <a:bodyPr/>
+          <a:lstStyle/>
+          <a:p>
+            <a:fld id="{B6F15528-21DE-4FAA-801E-634DDDAF4B2B}" type="slidenum">
+              <a:rPr lang="en-US" smtClean="0"/>
+              <a:pPr/>
+              <a:t>21</a:t>
+            </a:fld>
+            <a:endParaRPr lang="en-US"/>
+          </a:p>
+        </p:txBody>
+      </p:sp>
+      <p:grpSp>
+        <p:nvGrpSpPr>
+          <p:cNvPr id="5" name="Group 4"/>
+          <p:cNvGrpSpPr/>
+          <p:nvPr/>
+        </p:nvGrpSpPr>
+        <p:grpSpPr>
+          <a:xfrm>
+            <a:off x="304800" y="1371600"/>
+            <a:ext cx="3886200" cy="5020574"/>
+            <a:chOff x="304800" y="1371600"/>
+            <a:chExt cx="3886200" cy="5020574"/>
+          </a:xfrm>
+          <a:solidFill>
+            <a:schemeClr val="bg1">
+              <a:lumMod val="85000"/>
+            </a:schemeClr>
+          </a:solidFill>
+        </p:grpSpPr>
+        <p:sp>
+          <p:nvSpPr>
+            <p:cNvPr id="6" name="TextBox 5"/>
+            <p:cNvSpPr txBox="1"/>
+            <p:nvPr/>
+          </p:nvSpPr>
+          <p:spPr>
+            <a:xfrm>
+              <a:off x="304800" y="1371600"/>
+              <a:ext cx="3393878" cy="1569660"/>
+            </a:xfrm>
+            <a:prstGeom prst="rect">
+              <a:avLst/>
+            </a:prstGeom>
+            <a:grpFill/>
+            <a:ln>
+              <a:solidFill>
+                <a:schemeClr val="tx1"/>
+              </a:solidFill>
+            </a:ln>
+          </p:spPr>
+          <p:txBody>
+            <a:bodyPr wrap="none" rtlCol="0">
+              <a:spAutoFit/>
+            </a:bodyPr>
+            <a:lstStyle/>
+            <a:p>
+              <a:r>
+                <a:rPr lang="nl-BE" sz="1600" dirty="0" smtClean="0">
+                  <a:latin typeface="Courier New" panose="02070309020205020404" pitchFamily="49" charset="0"/>
+                  <a:cs typeface="Courier New" panose="02070309020205020404" pitchFamily="49" charset="0"/>
+                </a:rPr>
+                <a:t>class </a:t>
+              </a:r>
+              <a:r>
+                <a:rPr lang="nl-BE" sz="1600" dirty="0" err="1" smtClean="0">
+                  <a:latin typeface="Courier New" panose="02070309020205020404" pitchFamily="49" charset="0"/>
+                  <a:cs typeface="Courier New" panose="02070309020205020404" pitchFamily="49" charset="0"/>
+                </a:rPr>
+                <a:t>Particle</a:t>
+              </a:r>
+              <a:r>
+                <a:rPr lang="nl-BE" sz="1600" dirty="0" smtClean="0">
+                  <a:latin typeface="Courier New" panose="02070309020205020404" pitchFamily="49" charset="0"/>
+                  <a:cs typeface="Courier New" panose="02070309020205020404" pitchFamily="49" charset="0"/>
+                </a:rPr>
+                <a:t>(object):</a:t>
+              </a:r>
+            </a:p>
+            <a:p>
+              <a:endParaRPr lang="en-US" sz="1600" dirty="0">
+                <a:latin typeface="Courier New" panose="02070309020205020404" pitchFamily="49" charset="0"/>
+                <a:cs typeface="Courier New" panose="02070309020205020404" pitchFamily="49" charset="0"/>
+              </a:endParaRPr>
+            </a:p>
+            <a:p>
+              <a:r>
+                <a:rPr lang="en-US" sz="1600" dirty="0" smtClean="0">
+                  <a:latin typeface="Courier New" panose="02070309020205020404" pitchFamily="49" charset="0"/>
+                  <a:cs typeface="Courier New" panose="02070309020205020404" pitchFamily="49" charset="0"/>
+                </a:rPr>
+                <a:t>    </a:t>
+              </a:r>
+              <a:r>
+                <a:rPr lang="en-US" sz="1600" dirty="0" err="1" smtClean="0">
+                  <a:latin typeface="Courier New" panose="02070309020205020404" pitchFamily="49" charset="0"/>
+                  <a:cs typeface="Courier New" panose="02070309020205020404" pitchFamily="49" charset="0"/>
+                </a:rPr>
+                <a:t>def</a:t>
+              </a:r>
+              <a:r>
+                <a:rPr lang="en-US" sz="1600" dirty="0" smtClean="0">
+                  <a:latin typeface="Courier New" panose="02070309020205020404" pitchFamily="49" charset="0"/>
+                  <a:cs typeface="Courier New" panose="02070309020205020404" pitchFamily="49" charset="0"/>
+                </a:rPr>
+                <a:t> __</a:t>
+              </a:r>
+              <a:r>
+                <a:rPr lang="en-US" sz="1600" dirty="0" err="1" smtClean="0">
+                  <a:latin typeface="Courier New" panose="02070309020205020404" pitchFamily="49" charset="0"/>
+                  <a:cs typeface="Courier New" panose="02070309020205020404" pitchFamily="49" charset="0"/>
+                </a:rPr>
+                <a:t>init</a:t>
+              </a:r>
+              <a:r>
+                <a:rPr lang="en-US" sz="1600" dirty="0" smtClean="0">
+                  <a:latin typeface="Courier New" panose="02070309020205020404" pitchFamily="49" charset="0"/>
+                  <a:cs typeface="Courier New" panose="02070309020205020404" pitchFamily="49" charset="0"/>
+                </a:rPr>
+                <a:t>__(m, x, v):</a:t>
+              </a:r>
+              <a:endParaRPr lang="nl-BE" sz="1600" dirty="0" smtClean="0">
+                <a:latin typeface="Courier New" panose="02070309020205020404" pitchFamily="49" charset="0"/>
+                <a:cs typeface="Courier New" panose="02070309020205020404" pitchFamily="49" charset="0"/>
+              </a:endParaRPr>
+            </a:p>
+            <a:p>
+              <a:r>
+                <a:rPr lang="en-US" sz="1600" dirty="0" smtClean="0">
+                  <a:latin typeface="Courier New" panose="02070309020205020404" pitchFamily="49" charset="0"/>
+                  <a:cs typeface="Courier New" panose="02070309020205020404" pitchFamily="49" charset="0"/>
+                </a:rPr>
+                <a:t>        </a:t>
+              </a:r>
+              <a:r>
+                <a:rPr lang="en-US" sz="1600" dirty="0" err="1">
+                  <a:latin typeface="Courier New" panose="02070309020205020404" pitchFamily="49" charset="0"/>
+                  <a:cs typeface="Courier New" panose="02070309020205020404" pitchFamily="49" charset="0"/>
+                </a:rPr>
+                <a:t>self.m</a:t>
+              </a:r>
+              <a:r>
+                <a:rPr lang="en-US" sz="1600" dirty="0">
+                  <a:latin typeface="Courier New" panose="02070309020205020404" pitchFamily="49" charset="0"/>
+                  <a:cs typeface="Courier New" panose="02070309020205020404" pitchFamily="49" charset="0"/>
+                </a:rPr>
+                <a:t> = </a:t>
+              </a:r>
+              <a:r>
+                <a:rPr lang="en-US" sz="1600" dirty="0" smtClean="0">
+                  <a:latin typeface="Courier New" panose="02070309020205020404" pitchFamily="49" charset="0"/>
+                  <a:cs typeface="Courier New" panose="02070309020205020404" pitchFamily="49" charset="0"/>
+                </a:rPr>
+                <a:t>m</a:t>
+              </a:r>
+            </a:p>
+            <a:p>
+              <a:r>
+                <a:rPr lang="en-US" sz="1600" dirty="0" smtClean="0">
+                  <a:latin typeface="Courier New" panose="02070309020205020404" pitchFamily="49" charset="0"/>
+                  <a:cs typeface="Courier New" panose="02070309020205020404" pitchFamily="49" charset="0"/>
+                </a:rPr>
+                <a:t>        </a:t>
+              </a:r>
+              <a:r>
+                <a:rPr lang="en-US" sz="1600" dirty="0" err="1" smtClean="0">
+                  <a:latin typeface="Courier New" panose="02070309020205020404" pitchFamily="49" charset="0"/>
+                  <a:cs typeface="Courier New" panose="02070309020205020404" pitchFamily="49" charset="0"/>
+                </a:rPr>
+                <a:t>self.x</a:t>
+              </a:r>
+              <a:r>
+                <a:rPr lang="en-US" sz="1600" dirty="0" smtClean="0">
+                  <a:latin typeface="Courier New" panose="02070309020205020404" pitchFamily="49" charset="0"/>
+                  <a:cs typeface="Courier New" panose="02070309020205020404" pitchFamily="49" charset="0"/>
+                </a:rPr>
+                <a:t> = x</a:t>
+              </a:r>
+            </a:p>
+            <a:p>
+              <a:r>
+                <a:rPr lang="en-US" sz="1600" dirty="0">
+                  <a:latin typeface="Courier New" panose="02070309020205020404" pitchFamily="49" charset="0"/>
+                  <a:cs typeface="Courier New" panose="02070309020205020404" pitchFamily="49" charset="0"/>
+                </a:rPr>
+                <a:t> </a:t>
+              </a:r>
+              <a:r>
+                <a:rPr lang="en-US" sz="1600" dirty="0" smtClean="0">
+                  <a:latin typeface="Courier New" panose="02070309020205020404" pitchFamily="49" charset="0"/>
+                  <a:cs typeface="Courier New" panose="02070309020205020404" pitchFamily="49" charset="0"/>
+                </a:rPr>
+                <a:t>       </a:t>
+              </a:r>
+              <a:r>
+                <a:rPr lang="en-US" sz="1600" dirty="0" err="1" smtClean="0">
+                  <a:latin typeface="Courier New" panose="02070309020205020404" pitchFamily="49" charset="0"/>
+                  <a:cs typeface="Courier New" panose="02070309020205020404" pitchFamily="49" charset="0"/>
+                </a:rPr>
+                <a:t>self.v</a:t>
+              </a:r>
+              <a:r>
+                <a:rPr lang="en-US" sz="1600" dirty="0">
+                  <a:latin typeface="Courier New" panose="02070309020205020404" pitchFamily="49" charset="0"/>
+                  <a:cs typeface="Courier New" panose="02070309020205020404" pitchFamily="49" charset="0"/>
+                </a:rPr>
+                <a:t> </a:t>
+              </a:r>
+              <a:r>
+                <a:rPr lang="en-US" sz="1600" dirty="0" smtClean="0">
+                  <a:latin typeface="Courier New" panose="02070309020205020404" pitchFamily="49" charset="0"/>
+                  <a:cs typeface="Courier New" panose="02070309020205020404" pitchFamily="49" charset="0"/>
+                </a:rPr>
+                <a:t>= v</a:t>
+              </a:r>
+            </a:p>
+          </p:txBody>
+        </p:sp>
+        <p:sp>
+          <p:nvSpPr>
+            <p:cNvPr id="7" name="TextBox 6"/>
+            <p:cNvSpPr txBox="1"/>
+            <p:nvPr/>
+          </p:nvSpPr>
+          <p:spPr>
+            <a:xfrm>
+              <a:off x="3040620" y="6084397"/>
+              <a:ext cx="1150380" cy="307777"/>
+            </a:xfrm>
+            <a:prstGeom prst="rect">
+              <a:avLst/>
+            </a:prstGeom>
+            <a:solidFill>
+              <a:schemeClr val="bg1"/>
+            </a:solidFill>
+            <a:ln>
+              <a:solidFill>
+                <a:schemeClr val="tx1"/>
+              </a:solidFill>
+            </a:ln>
+          </p:spPr>
+          <p:txBody>
+            <a:bodyPr wrap="none" rtlCol="0">
+              <a:spAutoFit/>
+            </a:bodyPr>
+            <a:lstStyle/>
+            <a:p>
+              <a:r>
+                <a:rPr lang="en-US" sz="1400" dirty="0" err="1" smtClean="0"/>
+                <a:t>primes_c.pyx</a:t>
+              </a:r>
+              <a:endParaRPr lang="nl-BE" sz="1400" dirty="0"/>
+            </a:p>
+          </p:txBody>
+        </p:sp>
+      </p:grpSp>
+    </p:spTree>
+    <p:extLst>
+      <p:ext uri="{BB962C8B-B14F-4D97-AF65-F5344CB8AC3E}">
+        <p14:creationId xmlns:p14="http://schemas.microsoft.com/office/powerpoint/2010/main" val="4091451039"/>
       </p:ext>
     </p:extLst>
   </p:cSld>

</xml_diff>

<commit_message>
Added slides on extension types
</commit_message>
<xml_diff>
--- a/Python/Cython/cython.pptx
+++ b/Python/Cython/cython.pptx
@@ -5,7 +5,7 @@
     <p:sldMasterId id="2147483648" r:id="rId1"/>
   </p:sldMasterIdLst>
   <p:notesMasterIdLst>
-    <p:notesMasterId r:id="rId23"/>
+    <p:notesMasterId r:id="rId25"/>
   </p:notesMasterIdLst>
   <p:sldIdLst>
     <p:sldId id="256" r:id="rId2"/>
@@ -18,17 +18,19 @@
     <p:sldId id="263" r:id="rId9"/>
     <p:sldId id="265" r:id="rId10"/>
     <p:sldId id="264" r:id="rId11"/>
-    <p:sldId id="276" r:id="rId12"/>
-    <p:sldId id="268" r:id="rId13"/>
-    <p:sldId id="267" r:id="rId14"/>
-    <p:sldId id="272" r:id="rId15"/>
-    <p:sldId id="269" r:id="rId16"/>
-    <p:sldId id="270" r:id="rId17"/>
-    <p:sldId id="271" r:id="rId18"/>
-    <p:sldId id="273" r:id="rId19"/>
-    <p:sldId id="274" r:id="rId20"/>
-    <p:sldId id="275" r:id="rId21"/>
-    <p:sldId id="277" r:id="rId22"/>
+    <p:sldId id="279" r:id="rId12"/>
+    <p:sldId id="276" r:id="rId13"/>
+    <p:sldId id="268" r:id="rId14"/>
+    <p:sldId id="267" r:id="rId15"/>
+    <p:sldId id="272" r:id="rId16"/>
+    <p:sldId id="269" r:id="rId17"/>
+    <p:sldId id="270" r:id="rId18"/>
+    <p:sldId id="271" r:id="rId19"/>
+    <p:sldId id="273" r:id="rId20"/>
+    <p:sldId id="274" r:id="rId21"/>
+    <p:sldId id="275" r:id="rId22"/>
+    <p:sldId id="277" r:id="rId23"/>
+    <p:sldId id="278" r:id="rId24"/>
   </p:sldIdLst>
   <p:sldSz cx="9144000" cy="6858000" type="screen4x3"/>
   <p:notesSz cx="6858000" cy="9144000"/>
@@ -146,6 +148,7 @@
             <p14:sldId id="263"/>
             <p14:sldId id="265"/>
             <p14:sldId id="264"/>
+            <p14:sldId id="279"/>
             <p14:sldId id="276"/>
             <p14:sldId id="268"/>
             <p14:sldId id="267"/>
@@ -157,12 +160,13 @@
             <p14:sldId id="274"/>
             <p14:sldId id="275"/>
             <p14:sldId id="277"/>
+            <p14:sldId id="278"/>
           </p14:sldIdLst>
         </p14:section>
       </p14:sectionLst>
     </p:ext>
     <p:ext uri="{EFAFB233-063F-42B5-8137-9DF3F51BA10A}">
-      <p15:sldGuideLst xmlns:p15="http://schemas.microsoft.com/office/powerpoint/2012/main" xmlns="">
+      <p15:sldGuideLst xmlns="" xmlns:p15="http://schemas.microsoft.com/office/powerpoint/2012/main">
         <p15:guide id="1" orient="horz" pos="2160">
           <p15:clr>
             <a:srgbClr val="A4A3A4"/>
@@ -261,7 +265,7 @@
           <a:p>
             <a:fld id="{16B045E4-7DA3-41B9-B0DA-4BEE0876FA88}" type="datetimeFigureOut">
               <a:rPr lang="nl-BE" smtClean="0"/>
-              <a:t>24/02/2016</a:t>
+              <a:t>25/02/2016</a:t>
             </a:fld>
             <a:endParaRPr lang="nl-BE"/>
           </a:p>
@@ -710,7 +714,7 @@
           <a:p>
             <a:fld id="{53B2420D-148A-400F-B88D-527DF6E13622}" type="datetime1">
               <a:rPr lang="en-US" smtClean="0"/>
-              <a:t>2016-02-24</a:t>
+              <a:t>2016-02-25</a:t>
             </a:fld>
             <a:endParaRPr lang="en-US"/>
           </a:p>
@@ -876,7 +880,7 @@
           <a:p>
             <a:fld id="{52A01B9A-6787-4B63-BAEF-E3CF67589D82}" type="datetime1">
               <a:rPr lang="en-US" smtClean="0"/>
-              <a:t>2016-02-24</a:t>
+              <a:t>2016-02-25</a:t>
             </a:fld>
             <a:endParaRPr lang="en-US"/>
           </a:p>
@@ -1052,7 +1056,7 @@
           <a:p>
             <a:fld id="{6E982D42-2071-4A3D-B614-2380183202E1}" type="datetime1">
               <a:rPr lang="en-US" smtClean="0"/>
-              <a:t>2016-02-24</a:t>
+              <a:t>2016-02-25</a:t>
             </a:fld>
             <a:endParaRPr lang="en-US"/>
           </a:p>
@@ -1218,7 +1222,7 @@
           <a:p>
             <a:fld id="{2E90E067-04B9-40C0-BFE6-53BAD2F7119C}" type="datetime1">
               <a:rPr lang="en-US" smtClean="0"/>
-              <a:t>2016-02-24</a:t>
+              <a:t>2016-02-25</a:t>
             </a:fld>
             <a:endParaRPr lang="en-US"/>
           </a:p>
@@ -1460,7 +1464,7 @@
           <a:p>
             <a:fld id="{D7CB2E72-949E-4479-B957-DBA32EC1FAB9}" type="datetime1">
               <a:rPr lang="en-US" smtClean="0"/>
-              <a:t>2016-02-24</a:t>
+              <a:t>2016-02-25</a:t>
             </a:fld>
             <a:endParaRPr lang="en-US"/>
           </a:p>
@@ -1744,7 +1748,7 @@
           <a:p>
             <a:fld id="{A06819D6-C5C8-405A-96EE-DAC9728267C0}" type="datetime1">
               <a:rPr lang="en-US" smtClean="0"/>
-              <a:t>2016-02-24</a:t>
+              <a:t>2016-02-25</a:t>
             </a:fld>
             <a:endParaRPr lang="en-US"/>
           </a:p>
@@ -2162,7 +2166,7 @@
           <a:p>
             <a:fld id="{476A766D-F1AD-47B2-B323-71C0AAEFC468}" type="datetime1">
               <a:rPr lang="en-US" smtClean="0"/>
-              <a:t>2016-02-24</a:t>
+              <a:t>2016-02-25</a:t>
             </a:fld>
             <a:endParaRPr lang="en-US"/>
           </a:p>
@@ -2276,7 +2280,7 @@
           <a:p>
             <a:fld id="{E8021487-0835-4E27-A96A-FE7FCF3265BD}" type="datetime1">
               <a:rPr lang="en-US" smtClean="0"/>
-              <a:t>2016-02-24</a:t>
+              <a:t>2016-02-25</a:t>
             </a:fld>
             <a:endParaRPr lang="en-US"/>
           </a:p>
@@ -2367,7 +2371,7 @@
           <a:p>
             <a:fld id="{D8423321-723F-439B-A2FC-3D1497BCF824}" type="datetime1">
               <a:rPr lang="en-US" smtClean="0"/>
-              <a:t>2016-02-24</a:t>
+              <a:t>2016-02-25</a:t>
             </a:fld>
             <a:endParaRPr lang="en-US"/>
           </a:p>
@@ -2640,7 +2644,7 @@
           <a:p>
             <a:fld id="{C23318F9-3CB8-42B9-8393-7570C1C1A70D}" type="datetime1">
               <a:rPr lang="en-US" smtClean="0"/>
-              <a:t>2016-02-24</a:t>
+              <a:t>2016-02-25</a:t>
             </a:fld>
             <a:endParaRPr lang="en-US"/>
           </a:p>
@@ -2889,7 +2893,7 @@
           <a:p>
             <a:fld id="{6867E127-D066-4A1C-B918-F70FF61E725D}" type="datetime1">
               <a:rPr lang="en-US" smtClean="0"/>
-              <a:t>2016-02-24</a:t>
+              <a:t>2016-02-25</a:t>
             </a:fld>
             <a:endParaRPr lang="en-US"/>
           </a:p>
@@ -3098,7 +3102,7 @@
           <a:p>
             <a:fld id="{E6FF7314-6885-4B6E-804E-F9FE9C155D78}" type="datetime1">
               <a:rPr lang="en-US" smtClean="0"/>
-              <a:t>2016-02-24</a:t>
+              <a:t>2016-02-25</a:t>
             </a:fld>
             <a:endParaRPr lang="en-US"/>
           </a:p>
@@ -4265,12 +4269,8 @@
           <a:lstStyle/>
           <a:p>
             <a:r>
-              <a:rPr lang="en-US" dirty="0"/>
-              <a:t>S</a:t>
-            </a:r>
-            <a:r>
               <a:rPr lang="en-US" dirty="0" smtClean="0"/>
-              <a:t>tructures</a:t>
+              <a:t>Type casts</a:t>
             </a:r>
             <a:endParaRPr lang="nl-BE" dirty="0"/>
           </a:p>
@@ -4291,65 +4291,7 @@
           <a:bodyPr/>
           <a:lstStyle/>
           <a:p>
-            <a:r>
-              <a:rPr lang="en-US" dirty="0" smtClean="0"/>
-              <a:t>Define </a:t>
-            </a:r>
-            <a:r>
-              <a:rPr lang="en-US" dirty="0" err="1" smtClean="0"/>
-              <a:t>struct</a:t>
-            </a:r>
-            <a:r>
-              <a:rPr lang="en-US" dirty="0" smtClean="0"/>
-              <a:t> type in </a:t>
-            </a:r>
-            <a:r>
-              <a:rPr lang="en-US" dirty="0" err="1" smtClean="0">
-                <a:latin typeface="Courier New" panose="02070309020205020404" pitchFamily="49" charset="0"/>
-                <a:cs typeface="Courier New" panose="02070309020205020404" pitchFamily="49" charset="0"/>
-              </a:rPr>
-              <a:t>particle.pyx</a:t>
-            </a:r>
-            <a:endParaRPr lang="en-US" dirty="0" smtClean="0">
-              <a:latin typeface="Courier New" panose="02070309020205020404" pitchFamily="49" charset="0"/>
-              <a:cs typeface="Courier New" panose="02070309020205020404" pitchFamily="49" charset="0"/>
-            </a:endParaRPr>
-          </a:p>
-          <a:p>
-            <a:endParaRPr lang="en-US" dirty="0"/>
-          </a:p>
-          <a:p>
-            <a:pPr marL="0" indent="0">
-              <a:buNone/>
-            </a:pPr>
-            <a:endParaRPr lang="en-US" dirty="0"/>
-          </a:p>
-          <a:p>
-            <a:r>
-              <a:rPr lang="en-US" dirty="0" smtClean="0"/>
-              <a:t>Declare and use variables in </a:t>
-            </a:r>
-            <a:r>
-              <a:rPr lang="en-US" dirty="0" err="1" smtClean="0">
-                <a:latin typeface="Courier New" panose="02070309020205020404" pitchFamily="49" charset="0"/>
-                <a:cs typeface="Courier New" panose="02070309020205020404" pitchFamily="49" charset="0"/>
-              </a:rPr>
-              <a:t>particle.pyx</a:t>
-            </a:r>
-            <a:endParaRPr lang="en-US" dirty="0" smtClean="0">
-              <a:latin typeface="Courier New" panose="02070309020205020404" pitchFamily="49" charset="0"/>
-              <a:cs typeface="Courier New" panose="02070309020205020404" pitchFamily="49" charset="0"/>
-            </a:endParaRPr>
-          </a:p>
-          <a:p>
-            <a:endParaRPr lang="en-US" dirty="0"/>
-          </a:p>
-          <a:p>
-            <a:r>
-              <a:rPr lang="en-US" dirty="0" smtClean="0"/>
-              <a:t>Use variables in Python</a:t>
-            </a:r>
-            <a:endParaRPr lang="nl-BE" dirty="0"/>
+            <a:endParaRPr lang="nl-BE"/>
           </a:p>
         </p:txBody>
       </p:sp>
@@ -4372,6 +4314,171 @@
               <a:rPr lang="en-US" smtClean="0"/>
               <a:pPr/>
               <a:t>11</a:t>
+            </a:fld>
+            <a:endParaRPr lang="en-US"/>
+          </a:p>
+        </p:txBody>
+      </p:sp>
+    </p:spTree>
+    <p:extLst>
+      <p:ext uri="{BB962C8B-B14F-4D97-AF65-F5344CB8AC3E}">
+        <p14:creationId xmlns:p14="http://schemas.microsoft.com/office/powerpoint/2010/main" val="2482063900"/>
+      </p:ext>
+    </p:extLst>
+  </p:cSld>
+  <p:clrMapOvr>
+    <a:masterClrMapping/>
+  </p:clrMapOvr>
+  <p:timing>
+    <p:tnLst>
+      <p:par>
+        <p:cTn id="1" dur="indefinite" restart="never" nodeType="tmRoot"/>
+      </p:par>
+    </p:tnLst>
+  </p:timing>
+</p:sld>
+</file>
+
+<file path=ppt/slides/slide12.xml><?xml version="1.0" encoding="utf-8"?>
+<p:sld xmlns:a="http://schemas.openxmlformats.org/drawingml/2006/main" xmlns:r="http://schemas.openxmlformats.org/officeDocument/2006/relationships" xmlns:p="http://schemas.openxmlformats.org/presentationml/2006/main">
+  <p:cSld>
+    <p:spTree>
+      <p:nvGrpSpPr>
+        <p:cNvPr id="1" name=""/>
+        <p:cNvGrpSpPr/>
+        <p:nvPr/>
+      </p:nvGrpSpPr>
+      <p:grpSpPr>
+        <a:xfrm>
+          <a:off x="0" y="0"/>
+          <a:ext cx="0" cy="0"/>
+          <a:chOff x="0" y="0"/>
+          <a:chExt cx="0" cy="0"/>
+        </a:xfrm>
+      </p:grpSpPr>
+      <p:sp>
+        <p:nvSpPr>
+          <p:cNvPr id="2" name="Title 1"/>
+          <p:cNvSpPr>
+            <a:spLocks noGrp="1"/>
+          </p:cNvSpPr>
+          <p:nvPr>
+            <p:ph type="title"/>
+          </p:nvPr>
+        </p:nvSpPr>
+        <p:spPr/>
+        <p:txBody>
+          <a:bodyPr/>
+          <a:lstStyle/>
+          <a:p>
+            <a:r>
+              <a:rPr lang="en-US" dirty="0"/>
+              <a:t>S</a:t>
+            </a:r>
+            <a:r>
+              <a:rPr lang="en-US" dirty="0" smtClean="0"/>
+              <a:t>tructures</a:t>
+            </a:r>
+            <a:endParaRPr lang="nl-BE" dirty="0"/>
+          </a:p>
+        </p:txBody>
+      </p:sp>
+      <p:sp>
+        <p:nvSpPr>
+          <p:cNvPr id="3" name="Content Placeholder 2"/>
+          <p:cNvSpPr>
+            <a:spLocks noGrp="1"/>
+          </p:cNvSpPr>
+          <p:nvPr>
+            <p:ph idx="1"/>
+          </p:nvPr>
+        </p:nvSpPr>
+        <p:spPr/>
+        <p:txBody>
+          <a:bodyPr/>
+          <a:lstStyle/>
+          <a:p>
+            <a:r>
+              <a:rPr lang="en-US" dirty="0" smtClean="0"/>
+              <a:t>Define </a:t>
+            </a:r>
+            <a:r>
+              <a:rPr lang="en-US" dirty="0" err="1" smtClean="0"/>
+              <a:t>struct</a:t>
+            </a:r>
+            <a:r>
+              <a:rPr lang="en-US" dirty="0" smtClean="0"/>
+              <a:t> type in </a:t>
+            </a:r>
+            <a:r>
+              <a:rPr lang="en-US" dirty="0" err="1" smtClean="0">
+                <a:latin typeface="Courier New" panose="02070309020205020404" pitchFamily="49" charset="0"/>
+                <a:cs typeface="Courier New" panose="02070309020205020404" pitchFamily="49" charset="0"/>
+              </a:rPr>
+              <a:t>particle.pyx</a:t>
+            </a:r>
+            <a:endParaRPr lang="en-US" dirty="0" smtClean="0">
+              <a:latin typeface="Courier New" panose="02070309020205020404" pitchFamily="49" charset="0"/>
+              <a:cs typeface="Courier New" panose="02070309020205020404" pitchFamily="49" charset="0"/>
+            </a:endParaRPr>
+          </a:p>
+          <a:p>
+            <a:endParaRPr lang="en-US" dirty="0"/>
+          </a:p>
+          <a:p>
+            <a:pPr marL="0" indent="0">
+              <a:buNone/>
+            </a:pPr>
+            <a:endParaRPr lang="en-US" dirty="0"/>
+          </a:p>
+          <a:p>
+            <a:r>
+              <a:rPr lang="en-US" dirty="0" smtClean="0"/>
+              <a:t>Declare and use variables in </a:t>
+            </a:r>
+            <a:r>
+              <a:rPr lang="en-US" dirty="0" err="1" smtClean="0">
+                <a:latin typeface="Courier New" panose="02070309020205020404" pitchFamily="49" charset="0"/>
+                <a:cs typeface="Courier New" panose="02070309020205020404" pitchFamily="49" charset="0"/>
+              </a:rPr>
+              <a:t>particle.pyx</a:t>
+            </a:r>
+            <a:endParaRPr lang="en-US" dirty="0" smtClean="0">
+              <a:latin typeface="Courier New" panose="02070309020205020404" pitchFamily="49" charset="0"/>
+              <a:cs typeface="Courier New" panose="02070309020205020404" pitchFamily="49" charset="0"/>
+            </a:endParaRPr>
+          </a:p>
+          <a:p>
+            <a:endParaRPr lang="en-US" dirty="0"/>
+          </a:p>
+          <a:p>
+            <a:r>
+              <a:rPr lang="en-US" dirty="0" smtClean="0"/>
+              <a:t>Use variables in Python</a:t>
+            </a:r>
+            <a:endParaRPr lang="nl-BE" dirty="0"/>
+          </a:p>
+        </p:txBody>
+      </p:sp>
+      <p:sp>
+        <p:nvSpPr>
+          <p:cNvPr id="4" name="Slide Number Placeholder 3"/>
+          <p:cNvSpPr>
+            <a:spLocks noGrp="1"/>
+          </p:cNvSpPr>
+          <p:nvPr>
+            <p:ph type="sldNum" sz="quarter" idx="12"/>
+          </p:nvPr>
+        </p:nvSpPr>
+        <p:spPr/>
+        <p:txBody>
+          <a:bodyPr/>
+          <a:lstStyle/>
+          <a:p>
+            <a:fld id="{B6F15528-21DE-4FAA-801E-634DDDAF4B2B}" type="slidenum">
+              <a:rPr lang="en-US" smtClean="0"/>
+              <a:pPr/>
+              <a:t>12</a:t>
             </a:fld>
             <a:endParaRPr lang="en-US"/>
           </a:p>
@@ -4434,21 +4541,7 @@
                 <a:latin typeface="Courier New" panose="02070309020205020404" pitchFamily="49" charset="0"/>
                 <a:cs typeface="Courier New" panose="02070309020205020404" pitchFamily="49" charset="0"/>
               </a:rPr>
-              <a:t> </a:t>
-            </a:r>
-            <a:r>
-              <a:rPr lang="en-US" dirty="0" smtClean="0">
-                <a:latin typeface="Courier New" panose="02070309020205020404" pitchFamily="49" charset="0"/>
-                <a:cs typeface="Courier New" panose="02070309020205020404" pitchFamily="49" charset="0"/>
-              </a:rPr>
-              <a:t>Particle:</a:t>
-            </a:r>
-            <a:r>
-              <a:rPr lang="en-US" dirty="0" smtClean="0">
-                <a:latin typeface="Courier New" panose="02070309020205020404" pitchFamily="49" charset="0"/>
-                <a:cs typeface="Courier New" panose="02070309020205020404" pitchFamily="49" charset="0"/>
-              </a:rPr>
-              <a:t/>
+              <a:t> Particle:</a:t>
             </a:r>
             <a:br>
               <a:rPr lang="en-US" dirty="0" smtClean="0">
@@ -4506,10 +4599,6 @@
               </a:rPr>
               <a:t> charge</a:t>
             </a:r>
-            <a:endParaRPr lang="en-US" dirty="0" smtClean="0">
-              <a:latin typeface="Courier New" panose="02070309020205020404" pitchFamily="49" charset="0"/>
-              <a:cs typeface="Courier New" panose="02070309020205020404" pitchFamily="49" charset="0"/>
-            </a:endParaRPr>
           </a:p>
         </p:txBody>
       </p:sp>
@@ -4659,21 +4748,7 @@
                 <a:latin typeface="Courier New" panose="02070309020205020404" pitchFamily="49" charset="0"/>
                 <a:cs typeface="Courier New" panose="02070309020205020404" pitchFamily="49" charset="0"/>
               </a:rPr>
-              <a:t>radius(Parti</a:t>
-            </a:r>
-            <a:r>
-              <a:rPr lang="en-US" dirty="0" smtClean="0">
-                <a:latin typeface="Courier New" panose="02070309020205020404" pitchFamily="49" charset="0"/>
-                <a:cs typeface="Courier New" panose="02070309020205020404" pitchFamily="49" charset="0"/>
-              </a:rPr>
-              <a:t>cle</a:t>
-            </a:r>
-            <a:r>
-              <a:rPr lang="en-US" dirty="0" smtClean="0">
-                <a:latin typeface="Courier New" panose="02070309020205020404" pitchFamily="49" charset="0"/>
-                <a:cs typeface="Courier New" panose="02070309020205020404" pitchFamily="49" charset="0"/>
-              </a:rPr>
-              <a:t> p):</a:t>
+              <a:t>radius(Particle p):</a:t>
             </a:r>
             <a:endParaRPr lang="en-US" dirty="0">
               <a:latin typeface="Courier New" panose="02070309020205020404" pitchFamily="49" charset="0"/>
@@ -5022,19 +5097,17 @@
                 <a:latin typeface="Courier New" panose="02070309020205020404" pitchFamily="49" charset="0"/>
                 <a:cs typeface="Courier New" panose="02070309020205020404" pitchFamily="49" charset="0"/>
               </a:rPr>
-              <a:t>mport </a:t>
-            </a:r>
+              <a:t>mport particle</a:t>
+            </a:r>
+          </a:p>
+          <a:p>
             <a:r>
               <a:rPr lang="en-US" dirty="0" smtClean="0">
                 <a:latin typeface="Courier New" panose="02070309020205020404" pitchFamily="49" charset="0"/>
                 <a:cs typeface="Courier New" panose="02070309020205020404" pitchFamily="49" charset="0"/>
               </a:rPr>
-              <a:t>particle</a:t>
-            </a:r>
-            <a:endParaRPr lang="en-US" dirty="0" smtClean="0">
-              <a:latin typeface="Courier New" panose="02070309020205020404" pitchFamily="49" charset="0"/>
-              <a:cs typeface="Courier New" panose="02070309020205020404" pitchFamily="49" charset="0"/>
-            </a:endParaRPr>
+              <a:t>p = {'x': 1.0, 'y': -2.3, 'charge': 1}</a:t>
+            </a:r>
           </a:p>
           <a:p>
             <a:r>
@@ -5042,51 +5115,21 @@
                 <a:latin typeface="Courier New" panose="02070309020205020404" pitchFamily="49" charset="0"/>
                 <a:cs typeface="Courier New" panose="02070309020205020404" pitchFamily="49" charset="0"/>
               </a:rPr>
-              <a:t>p = {'x': 1.0, 'y': -2.3, </a:t>
+              <a:t>print(</a:t>
+            </a:r>
+            <a:r>
+              <a:rPr lang="en-US" dirty="0" err="1" smtClean="0">
+                <a:latin typeface="Courier New" panose="02070309020205020404" pitchFamily="49" charset="0"/>
+                <a:cs typeface="Courier New" panose="02070309020205020404" pitchFamily="49" charset="0"/>
+              </a:rPr>
+              <a:t>particle.radius</a:t>
             </a:r>
             <a:r>
               <a:rPr lang="en-US" dirty="0" smtClean="0">
                 <a:latin typeface="Courier New" panose="02070309020205020404" pitchFamily="49" charset="0"/>
                 <a:cs typeface="Courier New" panose="02070309020205020404" pitchFamily="49" charset="0"/>
               </a:rPr>
-              <a:t>'charge': </a:t>
-            </a:r>
-            <a:r>
-              <a:rPr lang="en-US" dirty="0" smtClean="0">
-                <a:latin typeface="Courier New" panose="02070309020205020404" pitchFamily="49" charset="0"/>
-                <a:cs typeface="Courier New" panose="02070309020205020404" pitchFamily="49" charset="0"/>
-              </a:rPr>
-              <a:t>1}</a:t>
-            </a:r>
-          </a:p>
-          <a:p>
-            <a:r>
-              <a:rPr lang="en-US" dirty="0" smtClean="0">
-                <a:latin typeface="Courier New" panose="02070309020205020404" pitchFamily="49" charset="0"/>
-                <a:cs typeface="Courier New" panose="02070309020205020404" pitchFamily="49" charset="0"/>
-              </a:rPr>
-              <a:t>print(</a:t>
-            </a:r>
-            <a:r>
-              <a:rPr lang="en-US" dirty="0" err="1" smtClean="0">
-                <a:latin typeface="Courier New" panose="02070309020205020404" pitchFamily="49" charset="0"/>
-                <a:cs typeface="Courier New" panose="02070309020205020404" pitchFamily="49" charset="0"/>
-              </a:rPr>
-              <a:t>particle.radius</a:t>
-            </a:r>
-            <a:r>
-              <a:rPr lang="en-US" dirty="0" smtClean="0">
-                <a:latin typeface="Courier New" panose="02070309020205020404" pitchFamily="49" charset="0"/>
-                <a:cs typeface="Courier New" panose="02070309020205020404" pitchFamily="49" charset="0"/>
-              </a:rPr>
-              <a:t>(p</a:t>
-            </a:r>
-            <a:r>
-              <a:rPr lang="en-US" dirty="0" smtClean="0">
-                <a:latin typeface="Courier New" panose="02070309020205020404" pitchFamily="49" charset="0"/>
-                <a:cs typeface="Courier New" panose="02070309020205020404" pitchFamily="49" charset="0"/>
-              </a:rPr>
-              <a:t>))</a:t>
+              <a:t>(p))</a:t>
             </a:r>
           </a:p>
         </p:txBody>
@@ -5506,7 +5549,7 @@
 </p:sld>
 </file>
 
-<file path=ppt/slides/slide12.xml><?xml version="1.0" encoding="utf-8"?>
+<file path=ppt/slides/slide13.xml><?xml version="1.0" encoding="utf-8"?>
 <p:sld xmlns:a="http://schemas.openxmlformats.org/drawingml/2006/main" xmlns:r="http://schemas.openxmlformats.org/officeDocument/2006/relationships" xmlns:p="http://schemas.openxmlformats.org/presentationml/2006/main">
   <p:cSld>
     <p:spTree>
@@ -5651,7 +5694,7 @@
             <a:fld id="{B6F15528-21DE-4FAA-801E-634DDDAF4B2B}" type="slidenum">
               <a:rPr lang="en-US" smtClean="0"/>
               <a:pPr/>
-              <a:t>12</a:t>
+              <a:t>13</a:t>
             </a:fld>
             <a:endParaRPr lang="en-US"/>
           </a:p>
@@ -6315,7 +6358,7 @@
 </p:sld>
 </file>
 
-<file path=ppt/slides/slide13.xml><?xml version="1.0" encoding="utf-8"?>
+<file path=ppt/slides/slide14.xml><?xml version="1.0" encoding="utf-8"?>
 <p:sld xmlns:a="http://schemas.openxmlformats.org/drawingml/2006/main" xmlns:r="http://schemas.openxmlformats.org/officeDocument/2006/relationships" xmlns:p="http://schemas.openxmlformats.org/presentationml/2006/main">
   <p:cSld>
     <p:spTree>
@@ -6408,7 +6451,7 @@
             <a:fld id="{B6F15528-21DE-4FAA-801E-634DDDAF4B2B}" type="slidenum">
               <a:rPr lang="en-US" smtClean="0"/>
               <a:pPr/>
-              <a:t>13</a:t>
+              <a:t>14</a:t>
             </a:fld>
             <a:endParaRPr lang="en-US"/>
           </a:p>
@@ -7077,7 +7120,7 @@
 </p:sld>
 </file>
 
-<file path=ppt/slides/slide14.xml><?xml version="1.0" encoding="utf-8"?>
+<file path=ppt/slides/slide15.xml><?xml version="1.0" encoding="utf-8"?>
 <p:sld xmlns:a="http://schemas.openxmlformats.org/drawingml/2006/main" xmlns:r="http://schemas.openxmlformats.org/officeDocument/2006/relationships" xmlns:p="http://schemas.openxmlformats.org/presentationml/2006/main">
   <p:cSld>
     <p:spTree>
@@ -7195,61 +7238,61 @@
                 <a:latin typeface="Courier New" panose="02070309020205020404" pitchFamily="49" charset="0"/>
                 <a:cs typeface="Courier New" panose="02070309020205020404" pitchFamily="49" charset="0"/>
               </a:rPr>
-              <a:t> == 'd</a:t>
-            </a:r>
+              <a:t> == 'd'</a:t>
+            </a:r>
+          </a:p>
+          <a:p>
             <a:r>
               <a:rPr lang="en-US" dirty="0" smtClean="0">
-                <a:latin typeface="Courier New" panose="02070309020205020404" pitchFamily="49" charset="0"/>
-                <a:cs typeface="Courier New" panose="02070309020205020404" pitchFamily="49" charset="0"/>
-              </a:rPr>
-              <a:t>'</a:t>
-            </a:r>
-          </a:p>
-          <a:p>
+                <a:cs typeface="Courier New" panose="02070309020205020404" pitchFamily="49" charset="0"/>
+              </a:rPr>
+              <a:t>Data size: </a:t>
+            </a:r>
+            <a:r>
+              <a:rPr lang="en-US" dirty="0" err="1" smtClean="0">
+                <a:latin typeface="Courier New" panose="02070309020205020404" pitchFamily="49" charset="0"/>
+                <a:cs typeface="Courier New" panose="02070309020205020404" pitchFamily="49" charset="0"/>
+              </a:rPr>
+              <a:t>mv.itemsize</a:t>
+            </a:r>
             <a:r>
               <a:rPr lang="en-US" dirty="0" smtClean="0">
-                <a:cs typeface="Courier New" panose="02070309020205020404" pitchFamily="49" charset="0"/>
-              </a:rPr>
-              <a:t>Data size: </a:t>
+                <a:latin typeface="Courier New" panose="02070309020205020404" pitchFamily="49" charset="0"/>
+                <a:cs typeface="Courier New" panose="02070309020205020404" pitchFamily="49" charset="0"/>
+              </a:rPr>
+              <a:t> == 8</a:t>
+            </a:r>
+          </a:p>
+          <a:p>
+            <a:r>
+              <a:rPr lang="en-US" dirty="0" smtClean="0"/>
+              <a:t>Size: </a:t>
             </a:r>
             <a:r>
               <a:rPr lang="en-US" dirty="0" err="1" smtClean="0">
                 <a:latin typeface="Courier New" panose="02070309020205020404" pitchFamily="49" charset="0"/>
                 <a:cs typeface="Courier New" panose="02070309020205020404" pitchFamily="49" charset="0"/>
               </a:rPr>
-              <a:t>mv.itemsize</a:t>
+              <a:t>mv.nbytes</a:t>
             </a:r>
             <a:r>
               <a:rPr lang="en-US" dirty="0" smtClean="0">
                 <a:latin typeface="Courier New" panose="02070309020205020404" pitchFamily="49" charset="0"/>
                 <a:cs typeface="Courier New" panose="02070309020205020404" pitchFamily="49" charset="0"/>
               </a:rPr>
-              <a:t> == 8</a:t>
+              <a:t> == </a:t>
+            </a:r>
+            <a:r>
+              <a:rPr lang="en-US" dirty="0" smtClean="0">
+                <a:latin typeface="Courier New" panose="02070309020205020404" pitchFamily="49" charset="0"/>
+                <a:cs typeface="Courier New" panose="02070309020205020404" pitchFamily="49" charset="0"/>
+              </a:rPr>
+              <a:t>4*7*8</a:t>
             </a:r>
             <a:endParaRPr lang="en-US" dirty="0" smtClean="0">
               <a:latin typeface="Courier New" panose="02070309020205020404" pitchFamily="49" charset="0"/>
               <a:cs typeface="Courier New" panose="02070309020205020404" pitchFamily="49" charset="0"/>
             </a:endParaRPr>
-          </a:p>
-          <a:p>
-            <a:r>
-              <a:rPr lang="en-US" dirty="0" smtClean="0"/>
-              <a:t>Size: </a:t>
-            </a:r>
-            <a:r>
-              <a:rPr lang="en-US" dirty="0" err="1" smtClean="0">
-                <a:latin typeface="Courier New" panose="02070309020205020404" pitchFamily="49" charset="0"/>
-                <a:cs typeface="Courier New" panose="02070309020205020404" pitchFamily="49" charset="0"/>
-              </a:rPr>
-              <a:t>mv.nbytes</a:t>
-            </a:r>
-            <a:r>
-              <a:rPr lang="en-US" dirty="0" smtClean="0">
-                <a:latin typeface="Courier New" panose="02070309020205020404" pitchFamily="49" charset="0"/>
-                <a:cs typeface="Courier New" panose="02070309020205020404" pitchFamily="49" charset="0"/>
-              </a:rPr>
-              <a:t> == 7*4*8</a:t>
-            </a:r>
           </a:p>
           <a:p>
             <a:r>
@@ -7317,7 +7360,7 @@
             <a:fld id="{B6F15528-21DE-4FAA-801E-634DDDAF4B2B}" type="slidenum">
               <a:rPr lang="en-US" smtClean="0"/>
               <a:pPr/>
-              <a:t>14</a:t>
+              <a:t>15</a:t>
             </a:fld>
             <a:endParaRPr lang="en-US"/>
           </a:p>
@@ -7852,109 +7895,6 @@
 </p:sld>
 </file>
 
-<file path=ppt/slides/slide15.xml><?xml version="1.0" encoding="utf-8"?>
-<p:sld xmlns:a="http://schemas.openxmlformats.org/drawingml/2006/main" xmlns:r="http://schemas.openxmlformats.org/officeDocument/2006/relationships" xmlns:p="http://schemas.openxmlformats.org/presentationml/2006/main">
-  <p:cSld>
-    <p:spTree>
-      <p:nvGrpSpPr>
-        <p:cNvPr id="1" name=""/>
-        <p:cNvGrpSpPr/>
-        <p:nvPr/>
-      </p:nvGrpSpPr>
-      <p:grpSpPr>
-        <a:xfrm>
-          <a:off x="0" y="0"/>
-          <a:ext cx="0" cy="0"/>
-          <a:chOff x="0" y="0"/>
-          <a:chExt cx="0" cy="0"/>
-        </a:xfrm>
-      </p:grpSpPr>
-      <p:sp>
-        <p:nvSpPr>
-          <p:cNvPr id="2" name="Title 1"/>
-          <p:cNvSpPr>
-            <a:spLocks noGrp="1"/>
-          </p:cNvSpPr>
-          <p:nvPr>
-            <p:ph type="title"/>
-          </p:nvPr>
-        </p:nvSpPr>
-        <p:spPr/>
-        <p:txBody>
-          <a:bodyPr/>
-          <a:lstStyle/>
-          <a:p>
-            <a:r>
-              <a:rPr lang="en-US" dirty="0" smtClean="0"/>
-              <a:t>Functions</a:t>
-            </a:r>
-            <a:endParaRPr lang="nl-BE" dirty="0"/>
-          </a:p>
-        </p:txBody>
-      </p:sp>
-      <p:sp>
-        <p:nvSpPr>
-          <p:cNvPr id="3" name="Text Placeholder 2"/>
-          <p:cNvSpPr>
-            <a:spLocks noGrp="1"/>
-          </p:cNvSpPr>
-          <p:nvPr>
-            <p:ph type="body" idx="1"/>
-          </p:nvPr>
-        </p:nvSpPr>
-        <p:spPr/>
-        <p:txBody>
-          <a:bodyPr/>
-          <a:lstStyle/>
-          <a:p>
-            <a:endParaRPr lang="nl-BE"/>
-          </a:p>
-        </p:txBody>
-      </p:sp>
-      <p:sp>
-        <p:nvSpPr>
-          <p:cNvPr id="4" name="Slide Number Placeholder 3"/>
-          <p:cNvSpPr>
-            <a:spLocks noGrp="1"/>
-          </p:cNvSpPr>
-          <p:nvPr>
-            <p:ph type="sldNum" sz="quarter" idx="12"/>
-          </p:nvPr>
-        </p:nvSpPr>
-        <p:spPr/>
-        <p:txBody>
-          <a:bodyPr/>
-          <a:lstStyle/>
-          <a:p>
-            <a:fld id="{B6F15528-21DE-4FAA-801E-634DDDAF4B2B}" type="slidenum">
-              <a:rPr lang="en-US" smtClean="0"/>
-              <a:pPr/>
-              <a:t>15</a:t>
-            </a:fld>
-            <a:endParaRPr lang="en-US"/>
-          </a:p>
-        </p:txBody>
-      </p:sp>
-    </p:spTree>
-    <p:extLst>
-      <p:ext uri="{BB962C8B-B14F-4D97-AF65-F5344CB8AC3E}">
-        <p14:creationId xmlns:p14="http://schemas.microsoft.com/office/powerpoint/2010/main" val="2592723755"/>
-      </p:ext>
-    </p:extLst>
-  </p:cSld>
-  <p:clrMapOvr>
-    <a:masterClrMapping/>
-  </p:clrMapOvr>
-  <p:timing>
-    <p:tnLst>
-      <p:par>
-        <p:cTn id="1" dur="indefinite" restart="never" nodeType="tmRoot"/>
-      </p:par>
-    </p:tnLst>
-  </p:timing>
-</p:sld>
-</file>
-
 <file path=ppt/slides/slide16.xml><?xml version="1.0" encoding="utf-8"?>
 <p:sld xmlns:a="http://schemas.openxmlformats.org/drawingml/2006/main" xmlns:r="http://schemas.openxmlformats.org/officeDocument/2006/relationships" xmlns:p="http://schemas.openxmlformats.org/presentationml/2006/main">
   <p:cSld>
@@ -7989,6 +7929,109 @@
           <a:p>
             <a:r>
               <a:rPr lang="en-US" dirty="0" smtClean="0"/>
+              <a:t>Functions</a:t>
+            </a:r>
+            <a:endParaRPr lang="nl-BE" dirty="0"/>
+          </a:p>
+        </p:txBody>
+      </p:sp>
+      <p:sp>
+        <p:nvSpPr>
+          <p:cNvPr id="3" name="Text Placeholder 2"/>
+          <p:cNvSpPr>
+            <a:spLocks noGrp="1"/>
+          </p:cNvSpPr>
+          <p:nvPr>
+            <p:ph type="body" idx="1"/>
+          </p:nvPr>
+        </p:nvSpPr>
+        <p:spPr/>
+        <p:txBody>
+          <a:bodyPr/>
+          <a:lstStyle/>
+          <a:p>
+            <a:endParaRPr lang="nl-BE"/>
+          </a:p>
+        </p:txBody>
+      </p:sp>
+      <p:sp>
+        <p:nvSpPr>
+          <p:cNvPr id="4" name="Slide Number Placeholder 3"/>
+          <p:cNvSpPr>
+            <a:spLocks noGrp="1"/>
+          </p:cNvSpPr>
+          <p:nvPr>
+            <p:ph type="sldNum" sz="quarter" idx="12"/>
+          </p:nvPr>
+        </p:nvSpPr>
+        <p:spPr/>
+        <p:txBody>
+          <a:bodyPr/>
+          <a:lstStyle/>
+          <a:p>
+            <a:fld id="{B6F15528-21DE-4FAA-801E-634DDDAF4B2B}" type="slidenum">
+              <a:rPr lang="en-US" smtClean="0"/>
+              <a:pPr/>
+              <a:t>16</a:t>
+            </a:fld>
+            <a:endParaRPr lang="en-US"/>
+          </a:p>
+        </p:txBody>
+      </p:sp>
+    </p:spTree>
+    <p:extLst>
+      <p:ext uri="{BB962C8B-B14F-4D97-AF65-F5344CB8AC3E}">
+        <p14:creationId xmlns:p14="http://schemas.microsoft.com/office/powerpoint/2010/main" val="2592723755"/>
+      </p:ext>
+    </p:extLst>
+  </p:cSld>
+  <p:clrMapOvr>
+    <a:masterClrMapping/>
+  </p:clrMapOvr>
+  <p:timing>
+    <p:tnLst>
+      <p:par>
+        <p:cTn id="1" dur="indefinite" restart="never" nodeType="tmRoot"/>
+      </p:par>
+    </p:tnLst>
+  </p:timing>
+</p:sld>
+</file>
+
+<file path=ppt/slides/slide17.xml><?xml version="1.0" encoding="utf-8"?>
+<p:sld xmlns:a="http://schemas.openxmlformats.org/drawingml/2006/main" xmlns:r="http://schemas.openxmlformats.org/officeDocument/2006/relationships" xmlns:p="http://schemas.openxmlformats.org/presentationml/2006/main">
+  <p:cSld>
+    <p:spTree>
+      <p:nvGrpSpPr>
+        <p:cNvPr id="1" name=""/>
+        <p:cNvGrpSpPr/>
+        <p:nvPr/>
+      </p:nvGrpSpPr>
+      <p:grpSpPr>
+        <a:xfrm>
+          <a:off x="0" y="0"/>
+          <a:ext cx="0" cy="0"/>
+          <a:chOff x="0" y="0"/>
+          <a:chExt cx="0" cy="0"/>
+        </a:xfrm>
+      </p:grpSpPr>
+      <p:sp>
+        <p:nvSpPr>
+          <p:cNvPr id="2" name="Title 1"/>
+          <p:cNvSpPr>
+            <a:spLocks noGrp="1"/>
+          </p:cNvSpPr>
+          <p:nvPr>
+            <p:ph type="title"/>
+          </p:nvPr>
+        </p:nvSpPr>
+        <p:spPr/>
+        <p:txBody>
+          <a:bodyPr/>
+          <a:lstStyle/>
+          <a:p>
+            <a:r>
+              <a:rPr lang="en-US" dirty="0" smtClean="0"/>
               <a:t>Three types of functions</a:t>
             </a:r>
             <a:endParaRPr lang="nl-BE" dirty="0"/>
@@ -8112,7 +8155,7 @@
             <a:fld id="{B6F15528-21DE-4FAA-801E-634DDDAF4B2B}" type="slidenum">
               <a:rPr lang="en-US" smtClean="0"/>
               <a:pPr/>
-              <a:t>16</a:t>
+              <a:t>17</a:t>
             </a:fld>
             <a:endParaRPr lang="en-US"/>
           </a:p>
@@ -8837,7 +8880,7 @@
 </p:sld>
 </file>
 
-<file path=ppt/slides/slide17.xml><?xml version="1.0" encoding="utf-8"?>
+<file path=ppt/slides/slide18.xml><?xml version="1.0" encoding="utf-8"?>
 <p:sld xmlns:a="http://schemas.openxmlformats.org/drawingml/2006/main" xmlns:r="http://schemas.openxmlformats.org/officeDocument/2006/relationships" xmlns:p="http://schemas.openxmlformats.org/presentationml/2006/main">
   <p:cSld>
     <p:spTree>
@@ -8963,7 +9006,7 @@
             <a:fld id="{B6F15528-21DE-4FAA-801E-634DDDAF4B2B}" type="slidenum">
               <a:rPr lang="en-US" smtClean="0"/>
               <a:pPr/>
-              <a:t>17</a:t>
+              <a:t>18</a:t>
             </a:fld>
             <a:endParaRPr lang="en-US"/>
           </a:p>
@@ -9830,7 +9873,7 @@
 </p:sld>
 </file>
 
-<file path=ppt/slides/slide18.xml><?xml version="1.0" encoding="utf-8"?>
+<file path=ppt/slides/slide19.xml><?xml version="1.0" encoding="utf-8"?>
 <p:sld xmlns:a="http://schemas.openxmlformats.org/drawingml/2006/main" xmlns:r="http://schemas.openxmlformats.org/officeDocument/2006/relationships" xmlns:p="http://schemas.openxmlformats.org/presentationml/2006/main">
   <p:cSld>
     <p:spTree>
@@ -9961,7 +10004,7 @@
             <a:fld id="{B6F15528-21DE-4FAA-801E-634DDDAF4B2B}" type="slidenum">
               <a:rPr lang="en-US" smtClean="0"/>
               <a:pPr/>
-              <a:t>18</a:t>
+              <a:t>19</a:t>
             </a:fld>
             <a:endParaRPr lang="en-US"/>
           </a:p>
@@ -10754,102 +10797,6 @@
 </p:sld>
 </file>
 
-<file path=ppt/slides/slide19.xml><?xml version="1.0" encoding="utf-8"?>
-<p:sld xmlns:a="http://schemas.openxmlformats.org/drawingml/2006/main" xmlns:r="http://schemas.openxmlformats.org/officeDocument/2006/relationships" xmlns:p="http://schemas.openxmlformats.org/presentationml/2006/main">
-  <p:cSld>
-    <p:spTree>
-      <p:nvGrpSpPr>
-        <p:cNvPr id="1" name=""/>
-        <p:cNvGrpSpPr/>
-        <p:nvPr/>
-      </p:nvGrpSpPr>
-      <p:grpSpPr>
-        <a:xfrm>
-          <a:off x="0" y="0"/>
-          <a:ext cx="0" cy="0"/>
-          <a:chOff x="0" y="0"/>
-          <a:chExt cx="0" cy="0"/>
-        </a:xfrm>
-      </p:grpSpPr>
-      <p:sp>
-        <p:nvSpPr>
-          <p:cNvPr id="2" name="Title 1"/>
-          <p:cNvSpPr>
-            <a:spLocks noGrp="1"/>
-          </p:cNvSpPr>
-          <p:nvPr>
-            <p:ph type="title"/>
-          </p:nvPr>
-        </p:nvSpPr>
-        <p:spPr/>
-        <p:txBody>
-          <a:bodyPr/>
-          <a:lstStyle/>
-          <a:p>
-            <a:r>
-              <a:rPr lang="en-US" dirty="0" smtClean="0"/>
-              <a:t>Pointers</a:t>
-            </a:r>
-            <a:endParaRPr lang="nl-BE" dirty="0"/>
-          </a:p>
-        </p:txBody>
-      </p:sp>
-      <p:sp>
-        <p:nvSpPr>
-          <p:cNvPr id="3" name="Text Placeholder 2"/>
-          <p:cNvSpPr>
-            <a:spLocks noGrp="1"/>
-          </p:cNvSpPr>
-          <p:nvPr>
-            <p:ph type="body" idx="1"/>
-          </p:nvPr>
-        </p:nvSpPr>
-        <p:spPr/>
-        <p:txBody>
-          <a:bodyPr/>
-          <a:lstStyle/>
-          <a:p>
-            <a:endParaRPr lang="nl-BE"/>
-          </a:p>
-        </p:txBody>
-      </p:sp>
-      <p:sp>
-        <p:nvSpPr>
-          <p:cNvPr id="4" name="Slide Number Placeholder 3"/>
-          <p:cNvSpPr>
-            <a:spLocks noGrp="1"/>
-          </p:cNvSpPr>
-          <p:nvPr>
-            <p:ph type="sldNum" sz="quarter" idx="12"/>
-          </p:nvPr>
-        </p:nvSpPr>
-        <p:spPr/>
-        <p:txBody>
-          <a:bodyPr/>
-          <a:lstStyle/>
-          <a:p>
-            <a:fld id="{B6F15528-21DE-4FAA-801E-634DDDAF4B2B}" type="slidenum">
-              <a:rPr lang="en-US" smtClean="0"/>
-              <a:pPr/>
-              <a:t>19</a:t>
-            </a:fld>
-            <a:endParaRPr lang="en-US"/>
-          </a:p>
-        </p:txBody>
-      </p:sp>
-    </p:spTree>
-    <p:extLst>
-      <p:ext uri="{BB962C8B-B14F-4D97-AF65-F5344CB8AC3E}">
-        <p14:creationId xmlns:p14="http://schemas.microsoft.com/office/powerpoint/2010/main" val="1498256543"/>
-      </p:ext>
-    </p:extLst>
-  </p:cSld>
-  <p:clrMapOvr>
-    <a:masterClrMapping/>
-  </p:clrMapOvr>
-</p:sld>
-</file>
-
 <file path=ppt/slides/slide2.xml><?xml version="1.0" encoding="utf-8"?>
 <p:sld xmlns:a="http://schemas.openxmlformats.org/drawingml/2006/main" xmlns:r="http://schemas.openxmlformats.org/officeDocument/2006/relationships" xmlns:p="http://schemas.openxmlformats.org/presentationml/2006/main">
   <p:cSld>
@@ -10987,7 +10934,7 @@
           <a:p>
             <a:r>
               <a:rPr lang="en-US" dirty="0" smtClean="0"/>
-              <a:t>Classes</a:t>
+              <a:t>Pointers</a:t>
             </a:r>
             <a:endParaRPr lang="nl-BE" dirty="0"/>
           </a:p>
@@ -11039,7 +10986,7 @@
     </p:spTree>
     <p:extLst>
       <p:ext uri="{BB962C8B-B14F-4D97-AF65-F5344CB8AC3E}">
-        <p14:creationId xmlns:p14="http://schemas.microsoft.com/office/powerpoint/2010/main" val="2062493159"/>
+        <p14:creationId xmlns:p14="http://schemas.microsoft.com/office/powerpoint/2010/main" val="1498256543"/>
       </p:ext>
     </p:extLst>
   </p:cSld>
@@ -11091,6 +11038,25 @@
       </p:sp>
       <p:sp>
         <p:nvSpPr>
+          <p:cNvPr id="3" name="Text Placeholder 2"/>
+          <p:cNvSpPr>
+            <a:spLocks noGrp="1"/>
+          </p:cNvSpPr>
+          <p:nvPr>
+            <p:ph type="body" idx="1"/>
+          </p:nvPr>
+        </p:nvSpPr>
+        <p:spPr/>
+        <p:txBody>
+          <a:bodyPr/>
+          <a:lstStyle/>
+          <a:p>
+            <a:endParaRPr lang="nl-BE"/>
+          </a:p>
+        </p:txBody>
+      </p:sp>
+      <p:sp>
+        <p:nvSpPr>
           <p:cNvPr id="4" name="Slide Number Placeholder 3"/>
           <p:cNvSpPr>
             <a:spLocks noGrp="1"/>
@@ -11113,6 +11079,213 @@
           </a:p>
         </p:txBody>
       </p:sp>
+    </p:spTree>
+    <p:extLst>
+      <p:ext uri="{BB962C8B-B14F-4D97-AF65-F5344CB8AC3E}">
+        <p14:creationId xmlns:p14="http://schemas.microsoft.com/office/powerpoint/2010/main" val="2062493159"/>
+      </p:ext>
+    </p:extLst>
+  </p:cSld>
+  <p:clrMapOvr>
+    <a:masterClrMapping/>
+  </p:clrMapOvr>
+  <p:timing>
+    <p:tnLst>
+      <p:par>
+        <p:cTn id="1" dur="indefinite" restart="never" nodeType="tmRoot"/>
+      </p:par>
+    </p:tnLst>
+  </p:timing>
+</p:sld>
+</file>
+
+<file path=ppt/slides/slide22.xml><?xml version="1.0" encoding="utf-8"?>
+<p:sld xmlns:a="http://schemas.openxmlformats.org/drawingml/2006/main" xmlns:r="http://schemas.openxmlformats.org/officeDocument/2006/relationships" xmlns:p="http://schemas.openxmlformats.org/presentationml/2006/main">
+  <p:cSld>
+    <p:spTree>
+      <p:nvGrpSpPr>
+        <p:cNvPr id="1" name=""/>
+        <p:cNvGrpSpPr/>
+        <p:nvPr/>
+      </p:nvGrpSpPr>
+      <p:grpSpPr>
+        <a:xfrm>
+          <a:off x="0" y="0"/>
+          <a:ext cx="0" cy="0"/>
+          <a:chOff x="0" y="0"/>
+          <a:chExt cx="0" cy="0"/>
+        </a:xfrm>
+      </p:grpSpPr>
+      <p:sp>
+        <p:nvSpPr>
+          <p:cNvPr id="2" name="Title 1"/>
+          <p:cNvSpPr>
+            <a:spLocks noGrp="1"/>
+          </p:cNvSpPr>
+          <p:nvPr>
+            <p:ph type="title"/>
+          </p:nvPr>
+        </p:nvSpPr>
+        <p:spPr/>
+        <p:txBody>
+          <a:bodyPr/>
+          <a:lstStyle/>
+          <a:p>
+            <a:r>
+              <a:rPr lang="en-US" dirty="0" smtClean="0"/>
+              <a:t>Extension types</a:t>
+            </a:r>
+            <a:endParaRPr lang="nl-BE" dirty="0"/>
+          </a:p>
+        </p:txBody>
+      </p:sp>
+      <p:sp>
+        <p:nvSpPr>
+          <p:cNvPr id="3" name="Content Placeholder 2"/>
+          <p:cNvSpPr>
+            <a:spLocks noGrp="1"/>
+          </p:cNvSpPr>
+          <p:nvPr>
+            <p:ph sz="half" idx="1"/>
+          </p:nvPr>
+        </p:nvSpPr>
+        <p:spPr>
+          <a:xfrm>
+            <a:off x="381000" y="4724400"/>
+            <a:ext cx="3810000" cy="1554163"/>
+          </a:xfrm>
+        </p:spPr>
+        <p:txBody>
+          <a:bodyPr>
+            <a:normAutofit fontScale="85000" lnSpcReduction="20000"/>
+          </a:bodyPr>
+          <a:lstStyle/>
+          <a:p>
+            <a:r>
+              <a:rPr lang="en-US" dirty="0" smtClean="0"/>
+              <a:t>Can access m, x, v</a:t>
+            </a:r>
+          </a:p>
+          <a:p>
+            <a:r>
+              <a:rPr lang="en-US" dirty="0" smtClean="0"/>
+              <a:t>Can add arbitrary object </a:t>
+            </a:r>
+            <a:r>
+              <a:rPr lang="en-US" dirty="0" err="1" smtClean="0"/>
+              <a:t>attrubutes</a:t>
+            </a:r>
+            <a:endParaRPr lang="en-US" dirty="0" smtClean="0"/>
+          </a:p>
+          <a:p>
+            <a:r>
+              <a:rPr lang="en-US" dirty="0" smtClean="0"/>
+              <a:t>Attributes in </a:t>
+            </a:r>
+            <a:r>
+              <a:rPr lang="en-US" dirty="0" smtClean="0">
+                <a:latin typeface="Courier New" panose="02070309020205020404" pitchFamily="49" charset="0"/>
+                <a:cs typeface="Courier New" panose="02070309020205020404" pitchFamily="49" charset="0"/>
+              </a:rPr>
+              <a:t>__</a:t>
+            </a:r>
+            <a:r>
+              <a:rPr lang="en-US" dirty="0" err="1" smtClean="0">
+                <a:latin typeface="Courier New" panose="02070309020205020404" pitchFamily="49" charset="0"/>
+                <a:cs typeface="Courier New" panose="02070309020205020404" pitchFamily="49" charset="0"/>
+              </a:rPr>
+              <a:t>dict</a:t>
+            </a:r>
+            <a:r>
+              <a:rPr lang="en-US" dirty="0" smtClean="0">
+                <a:latin typeface="Courier New" panose="02070309020205020404" pitchFamily="49" charset="0"/>
+                <a:cs typeface="Courier New" panose="02070309020205020404" pitchFamily="49" charset="0"/>
+              </a:rPr>
+              <a:t>__</a:t>
+            </a:r>
+            <a:endParaRPr lang="nl-BE" dirty="0">
+              <a:latin typeface="Courier New" panose="02070309020205020404" pitchFamily="49" charset="0"/>
+              <a:cs typeface="Courier New" panose="02070309020205020404" pitchFamily="49" charset="0"/>
+            </a:endParaRPr>
+          </a:p>
+        </p:txBody>
+      </p:sp>
+      <p:sp>
+        <p:nvSpPr>
+          <p:cNvPr id="11" name="Content Placeholder 10"/>
+          <p:cNvSpPr>
+            <a:spLocks noGrp="1"/>
+          </p:cNvSpPr>
+          <p:nvPr>
+            <p:ph sz="half" idx="2"/>
+          </p:nvPr>
+        </p:nvSpPr>
+        <p:spPr>
+          <a:xfrm>
+            <a:off x="5181600" y="4724400"/>
+            <a:ext cx="3657600" cy="1554163"/>
+          </a:xfrm>
+        </p:spPr>
+        <p:txBody>
+          <a:bodyPr>
+            <a:normAutofit fontScale="85000" lnSpcReduction="20000"/>
+          </a:bodyPr>
+          <a:lstStyle/>
+          <a:p>
+            <a:r>
+              <a:rPr lang="en-US" dirty="0" smtClean="0"/>
+              <a:t>Can't access m, x, v</a:t>
+            </a:r>
+          </a:p>
+          <a:p>
+            <a:r>
+              <a:rPr lang="en-US" dirty="0" smtClean="0"/>
+              <a:t>Can't add object attributes</a:t>
+            </a:r>
+          </a:p>
+          <a:p>
+            <a:r>
+              <a:rPr lang="en-US" dirty="0" smtClean="0"/>
+              <a:t>Attributes in C </a:t>
+            </a:r>
+            <a:r>
+              <a:rPr lang="en-US" dirty="0" err="1" smtClean="0">
+                <a:latin typeface="Courier New" panose="02070309020205020404" pitchFamily="49" charset="0"/>
+                <a:cs typeface="Courier New" panose="02070309020205020404" pitchFamily="49" charset="0"/>
+              </a:rPr>
+              <a:t>struct</a:t>
+            </a:r>
+            <a:endParaRPr lang="nl-BE" dirty="0">
+              <a:latin typeface="Courier New" panose="02070309020205020404" pitchFamily="49" charset="0"/>
+              <a:cs typeface="Courier New" panose="02070309020205020404" pitchFamily="49" charset="0"/>
+            </a:endParaRPr>
+          </a:p>
+        </p:txBody>
+      </p:sp>
+      <p:sp>
+        <p:nvSpPr>
+          <p:cNvPr id="4" name="Slide Number Placeholder 3"/>
+          <p:cNvSpPr>
+            <a:spLocks noGrp="1"/>
+          </p:cNvSpPr>
+          <p:nvPr>
+            <p:ph type="sldNum" sz="quarter" idx="12"/>
+          </p:nvPr>
+        </p:nvSpPr>
+        <p:spPr/>
+        <p:txBody>
+          <a:bodyPr/>
+          <a:lstStyle/>
+          <a:p>
+            <a:fld id="{B6F15528-21DE-4FAA-801E-634DDDAF4B2B}" type="slidenum">
+              <a:rPr lang="en-US" smtClean="0"/>
+              <a:pPr/>
+              <a:t>22</a:t>
+            </a:fld>
+            <a:endParaRPr lang="en-US"/>
+          </a:p>
+        </p:txBody>
+      </p:sp>
       <p:grpSp>
         <p:nvGrpSpPr>
           <p:cNvPr id="5" name="Group 4"/>
@@ -11122,9 +11295,9 @@
         <p:grpSpPr>
           <a:xfrm>
             <a:off x="304800" y="1371600"/>
-            <a:ext cx="3886200" cy="5020574"/>
+            <a:ext cx="3640740" cy="2556164"/>
             <a:chOff x="304800" y="1371600"/>
-            <a:chExt cx="3886200" cy="5020574"/>
+            <a:chExt cx="3640740" cy="2556164"/>
           </a:xfrm>
           <a:solidFill>
             <a:schemeClr val="bg1">
@@ -11141,7 +11314,7 @@
           <p:spPr>
             <a:xfrm>
               <a:off x="304800" y="1371600"/>
-              <a:ext cx="3393878" cy="1569660"/>
+              <a:ext cx="3640740" cy="2554545"/>
             </a:xfrm>
             <a:prstGeom prst="rect">
               <a:avLst/>
@@ -11315,8 +11488,98 @@
                   <a:latin typeface="Courier New" panose="02070309020205020404" pitchFamily="49" charset="0"/>
                   <a:cs typeface="Courier New" panose="02070309020205020404" pitchFamily="49" charset="0"/>
                 </a:rPr>
-                <a:t>= v</a:t>
-              </a:r>
+                <a:t>= </a:t>
+              </a:r>
+              <a:r>
+                <a:rPr lang="en-US" sz="1600" dirty="0" smtClean="0">
+                  <a:latin typeface="Courier New" panose="02070309020205020404" pitchFamily="49" charset="0"/>
+                  <a:cs typeface="Courier New" panose="02070309020205020404" pitchFamily="49" charset="0"/>
+                </a:rPr>
+                <a:t>v</a:t>
+              </a:r>
+            </a:p>
+            <a:p>
+              <a:endParaRPr lang="en-US" sz="1600" dirty="0" smtClean="0">
+                <a:latin typeface="Courier New" panose="02070309020205020404" pitchFamily="49" charset="0"/>
+                <a:cs typeface="Courier New" panose="02070309020205020404" pitchFamily="49" charset="0"/>
+              </a:endParaRPr>
+            </a:p>
+            <a:p>
+              <a:r>
+                <a:rPr lang="en-US" sz="1600" dirty="0">
+                  <a:latin typeface="Courier New" panose="02070309020205020404" pitchFamily="49" charset="0"/>
+                  <a:cs typeface="Courier New" panose="02070309020205020404" pitchFamily="49" charset="0"/>
+                </a:rPr>
+                <a:t> </a:t>
+              </a:r>
+              <a:r>
+                <a:rPr lang="en-US" sz="1600" dirty="0" smtClean="0">
+                  <a:latin typeface="Courier New" panose="02070309020205020404" pitchFamily="49" charset="0"/>
+                  <a:cs typeface="Courier New" panose="02070309020205020404" pitchFamily="49" charset="0"/>
+                </a:rPr>
+                <a:t>   </a:t>
+              </a:r>
+              <a:r>
+                <a:rPr lang="en-US" sz="1600" dirty="0" err="1" smtClean="0">
+                  <a:latin typeface="Courier New" panose="02070309020205020404" pitchFamily="49" charset="0"/>
+                  <a:cs typeface="Courier New" panose="02070309020205020404" pitchFamily="49" charset="0"/>
+                </a:rPr>
+                <a:t>def</a:t>
+              </a:r>
+              <a:r>
+                <a:rPr lang="en-US" sz="1600" dirty="0" smtClean="0">
+                  <a:latin typeface="Courier New" panose="02070309020205020404" pitchFamily="49" charset="0"/>
+                  <a:cs typeface="Courier New" panose="02070309020205020404" pitchFamily="49" charset="0"/>
+                </a:rPr>
+                <a:t> momentum(self):</a:t>
+              </a:r>
+            </a:p>
+            <a:p>
+              <a:r>
+                <a:rPr lang="en-US" sz="1600" dirty="0">
+                  <a:latin typeface="Courier New" panose="02070309020205020404" pitchFamily="49" charset="0"/>
+                  <a:cs typeface="Courier New" panose="02070309020205020404" pitchFamily="49" charset="0"/>
+                </a:rPr>
+                <a:t> </a:t>
+              </a:r>
+              <a:r>
+                <a:rPr lang="en-US" sz="1600" dirty="0" smtClean="0">
+                  <a:latin typeface="Courier New" panose="02070309020205020404" pitchFamily="49" charset="0"/>
+                  <a:cs typeface="Courier New" panose="02070309020205020404" pitchFamily="49" charset="0"/>
+                </a:rPr>
+                <a:t>       return </a:t>
+              </a:r>
+              <a:r>
+                <a:rPr lang="en-US" sz="1600" dirty="0" err="1" smtClean="0">
+                  <a:latin typeface="Courier New" panose="02070309020205020404" pitchFamily="49" charset="0"/>
+                  <a:cs typeface="Courier New" panose="02070309020205020404" pitchFamily="49" charset="0"/>
+                </a:rPr>
+                <a:t>self.m</a:t>
+              </a:r>
+              <a:r>
+                <a:rPr lang="en-US" sz="1600" dirty="0" smtClean="0">
+                  <a:latin typeface="Courier New" panose="02070309020205020404" pitchFamily="49" charset="0"/>
+                  <a:cs typeface="Courier New" panose="02070309020205020404" pitchFamily="49" charset="0"/>
+                </a:rPr>
+                <a:t>*</a:t>
+              </a:r>
+              <a:r>
+                <a:rPr lang="en-US" sz="1600" dirty="0" err="1" smtClean="0">
+                  <a:latin typeface="Courier New" panose="02070309020205020404" pitchFamily="49" charset="0"/>
+                  <a:cs typeface="Courier New" panose="02070309020205020404" pitchFamily="49" charset="0"/>
+                </a:rPr>
+                <a:t>self.v</a:t>
+              </a:r>
+              <a:endParaRPr lang="en-US" sz="1600" dirty="0" smtClean="0">
+                <a:latin typeface="Courier New" panose="02070309020205020404" pitchFamily="49" charset="0"/>
+                <a:cs typeface="Courier New" panose="02070309020205020404" pitchFamily="49" charset="0"/>
+              </a:endParaRPr>
+            </a:p>
+            <a:p>
+              <a:endParaRPr lang="en-US" sz="1600" dirty="0" smtClean="0">
+                <a:latin typeface="Courier New" panose="02070309020205020404" pitchFamily="49" charset="0"/>
+                <a:cs typeface="Courier New" panose="02070309020205020404" pitchFamily="49" charset="0"/>
+              </a:endParaRPr>
             </a:p>
           </p:txBody>
         </p:sp>
@@ -11328,8 +11591,8 @@
           </p:nvSpPr>
           <p:spPr>
             <a:xfrm>
-              <a:off x="3040620" y="6084397"/>
-              <a:ext cx="1150380" cy="307777"/>
+              <a:off x="304800" y="3619987"/>
+              <a:ext cx="1142364" cy="307777"/>
             </a:xfrm>
             <a:prstGeom prst="rect">
               <a:avLst/>
@@ -11350,13 +11613,681 @@
             <a:lstStyle/>
             <a:p>
               <a:r>
-                <a:rPr lang="en-US" sz="1400" dirty="0" err="1" smtClean="0"/>
-                <a:t>primes_c.pyx</a:t>
+                <a:rPr lang="en-US" sz="1400" dirty="0" smtClean="0"/>
+                <a:t>particle_p</a:t>
+              </a:r>
+              <a:r>
+                <a:rPr lang="en-US" sz="1400" dirty="0" smtClean="0"/>
+                <a:t>.py</a:t>
               </a:r>
               <a:endParaRPr lang="nl-BE" sz="1400" dirty="0"/>
             </a:p>
           </p:txBody>
         </p:sp>
+      </p:grpSp>
+      <p:grpSp>
+        <p:nvGrpSpPr>
+          <p:cNvPr id="8" name="Group 7"/>
+          <p:cNvGrpSpPr/>
+          <p:nvPr/>
+        </p:nvGrpSpPr>
+        <p:grpSpPr>
+          <a:xfrm>
+            <a:off x="5181600" y="1371600"/>
+            <a:ext cx="3640740" cy="3048000"/>
+            <a:chOff x="304800" y="1371600"/>
+            <a:chExt cx="3640740" cy="3048000"/>
+          </a:xfrm>
+          <a:solidFill>
+            <a:schemeClr val="bg1">
+              <a:lumMod val="85000"/>
+            </a:schemeClr>
+          </a:solidFill>
+        </p:grpSpPr>
+        <p:sp>
+          <p:nvSpPr>
+            <p:cNvPr id="9" name="TextBox 8"/>
+            <p:cNvSpPr txBox="1"/>
+            <p:nvPr/>
+          </p:nvSpPr>
+          <p:spPr>
+            <a:xfrm>
+              <a:off x="304800" y="1371600"/>
+              <a:ext cx="3640740" cy="3046988"/>
+            </a:xfrm>
+            <a:prstGeom prst="rect">
+              <a:avLst/>
+            </a:prstGeom>
+            <a:grpFill/>
+            <a:ln>
+              <a:solidFill>
+                <a:schemeClr val="tx1"/>
+              </a:solidFill>
+            </a:ln>
+          </p:spPr>
+          <p:txBody>
+            <a:bodyPr wrap="none" rtlCol="0">
+              <a:spAutoFit/>
+            </a:bodyPr>
+            <a:lstStyle/>
+            <a:p>
+              <a:r>
+                <a:rPr lang="nl-BE" sz="1600" b="1" dirty="0" err="1" smtClean="0">
+                  <a:latin typeface="Courier New" panose="02070309020205020404" pitchFamily="49" charset="0"/>
+                  <a:cs typeface="Courier New" panose="02070309020205020404" pitchFamily="49" charset="0"/>
+                </a:rPr>
+                <a:t>cdef</a:t>
+              </a:r>
+              <a:r>
+                <a:rPr lang="nl-BE" sz="1600" dirty="0" smtClean="0">
+                  <a:latin typeface="Courier New" panose="02070309020205020404" pitchFamily="49" charset="0"/>
+                  <a:cs typeface="Courier New" panose="02070309020205020404" pitchFamily="49" charset="0"/>
+                </a:rPr>
+                <a:t> class </a:t>
+              </a:r>
+              <a:r>
+                <a:rPr lang="nl-BE" sz="1600" dirty="0" err="1" smtClean="0">
+                  <a:latin typeface="Courier New" panose="02070309020205020404" pitchFamily="49" charset="0"/>
+                  <a:cs typeface="Courier New" panose="02070309020205020404" pitchFamily="49" charset="0"/>
+                </a:rPr>
+                <a:t>Particle</a:t>
+              </a:r>
+              <a:r>
+                <a:rPr lang="nl-BE" sz="1600" dirty="0" smtClean="0">
+                  <a:latin typeface="Courier New" panose="02070309020205020404" pitchFamily="49" charset="0"/>
+                  <a:cs typeface="Courier New" panose="02070309020205020404" pitchFamily="49" charset="0"/>
+                </a:rPr>
+                <a:t>(object):</a:t>
+              </a:r>
+            </a:p>
+            <a:p>
+              <a:endParaRPr lang="en-US" sz="1600" dirty="0" smtClean="0">
+                <a:latin typeface="Courier New" panose="02070309020205020404" pitchFamily="49" charset="0"/>
+                <a:cs typeface="Courier New" panose="02070309020205020404" pitchFamily="49" charset="0"/>
+              </a:endParaRPr>
+            </a:p>
+            <a:p>
+              <a:r>
+                <a:rPr lang="en-US" sz="1600" dirty="0">
+                  <a:latin typeface="Courier New" panose="02070309020205020404" pitchFamily="49" charset="0"/>
+                  <a:cs typeface="Courier New" panose="02070309020205020404" pitchFamily="49" charset="0"/>
+                </a:rPr>
+                <a:t> </a:t>
+              </a:r>
+              <a:r>
+                <a:rPr lang="en-US" sz="1600" dirty="0" smtClean="0">
+                  <a:latin typeface="Courier New" panose="02070309020205020404" pitchFamily="49" charset="0"/>
+                  <a:cs typeface="Courier New" panose="02070309020205020404" pitchFamily="49" charset="0"/>
+                </a:rPr>
+                <a:t>   </a:t>
+              </a:r>
+              <a:r>
+                <a:rPr lang="en-US" sz="1600" b="1" dirty="0" err="1" smtClean="0">
+                  <a:latin typeface="Courier New" panose="02070309020205020404" pitchFamily="49" charset="0"/>
+                  <a:cs typeface="Courier New" panose="02070309020205020404" pitchFamily="49" charset="0"/>
+                </a:rPr>
+                <a:t>cdef</a:t>
+              </a:r>
+              <a:r>
+                <a:rPr lang="en-US" sz="1600" b="1" dirty="0" smtClean="0">
+                  <a:latin typeface="Courier New" panose="02070309020205020404" pitchFamily="49" charset="0"/>
+                  <a:cs typeface="Courier New" panose="02070309020205020404" pitchFamily="49" charset="0"/>
+                </a:rPr>
+                <a:t> double m, x, v</a:t>
+              </a:r>
+            </a:p>
+            <a:p>
+              <a:endParaRPr lang="en-US" sz="1600" dirty="0">
+                <a:latin typeface="Courier New" panose="02070309020205020404" pitchFamily="49" charset="0"/>
+                <a:cs typeface="Courier New" panose="02070309020205020404" pitchFamily="49" charset="0"/>
+              </a:endParaRPr>
+            </a:p>
+            <a:p>
+              <a:r>
+                <a:rPr lang="en-US" sz="1600" dirty="0" smtClean="0">
+                  <a:latin typeface="Courier New" panose="02070309020205020404" pitchFamily="49" charset="0"/>
+                  <a:cs typeface="Courier New" panose="02070309020205020404" pitchFamily="49" charset="0"/>
+                </a:rPr>
+                <a:t>    </a:t>
+              </a:r>
+              <a:r>
+                <a:rPr lang="en-US" sz="1600" dirty="0" err="1" smtClean="0">
+                  <a:latin typeface="Courier New" panose="02070309020205020404" pitchFamily="49" charset="0"/>
+                  <a:cs typeface="Courier New" panose="02070309020205020404" pitchFamily="49" charset="0"/>
+                </a:rPr>
+                <a:t>def</a:t>
+              </a:r>
+              <a:r>
+                <a:rPr lang="en-US" sz="1600" dirty="0" smtClean="0">
+                  <a:latin typeface="Courier New" panose="02070309020205020404" pitchFamily="49" charset="0"/>
+                  <a:cs typeface="Courier New" panose="02070309020205020404" pitchFamily="49" charset="0"/>
+                </a:rPr>
+                <a:t> __</a:t>
+              </a:r>
+              <a:r>
+                <a:rPr lang="en-US" sz="1600" dirty="0" err="1" smtClean="0">
+                  <a:latin typeface="Courier New" panose="02070309020205020404" pitchFamily="49" charset="0"/>
+                  <a:cs typeface="Courier New" panose="02070309020205020404" pitchFamily="49" charset="0"/>
+                </a:rPr>
+                <a:t>init</a:t>
+              </a:r>
+              <a:r>
+                <a:rPr lang="en-US" sz="1600" dirty="0" smtClean="0">
+                  <a:latin typeface="Courier New" panose="02070309020205020404" pitchFamily="49" charset="0"/>
+                  <a:cs typeface="Courier New" panose="02070309020205020404" pitchFamily="49" charset="0"/>
+                </a:rPr>
+                <a:t>__(m, x, v):</a:t>
+              </a:r>
+              <a:endParaRPr lang="nl-BE" sz="1600" dirty="0" smtClean="0">
+                <a:latin typeface="Courier New" panose="02070309020205020404" pitchFamily="49" charset="0"/>
+                <a:cs typeface="Courier New" panose="02070309020205020404" pitchFamily="49" charset="0"/>
+              </a:endParaRPr>
+            </a:p>
+            <a:p>
+              <a:r>
+                <a:rPr lang="en-US" sz="1600" dirty="0" smtClean="0">
+                  <a:latin typeface="Courier New" panose="02070309020205020404" pitchFamily="49" charset="0"/>
+                  <a:cs typeface="Courier New" panose="02070309020205020404" pitchFamily="49" charset="0"/>
+                </a:rPr>
+                <a:t>        </a:t>
+              </a:r>
+              <a:r>
+                <a:rPr lang="en-US" sz="1600" dirty="0" err="1">
+                  <a:latin typeface="Courier New" panose="02070309020205020404" pitchFamily="49" charset="0"/>
+                  <a:cs typeface="Courier New" panose="02070309020205020404" pitchFamily="49" charset="0"/>
+                </a:rPr>
+                <a:t>self.m</a:t>
+              </a:r>
+              <a:r>
+                <a:rPr lang="en-US" sz="1600" dirty="0">
+                  <a:latin typeface="Courier New" panose="02070309020205020404" pitchFamily="49" charset="0"/>
+                  <a:cs typeface="Courier New" panose="02070309020205020404" pitchFamily="49" charset="0"/>
+                </a:rPr>
+                <a:t> = </a:t>
+              </a:r>
+              <a:r>
+                <a:rPr lang="en-US" sz="1600" dirty="0" smtClean="0">
+                  <a:latin typeface="Courier New" panose="02070309020205020404" pitchFamily="49" charset="0"/>
+                  <a:cs typeface="Courier New" panose="02070309020205020404" pitchFamily="49" charset="0"/>
+                </a:rPr>
+                <a:t>m</a:t>
+              </a:r>
+            </a:p>
+            <a:p>
+              <a:r>
+                <a:rPr lang="en-US" sz="1600" dirty="0" smtClean="0">
+                  <a:latin typeface="Courier New" panose="02070309020205020404" pitchFamily="49" charset="0"/>
+                  <a:cs typeface="Courier New" panose="02070309020205020404" pitchFamily="49" charset="0"/>
+                </a:rPr>
+                <a:t>        </a:t>
+              </a:r>
+              <a:r>
+                <a:rPr lang="en-US" sz="1600" dirty="0" err="1" smtClean="0">
+                  <a:latin typeface="Courier New" panose="02070309020205020404" pitchFamily="49" charset="0"/>
+                  <a:cs typeface="Courier New" panose="02070309020205020404" pitchFamily="49" charset="0"/>
+                </a:rPr>
+                <a:t>self.x</a:t>
+              </a:r>
+              <a:r>
+                <a:rPr lang="en-US" sz="1600" dirty="0" smtClean="0">
+                  <a:latin typeface="Courier New" panose="02070309020205020404" pitchFamily="49" charset="0"/>
+                  <a:cs typeface="Courier New" panose="02070309020205020404" pitchFamily="49" charset="0"/>
+                </a:rPr>
+                <a:t> = x</a:t>
+              </a:r>
+            </a:p>
+            <a:p>
+              <a:r>
+                <a:rPr lang="en-US" sz="1600" dirty="0">
+                  <a:latin typeface="Courier New" panose="02070309020205020404" pitchFamily="49" charset="0"/>
+                  <a:cs typeface="Courier New" panose="02070309020205020404" pitchFamily="49" charset="0"/>
+                </a:rPr>
+                <a:t> </a:t>
+              </a:r>
+              <a:r>
+                <a:rPr lang="en-US" sz="1600" dirty="0" smtClean="0">
+                  <a:latin typeface="Courier New" panose="02070309020205020404" pitchFamily="49" charset="0"/>
+                  <a:cs typeface="Courier New" panose="02070309020205020404" pitchFamily="49" charset="0"/>
+                </a:rPr>
+                <a:t>       </a:t>
+              </a:r>
+              <a:r>
+                <a:rPr lang="en-US" sz="1600" dirty="0" err="1" smtClean="0">
+                  <a:latin typeface="Courier New" panose="02070309020205020404" pitchFamily="49" charset="0"/>
+                  <a:cs typeface="Courier New" panose="02070309020205020404" pitchFamily="49" charset="0"/>
+                </a:rPr>
+                <a:t>self.v</a:t>
+              </a:r>
+              <a:r>
+                <a:rPr lang="en-US" sz="1600" dirty="0">
+                  <a:latin typeface="Courier New" panose="02070309020205020404" pitchFamily="49" charset="0"/>
+                  <a:cs typeface="Courier New" panose="02070309020205020404" pitchFamily="49" charset="0"/>
+                </a:rPr>
+                <a:t> </a:t>
+              </a:r>
+              <a:r>
+                <a:rPr lang="en-US" sz="1600" dirty="0" smtClean="0">
+                  <a:latin typeface="Courier New" panose="02070309020205020404" pitchFamily="49" charset="0"/>
+                  <a:cs typeface="Courier New" panose="02070309020205020404" pitchFamily="49" charset="0"/>
+                </a:rPr>
+                <a:t>= </a:t>
+              </a:r>
+              <a:r>
+                <a:rPr lang="en-US" sz="1600" dirty="0" smtClean="0">
+                  <a:latin typeface="Courier New" panose="02070309020205020404" pitchFamily="49" charset="0"/>
+                  <a:cs typeface="Courier New" panose="02070309020205020404" pitchFamily="49" charset="0"/>
+                </a:rPr>
+                <a:t>v</a:t>
+              </a:r>
+            </a:p>
+            <a:p>
+              <a:endParaRPr lang="en-US" sz="1600" dirty="0" smtClean="0">
+                <a:latin typeface="Courier New" panose="02070309020205020404" pitchFamily="49" charset="0"/>
+                <a:cs typeface="Courier New" panose="02070309020205020404" pitchFamily="49" charset="0"/>
+              </a:endParaRPr>
+            </a:p>
+            <a:p>
+              <a:r>
+                <a:rPr lang="en-US" sz="1600" dirty="0">
+                  <a:latin typeface="Courier New" panose="02070309020205020404" pitchFamily="49" charset="0"/>
+                  <a:cs typeface="Courier New" panose="02070309020205020404" pitchFamily="49" charset="0"/>
+                </a:rPr>
+                <a:t> </a:t>
+              </a:r>
+              <a:r>
+                <a:rPr lang="en-US" sz="1600" dirty="0" smtClean="0">
+                  <a:latin typeface="Courier New" panose="02070309020205020404" pitchFamily="49" charset="0"/>
+                  <a:cs typeface="Courier New" panose="02070309020205020404" pitchFamily="49" charset="0"/>
+                </a:rPr>
+                <a:t>   </a:t>
+              </a:r>
+              <a:r>
+                <a:rPr lang="en-US" sz="1600" dirty="0" err="1" smtClean="0">
+                  <a:latin typeface="Courier New" panose="02070309020205020404" pitchFamily="49" charset="0"/>
+                  <a:cs typeface="Courier New" panose="02070309020205020404" pitchFamily="49" charset="0"/>
+                </a:rPr>
+                <a:t>def</a:t>
+              </a:r>
+              <a:r>
+                <a:rPr lang="en-US" sz="1600" dirty="0" smtClean="0">
+                  <a:latin typeface="Courier New" panose="02070309020205020404" pitchFamily="49" charset="0"/>
+                  <a:cs typeface="Courier New" panose="02070309020205020404" pitchFamily="49" charset="0"/>
+                </a:rPr>
+                <a:t> momentum(self):</a:t>
+              </a:r>
+            </a:p>
+            <a:p>
+              <a:r>
+                <a:rPr lang="en-US" sz="1600" dirty="0">
+                  <a:latin typeface="Courier New" panose="02070309020205020404" pitchFamily="49" charset="0"/>
+                  <a:cs typeface="Courier New" panose="02070309020205020404" pitchFamily="49" charset="0"/>
+                </a:rPr>
+                <a:t> </a:t>
+              </a:r>
+              <a:r>
+                <a:rPr lang="en-US" sz="1600" dirty="0" smtClean="0">
+                  <a:latin typeface="Courier New" panose="02070309020205020404" pitchFamily="49" charset="0"/>
+                  <a:cs typeface="Courier New" panose="02070309020205020404" pitchFamily="49" charset="0"/>
+                </a:rPr>
+                <a:t>       return </a:t>
+              </a:r>
+              <a:r>
+                <a:rPr lang="en-US" sz="1600" dirty="0" err="1" smtClean="0">
+                  <a:latin typeface="Courier New" panose="02070309020205020404" pitchFamily="49" charset="0"/>
+                  <a:cs typeface="Courier New" panose="02070309020205020404" pitchFamily="49" charset="0"/>
+                </a:rPr>
+                <a:t>self.m</a:t>
+              </a:r>
+              <a:r>
+                <a:rPr lang="en-US" sz="1600" dirty="0" smtClean="0">
+                  <a:latin typeface="Courier New" panose="02070309020205020404" pitchFamily="49" charset="0"/>
+                  <a:cs typeface="Courier New" panose="02070309020205020404" pitchFamily="49" charset="0"/>
+                </a:rPr>
+                <a:t>*</a:t>
+              </a:r>
+              <a:r>
+                <a:rPr lang="en-US" sz="1600" dirty="0" err="1" smtClean="0">
+                  <a:latin typeface="Courier New" panose="02070309020205020404" pitchFamily="49" charset="0"/>
+                  <a:cs typeface="Courier New" panose="02070309020205020404" pitchFamily="49" charset="0"/>
+                </a:rPr>
+                <a:t>self.v</a:t>
+              </a:r>
+              <a:endParaRPr lang="en-US" sz="1600" dirty="0" smtClean="0">
+                <a:latin typeface="Courier New" panose="02070309020205020404" pitchFamily="49" charset="0"/>
+                <a:cs typeface="Courier New" panose="02070309020205020404" pitchFamily="49" charset="0"/>
+              </a:endParaRPr>
+            </a:p>
+            <a:p>
+              <a:endParaRPr lang="en-US" sz="1600" dirty="0" smtClean="0">
+                <a:latin typeface="Courier New" panose="02070309020205020404" pitchFamily="49" charset="0"/>
+                <a:cs typeface="Courier New" panose="02070309020205020404" pitchFamily="49" charset="0"/>
+              </a:endParaRPr>
+            </a:p>
+          </p:txBody>
+        </p:sp>
+        <p:sp>
+          <p:nvSpPr>
+            <p:cNvPr id="10" name="TextBox 9"/>
+            <p:cNvSpPr txBox="1"/>
+            <p:nvPr/>
+          </p:nvSpPr>
+          <p:spPr>
+            <a:xfrm>
+              <a:off x="304800" y="4111823"/>
+              <a:ext cx="1201676" cy="307777"/>
+            </a:xfrm>
+            <a:prstGeom prst="rect">
+              <a:avLst/>
+            </a:prstGeom>
+            <a:solidFill>
+              <a:schemeClr val="bg1"/>
+            </a:solidFill>
+            <a:ln>
+              <a:solidFill>
+                <a:schemeClr val="tx1"/>
+              </a:solidFill>
+            </a:ln>
+          </p:spPr>
+          <p:txBody>
+            <a:bodyPr wrap="none" rtlCol="0">
+              <a:spAutoFit/>
+            </a:bodyPr>
+            <a:lstStyle/>
+            <a:p>
+              <a:r>
+                <a:rPr lang="en-US" sz="1400" dirty="0" err="1" smtClean="0"/>
+                <a:t>particle_c</a:t>
+              </a:r>
+              <a:r>
+                <a:rPr lang="en-US" sz="1400" dirty="0" err="1" smtClean="0"/>
+                <a:t>.pyx</a:t>
+              </a:r>
+              <a:endParaRPr lang="nl-BE" sz="1400" dirty="0"/>
+            </a:p>
+          </p:txBody>
+        </p:sp>
+      </p:grpSp>
+      <p:grpSp>
+        <p:nvGrpSpPr>
+          <p:cNvPr id="31" name="Group 30"/>
+          <p:cNvGrpSpPr/>
+          <p:nvPr/>
+        </p:nvGrpSpPr>
+        <p:grpSpPr>
+          <a:xfrm>
+            <a:off x="2971800" y="2200870"/>
+            <a:ext cx="2913082" cy="923330"/>
+            <a:chOff x="2971800" y="2200870"/>
+            <a:chExt cx="2913082" cy="923330"/>
+          </a:xfrm>
+        </p:grpSpPr>
+        <p:sp>
+          <p:nvSpPr>
+            <p:cNvPr id="13" name="TextBox 12"/>
+            <p:cNvSpPr txBox="1"/>
+            <p:nvPr/>
+          </p:nvSpPr>
+          <p:spPr>
+            <a:xfrm>
+              <a:off x="4267200" y="2200870"/>
+              <a:ext cx="1330364" cy="923330"/>
+            </a:xfrm>
+            <a:prstGeom prst="rect">
+              <a:avLst/>
+            </a:prstGeom>
+            <a:solidFill>
+              <a:schemeClr val="bg1"/>
+            </a:solidFill>
+            <a:ln>
+              <a:solidFill>
+                <a:schemeClr val="tx1"/>
+              </a:solidFill>
+            </a:ln>
+          </p:spPr>
+          <p:txBody>
+            <a:bodyPr wrap="none" rtlCol="0">
+              <a:spAutoFit/>
+            </a:bodyPr>
+            <a:lstStyle/>
+            <a:p>
+              <a:r>
+                <a:rPr lang="en-US" dirty="0" smtClean="0"/>
+                <a:t>object </a:t>
+              </a:r>
+              <a:br>
+                <a:rPr lang="en-US" dirty="0" smtClean="0"/>
+              </a:br>
+              <a:r>
+                <a:rPr lang="en-US" dirty="0" smtClean="0"/>
+                <a:t>attribute</a:t>
+              </a:r>
+              <a:br>
+                <a:rPr lang="en-US" dirty="0" smtClean="0"/>
+              </a:br>
+              <a:r>
+                <a:rPr lang="en-US" dirty="0" smtClean="0"/>
+                <a:t>declarations</a:t>
+              </a:r>
+              <a:endParaRPr lang="nl-BE" dirty="0"/>
+            </a:p>
+          </p:txBody>
+        </p:sp>
+        <p:cxnSp>
+          <p:nvCxnSpPr>
+            <p:cNvPr id="14" name="Straight Arrow Connector 13"/>
+            <p:cNvCxnSpPr/>
+            <p:nvPr/>
+          </p:nvCxnSpPr>
+          <p:spPr>
+            <a:xfrm flipV="1">
+              <a:off x="5597564" y="2200870"/>
+              <a:ext cx="287318" cy="542330"/>
+            </a:xfrm>
+            <a:prstGeom prst="straightConnector1">
+              <a:avLst/>
+            </a:prstGeom>
+            <a:ln w="19050">
+              <a:solidFill>
+                <a:schemeClr val="tx1"/>
+              </a:solidFill>
+              <a:tailEnd type="stealth" w="lg" len="lg"/>
+            </a:ln>
+          </p:spPr>
+          <p:style>
+            <a:lnRef idx="1">
+              <a:schemeClr val="accent1"/>
+            </a:lnRef>
+            <a:fillRef idx="0">
+              <a:schemeClr val="accent1"/>
+            </a:fillRef>
+            <a:effectRef idx="0">
+              <a:schemeClr val="accent1"/>
+            </a:effectRef>
+            <a:fontRef idx="minor">
+              <a:schemeClr val="tx1"/>
+            </a:fontRef>
+          </p:style>
+        </p:cxnSp>
+        <p:cxnSp>
+          <p:nvCxnSpPr>
+            <p:cNvPr id="21" name="Straight Arrow Connector 20"/>
+            <p:cNvCxnSpPr>
+              <a:stCxn id="13" idx="1"/>
+            </p:cNvCxnSpPr>
+            <p:nvPr/>
+          </p:nvCxnSpPr>
+          <p:spPr>
+            <a:xfrm flipH="1" flipV="1">
+              <a:off x="2971800" y="2436167"/>
+              <a:ext cx="1295400" cy="226368"/>
+            </a:xfrm>
+            <a:prstGeom prst="straightConnector1">
+              <a:avLst/>
+            </a:prstGeom>
+            <a:ln w="19050">
+              <a:solidFill>
+                <a:schemeClr val="tx1"/>
+              </a:solidFill>
+              <a:tailEnd type="stealth" w="lg" len="lg"/>
+            </a:ln>
+          </p:spPr>
+          <p:style>
+            <a:lnRef idx="1">
+              <a:schemeClr val="accent1"/>
+            </a:lnRef>
+            <a:fillRef idx="0">
+              <a:schemeClr val="accent1"/>
+            </a:fillRef>
+            <a:effectRef idx="0">
+              <a:schemeClr val="accent1"/>
+            </a:effectRef>
+            <a:fontRef idx="minor">
+              <a:schemeClr val="tx1"/>
+            </a:fontRef>
+          </p:style>
+        </p:cxnSp>
+      </p:grpSp>
+      <p:grpSp>
+        <p:nvGrpSpPr>
+          <p:cNvPr id="32" name="Group 31"/>
+          <p:cNvGrpSpPr/>
+          <p:nvPr/>
+        </p:nvGrpSpPr>
+        <p:grpSpPr>
+          <a:xfrm>
+            <a:off x="3048000" y="2662535"/>
+            <a:ext cx="3124200" cy="1452265"/>
+            <a:chOff x="3048000" y="2662535"/>
+            <a:chExt cx="3124200" cy="1452265"/>
+          </a:xfrm>
+        </p:grpSpPr>
+        <p:sp>
+          <p:nvSpPr>
+            <p:cNvPr id="17" name="TextBox 16"/>
+            <p:cNvSpPr txBox="1"/>
+            <p:nvPr/>
+          </p:nvSpPr>
+          <p:spPr>
+            <a:xfrm>
+              <a:off x="4267200" y="3191470"/>
+              <a:ext cx="1330364" cy="923330"/>
+            </a:xfrm>
+            <a:prstGeom prst="rect">
+              <a:avLst/>
+            </a:prstGeom>
+            <a:solidFill>
+              <a:schemeClr val="bg1"/>
+            </a:solidFill>
+            <a:ln>
+              <a:solidFill>
+                <a:schemeClr val="tx1"/>
+              </a:solidFill>
+            </a:ln>
+          </p:spPr>
+          <p:txBody>
+            <a:bodyPr wrap="square" rtlCol="0">
+              <a:spAutoFit/>
+            </a:bodyPr>
+            <a:lstStyle/>
+            <a:p>
+              <a:r>
+                <a:rPr lang="en-US" dirty="0" smtClean="0"/>
+                <a:t>object </a:t>
+              </a:r>
+              <a:br>
+                <a:rPr lang="en-US" dirty="0" smtClean="0"/>
+              </a:br>
+              <a:r>
+                <a:rPr lang="en-US" dirty="0" smtClean="0"/>
+                <a:t>attribute</a:t>
+              </a:r>
+              <a:br>
+                <a:rPr lang="en-US" dirty="0" smtClean="0"/>
+              </a:br>
+              <a:r>
+                <a:rPr lang="en-US" dirty="0" smtClean="0"/>
+                <a:t>definitions</a:t>
+              </a:r>
+              <a:endParaRPr lang="nl-BE" dirty="0"/>
+            </a:p>
+          </p:txBody>
+        </p:sp>
+        <p:cxnSp>
+          <p:nvCxnSpPr>
+            <p:cNvPr id="18" name="Straight Arrow Connector 17"/>
+            <p:cNvCxnSpPr>
+              <a:stCxn id="17" idx="3"/>
+            </p:cNvCxnSpPr>
+            <p:nvPr/>
+          </p:nvCxnSpPr>
+          <p:spPr>
+            <a:xfrm flipV="1">
+              <a:off x="5597564" y="3048001"/>
+              <a:ext cx="574636" cy="605134"/>
+            </a:xfrm>
+            <a:prstGeom prst="straightConnector1">
+              <a:avLst/>
+            </a:prstGeom>
+            <a:ln w="19050">
+              <a:solidFill>
+                <a:schemeClr val="tx1"/>
+              </a:solidFill>
+              <a:tailEnd type="stealth" w="lg" len="lg"/>
+            </a:ln>
+          </p:spPr>
+          <p:style>
+            <a:lnRef idx="1">
+              <a:schemeClr val="accent1"/>
+            </a:lnRef>
+            <a:fillRef idx="0">
+              <a:schemeClr val="accent1"/>
+            </a:fillRef>
+            <a:effectRef idx="0">
+              <a:schemeClr val="accent1"/>
+            </a:effectRef>
+            <a:fontRef idx="minor">
+              <a:schemeClr val="tx1"/>
+            </a:fontRef>
+          </p:style>
+        </p:cxnSp>
+        <p:cxnSp>
+          <p:nvCxnSpPr>
+            <p:cNvPr id="24" name="Straight Arrow Connector 23"/>
+            <p:cNvCxnSpPr>
+              <a:stCxn id="17" idx="1"/>
+            </p:cNvCxnSpPr>
+            <p:nvPr/>
+          </p:nvCxnSpPr>
+          <p:spPr>
+            <a:xfrm flipH="1" flipV="1">
+              <a:off x="3048000" y="2662535"/>
+              <a:ext cx="1219200" cy="990600"/>
+            </a:xfrm>
+            <a:prstGeom prst="straightConnector1">
+              <a:avLst/>
+            </a:prstGeom>
+            <a:ln w="19050">
+              <a:solidFill>
+                <a:schemeClr val="tx1"/>
+              </a:solidFill>
+              <a:tailEnd type="stealth" w="lg" len="lg"/>
+            </a:ln>
+          </p:spPr>
+          <p:style>
+            <a:lnRef idx="1">
+              <a:schemeClr val="accent1"/>
+            </a:lnRef>
+            <a:fillRef idx="0">
+              <a:schemeClr val="accent1"/>
+            </a:fillRef>
+            <a:effectRef idx="0">
+              <a:schemeClr val="accent1"/>
+            </a:effectRef>
+            <a:fontRef idx="minor">
+              <a:schemeClr val="tx1"/>
+            </a:fontRef>
+          </p:style>
+        </p:cxnSp>
       </p:grpSp>
     </p:spTree>
     <p:extLst>
@@ -11368,6 +12299,1119 @@
   <p:clrMapOvr>
     <a:masterClrMapping/>
   </p:clrMapOvr>
+  <p:timing>
+    <p:tnLst>
+      <p:par>
+        <p:cTn id="1" dur="indefinite" restart="never" nodeType="tmRoot">
+          <p:childTnLst>
+            <p:seq concurrent="1" nextAc="seek">
+              <p:cTn id="2" dur="indefinite" nodeType="mainSeq">
+                <p:childTnLst>
+                  <p:par>
+                    <p:cTn id="3" fill="hold">
+                      <p:stCondLst>
+                        <p:cond delay="indefinite"/>
+                      </p:stCondLst>
+                      <p:childTnLst>
+                        <p:par>
+                          <p:cTn id="4" fill="hold">
+                            <p:stCondLst>
+                              <p:cond delay="0"/>
+                            </p:stCondLst>
+                            <p:childTnLst>
+                              <p:par>
+                                <p:cTn id="5" presetID="1" presetClass="entr" presetSubtype="0" fill="hold" nodeType="clickEffect">
+                                  <p:stCondLst>
+                                    <p:cond delay="0"/>
+                                  </p:stCondLst>
+                                  <p:childTnLst>
+                                    <p:set>
+                                      <p:cBhvr>
+                                        <p:cTn id="6" dur="1" fill="hold">
+                                          <p:stCondLst>
+                                            <p:cond delay="0"/>
+                                          </p:stCondLst>
+                                        </p:cTn>
+                                        <p:tgtEl>
+                                          <p:spTgt spid="8"/>
+                                        </p:tgtEl>
+                                        <p:attrNameLst>
+                                          <p:attrName>style.visibility</p:attrName>
+                                        </p:attrNameLst>
+                                      </p:cBhvr>
+                                      <p:to>
+                                        <p:strVal val="visible"/>
+                                      </p:to>
+                                    </p:set>
+                                  </p:childTnLst>
+                                </p:cTn>
+                              </p:par>
+                            </p:childTnLst>
+                          </p:cTn>
+                        </p:par>
+                      </p:childTnLst>
+                    </p:cTn>
+                  </p:par>
+                  <p:par>
+                    <p:cTn id="7" fill="hold">
+                      <p:stCondLst>
+                        <p:cond delay="indefinite"/>
+                      </p:stCondLst>
+                      <p:childTnLst>
+                        <p:par>
+                          <p:cTn id="8" fill="hold">
+                            <p:stCondLst>
+                              <p:cond delay="0"/>
+                            </p:stCondLst>
+                            <p:childTnLst>
+                              <p:par>
+                                <p:cTn id="9" presetID="1" presetClass="entr" presetSubtype="0" fill="hold" nodeType="clickEffect">
+                                  <p:stCondLst>
+                                    <p:cond delay="0"/>
+                                  </p:stCondLst>
+                                  <p:childTnLst>
+                                    <p:set>
+                                      <p:cBhvr>
+                                        <p:cTn id="10" dur="1" fill="hold">
+                                          <p:stCondLst>
+                                            <p:cond delay="0"/>
+                                          </p:stCondLst>
+                                        </p:cTn>
+                                        <p:tgtEl>
+                                          <p:spTgt spid="31"/>
+                                        </p:tgtEl>
+                                        <p:attrNameLst>
+                                          <p:attrName>style.visibility</p:attrName>
+                                        </p:attrNameLst>
+                                      </p:cBhvr>
+                                      <p:to>
+                                        <p:strVal val="visible"/>
+                                      </p:to>
+                                    </p:set>
+                                  </p:childTnLst>
+                                </p:cTn>
+                              </p:par>
+                            </p:childTnLst>
+                          </p:cTn>
+                        </p:par>
+                      </p:childTnLst>
+                    </p:cTn>
+                  </p:par>
+                  <p:par>
+                    <p:cTn id="11" fill="hold">
+                      <p:stCondLst>
+                        <p:cond delay="indefinite"/>
+                      </p:stCondLst>
+                      <p:childTnLst>
+                        <p:par>
+                          <p:cTn id="12" fill="hold">
+                            <p:stCondLst>
+                              <p:cond delay="0"/>
+                            </p:stCondLst>
+                            <p:childTnLst>
+                              <p:par>
+                                <p:cTn id="13" presetID="1" presetClass="entr" presetSubtype="0" fill="hold" nodeType="clickEffect">
+                                  <p:stCondLst>
+                                    <p:cond delay="0"/>
+                                  </p:stCondLst>
+                                  <p:childTnLst>
+                                    <p:set>
+                                      <p:cBhvr>
+                                        <p:cTn id="14" dur="1" fill="hold">
+                                          <p:stCondLst>
+                                            <p:cond delay="0"/>
+                                          </p:stCondLst>
+                                        </p:cTn>
+                                        <p:tgtEl>
+                                          <p:spTgt spid="32"/>
+                                        </p:tgtEl>
+                                        <p:attrNameLst>
+                                          <p:attrName>style.visibility</p:attrName>
+                                        </p:attrNameLst>
+                                      </p:cBhvr>
+                                      <p:to>
+                                        <p:strVal val="visible"/>
+                                      </p:to>
+                                    </p:set>
+                                  </p:childTnLst>
+                                </p:cTn>
+                              </p:par>
+                            </p:childTnLst>
+                          </p:cTn>
+                        </p:par>
+                      </p:childTnLst>
+                    </p:cTn>
+                  </p:par>
+                  <p:par>
+                    <p:cTn id="15" fill="hold">
+                      <p:stCondLst>
+                        <p:cond delay="indefinite"/>
+                      </p:stCondLst>
+                      <p:childTnLst>
+                        <p:par>
+                          <p:cTn id="16" fill="hold">
+                            <p:stCondLst>
+                              <p:cond delay="0"/>
+                            </p:stCondLst>
+                            <p:childTnLst>
+                              <p:par>
+                                <p:cTn id="17" presetID="1" presetClass="entr" presetSubtype="0" fill="hold" grpId="0" nodeType="clickEffect">
+                                  <p:stCondLst>
+                                    <p:cond delay="0"/>
+                                  </p:stCondLst>
+                                  <p:childTnLst>
+                                    <p:set>
+                                      <p:cBhvr>
+                                        <p:cTn id="18" dur="1" fill="hold">
+                                          <p:stCondLst>
+                                            <p:cond delay="0"/>
+                                          </p:stCondLst>
+                                        </p:cTn>
+                                        <p:tgtEl>
+                                          <p:spTgt spid="3">
+                                            <p:txEl>
+                                              <p:pRg st="0" end="0"/>
+                                            </p:txEl>
+                                          </p:spTgt>
+                                        </p:tgtEl>
+                                        <p:attrNameLst>
+                                          <p:attrName>style.visibility</p:attrName>
+                                        </p:attrNameLst>
+                                      </p:cBhvr>
+                                      <p:to>
+                                        <p:strVal val="visible"/>
+                                      </p:to>
+                                    </p:set>
+                                  </p:childTnLst>
+                                </p:cTn>
+                              </p:par>
+                              <p:par>
+                                <p:cTn id="19" presetID="1" presetClass="entr" presetSubtype="0" fill="hold" grpId="0" nodeType="withEffect">
+                                  <p:stCondLst>
+                                    <p:cond delay="0"/>
+                                  </p:stCondLst>
+                                  <p:childTnLst>
+                                    <p:set>
+                                      <p:cBhvr>
+                                        <p:cTn id="20" dur="1" fill="hold">
+                                          <p:stCondLst>
+                                            <p:cond delay="0"/>
+                                          </p:stCondLst>
+                                        </p:cTn>
+                                        <p:tgtEl>
+                                          <p:spTgt spid="11">
+                                            <p:txEl>
+                                              <p:pRg st="0" end="0"/>
+                                            </p:txEl>
+                                          </p:spTgt>
+                                        </p:tgtEl>
+                                        <p:attrNameLst>
+                                          <p:attrName>style.visibility</p:attrName>
+                                        </p:attrNameLst>
+                                      </p:cBhvr>
+                                      <p:to>
+                                        <p:strVal val="visible"/>
+                                      </p:to>
+                                    </p:set>
+                                  </p:childTnLst>
+                                </p:cTn>
+                              </p:par>
+                            </p:childTnLst>
+                          </p:cTn>
+                        </p:par>
+                      </p:childTnLst>
+                    </p:cTn>
+                  </p:par>
+                  <p:par>
+                    <p:cTn id="21" fill="hold">
+                      <p:stCondLst>
+                        <p:cond delay="indefinite"/>
+                      </p:stCondLst>
+                      <p:childTnLst>
+                        <p:par>
+                          <p:cTn id="22" fill="hold">
+                            <p:stCondLst>
+                              <p:cond delay="0"/>
+                            </p:stCondLst>
+                            <p:childTnLst>
+                              <p:par>
+                                <p:cTn id="23" presetID="1" presetClass="entr" presetSubtype="0" fill="hold" grpId="0" nodeType="clickEffect">
+                                  <p:stCondLst>
+                                    <p:cond delay="0"/>
+                                  </p:stCondLst>
+                                  <p:childTnLst>
+                                    <p:set>
+                                      <p:cBhvr>
+                                        <p:cTn id="24" dur="1" fill="hold">
+                                          <p:stCondLst>
+                                            <p:cond delay="0"/>
+                                          </p:stCondLst>
+                                        </p:cTn>
+                                        <p:tgtEl>
+                                          <p:spTgt spid="3">
+                                            <p:txEl>
+                                              <p:pRg st="1" end="1"/>
+                                            </p:txEl>
+                                          </p:spTgt>
+                                        </p:tgtEl>
+                                        <p:attrNameLst>
+                                          <p:attrName>style.visibility</p:attrName>
+                                        </p:attrNameLst>
+                                      </p:cBhvr>
+                                      <p:to>
+                                        <p:strVal val="visible"/>
+                                      </p:to>
+                                    </p:set>
+                                  </p:childTnLst>
+                                </p:cTn>
+                              </p:par>
+                              <p:par>
+                                <p:cTn id="25" presetID="1" presetClass="entr" presetSubtype="0" fill="hold" grpId="0" nodeType="withEffect">
+                                  <p:stCondLst>
+                                    <p:cond delay="0"/>
+                                  </p:stCondLst>
+                                  <p:childTnLst>
+                                    <p:set>
+                                      <p:cBhvr>
+                                        <p:cTn id="26" dur="1" fill="hold">
+                                          <p:stCondLst>
+                                            <p:cond delay="0"/>
+                                          </p:stCondLst>
+                                        </p:cTn>
+                                        <p:tgtEl>
+                                          <p:spTgt spid="11">
+                                            <p:txEl>
+                                              <p:pRg st="1" end="1"/>
+                                            </p:txEl>
+                                          </p:spTgt>
+                                        </p:tgtEl>
+                                        <p:attrNameLst>
+                                          <p:attrName>style.visibility</p:attrName>
+                                        </p:attrNameLst>
+                                      </p:cBhvr>
+                                      <p:to>
+                                        <p:strVal val="visible"/>
+                                      </p:to>
+                                    </p:set>
+                                  </p:childTnLst>
+                                </p:cTn>
+                              </p:par>
+                            </p:childTnLst>
+                          </p:cTn>
+                        </p:par>
+                      </p:childTnLst>
+                    </p:cTn>
+                  </p:par>
+                  <p:par>
+                    <p:cTn id="27" fill="hold">
+                      <p:stCondLst>
+                        <p:cond delay="indefinite"/>
+                      </p:stCondLst>
+                      <p:childTnLst>
+                        <p:par>
+                          <p:cTn id="28" fill="hold">
+                            <p:stCondLst>
+                              <p:cond delay="0"/>
+                            </p:stCondLst>
+                            <p:childTnLst>
+                              <p:par>
+                                <p:cTn id="29" presetID="1" presetClass="entr" presetSubtype="0" fill="hold" grpId="0" nodeType="clickEffect">
+                                  <p:stCondLst>
+                                    <p:cond delay="0"/>
+                                  </p:stCondLst>
+                                  <p:childTnLst>
+                                    <p:set>
+                                      <p:cBhvr>
+                                        <p:cTn id="30" dur="1" fill="hold">
+                                          <p:stCondLst>
+                                            <p:cond delay="0"/>
+                                          </p:stCondLst>
+                                        </p:cTn>
+                                        <p:tgtEl>
+                                          <p:spTgt spid="3">
+                                            <p:txEl>
+                                              <p:pRg st="2" end="2"/>
+                                            </p:txEl>
+                                          </p:spTgt>
+                                        </p:tgtEl>
+                                        <p:attrNameLst>
+                                          <p:attrName>style.visibility</p:attrName>
+                                        </p:attrNameLst>
+                                      </p:cBhvr>
+                                      <p:to>
+                                        <p:strVal val="visible"/>
+                                      </p:to>
+                                    </p:set>
+                                  </p:childTnLst>
+                                </p:cTn>
+                              </p:par>
+                              <p:par>
+                                <p:cTn id="31" presetID="1" presetClass="entr" presetSubtype="0" fill="hold" grpId="0" nodeType="withEffect">
+                                  <p:stCondLst>
+                                    <p:cond delay="0"/>
+                                  </p:stCondLst>
+                                  <p:childTnLst>
+                                    <p:set>
+                                      <p:cBhvr>
+                                        <p:cTn id="32" dur="1" fill="hold">
+                                          <p:stCondLst>
+                                            <p:cond delay="0"/>
+                                          </p:stCondLst>
+                                        </p:cTn>
+                                        <p:tgtEl>
+                                          <p:spTgt spid="11">
+                                            <p:txEl>
+                                              <p:pRg st="2" end="2"/>
+                                            </p:txEl>
+                                          </p:spTgt>
+                                        </p:tgtEl>
+                                        <p:attrNameLst>
+                                          <p:attrName>style.visibility</p:attrName>
+                                        </p:attrNameLst>
+                                      </p:cBhvr>
+                                      <p:to>
+                                        <p:strVal val="visible"/>
+                                      </p:to>
+                                    </p:set>
+                                  </p:childTnLst>
+                                </p:cTn>
+                              </p:par>
+                            </p:childTnLst>
+                          </p:cTn>
+                        </p:par>
+                      </p:childTnLst>
+                    </p:cTn>
+                  </p:par>
+                </p:childTnLst>
+              </p:cTn>
+              <p:prevCondLst>
+                <p:cond evt="onPrev" delay="0">
+                  <p:tgtEl>
+                    <p:sldTgt/>
+                  </p:tgtEl>
+                </p:cond>
+              </p:prevCondLst>
+              <p:nextCondLst>
+                <p:cond evt="onNext" delay="0">
+                  <p:tgtEl>
+                    <p:sldTgt/>
+                  </p:tgtEl>
+                </p:cond>
+              </p:nextCondLst>
+            </p:seq>
+          </p:childTnLst>
+        </p:cTn>
+      </p:par>
+    </p:tnLst>
+    <p:bldLst>
+      <p:bldP spid="3" grpId="0" uiExpand="1" build="p"/>
+      <p:bldP spid="11" grpId="0" uiExpand="1" build="p"/>
+    </p:bldLst>
+  </p:timing>
+</p:sld>
+</file>
+
+<file path=ppt/slides/slide23.xml><?xml version="1.0" encoding="utf-8"?>
+<p:sld xmlns:a="http://schemas.openxmlformats.org/drawingml/2006/main" xmlns:r="http://schemas.openxmlformats.org/officeDocument/2006/relationships" xmlns:p="http://schemas.openxmlformats.org/presentationml/2006/main">
+  <p:cSld>
+    <p:spTree>
+      <p:nvGrpSpPr>
+        <p:cNvPr id="1" name=""/>
+        <p:cNvGrpSpPr/>
+        <p:nvPr/>
+      </p:nvGrpSpPr>
+      <p:grpSpPr>
+        <a:xfrm>
+          <a:off x="0" y="0"/>
+          <a:ext cx="0" cy="0"/>
+          <a:chOff x="0" y="0"/>
+          <a:chExt cx="0" cy="0"/>
+        </a:xfrm>
+      </p:grpSpPr>
+      <p:sp>
+        <p:nvSpPr>
+          <p:cNvPr id="2" name="Title 1"/>
+          <p:cNvSpPr>
+            <a:spLocks noGrp="1"/>
+          </p:cNvSpPr>
+          <p:nvPr>
+            <p:ph type="title"/>
+          </p:nvPr>
+        </p:nvSpPr>
+        <p:spPr/>
+        <p:txBody>
+          <a:bodyPr/>
+          <a:lstStyle/>
+          <a:p>
+            <a:r>
+              <a:rPr lang="en-US" dirty="0" smtClean="0"/>
+              <a:t>Attribute access control</a:t>
+            </a:r>
+            <a:endParaRPr lang="nl-BE" dirty="0"/>
+          </a:p>
+        </p:txBody>
+      </p:sp>
+      <p:sp>
+        <p:nvSpPr>
+          <p:cNvPr id="6" name="Content Placeholder 5"/>
+          <p:cNvSpPr>
+            <a:spLocks noGrp="1"/>
+          </p:cNvSpPr>
+          <p:nvPr>
+            <p:ph idx="1"/>
+          </p:nvPr>
+        </p:nvSpPr>
+        <p:spPr/>
+        <p:txBody>
+          <a:bodyPr/>
+          <a:lstStyle/>
+          <a:p>
+            <a:r>
+              <a:rPr lang="en-US" dirty="0" smtClean="0"/>
+              <a:t>Private by default</a:t>
+            </a:r>
+          </a:p>
+          <a:p>
+            <a:pPr lvl="1"/>
+            <a:r>
+              <a:rPr lang="en-US" dirty="0" smtClean="0"/>
+              <a:t>not accessible outside class scope</a:t>
+            </a:r>
+          </a:p>
+          <a:p>
+            <a:endParaRPr lang="en-US" dirty="0" smtClean="0"/>
+          </a:p>
+          <a:p>
+            <a:r>
+              <a:rPr lang="en-US" dirty="0" smtClean="0"/>
+              <a:t>Read only</a:t>
+            </a:r>
+          </a:p>
+          <a:p>
+            <a:pPr lvl="1"/>
+            <a:r>
+              <a:rPr lang="en-US" dirty="0" smtClean="0"/>
+              <a:t>value can be used everywhere</a:t>
+            </a:r>
+          </a:p>
+          <a:p>
+            <a:endParaRPr lang="en-US" dirty="0" smtClean="0"/>
+          </a:p>
+          <a:p>
+            <a:r>
+              <a:rPr lang="en-US" dirty="0" smtClean="0"/>
+              <a:t>Public</a:t>
+            </a:r>
+          </a:p>
+          <a:p>
+            <a:pPr lvl="1"/>
+            <a:r>
+              <a:rPr lang="en-US" dirty="0" smtClean="0"/>
+              <a:t>value can be modified everywhere</a:t>
+            </a:r>
+            <a:endParaRPr lang="nl-BE" dirty="0"/>
+          </a:p>
+        </p:txBody>
+      </p:sp>
+      <p:sp>
+        <p:nvSpPr>
+          <p:cNvPr id="5" name="Slide Number Placeholder 4"/>
+          <p:cNvSpPr>
+            <a:spLocks noGrp="1"/>
+          </p:cNvSpPr>
+          <p:nvPr>
+            <p:ph type="sldNum" sz="quarter" idx="12"/>
+          </p:nvPr>
+        </p:nvSpPr>
+        <p:spPr/>
+        <p:txBody>
+          <a:bodyPr/>
+          <a:lstStyle/>
+          <a:p>
+            <a:fld id="{B6F15528-21DE-4FAA-801E-634DDDAF4B2B}" type="slidenum">
+              <a:rPr lang="en-US" smtClean="0"/>
+              <a:pPr/>
+              <a:t>23</a:t>
+            </a:fld>
+            <a:endParaRPr lang="en-US"/>
+          </a:p>
+        </p:txBody>
+      </p:sp>
+      <p:sp>
+        <p:nvSpPr>
+          <p:cNvPr id="7" name="TextBox 6"/>
+          <p:cNvSpPr txBox="1"/>
+          <p:nvPr/>
+        </p:nvSpPr>
+        <p:spPr>
+          <a:xfrm>
+            <a:off x="1219200" y="2754868"/>
+            <a:ext cx="3581400" cy="369332"/>
+          </a:xfrm>
+          <a:prstGeom prst="rect">
+            <a:avLst/>
+          </a:prstGeom>
+          <a:solidFill>
+            <a:schemeClr val="bg1">
+              <a:lumMod val="85000"/>
+            </a:schemeClr>
+          </a:solidFill>
+          <a:ln>
+            <a:solidFill>
+              <a:schemeClr val="tx1"/>
+            </a:solidFill>
+          </a:ln>
+        </p:spPr>
+        <p:txBody>
+          <a:bodyPr wrap="square" rtlCol="0">
+            <a:spAutoFit/>
+          </a:bodyPr>
+          <a:lstStyle/>
+          <a:p>
+            <a:r>
+              <a:rPr lang="en-US" dirty="0" err="1" smtClean="0">
+                <a:latin typeface="Courier New" panose="02070309020205020404" pitchFamily="49" charset="0"/>
+                <a:cs typeface="Courier New" panose="02070309020205020404" pitchFamily="49" charset="0"/>
+              </a:rPr>
+              <a:t>cdef</a:t>
+            </a:r>
+            <a:r>
+              <a:rPr lang="en-US" dirty="0" smtClean="0">
+                <a:latin typeface="Courier New" panose="02070309020205020404" pitchFamily="49" charset="0"/>
+                <a:cs typeface="Courier New" panose="02070309020205020404" pitchFamily="49" charset="0"/>
+              </a:rPr>
+              <a:t> </a:t>
+            </a:r>
+            <a:r>
+              <a:rPr lang="en-US" dirty="0" smtClean="0">
+                <a:latin typeface="Courier New" panose="02070309020205020404" pitchFamily="49" charset="0"/>
+                <a:cs typeface="Courier New" panose="02070309020205020404" pitchFamily="49" charset="0"/>
+              </a:rPr>
+              <a:t>double m</a:t>
+            </a:r>
+            <a:endParaRPr lang="en-US" dirty="0" smtClean="0">
+              <a:latin typeface="Courier New" panose="02070309020205020404" pitchFamily="49" charset="0"/>
+              <a:cs typeface="Courier New" panose="02070309020205020404" pitchFamily="49" charset="0"/>
+            </a:endParaRPr>
+          </a:p>
+        </p:txBody>
+      </p:sp>
+      <p:sp>
+        <p:nvSpPr>
+          <p:cNvPr id="8" name="TextBox 7"/>
+          <p:cNvSpPr txBox="1"/>
+          <p:nvPr/>
+        </p:nvSpPr>
+        <p:spPr>
+          <a:xfrm>
+            <a:off x="1219200" y="4495800"/>
+            <a:ext cx="3581400" cy="369332"/>
+          </a:xfrm>
+          <a:prstGeom prst="rect">
+            <a:avLst/>
+          </a:prstGeom>
+          <a:solidFill>
+            <a:schemeClr val="bg1">
+              <a:lumMod val="85000"/>
+            </a:schemeClr>
+          </a:solidFill>
+          <a:ln>
+            <a:solidFill>
+              <a:schemeClr val="tx1"/>
+            </a:solidFill>
+          </a:ln>
+        </p:spPr>
+        <p:txBody>
+          <a:bodyPr wrap="square" rtlCol="0">
+            <a:spAutoFit/>
+          </a:bodyPr>
+          <a:lstStyle/>
+          <a:p>
+            <a:r>
+              <a:rPr lang="en-US" dirty="0" err="1" smtClean="0">
+                <a:latin typeface="Courier New" panose="02070309020205020404" pitchFamily="49" charset="0"/>
+                <a:cs typeface="Courier New" panose="02070309020205020404" pitchFamily="49" charset="0"/>
+              </a:rPr>
+              <a:t>cdef</a:t>
+            </a:r>
+            <a:r>
+              <a:rPr lang="en-US" dirty="0" smtClean="0">
+                <a:latin typeface="Courier New" panose="02070309020205020404" pitchFamily="49" charset="0"/>
+                <a:cs typeface="Courier New" panose="02070309020205020404" pitchFamily="49" charset="0"/>
+              </a:rPr>
+              <a:t> </a:t>
+            </a:r>
+            <a:r>
+              <a:rPr lang="en-US" b="1" dirty="0" err="1" smtClean="0">
+                <a:latin typeface="Courier New" panose="02070309020205020404" pitchFamily="49" charset="0"/>
+                <a:cs typeface="Courier New" panose="02070309020205020404" pitchFamily="49" charset="0"/>
+              </a:rPr>
+              <a:t>readonly</a:t>
+            </a:r>
+            <a:r>
+              <a:rPr lang="en-US" dirty="0" smtClean="0">
+                <a:latin typeface="Courier New" panose="02070309020205020404" pitchFamily="49" charset="0"/>
+                <a:cs typeface="Courier New" panose="02070309020205020404" pitchFamily="49" charset="0"/>
+              </a:rPr>
+              <a:t> </a:t>
+            </a:r>
+            <a:r>
+              <a:rPr lang="en-US" dirty="0" smtClean="0">
+                <a:latin typeface="Courier New" panose="02070309020205020404" pitchFamily="49" charset="0"/>
+                <a:cs typeface="Courier New" panose="02070309020205020404" pitchFamily="49" charset="0"/>
+              </a:rPr>
+              <a:t>double m</a:t>
+            </a:r>
+            <a:endParaRPr lang="en-US" dirty="0" smtClean="0">
+              <a:latin typeface="Courier New" panose="02070309020205020404" pitchFamily="49" charset="0"/>
+              <a:cs typeface="Courier New" panose="02070309020205020404" pitchFamily="49" charset="0"/>
+            </a:endParaRPr>
+          </a:p>
+        </p:txBody>
+      </p:sp>
+      <p:sp>
+        <p:nvSpPr>
+          <p:cNvPr id="9" name="TextBox 8"/>
+          <p:cNvSpPr txBox="1"/>
+          <p:nvPr/>
+        </p:nvSpPr>
+        <p:spPr>
+          <a:xfrm>
+            <a:off x="1219200" y="6183868"/>
+            <a:ext cx="3581400" cy="369332"/>
+          </a:xfrm>
+          <a:prstGeom prst="rect">
+            <a:avLst/>
+          </a:prstGeom>
+          <a:solidFill>
+            <a:schemeClr val="bg1">
+              <a:lumMod val="85000"/>
+            </a:schemeClr>
+          </a:solidFill>
+          <a:ln>
+            <a:solidFill>
+              <a:schemeClr val="tx1"/>
+            </a:solidFill>
+          </a:ln>
+        </p:spPr>
+        <p:txBody>
+          <a:bodyPr wrap="square" rtlCol="0">
+            <a:spAutoFit/>
+          </a:bodyPr>
+          <a:lstStyle/>
+          <a:p>
+            <a:r>
+              <a:rPr lang="en-US" dirty="0" err="1" smtClean="0">
+                <a:latin typeface="Courier New" panose="02070309020205020404" pitchFamily="49" charset="0"/>
+                <a:cs typeface="Courier New" panose="02070309020205020404" pitchFamily="49" charset="0"/>
+              </a:rPr>
+              <a:t>cdef</a:t>
+            </a:r>
+            <a:r>
+              <a:rPr lang="en-US" dirty="0" smtClean="0">
+                <a:latin typeface="Courier New" panose="02070309020205020404" pitchFamily="49" charset="0"/>
+                <a:cs typeface="Courier New" panose="02070309020205020404" pitchFamily="49" charset="0"/>
+              </a:rPr>
+              <a:t> </a:t>
+            </a:r>
+            <a:r>
+              <a:rPr lang="en-US" b="1" dirty="0" smtClean="0">
+                <a:latin typeface="Courier New" panose="02070309020205020404" pitchFamily="49" charset="0"/>
+                <a:cs typeface="Courier New" panose="02070309020205020404" pitchFamily="49" charset="0"/>
+              </a:rPr>
+              <a:t>public</a:t>
+            </a:r>
+            <a:r>
+              <a:rPr lang="en-US" dirty="0" smtClean="0">
+                <a:latin typeface="Courier New" panose="02070309020205020404" pitchFamily="49" charset="0"/>
+                <a:cs typeface="Courier New" panose="02070309020205020404" pitchFamily="49" charset="0"/>
+              </a:rPr>
+              <a:t> </a:t>
+            </a:r>
+            <a:r>
+              <a:rPr lang="en-US" dirty="0" smtClean="0">
+                <a:latin typeface="Courier New" panose="02070309020205020404" pitchFamily="49" charset="0"/>
+                <a:cs typeface="Courier New" panose="02070309020205020404" pitchFamily="49" charset="0"/>
+              </a:rPr>
+              <a:t>double m</a:t>
+            </a:r>
+            <a:endParaRPr lang="en-US" dirty="0" smtClean="0">
+              <a:latin typeface="Courier New" panose="02070309020205020404" pitchFamily="49" charset="0"/>
+              <a:cs typeface="Courier New" panose="02070309020205020404" pitchFamily="49" charset="0"/>
+            </a:endParaRPr>
+          </a:p>
+        </p:txBody>
+      </p:sp>
+    </p:spTree>
+    <p:extLst>
+      <p:ext uri="{BB962C8B-B14F-4D97-AF65-F5344CB8AC3E}">
+        <p14:creationId xmlns:p14="http://schemas.microsoft.com/office/powerpoint/2010/main" val="2809604952"/>
+      </p:ext>
+    </p:extLst>
+  </p:cSld>
+  <p:clrMapOvr>
+    <a:masterClrMapping/>
+  </p:clrMapOvr>
+  <p:timing>
+    <p:tnLst>
+      <p:par>
+        <p:cTn id="1" dur="indefinite" restart="never" nodeType="tmRoot">
+          <p:childTnLst>
+            <p:seq concurrent="1" nextAc="seek">
+              <p:cTn id="2" dur="indefinite" nodeType="mainSeq">
+                <p:childTnLst>
+                  <p:par>
+                    <p:cTn id="3" fill="hold">
+                      <p:stCondLst>
+                        <p:cond delay="indefinite"/>
+                        <p:cond evt="onBegin" delay="0">
+                          <p:tn val="2"/>
+                        </p:cond>
+                      </p:stCondLst>
+                      <p:childTnLst>
+                        <p:par>
+                          <p:cTn id="4" fill="hold">
+                            <p:stCondLst>
+                              <p:cond delay="0"/>
+                            </p:stCondLst>
+                            <p:childTnLst>
+                              <p:par>
+                                <p:cTn id="5" presetID="1" presetClass="entr" presetSubtype="0" fill="hold" grpId="0" nodeType="withEffect">
+                                  <p:stCondLst>
+                                    <p:cond delay="0"/>
+                                  </p:stCondLst>
+                                  <p:childTnLst>
+                                    <p:set>
+                                      <p:cBhvr>
+                                        <p:cTn id="6" dur="1" fill="hold">
+                                          <p:stCondLst>
+                                            <p:cond delay="0"/>
+                                          </p:stCondLst>
+                                        </p:cTn>
+                                        <p:tgtEl>
+                                          <p:spTgt spid="6">
+                                            <p:txEl>
+                                              <p:pRg st="0" end="0"/>
+                                            </p:txEl>
+                                          </p:spTgt>
+                                        </p:tgtEl>
+                                        <p:attrNameLst>
+                                          <p:attrName>style.visibility</p:attrName>
+                                        </p:attrNameLst>
+                                      </p:cBhvr>
+                                      <p:to>
+                                        <p:strVal val="visible"/>
+                                      </p:to>
+                                    </p:set>
+                                  </p:childTnLst>
+                                </p:cTn>
+                              </p:par>
+                              <p:par>
+                                <p:cTn id="7" presetID="1" presetClass="entr" presetSubtype="0" fill="hold" grpId="0" nodeType="withEffect">
+                                  <p:stCondLst>
+                                    <p:cond delay="0"/>
+                                  </p:stCondLst>
+                                  <p:childTnLst>
+                                    <p:set>
+                                      <p:cBhvr>
+                                        <p:cTn id="8" dur="1" fill="hold">
+                                          <p:stCondLst>
+                                            <p:cond delay="0"/>
+                                          </p:stCondLst>
+                                        </p:cTn>
+                                        <p:tgtEl>
+                                          <p:spTgt spid="6">
+                                            <p:txEl>
+                                              <p:pRg st="1" end="1"/>
+                                            </p:txEl>
+                                          </p:spTgt>
+                                        </p:tgtEl>
+                                        <p:attrNameLst>
+                                          <p:attrName>style.visibility</p:attrName>
+                                        </p:attrNameLst>
+                                      </p:cBhvr>
+                                      <p:to>
+                                        <p:strVal val="visible"/>
+                                      </p:to>
+                                    </p:set>
+                                  </p:childTnLst>
+                                </p:cTn>
+                              </p:par>
+                              <p:par>
+                                <p:cTn id="9" presetID="1" presetClass="entr" presetSubtype="0" fill="hold" grpId="0" nodeType="withEffect">
+                                  <p:stCondLst>
+                                    <p:cond delay="0"/>
+                                  </p:stCondLst>
+                                  <p:childTnLst>
+                                    <p:set>
+                                      <p:cBhvr>
+                                        <p:cTn id="10" dur="1" fill="hold">
+                                          <p:stCondLst>
+                                            <p:cond delay="0"/>
+                                          </p:stCondLst>
+                                        </p:cTn>
+                                        <p:tgtEl>
+                                          <p:spTgt spid="7"/>
+                                        </p:tgtEl>
+                                        <p:attrNameLst>
+                                          <p:attrName>style.visibility</p:attrName>
+                                        </p:attrNameLst>
+                                      </p:cBhvr>
+                                      <p:to>
+                                        <p:strVal val="visible"/>
+                                      </p:to>
+                                    </p:set>
+                                  </p:childTnLst>
+                                </p:cTn>
+                              </p:par>
+                            </p:childTnLst>
+                          </p:cTn>
+                        </p:par>
+                      </p:childTnLst>
+                    </p:cTn>
+                  </p:par>
+                  <p:par>
+                    <p:cTn id="11" fill="hold">
+                      <p:stCondLst>
+                        <p:cond delay="indefinite"/>
+                      </p:stCondLst>
+                      <p:childTnLst>
+                        <p:par>
+                          <p:cTn id="12" fill="hold">
+                            <p:stCondLst>
+                              <p:cond delay="0"/>
+                            </p:stCondLst>
+                            <p:childTnLst>
+                              <p:par>
+                                <p:cTn id="13" presetID="1" presetClass="entr" presetSubtype="0" fill="hold" grpId="0" nodeType="clickEffect">
+                                  <p:stCondLst>
+                                    <p:cond delay="0"/>
+                                  </p:stCondLst>
+                                  <p:childTnLst>
+                                    <p:set>
+                                      <p:cBhvr>
+                                        <p:cTn id="14" dur="1" fill="hold">
+                                          <p:stCondLst>
+                                            <p:cond delay="0"/>
+                                          </p:stCondLst>
+                                        </p:cTn>
+                                        <p:tgtEl>
+                                          <p:spTgt spid="6">
+                                            <p:txEl>
+                                              <p:pRg st="3" end="3"/>
+                                            </p:txEl>
+                                          </p:spTgt>
+                                        </p:tgtEl>
+                                        <p:attrNameLst>
+                                          <p:attrName>style.visibility</p:attrName>
+                                        </p:attrNameLst>
+                                      </p:cBhvr>
+                                      <p:to>
+                                        <p:strVal val="visible"/>
+                                      </p:to>
+                                    </p:set>
+                                  </p:childTnLst>
+                                </p:cTn>
+                              </p:par>
+                              <p:par>
+                                <p:cTn id="15" presetID="1" presetClass="entr" presetSubtype="0" fill="hold" grpId="0" nodeType="withEffect">
+                                  <p:stCondLst>
+                                    <p:cond delay="0"/>
+                                  </p:stCondLst>
+                                  <p:childTnLst>
+                                    <p:set>
+                                      <p:cBhvr>
+                                        <p:cTn id="16" dur="1" fill="hold">
+                                          <p:stCondLst>
+                                            <p:cond delay="0"/>
+                                          </p:stCondLst>
+                                        </p:cTn>
+                                        <p:tgtEl>
+                                          <p:spTgt spid="6">
+                                            <p:txEl>
+                                              <p:pRg st="4" end="4"/>
+                                            </p:txEl>
+                                          </p:spTgt>
+                                        </p:tgtEl>
+                                        <p:attrNameLst>
+                                          <p:attrName>style.visibility</p:attrName>
+                                        </p:attrNameLst>
+                                      </p:cBhvr>
+                                      <p:to>
+                                        <p:strVal val="visible"/>
+                                      </p:to>
+                                    </p:set>
+                                  </p:childTnLst>
+                                </p:cTn>
+                              </p:par>
+                              <p:par>
+                                <p:cTn id="17" presetID="1" presetClass="entr" presetSubtype="0" fill="hold" grpId="0" nodeType="withEffect">
+                                  <p:stCondLst>
+                                    <p:cond delay="0"/>
+                                  </p:stCondLst>
+                                  <p:childTnLst>
+                                    <p:set>
+                                      <p:cBhvr>
+                                        <p:cTn id="18" dur="1" fill="hold">
+                                          <p:stCondLst>
+                                            <p:cond delay="0"/>
+                                          </p:stCondLst>
+                                        </p:cTn>
+                                        <p:tgtEl>
+                                          <p:spTgt spid="8"/>
+                                        </p:tgtEl>
+                                        <p:attrNameLst>
+                                          <p:attrName>style.visibility</p:attrName>
+                                        </p:attrNameLst>
+                                      </p:cBhvr>
+                                      <p:to>
+                                        <p:strVal val="visible"/>
+                                      </p:to>
+                                    </p:set>
+                                  </p:childTnLst>
+                                </p:cTn>
+                              </p:par>
+                            </p:childTnLst>
+                          </p:cTn>
+                        </p:par>
+                      </p:childTnLst>
+                    </p:cTn>
+                  </p:par>
+                  <p:par>
+                    <p:cTn id="19" fill="hold">
+                      <p:stCondLst>
+                        <p:cond delay="indefinite"/>
+                      </p:stCondLst>
+                      <p:childTnLst>
+                        <p:par>
+                          <p:cTn id="20" fill="hold">
+                            <p:stCondLst>
+                              <p:cond delay="0"/>
+                            </p:stCondLst>
+                            <p:childTnLst>
+                              <p:par>
+                                <p:cTn id="21" presetID="1" presetClass="entr" presetSubtype="0" fill="hold" grpId="0" nodeType="clickEffect">
+                                  <p:stCondLst>
+                                    <p:cond delay="0"/>
+                                  </p:stCondLst>
+                                  <p:childTnLst>
+                                    <p:set>
+                                      <p:cBhvr>
+                                        <p:cTn id="22" dur="1" fill="hold">
+                                          <p:stCondLst>
+                                            <p:cond delay="0"/>
+                                          </p:stCondLst>
+                                        </p:cTn>
+                                        <p:tgtEl>
+                                          <p:spTgt spid="6">
+                                            <p:txEl>
+                                              <p:pRg st="6" end="6"/>
+                                            </p:txEl>
+                                          </p:spTgt>
+                                        </p:tgtEl>
+                                        <p:attrNameLst>
+                                          <p:attrName>style.visibility</p:attrName>
+                                        </p:attrNameLst>
+                                      </p:cBhvr>
+                                      <p:to>
+                                        <p:strVal val="visible"/>
+                                      </p:to>
+                                    </p:set>
+                                  </p:childTnLst>
+                                </p:cTn>
+                              </p:par>
+                              <p:par>
+                                <p:cTn id="23" presetID="1" presetClass="entr" presetSubtype="0" fill="hold" grpId="0" nodeType="withEffect">
+                                  <p:stCondLst>
+                                    <p:cond delay="0"/>
+                                  </p:stCondLst>
+                                  <p:childTnLst>
+                                    <p:set>
+                                      <p:cBhvr>
+                                        <p:cTn id="24" dur="1" fill="hold">
+                                          <p:stCondLst>
+                                            <p:cond delay="0"/>
+                                          </p:stCondLst>
+                                        </p:cTn>
+                                        <p:tgtEl>
+                                          <p:spTgt spid="6">
+                                            <p:txEl>
+                                              <p:pRg st="7" end="7"/>
+                                            </p:txEl>
+                                          </p:spTgt>
+                                        </p:tgtEl>
+                                        <p:attrNameLst>
+                                          <p:attrName>style.visibility</p:attrName>
+                                        </p:attrNameLst>
+                                      </p:cBhvr>
+                                      <p:to>
+                                        <p:strVal val="visible"/>
+                                      </p:to>
+                                    </p:set>
+                                  </p:childTnLst>
+                                </p:cTn>
+                              </p:par>
+                              <p:par>
+                                <p:cTn id="25" presetID="1" presetClass="entr" presetSubtype="0" fill="hold" grpId="0" nodeType="withEffect">
+                                  <p:stCondLst>
+                                    <p:cond delay="0"/>
+                                  </p:stCondLst>
+                                  <p:childTnLst>
+                                    <p:set>
+                                      <p:cBhvr>
+                                        <p:cTn id="26" dur="1" fill="hold">
+                                          <p:stCondLst>
+                                            <p:cond delay="0"/>
+                                          </p:stCondLst>
+                                        </p:cTn>
+                                        <p:tgtEl>
+                                          <p:spTgt spid="9"/>
+                                        </p:tgtEl>
+                                        <p:attrNameLst>
+                                          <p:attrName>style.visibility</p:attrName>
+                                        </p:attrNameLst>
+                                      </p:cBhvr>
+                                      <p:to>
+                                        <p:strVal val="visible"/>
+                                      </p:to>
+                                    </p:set>
+                                  </p:childTnLst>
+                                </p:cTn>
+                              </p:par>
+                            </p:childTnLst>
+                          </p:cTn>
+                        </p:par>
+                      </p:childTnLst>
+                    </p:cTn>
+                  </p:par>
+                </p:childTnLst>
+              </p:cTn>
+              <p:prevCondLst>
+                <p:cond evt="onPrev" delay="0">
+                  <p:tgtEl>
+                    <p:sldTgt/>
+                  </p:tgtEl>
+                </p:cond>
+              </p:prevCondLst>
+              <p:nextCondLst>
+                <p:cond evt="onNext" delay="0">
+                  <p:tgtEl>
+                    <p:sldTgt/>
+                  </p:tgtEl>
+                </p:cond>
+              </p:nextCondLst>
+            </p:seq>
+          </p:childTnLst>
+        </p:cTn>
+      </p:par>
+    </p:tnLst>
+    <p:bldLst>
+      <p:bldP spid="6" grpId="0" uiExpand="1" build="p"/>
+      <p:bldP spid="7" grpId="0" animBg="1"/>
+      <p:bldP spid="8" grpId="0" animBg="1"/>
+      <p:bldP spid="9" grpId="0" animBg="1"/>
+    </p:bldLst>
+  </p:timing>
 </p:sld>
 </file>
 

</xml_diff>

<commit_message>
Added slides on pointers, type casting/typedefs, extension types, conclusions, references
</commit_message>
<xml_diff>
--- a/Python/Cython/cython.pptx
+++ b/Python/Cython/cython.pptx
@@ -5,7 +5,7 @@
     <p:sldMasterId id="2147483648" r:id="rId1"/>
   </p:sldMasterIdLst>
   <p:notesMasterIdLst>
-    <p:notesMasterId r:id="rId25"/>
+    <p:notesMasterId r:id="rId32"/>
   </p:notesMasterIdLst>
   <p:sldIdLst>
     <p:sldId id="256" r:id="rId2"/>
@@ -20,17 +20,24 @@
     <p:sldId id="264" r:id="rId11"/>
     <p:sldId id="279" r:id="rId12"/>
     <p:sldId id="276" r:id="rId13"/>
-    <p:sldId id="268" r:id="rId14"/>
-    <p:sldId id="267" r:id="rId15"/>
-    <p:sldId id="272" r:id="rId16"/>
-    <p:sldId id="269" r:id="rId17"/>
-    <p:sldId id="270" r:id="rId18"/>
-    <p:sldId id="271" r:id="rId19"/>
-    <p:sldId id="273" r:id="rId20"/>
-    <p:sldId id="274" r:id="rId21"/>
+    <p:sldId id="283" r:id="rId14"/>
+    <p:sldId id="268" r:id="rId15"/>
+    <p:sldId id="267" r:id="rId16"/>
+    <p:sldId id="272" r:id="rId17"/>
+    <p:sldId id="269" r:id="rId18"/>
+    <p:sldId id="270" r:id="rId19"/>
+    <p:sldId id="271" r:id="rId20"/>
+    <p:sldId id="273" r:id="rId21"/>
     <p:sldId id="275" r:id="rId22"/>
     <p:sldId id="277" r:id="rId23"/>
     <p:sldId id="278" r:id="rId24"/>
+    <p:sldId id="282" r:id="rId25"/>
+    <p:sldId id="280" r:id="rId26"/>
+    <p:sldId id="281" r:id="rId27"/>
+    <p:sldId id="287" r:id="rId28"/>
+    <p:sldId id="284" r:id="rId29"/>
+    <p:sldId id="285" r:id="rId30"/>
+    <p:sldId id="286" r:id="rId31"/>
   </p:sldIdLst>
   <p:sldSz cx="9144000" cy="6858000" type="screen4x3"/>
   <p:notesSz cx="6858000" cy="9144000"/>
@@ -150,6 +157,7 @@
             <p14:sldId id="264"/>
             <p14:sldId id="279"/>
             <p14:sldId id="276"/>
+            <p14:sldId id="283"/>
             <p14:sldId id="268"/>
             <p14:sldId id="267"/>
             <p14:sldId id="272"/>
@@ -157,16 +165,22 @@
             <p14:sldId id="270"/>
             <p14:sldId id="271"/>
             <p14:sldId id="273"/>
-            <p14:sldId id="274"/>
             <p14:sldId id="275"/>
             <p14:sldId id="277"/>
             <p14:sldId id="278"/>
+            <p14:sldId id="282"/>
+            <p14:sldId id="280"/>
+            <p14:sldId id="281"/>
+            <p14:sldId id="287"/>
+            <p14:sldId id="284"/>
+            <p14:sldId id="285"/>
+            <p14:sldId id="286"/>
           </p14:sldIdLst>
         </p14:section>
       </p14:sectionLst>
     </p:ext>
     <p:ext uri="{EFAFB233-063F-42B5-8137-9DF3F51BA10A}">
-      <p15:sldGuideLst xmlns="" xmlns:p15="http://schemas.microsoft.com/office/powerpoint/2012/main">
+      <p15:sldGuideLst xmlns:p15="http://schemas.microsoft.com/office/powerpoint/2012/main">
         <p15:guide id="1" orient="horz" pos="2160">
           <p15:clr>
             <a:srgbClr val="A4A3A4"/>
@@ -265,7 +279,7 @@
           <a:p>
             <a:fld id="{16B045E4-7DA3-41B9-B0DA-4BEE0876FA88}" type="datetimeFigureOut">
               <a:rPr lang="nl-BE" smtClean="0"/>
-              <a:t>25/02/2016</a:t>
+              <a:t>2016-02-25</a:t>
             </a:fld>
             <a:endParaRPr lang="nl-BE"/>
           </a:p>
@@ -714,7 +728,7 @@
           <a:p>
             <a:fld id="{53B2420D-148A-400F-B88D-527DF6E13622}" type="datetime1">
               <a:rPr lang="en-US" smtClean="0"/>
-              <a:t>2016-02-25</a:t>
+              <a:t>2/25/2016</a:t>
             </a:fld>
             <a:endParaRPr lang="en-US"/>
           </a:p>
@@ -880,7 +894,7 @@
           <a:p>
             <a:fld id="{52A01B9A-6787-4B63-BAEF-E3CF67589D82}" type="datetime1">
               <a:rPr lang="en-US" smtClean="0"/>
-              <a:t>2016-02-25</a:t>
+              <a:t>2/25/2016</a:t>
             </a:fld>
             <a:endParaRPr lang="en-US"/>
           </a:p>
@@ -1056,7 +1070,7 @@
           <a:p>
             <a:fld id="{6E982D42-2071-4A3D-B614-2380183202E1}" type="datetime1">
               <a:rPr lang="en-US" smtClean="0"/>
-              <a:t>2016-02-25</a:t>
+              <a:t>2/25/2016</a:t>
             </a:fld>
             <a:endParaRPr lang="en-US"/>
           </a:p>
@@ -1222,7 +1236,7 @@
           <a:p>
             <a:fld id="{2E90E067-04B9-40C0-BFE6-53BAD2F7119C}" type="datetime1">
               <a:rPr lang="en-US" smtClean="0"/>
-              <a:t>2016-02-25</a:t>
+              <a:t>2/25/2016</a:t>
             </a:fld>
             <a:endParaRPr lang="en-US"/>
           </a:p>
@@ -1464,7 +1478,7 @@
           <a:p>
             <a:fld id="{D7CB2E72-949E-4479-B957-DBA32EC1FAB9}" type="datetime1">
               <a:rPr lang="en-US" smtClean="0"/>
-              <a:t>2016-02-25</a:t>
+              <a:t>2/25/2016</a:t>
             </a:fld>
             <a:endParaRPr lang="en-US"/>
           </a:p>
@@ -1748,7 +1762,7 @@
           <a:p>
             <a:fld id="{A06819D6-C5C8-405A-96EE-DAC9728267C0}" type="datetime1">
               <a:rPr lang="en-US" smtClean="0"/>
-              <a:t>2016-02-25</a:t>
+              <a:t>2/25/2016</a:t>
             </a:fld>
             <a:endParaRPr lang="en-US"/>
           </a:p>
@@ -2166,7 +2180,7 @@
           <a:p>
             <a:fld id="{476A766D-F1AD-47B2-B323-71C0AAEFC468}" type="datetime1">
               <a:rPr lang="en-US" smtClean="0"/>
-              <a:t>2016-02-25</a:t>
+              <a:t>2/25/2016</a:t>
             </a:fld>
             <a:endParaRPr lang="en-US"/>
           </a:p>
@@ -2280,7 +2294,7 @@
           <a:p>
             <a:fld id="{E8021487-0835-4E27-A96A-FE7FCF3265BD}" type="datetime1">
               <a:rPr lang="en-US" smtClean="0"/>
-              <a:t>2016-02-25</a:t>
+              <a:t>2/25/2016</a:t>
             </a:fld>
             <a:endParaRPr lang="en-US"/>
           </a:p>
@@ -2371,7 +2385,7 @@
           <a:p>
             <a:fld id="{D8423321-723F-439B-A2FC-3D1497BCF824}" type="datetime1">
               <a:rPr lang="en-US" smtClean="0"/>
-              <a:t>2016-02-25</a:t>
+              <a:t>2/25/2016</a:t>
             </a:fld>
             <a:endParaRPr lang="en-US"/>
           </a:p>
@@ -2644,7 +2658,7 @@
           <a:p>
             <a:fld id="{C23318F9-3CB8-42B9-8393-7570C1C1A70D}" type="datetime1">
               <a:rPr lang="en-US" smtClean="0"/>
-              <a:t>2016-02-25</a:t>
+              <a:t>2/25/2016</a:t>
             </a:fld>
             <a:endParaRPr lang="en-US"/>
           </a:p>
@@ -2893,7 +2907,7 @@
           <a:p>
             <a:fld id="{6867E127-D066-4A1C-B918-F70FF61E725D}" type="datetime1">
               <a:rPr lang="en-US" smtClean="0"/>
-              <a:t>2016-02-25</a:t>
+              <a:t>2/25/2016</a:t>
             </a:fld>
             <a:endParaRPr lang="en-US"/>
           </a:p>
@@ -3102,7 +3116,7 @@
           <a:p>
             <a:fld id="{E6FF7314-6885-4B6E-804E-F9FE9C155D78}" type="datetime1">
               <a:rPr lang="en-US" smtClean="0"/>
-              <a:t>2016-02-25</a:t>
+              <a:t>2/25/2016</a:t>
             </a:fld>
             <a:endParaRPr lang="en-US"/>
           </a:p>
@@ -3570,6 +3584,13 @@
   <p:clrMapOvr>
     <a:masterClrMapping/>
   </p:clrMapOvr>
+  <p:timing>
+    <p:tnLst>
+      <p:par>
+        <p:cTn id="1" dur="indefinite" restart="never" nodeType="tmRoot"/>
+      </p:par>
+    </p:tnLst>
+  </p:timing>
 </p:sld>
 </file>
 
@@ -4270,7 +4291,11 @@
           <a:p>
             <a:r>
               <a:rPr lang="en-US" dirty="0" smtClean="0"/>
-              <a:t>Type casts</a:t>
+              <a:t>Type casts &amp; </a:t>
+            </a:r>
+            <a:r>
+              <a:rPr lang="en-US" dirty="0" err="1" smtClean="0"/>
+              <a:t>typedefs</a:t>
             </a:r>
             <a:endParaRPr lang="nl-BE" dirty="0"/>
           </a:p>
@@ -4291,7 +4316,134 @@
           <a:bodyPr/>
           <a:lstStyle/>
           <a:p>
-            <a:endParaRPr lang="nl-BE"/>
+            <a:r>
+              <a:rPr lang="en-US" dirty="0" smtClean="0"/>
+              <a:t>Type casting</a:t>
+            </a:r>
+          </a:p>
+          <a:p>
+            <a:pPr lvl="1"/>
+            <a:r>
+              <a:rPr lang="en-US" dirty="0" smtClean="0"/>
+              <a:t>In C: </a:t>
+            </a:r>
+            <a:r>
+              <a:rPr lang="en-US" dirty="0" smtClean="0">
+                <a:latin typeface="Courier New" panose="02070309020205020404" pitchFamily="49" charset="0"/>
+                <a:cs typeface="Courier New" panose="02070309020205020404" pitchFamily="49" charset="0"/>
+              </a:rPr>
+              <a:t>a = (</a:t>
+            </a:r>
+            <a:r>
+              <a:rPr lang="en-US" dirty="0" err="1" smtClean="0">
+                <a:latin typeface="Courier New" panose="02070309020205020404" pitchFamily="49" charset="0"/>
+                <a:cs typeface="Courier New" panose="02070309020205020404" pitchFamily="49" charset="0"/>
+              </a:rPr>
+              <a:t>int</a:t>
+            </a:r>
+            <a:r>
+              <a:rPr lang="en-US" dirty="0" smtClean="0">
+                <a:latin typeface="Courier New" panose="02070309020205020404" pitchFamily="49" charset="0"/>
+                <a:cs typeface="Courier New" panose="02070309020205020404" pitchFamily="49" charset="0"/>
+              </a:rPr>
+              <a:t>) b</a:t>
+            </a:r>
+          </a:p>
+          <a:p>
+            <a:pPr lvl="1"/>
+            <a:r>
+              <a:rPr lang="en-US" dirty="0" smtClean="0"/>
+              <a:t>In </a:t>
+            </a:r>
+            <a:r>
+              <a:rPr lang="en-US" dirty="0" err="1" smtClean="0"/>
+              <a:t>Cython</a:t>
+            </a:r>
+            <a:r>
+              <a:rPr lang="en-US" dirty="0" smtClean="0"/>
+              <a:t>: </a:t>
+            </a:r>
+            <a:r>
+              <a:rPr lang="en-US" dirty="0" smtClean="0">
+                <a:latin typeface="Courier New" panose="02070309020205020404" pitchFamily="49" charset="0"/>
+                <a:cs typeface="Courier New" panose="02070309020205020404" pitchFamily="49" charset="0"/>
+              </a:rPr>
+              <a:t>a = &lt;</a:t>
+            </a:r>
+            <a:r>
+              <a:rPr lang="en-US" dirty="0" err="1" smtClean="0">
+                <a:latin typeface="Courier New" panose="02070309020205020404" pitchFamily="49" charset="0"/>
+                <a:cs typeface="Courier New" panose="02070309020205020404" pitchFamily="49" charset="0"/>
+              </a:rPr>
+              <a:t>int</a:t>
+            </a:r>
+            <a:r>
+              <a:rPr lang="en-US" dirty="0" smtClean="0">
+                <a:latin typeface="Courier New" panose="02070309020205020404" pitchFamily="49" charset="0"/>
+                <a:cs typeface="Courier New" panose="02070309020205020404" pitchFamily="49" charset="0"/>
+              </a:rPr>
+              <a:t>&gt; b</a:t>
+            </a:r>
+          </a:p>
+          <a:p>
+            <a:r>
+              <a:rPr lang="en-US" dirty="0" smtClean="0"/>
+              <a:t>Type aliases</a:t>
+            </a:r>
+          </a:p>
+          <a:p>
+            <a:pPr lvl="1"/>
+            <a:r>
+              <a:rPr lang="en-US" dirty="0" smtClean="0"/>
+              <a:t>In C: </a:t>
+            </a:r>
+            <a:r>
+              <a:rPr lang="en-US" dirty="0" err="1" smtClean="0">
+                <a:latin typeface="Courier New" panose="02070309020205020404" pitchFamily="49" charset="0"/>
+                <a:cs typeface="Courier New" panose="02070309020205020404" pitchFamily="49" charset="0"/>
+              </a:rPr>
+              <a:t>typedef</a:t>
+            </a:r>
+            <a:r>
+              <a:rPr lang="en-US" dirty="0" smtClean="0">
+                <a:latin typeface="Courier New" panose="02070309020205020404" pitchFamily="49" charset="0"/>
+                <a:cs typeface="Courier New" panose="02070309020205020404" pitchFamily="49" charset="0"/>
+              </a:rPr>
+              <a:t> double real</a:t>
+            </a:r>
+          </a:p>
+          <a:p>
+            <a:pPr lvl="1"/>
+            <a:r>
+              <a:rPr lang="en-US" dirty="0" smtClean="0"/>
+              <a:t>In </a:t>
+            </a:r>
+            <a:r>
+              <a:rPr lang="en-US" dirty="0" err="1" smtClean="0"/>
+              <a:t>Cython</a:t>
+            </a:r>
+            <a:r>
+              <a:rPr lang="en-US" dirty="0" smtClean="0"/>
+              <a:t>: </a:t>
+            </a:r>
+            <a:r>
+              <a:rPr lang="en-US" dirty="0" err="1" smtClean="0">
+                <a:latin typeface="Courier New" panose="02070309020205020404" pitchFamily="49" charset="0"/>
+                <a:cs typeface="Courier New" panose="02070309020205020404" pitchFamily="49" charset="0"/>
+              </a:rPr>
+              <a:t>ctypedef</a:t>
+            </a:r>
+            <a:r>
+              <a:rPr lang="en-US" dirty="0" smtClean="0">
+                <a:latin typeface="Courier New" panose="02070309020205020404" pitchFamily="49" charset="0"/>
+                <a:cs typeface="Courier New" panose="02070309020205020404" pitchFamily="49" charset="0"/>
+              </a:rPr>
+              <a:t> double real</a:t>
+            </a:r>
+            <a:endParaRPr lang="nl-BE" dirty="0">
+              <a:latin typeface="Courier New" panose="02070309020205020404" pitchFamily="49" charset="0"/>
+              <a:cs typeface="Courier New" panose="02070309020205020404" pitchFamily="49" charset="0"/>
+            </a:endParaRPr>
           </a:p>
         </p:txBody>
       </p:sp>
@@ -5568,6 +5720,1142 @@
       </p:grpSpPr>
       <p:sp>
         <p:nvSpPr>
+          <p:cNvPr id="5" name="Title 4"/>
+          <p:cNvSpPr>
+            <a:spLocks noGrp="1"/>
+          </p:cNvSpPr>
+          <p:nvPr>
+            <p:ph type="title"/>
+          </p:nvPr>
+        </p:nvSpPr>
+        <p:spPr/>
+        <p:txBody>
+          <a:bodyPr/>
+          <a:lstStyle/>
+          <a:p>
+            <a:r>
+              <a:rPr lang="en-US" dirty="0" smtClean="0"/>
+              <a:t>Pointers</a:t>
+            </a:r>
+            <a:endParaRPr lang="nl-BE" dirty="0"/>
+          </a:p>
+        </p:txBody>
+      </p:sp>
+      <p:sp>
+        <p:nvSpPr>
+          <p:cNvPr id="6" name="Content Placeholder 5"/>
+          <p:cNvSpPr>
+            <a:spLocks noGrp="1"/>
+          </p:cNvSpPr>
+          <p:nvPr>
+            <p:ph idx="1"/>
+          </p:nvPr>
+        </p:nvSpPr>
+        <p:spPr/>
+        <p:txBody>
+          <a:bodyPr>
+            <a:normAutofit lnSpcReduction="10000"/>
+          </a:bodyPr>
+          <a:lstStyle/>
+          <a:p>
+            <a:r>
+              <a:rPr lang="en-US" dirty="0" smtClean="0"/>
+              <a:t>Declaring pointer variable</a:t>
+            </a:r>
+          </a:p>
+          <a:p>
+            <a:endParaRPr lang="en-US" dirty="0"/>
+          </a:p>
+          <a:p>
+            <a:r>
+              <a:rPr lang="en-US" dirty="0" smtClean="0"/>
+              <a:t>Address operator</a:t>
+            </a:r>
+          </a:p>
+          <a:p>
+            <a:endParaRPr lang="en-US" dirty="0"/>
+          </a:p>
+          <a:p>
+            <a:r>
+              <a:rPr lang="en-US" dirty="0" smtClean="0"/>
+              <a:t>Dereferencing</a:t>
+            </a:r>
+          </a:p>
+          <a:p>
+            <a:endParaRPr lang="en-US" dirty="0"/>
+          </a:p>
+          <a:p>
+            <a:pPr lvl="1"/>
+            <a:r>
+              <a:rPr lang="en-US" dirty="0" smtClean="0"/>
+              <a:t>C: </a:t>
+            </a:r>
+            <a:r>
+              <a:rPr lang="en-US" dirty="0" smtClean="0">
+                <a:latin typeface="Courier New" panose="02070309020205020404" pitchFamily="49" charset="0"/>
+                <a:cs typeface="Courier New" panose="02070309020205020404" pitchFamily="49" charset="0"/>
+              </a:rPr>
+              <a:t>*p</a:t>
+            </a:r>
+          </a:p>
+          <a:p>
+            <a:pPr lvl="1"/>
+            <a:r>
+              <a:rPr lang="en-US" dirty="0" err="1" smtClean="0"/>
+              <a:t>Cython</a:t>
+            </a:r>
+            <a:r>
+              <a:rPr lang="en-US" dirty="0" smtClean="0"/>
+              <a:t>: </a:t>
+            </a:r>
+            <a:r>
+              <a:rPr lang="en-US" dirty="0" smtClean="0">
+                <a:latin typeface="Courier New" panose="02070309020205020404" pitchFamily="49" charset="0"/>
+                <a:cs typeface="Courier New" panose="02070309020205020404" pitchFamily="49" charset="0"/>
+              </a:rPr>
+              <a:t>p[0]</a:t>
+            </a:r>
+          </a:p>
+        </p:txBody>
+      </p:sp>
+      <p:sp>
+        <p:nvSpPr>
+          <p:cNvPr id="4" name="Slide Number Placeholder 3"/>
+          <p:cNvSpPr>
+            <a:spLocks noGrp="1"/>
+          </p:cNvSpPr>
+          <p:nvPr>
+            <p:ph type="sldNum" sz="quarter" idx="12"/>
+          </p:nvPr>
+        </p:nvSpPr>
+        <p:spPr/>
+        <p:txBody>
+          <a:bodyPr/>
+          <a:lstStyle/>
+          <a:p>
+            <a:fld id="{B6F15528-21DE-4FAA-801E-634DDDAF4B2B}" type="slidenum">
+              <a:rPr lang="en-US" smtClean="0"/>
+              <a:pPr/>
+              <a:t>13</a:t>
+            </a:fld>
+            <a:endParaRPr lang="en-US"/>
+          </a:p>
+        </p:txBody>
+      </p:sp>
+      <p:sp>
+        <p:nvSpPr>
+          <p:cNvPr id="7" name="TextBox 6"/>
+          <p:cNvSpPr txBox="1"/>
+          <p:nvPr/>
+        </p:nvSpPr>
+        <p:spPr>
+          <a:xfrm>
+            <a:off x="1295400" y="2209800"/>
+            <a:ext cx="2314153" cy="369332"/>
+          </a:xfrm>
+          <a:prstGeom prst="rect">
+            <a:avLst/>
+          </a:prstGeom>
+          <a:solidFill>
+            <a:schemeClr val="bg1">
+              <a:lumMod val="85000"/>
+            </a:schemeClr>
+          </a:solidFill>
+          <a:ln>
+            <a:solidFill>
+              <a:schemeClr val="tx1"/>
+            </a:solidFill>
+          </a:ln>
+        </p:spPr>
+        <p:txBody>
+          <a:bodyPr wrap="square" rtlCol="0">
+            <a:spAutoFit/>
+          </a:bodyPr>
+          <a:lstStyle/>
+          <a:p>
+            <a:r>
+              <a:rPr lang="en-US" dirty="0" err="1" smtClean="0">
+                <a:latin typeface="Courier New" panose="02070309020205020404" pitchFamily="49" charset="0"/>
+                <a:cs typeface="Courier New" panose="02070309020205020404" pitchFamily="49" charset="0"/>
+              </a:rPr>
+              <a:t>cdef</a:t>
+            </a:r>
+            <a:r>
+              <a:rPr lang="en-US" dirty="0" smtClean="0">
+                <a:latin typeface="Courier New" panose="02070309020205020404" pitchFamily="49" charset="0"/>
+                <a:cs typeface="Courier New" panose="02070309020205020404" pitchFamily="49" charset="0"/>
+              </a:rPr>
+              <a:t> </a:t>
+            </a:r>
+            <a:r>
+              <a:rPr lang="en-US" dirty="0" err="1" smtClean="0">
+                <a:latin typeface="Courier New" panose="02070309020205020404" pitchFamily="49" charset="0"/>
+                <a:cs typeface="Courier New" panose="02070309020205020404" pitchFamily="49" charset="0"/>
+              </a:rPr>
+              <a:t>int</a:t>
+            </a:r>
+            <a:r>
+              <a:rPr lang="en-US" dirty="0" smtClean="0">
+                <a:latin typeface="Courier New" panose="02070309020205020404" pitchFamily="49" charset="0"/>
+                <a:cs typeface="Courier New" panose="02070309020205020404" pitchFamily="49" charset="0"/>
+              </a:rPr>
+              <a:t> </a:t>
+            </a:r>
+            <a:r>
+              <a:rPr lang="en-US" dirty="0">
+                <a:latin typeface="Courier New" panose="02070309020205020404" pitchFamily="49" charset="0"/>
+                <a:cs typeface="Courier New" panose="02070309020205020404" pitchFamily="49" charset="0"/>
+              </a:rPr>
+              <a:t>*</a:t>
+            </a:r>
+            <a:r>
+              <a:rPr lang="en-US" dirty="0" smtClean="0">
+                <a:latin typeface="Courier New" panose="02070309020205020404" pitchFamily="49" charset="0"/>
+                <a:cs typeface="Courier New" panose="02070309020205020404" pitchFamily="49" charset="0"/>
+              </a:rPr>
+              <a:t>p, a</a:t>
+            </a:r>
+          </a:p>
+        </p:txBody>
+      </p:sp>
+      <p:grpSp>
+        <p:nvGrpSpPr>
+          <p:cNvPr id="8" name="Group 7"/>
+          <p:cNvGrpSpPr/>
+          <p:nvPr/>
+        </p:nvGrpSpPr>
+        <p:grpSpPr>
+          <a:xfrm>
+            <a:off x="2895601" y="2514601"/>
+            <a:ext cx="2970373" cy="494252"/>
+            <a:chOff x="3906569" y="2368898"/>
+            <a:chExt cx="2970373" cy="494252"/>
+          </a:xfrm>
+        </p:grpSpPr>
+        <p:sp>
+          <p:nvSpPr>
+            <p:cNvPr id="9" name="TextBox 8"/>
+            <p:cNvSpPr txBox="1"/>
+            <p:nvPr/>
+          </p:nvSpPr>
+          <p:spPr>
+            <a:xfrm>
+              <a:off x="5290097" y="2493818"/>
+              <a:ext cx="1586845" cy="369332"/>
+            </a:xfrm>
+            <a:prstGeom prst="rect">
+              <a:avLst/>
+            </a:prstGeom>
+            <a:solidFill>
+              <a:schemeClr val="bg1"/>
+            </a:solidFill>
+            <a:ln>
+              <a:solidFill>
+                <a:schemeClr val="tx1"/>
+              </a:solidFill>
+            </a:ln>
+          </p:spPr>
+          <p:txBody>
+            <a:bodyPr wrap="none" rtlCol="0">
+              <a:spAutoFit/>
+            </a:bodyPr>
+            <a:lstStyle/>
+            <a:p>
+              <a:r>
+                <a:rPr lang="en-US" dirty="0" smtClean="0"/>
+                <a:t>pointer to </a:t>
+              </a:r>
+              <a:r>
+                <a:rPr lang="en-US" dirty="0" err="1" smtClean="0">
+                  <a:latin typeface="Courier New" panose="02070309020205020404" pitchFamily="49" charset="0"/>
+                  <a:cs typeface="Courier New" panose="02070309020205020404" pitchFamily="49" charset="0"/>
+                </a:rPr>
+                <a:t>int</a:t>
+              </a:r>
+              <a:endParaRPr lang="nl-BE" dirty="0">
+                <a:latin typeface="Courier New" panose="02070309020205020404" pitchFamily="49" charset="0"/>
+                <a:cs typeface="Courier New" panose="02070309020205020404" pitchFamily="49" charset="0"/>
+              </a:endParaRPr>
+            </a:p>
+          </p:txBody>
+        </p:sp>
+        <p:cxnSp>
+          <p:nvCxnSpPr>
+            <p:cNvPr id="10" name="Straight Arrow Connector 9"/>
+            <p:cNvCxnSpPr>
+              <a:stCxn id="9" idx="1"/>
+            </p:cNvCxnSpPr>
+            <p:nvPr/>
+          </p:nvCxnSpPr>
+          <p:spPr>
+            <a:xfrm flipH="1" flipV="1">
+              <a:off x="3906569" y="2368898"/>
+              <a:ext cx="1383528" cy="309586"/>
+            </a:xfrm>
+            <a:prstGeom prst="straightConnector1">
+              <a:avLst/>
+            </a:prstGeom>
+            <a:ln w="19050">
+              <a:solidFill>
+                <a:schemeClr val="tx1"/>
+              </a:solidFill>
+              <a:tailEnd type="stealth" w="lg" len="lg"/>
+            </a:ln>
+          </p:spPr>
+          <p:style>
+            <a:lnRef idx="1">
+              <a:schemeClr val="accent1"/>
+            </a:lnRef>
+            <a:fillRef idx="0">
+              <a:schemeClr val="accent1"/>
+            </a:fillRef>
+            <a:effectRef idx="0">
+              <a:schemeClr val="accent1"/>
+            </a:effectRef>
+            <a:fontRef idx="minor">
+              <a:schemeClr val="tx1"/>
+            </a:fontRef>
+          </p:style>
+        </p:cxnSp>
+      </p:grpSp>
+      <p:grpSp>
+        <p:nvGrpSpPr>
+          <p:cNvPr id="12" name="Group 11"/>
+          <p:cNvGrpSpPr/>
+          <p:nvPr/>
+        </p:nvGrpSpPr>
+        <p:grpSpPr>
+          <a:xfrm>
+            <a:off x="3352800" y="2029920"/>
+            <a:ext cx="3519998" cy="369332"/>
+            <a:chOff x="3219342" y="2493818"/>
+            <a:chExt cx="3519998" cy="369332"/>
+          </a:xfrm>
+        </p:grpSpPr>
+        <p:sp>
+          <p:nvSpPr>
+            <p:cNvPr id="13" name="TextBox 12"/>
+            <p:cNvSpPr txBox="1"/>
+            <p:nvPr/>
+          </p:nvSpPr>
+          <p:spPr>
+            <a:xfrm>
+              <a:off x="5290097" y="2493818"/>
+              <a:ext cx="1449243" cy="369332"/>
+            </a:xfrm>
+            <a:prstGeom prst="rect">
+              <a:avLst/>
+            </a:prstGeom>
+            <a:solidFill>
+              <a:schemeClr val="bg1"/>
+            </a:solidFill>
+            <a:ln>
+              <a:solidFill>
+                <a:schemeClr val="tx1"/>
+              </a:solidFill>
+            </a:ln>
+          </p:spPr>
+          <p:txBody>
+            <a:bodyPr wrap="none" rtlCol="0">
+              <a:spAutoFit/>
+            </a:bodyPr>
+            <a:lstStyle/>
+            <a:p>
+              <a:r>
+                <a:rPr lang="en-US" dirty="0" err="1" smtClean="0">
+                  <a:latin typeface="Courier New" panose="02070309020205020404" pitchFamily="49" charset="0"/>
+                  <a:cs typeface="Courier New" panose="02070309020205020404" pitchFamily="49" charset="0"/>
+                </a:rPr>
+                <a:t>int</a:t>
+              </a:r>
+              <a:r>
+                <a:rPr lang="en-US" dirty="0" smtClean="0">
+                  <a:cs typeface="Courier New" panose="02070309020205020404" pitchFamily="49" charset="0"/>
+                </a:rPr>
+                <a:t> variable</a:t>
+              </a:r>
+              <a:endParaRPr lang="nl-BE" dirty="0">
+                <a:cs typeface="Courier New" panose="02070309020205020404" pitchFamily="49" charset="0"/>
+              </a:endParaRPr>
+            </a:p>
+          </p:txBody>
+        </p:sp>
+        <p:cxnSp>
+          <p:nvCxnSpPr>
+            <p:cNvPr id="14" name="Straight Arrow Connector 13"/>
+            <p:cNvCxnSpPr>
+              <a:stCxn id="13" idx="1"/>
+            </p:cNvCxnSpPr>
+            <p:nvPr/>
+          </p:nvCxnSpPr>
+          <p:spPr>
+            <a:xfrm flipH="1">
+              <a:off x="3219342" y="2678484"/>
+              <a:ext cx="2070755" cy="184666"/>
+            </a:xfrm>
+            <a:prstGeom prst="straightConnector1">
+              <a:avLst/>
+            </a:prstGeom>
+            <a:ln w="19050">
+              <a:solidFill>
+                <a:schemeClr val="tx1"/>
+              </a:solidFill>
+              <a:tailEnd type="stealth" w="lg" len="lg"/>
+            </a:ln>
+          </p:spPr>
+          <p:style>
+            <a:lnRef idx="1">
+              <a:schemeClr val="accent1"/>
+            </a:lnRef>
+            <a:fillRef idx="0">
+              <a:schemeClr val="accent1"/>
+            </a:fillRef>
+            <a:effectRef idx="0">
+              <a:schemeClr val="accent1"/>
+            </a:effectRef>
+            <a:fontRef idx="minor">
+              <a:schemeClr val="tx1"/>
+            </a:fontRef>
+          </p:style>
+        </p:cxnSp>
+      </p:grpSp>
+      <p:sp>
+        <p:nvSpPr>
+          <p:cNvPr id="16" name="TextBox 15"/>
+          <p:cNvSpPr txBox="1"/>
+          <p:nvPr/>
+        </p:nvSpPr>
+        <p:spPr>
+          <a:xfrm>
+            <a:off x="1295400" y="3288268"/>
+            <a:ext cx="2314153" cy="369332"/>
+          </a:xfrm>
+          <a:prstGeom prst="rect">
+            <a:avLst/>
+          </a:prstGeom>
+          <a:solidFill>
+            <a:schemeClr val="bg1">
+              <a:lumMod val="85000"/>
+            </a:schemeClr>
+          </a:solidFill>
+          <a:ln>
+            <a:solidFill>
+              <a:schemeClr val="tx1"/>
+            </a:solidFill>
+          </a:ln>
+        </p:spPr>
+        <p:txBody>
+          <a:bodyPr wrap="square" rtlCol="0">
+            <a:spAutoFit/>
+          </a:bodyPr>
+          <a:lstStyle/>
+          <a:p>
+            <a:r>
+              <a:rPr lang="en-US" dirty="0" smtClean="0">
+                <a:latin typeface="Courier New" panose="02070309020205020404" pitchFamily="49" charset="0"/>
+                <a:cs typeface="Courier New" panose="02070309020205020404" pitchFamily="49" charset="0"/>
+              </a:rPr>
+              <a:t>p = &amp;a</a:t>
+            </a:r>
+          </a:p>
+        </p:txBody>
+      </p:sp>
+      <p:sp>
+        <p:nvSpPr>
+          <p:cNvPr id="17" name="TextBox 16"/>
+          <p:cNvSpPr txBox="1"/>
+          <p:nvPr/>
+        </p:nvSpPr>
+        <p:spPr>
+          <a:xfrm>
+            <a:off x="1295400" y="4343400"/>
+            <a:ext cx="2314153" cy="369332"/>
+          </a:xfrm>
+          <a:prstGeom prst="rect">
+            <a:avLst/>
+          </a:prstGeom>
+          <a:solidFill>
+            <a:schemeClr val="bg1">
+              <a:lumMod val="85000"/>
+            </a:schemeClr>
+          </a:solidFill>
+          <a:ln>
+            <a:solidFill>
+              <a:schemeClr val="tx1"/>
+            </a:solidFill>
+          </a:ln>
+        </p:spPr>
+        <p:txBody>
+          <a:bodyPr wrap="square" rtlCol="0">
+            <a:spAutoFit/>
+          </a:bodyPr>
+          <a:lstStyle/>
+          <a:p>
+            <a:r>
+              <a:rPr lang="en-US" dirty="0" smtClean="0">
+                <a:latin typeface="Courier New" panose="02070309020205020404" pitchFamily="49" charset="0"/>
+                <a:cs typeface="Courier New" panose="02070309020205020404" pitchFamily="49" charset="0"/>
+              </a:rPr>
+              <a:t>p[0] += 1</a:t>
+            </a:r>
+          </a:p>
+        </p:txBody>
+      </p:sp>
+      <p:sp>
+        <p:nvSpPr>
+          <p:cNvPr id="18" name="TextBox 17"/>
+          <p:cNvSpPr txBox="1"/>
+          <p:nvPr/>
+        </p:nvSpPr>
+        <p:spPr>
+          <a:xfrm>
+            <a:off x="4344313" y="3276600"/>
+            <a:ext cx="2621423" cy="400110"/>
+          </a:xfrm>
+          <a:prstGeom prst="rect">
+            <a:avLst/>
+          </a:prstGeom>
+          <a:noFill/>
+        </p:spPr>
+        <p:txBody>
+          <a:bodyPr wrap="none" rtlCol="0">
+            <a:spAutoFit/>
+          </a:bodyPr>
+          <a:lstStyle/>
+          <a:p>
+            <a:r>
+              <a:rPr lang="en-US" sz="2000" dirty="0" smtClean="0">
+                <a:latin typeface="Courier New" panose="02070309020205020404" pitchFamily="49" charset="0"/>
+                <a:cs typeface="Courier New" panose="02070309020205020404" pitchFamily="49" charset="0"/>
+              </a:rPr>
+              <a:t>p</a:t>
+            </a:r>
+            <a:r>
+              <a:rPr lang="en-US" sz="2000" dirty="0" smtClean="0"/>
+              <a:t> contains address of </a:t>
+            </a:r>
+            <a:r>
+              <a:rPr lang="en-US" sz="2000" dirty="0" smtClean="0">
+                <a:latin typeface="Courier New" panose="02070309020205020404" pitchFamily="49" charset="0"/>
+                <a:cs typeface="Courier New" panose="02070309020205020404" pitchFamily="49" charset="0"/>
+              </a:rPr>
+              <a:t>a</a:t>
+            </a:r>
+            <a:endParaRPr lang="nl-BE" sz="2000" dirty="0">
+              <a:latin typeface="Courier New" panose="02070309020205020404" pitchFamily="49" charset="0"/>
+              <a:cs typeface="Courier New" panose="02070309020205020404" pitchFamily="49" charset="0"/>
+            </a:endParaRPr>
+          </a:p>
+        </p:txBody>
+      </p:sp>
+      <p:sp>
+        <p:nvSpPr>
+          <p:cNvPr id="19" name="TextBox 18"/>
+          <p:cNvSpPr txBox="1"/>
+          <p:nvPr/>
+        </p:nvSpPr>
+        <p:spPr>
+          <a:xfrm>
+            <a:off x="4343400" y="4324290"/>
+            <a:ext cx="2110129" cy="400110"/>
+          </a:xfrm>
+          <a:prstGeom prst="rect">
+            <a:avLst/>
+          </a:prstGeom>
+          <a:noFill/>
+        </p:spPr>
+        <p:txBody>
+          <a:bodyPr wrap="none" rtlCol="0">
+            <a:spAutoFit/>
+          </a:bodyPr>
+          <a:lstStyle/>
+          <a:p>
+            <a:r>
+              <a:rPr lang="en-US" sz="2000" dirty="0" smtClean="0">
+                <a:latin typeface="Courier New" panose="02070309020205020404" pitchFamily="49" charset="0"/>
+                <a:cs typeface="Courier New" panose="02070309020205020404" pitchFamily="49" charset="0"/>
+              </a:rPr>
+              <a:t>p[0]</a:t>
+            </a:r>
+            <a:r>
+              <a:rPr lang="en-US" sz="2000" dirty="0" smtClean="0"/>
+              <a:t> is value at </a:t>
+            </a:r>
+            <a:r>
+              <a:rPr lang="en-US" sz="2000" dirty="0" smtClean="0">
+                <a:latin typeface="Courier New" panose="02070309020205020404" pitchFamily="49" charset="0"/>
+                <a:cs typeface="Courier New" panose="02070309020205020404" pitchFamily="49" charset="0"/>
+              </a:rPr>
+              <a:t>p</a:t>
+            </a:r>
+            <a:endParaRPr lang="nl-BE" sz="2000" dirty="0">
+              <a:latin typeface="Courier New" panose="02070309020205020404" pitchFamily="49" charset="0"/>
+              <a:cs typeface="Courier New" panose="02070309020205020404" pitchFamily="49" charset="0"/>
+            </a:endParaRPr>
+          </a:p>
+        </p:txBody>
+      </p:sp>
+    </p:spTree>
+    <p:extLst>
+      <p:ext uri="{BB962C8B-B14F-4D97-AF65-F5344CB8AC3E}">
+        <p14:creationId xmlns:p14="http://schemas.microsoft.com/office/powerpoint/2010/main" val="2793959574"/>
+      </p:ext>
+    </p:extLst>
+  </p:cSld>
+  <p:clrMapOvr>
+    <a:masterClrMapping/>
+  </p:clrMapOvr>
+  <p:timing>
+    <p:tnLst>
+      <p:par>
+        <p:cTn id="1" dur="indefinite" restart="never" nodeType="tmRoot">
+          <p:childTnLst>
+            <p:seq concurrent="1" nextAc="seek">
+              <p:cTn id="2" dur="indefinite" nodeType="mainSeq">
+                <p:childTnLst>
+                  <p:par>
+                    <p:cTn id="3" fill="hold">
+                      <p:stCondLst>
+                        <p:cond delay="indefinite"/>
+                        <p:cond evt="onBegin" delay="0">
+                          <p:tn val="2"/>
+                        </p:cond>
+                      </p:stCondLst>
+                      <p:childTnLst>
+                        <p:par>
+                          <p:cTn id="4" fill="hold">
+                            <p:stCondLst>
+                              <p:cond delay="0"/>
+                            </p:stCondLst>
+                            <p:childTnLst>
+                              <p:par>
+                                <p:cTn id="5" presetID="1" presetClass="entr" presetSubtype="0" fill="hold" grpId="0" nodeType="withEffect">
+                                  <p:stCondLst>
+                                    <p:cond delay="0"/>
+                                  </p:stCondLst>
+                                  <p:childTnLst>
+                                    <p:set>
+                                      <p:cBhvr>
+                                        <p:cTn id="6" dur="1" fill="hold">
+                                          <p:stCondLst>
+                                            <p:cond delay="0"/>
+                                          </p:stCondLst>
+                                        </p:cTn>
+                                        <p:tgtEl>
+                                          <p:spTgt spid="6">
+                                            <p:txEl>
+                                              <p:pRg st="0" end="0"/>
+                                            </p:txEl>
+                                          </p:spTgt>
+                                        </p:tgtEl>
+                                        <p:attrNameLst>
+                                          <p:attrName>style.visibility</p:attrName>
+                                        </p:attrNameLst>
+                                      </p:cBhvr>
+                                      <p:to>
+                                        <p:strVal val="visible"/>
+                                      </p:to>
+                                    </p:set>
+                                  </p:childTnLst>
+                                </p:cTn>
+                              </p:par>
+                              <p:par>
+                                <p:cTn id="7" presetID="1" presetClass="entr" presetSubtype="0" fill="hold" grpId="0" nodeType="withEffect">
+                                  <p:stCondLst>
+                                    <p:cond delay="0"/>
+                                  </p:stCondLst>
+                                  <p:childTnLst>
+                                    <p:set>
+                                      <p:cBhvr>
+                                        <p:cTn id="8" dur="1" fill="hold">
+                                          <p:stCondLst>
+                                            <p:cond delay="0"/>
+                                          </p:stCondLst>
+                                        </p:cTn>
+                                        <p:tgtEl>
+                                          <p:spTgt spid="7"/>
+                                        </p:tgtEl>
+                                        <p:attrNameLst>
+                                          <p:attrName>style.visibility</p:attrName>
+                                        </p:attrNameLst>
+                                      </p:cBhvr>
+                                      <p:to>
+                                        <p:strVal val="visible"/>
+                                      </p:to>
+                                    </p:set>
+                                  </p:childTnLst>
+                                </p:cTn>
+                              </p:par>
+                            </p:childTnLst>
+                          </p:cTn>
+                        </p:par>
+                      </p:childTnLst>
+                    </p:cTn>
+                  </p:par>
+                  <p:par>
+                    <p:cTn id="9" fill="hold">
+                      <p:stCondLst>
+                        <p:cond delay="indefinite"/>
+                      </p:stCondLst>
+                      <p:childTnLst>
+                        <p:par>
+                          <p:cTn id="10" fill="hold">
+                            <p:stCondLst>
+                              <p:cond delay="0"/>
+                            </p:stCondLst>
+                            <p:childTnLst>
+                              <p:par>
+                                <p:cTn id="11" presetID="1" presetClass="entr" presetSubtype="0" fill="hold" nodeType="clickEffect">
+                                  <p:stCondLst>
+                                    <p:cond delay="0"/>
+                                  </p:stCondLst>
+                                  <p:childTnLst>
+                                    <p:set>
+                                      <p:cBhvr>
+                                        <p:cTn id="12" dur="1" fill="hold">
+                                          <p:stCondLst>
+                                            <p:cond delay="0"/>
+                                          </p:stCondLst>
+                                        </p:cTn>
+                                        <p:tgtEl>
+                                          <p:spTgt spid="8"/>
+                                        </p:tgtEl>
+                                        <p:attrNameLst>
+                                          <p:attrName>style.visibility</p:attrName>
+                                        </p:attrNameLst>
+                                      </p:cBhvr>
+                                      <p:to>
+                                        <p:strVal val="visible"/>
+                                      </p:to>
+                                    </p:set>
+                                  </p:childTnLst>
+                                </p:cTn>
+                              </p:par>
+                            </p:childTnLst>
+                          </p:cTn>
+                        </p:par>
+                      </p:childTnLst>
+                    </p:cTn>
+                  </p:par>
+                  <p:par>
+                    <p:cTn id="13" fill="hold">
+                      <p:stCondLst>
+                        <p:cond delay="indefinite"/>
+                      </p:stCondLst>
+                      <p:childTnLst>
+                        <p:par>
+                          <p:cTn id="14" fill="hold">
+                            <p:stCondLst>
+                              <p:cond delay="0"/>
+                            </p:stCondLst>
+                            <p:childTnLst>
+                              <p:par>
+                                <p:cTn id="15" presetID="1" presetClass="entr" presetSubtype="0" fill="hold" nodeType="clickEffect">
+                                  <p:stCondLst>
+                                    <p:cond delay="0"/>
+                                  </p:stCondLst>
+                                  <p:childTnLst>
+                                    <p:set>
+                                      <p:cBhvr>
+                                        <p:cTn id="16" dur="1" fill="hold">
+                                          <p:stCondLst>
+                                            <p:cond delay="0"/>
+                                          </p:stCondLst>
+                                        </p:cTn>
+                                        <p:tgtEl>
+                                          <p:spTgt spid="12"/>
+                                        </p:tgtEl>
+                                        <p:attrNameLst>
+                                          <p:attrName>style.visibility</p:attrName>
+                                        </p:attrNameLst>
+                                      </p:cBhvr>
+                                      <p:to>
+                                        <p:strVal val="visible"/>
+                                      </p:to>
+                                    </p:set>
+                                  </p:childTnLst>
+                                </p:cTn>
+                              </p:par>
+                            </p:childTnLst>
+                          </p:cTn>
+                        </p:par>
+                      </p:childTnLst>
+                    </p:cTn>
+                  </p:par>
+                  <p:par>
+                    <p:cTn id="17" fill="hold">
+                      <p:stCondLst>
+                        <p:cond delay="indefinite"/>
+                      </p:stCondLst>
+                      <p:childTnLst>
+                        <p:par>
+                          <p:cTn id="18" fill="hold">
+                            <p:stCondLst>
+                              <p:cond delay="0"/>
+                            </p:stCondLst>
+                            <p:childTnLst>
+                              <p:par>
+                                <p:cTn id="19" presetID="1" presetClass="entr" presetSubtype="0" fill="hold" grpId="0" nodeType="clickEffect">
+                                  <p:stCondLst>
+                                    <p:cond delay="0"/>
+                                  </p:stCondLst>
+                                  <p:childTnLst>
+                                    <p:set>
+                                      <p:cBhvr>
+                                        <p:cTn id="20" dur="1" fill="hold">
+                                          <p:stCondLst>
+                                            <p:cond delay="0"/>
+                                          </p:stCondLst>
+                                        </p:cTn>
+                                        <p:tgtEl>
+                                          <p:spTgt spid="6">
+                                            <p:txEl>
+                                              <p:pRg st="2" end="2"/>
+                                            </p:txEl>
+                                          </p:spTgt>
+                                        </p:tgtEl>
+                                        <p:attrNameLst>
+                                          <p:attrName>style.visibility</p:attrName>
+                                        </p:attrNameLst>
+                                      </p:cBhvr>
+                                      <p:to>
+                                        <p:strVal val="visible"/>
+                                      </p:to>
+                                    </p:set>
+                                  </p:childTnLst>
+                                </p:cTn>
+                              </p:par>
+                              <p:par>
+                                <p:cTn id="21" presetID="1" presetClass="entr" presetSubtype="0" fill="hold" grpId="0" nodeType="withEffect">
+                                  <p:stCondLst>
+                                    <p:cond delay="0"/>
+                                  </p:stCondLst>
+                                  <p:childTnLst>
+                                    <p:set>
+                                      <p:cBhvr>
+                                        <p:cTn id="22" dur="1" fill="hold">
+                                          <p:stCondLst>
+                                            <p:cond delay="0"/>
+                                          </p:stCondLst>
+                                        </p:cTn>
+                                        <p:tgtEl>
+                                          <p:spTgt spid="16"/>
+                                        </p:tgtEl>
+                                        <p:attrNameLst>
+                                          <p:attrName>style.visibility</p:attrName>
+                                        </p:attrNameLst>
+                                      </p:cBhvr>
+                                      <p:to>
+                                        <p:strVal val="visible"/>
+                                      </p:to>
+                                    </p:set>
+                                  </p:childTnLst>
+                                </p:cTn>
+                              </p:par>
+                            </p:childTnLst>
+                          </p:cTn>
+                        </p:par>
+                      </p:childTnLst>
+                    </p:cTn>
+                  </p:par>
+                  <p:par>
+                    <p:cTn id="23" fill="hold">
+                      <p:stCondLst>
+                        <p:cond delay="indefinite"/>
+                      </p:stCondLst>
+                      <p:childTnLst>
+                        <p:par>
+                          <p:cTn id="24" fill="hold">
+                            <p:stCondLst>
+                              <p:cond delay="0"/>
+                            </p:stCondLst>
+                            <p:childTnLst>
+                              <p:par>
+                                <p:cTn id="25" presetID="1" presetClass="entr" presetSubtype="0" fill="hold" grpId="0" nodeType="clickEffect">
+                                  <p:stCondLst>
+                                    <p:cond delay="0"/>
+                                  </p:stCondLst>
+                                  <p:childTnLst>
+                                    <p:set>
+                                      <p:cBhvr>
+                                        <p:cTn id="26" dur="1" fill="hold">
+                                          <p:stCondLst>
+                                            <p:cond delay="0"/>
+                                          </p:stCondLst>
+                                        </p:cTn>
+                                        <p:tgtEl>
+                                          <p:spTgt spid="18"/>
+                                        </p:tgtEl>
+                                        <p:attrNameLst>
+                                          <p:attrName>style.visibility</p:attrName>
+                                        </p:attrNameLst>
+                                      </p:cBhvr>
+                                      <p:to>
+                                        <p:strVal val="visible"/>
+                                      </p:to>
+                                    </p:set>
+                                  </p:childTnLst>
+                                </p:cTn>
+                              </p:par>
+                            </p:childTnLst>
+                          </p:cTn>
+                        </p:par>
+                      </p:childTnLst>
+                    </p:cTn>
+                  </p:par>
+                  <p:par>
+                    <p:cTn id="27" fill="hold">
+                      <p:stCondLst>
+                        <p:cond delay="indefinite"/>
+                      </p:stCondLst>
+                      <p:childTnLst>
+                        <p:par>
+                          <p:cTn id="28" fill="hold">
+                            <p:stCondLst>
+                              <p:cond delay="0"/>
+                            </p:stCondLst>
+                            <p:childTnLst>
+                              <p:par>
+                                <p:cTn id="29" presetID="1" presetClass="entr" presetSubtype="0" fill="hold" grpId="0" nodeType="clickEffect">
+                                  <p:stCondLst>
+                                    <p:cond delay="0"/>
+                                  </p:stCondLst>
+                                  <p:childTnLst>
+                                    <p:set>
+                                      <p:cBhvr>
+                                        <p:cTn id="30" dur="1" fill="hold">
+                                          <p:stCondLst>
+                                            <p:cond delay="0"/>
+                                          </p:stCondLst>
+                                        </p:cTn>
+                                        <p:tgtEl>
+                                          <p:spTgt spid="6">
+                                            <p:txEl>
+                                              <p:pRg st="4" end="4"/>
+                                            </p:txEl>
+                                          </p:spTgt>
+                                        </p:tgtEl>
+                                        <p:attrNameLst>
+                                          <p:attrName>style.visibility</p:attrName>
+                                        </p:attrNameLst>
+                                      </p:cBhvr>
+                                      <p:to>
+                                        <p:strVal val="visible"/>
+                                      </p:to>
+                                    </p:set>
+                                  </p:childTnLst>
+                                </p:cTn>
+                              </p:par>
+                              <p:par>
+                                <p:cTn id="31" presetID="1" presetClass="entr" presetSubtype="0" fill="hold" grpId="0" nodeType="withEffect">
+                                  <p:stCondLst>
+                                    <p:cond delay="0"/>
+                                  </p:stCondLst>
+                                  <p:childTnLst>
+                                    <p:set>
+                                      <p:cBhvr>
+                                        <p:cTn id="32" dur="1" fill="hold">
+                                          <p:stCondLst>
+                                            <p:cond delay="0"/>
+                                          </p:stCondLst>
+                                        </p:cTn>
+                                        <p:tgtEl>
+                                          <p:spTgt spid="17"/>
+                                        </p:tgtEl>
+                                        <p:attrNameLst>
+                                          <p:attrName>style.visibility</p:attrName>
+                                        </p:attrNameLst>
+                                      </p:cBhvr>
+                                      <p:to>
+                                        <p:strVal val="visible"/>
+                                      </p:to>
+                                    </p:set>
+                                  </p:childTnLst>
+                                </p:cTn>
+                              </p:par>
+                            </p:childTnLst>
+                          </p:cTn>
+                        </p:par>
+                      </p:childTnLst>
+                    </p:cTn>
+                  </p:par>
+                  <p:par>
+                    <p:cTn id="33" fill="hold">
+                      <p:stCondLst>
+                        <p:cond delay="indefinite"/>
+                      </p:stCondLst>
+                      <p:childTnLst>
+                        <p:par>
+                          <p:cTn id="34" fill="hold">
+                            <p:stCondLst>
+                              <p:cond delay="0"/>
+                            </p:stCondLst>
+                            <p:childTnLst>
+                              <p:par>
+                                <p:cTn id="35" presetID="1" presetClass="entr" presetSubtype="0" fill="hold" grpId="0" nodeType="clickEffect">
+                                  <p:stCondLst>
+                                    <p:cond delay="0"/>
+                                  </p:stCondLst>
+                                  <p:childTnLst>
+                                    <p:set>
+                                      <p:cBhvr>
+                                        <p:cTn id="36" dur="1" fill="hold">
+                                          <p:stCondLst>
+                                            <p:cond delay="0"/>
+                                          </p:stCondLst>
+                                        </p:cTn>
+                                        <p:tgtEl>
+                                          <p:spTgt spid="19"/>
+                                        </p:tgtEl>
+                                        <p:attrNameLst>
+                                          <p:attrName>style.visibility</p:attrName>
+                                        </p:attrNameLst>
+                                      </p:cBhvr>
+                                      <p:to>
+                                        <p:strVal val="visible"/>
+                                      </p:to>
+                                    </p:set>
+                                  </p:childTnLst>
+                                </p:cTn>
+                              </p:par>
+                            </p:childTnLst>
+                          </p:cTn>
+                        </p:par>
+                      </p:childTnLst>
+                    </p:cTn>
+                  </p:par>
+                  <p:par>
+                    <p:cTn id="37" fill="hold">
+                      <p:stCondLst>
+                        <p:cond delay="indefinite"/>
+                      </p:stCondLst>
+                      <p:childTnLst>
+                        <p:par>
+                          <p:cTn id="38" fill="hold">
+                            <p:stCondLst>
+                              <p:cond delay="0"/>
+                            </p:stCondLst>
+                            <p:childTnLst>
+                              <p:par>
+                                <p:cTn id="39" presetID="1" presetClass="entr" presetSubtype="0" fill="hold" grpId="0" nodeType="clickEffect">
+                                  <p:stCondLst>
+                                    <p:cond delay="0"/>
+                                  </p:stCondLst>
+                                  <p:childTnLst>
+                                    <p:set>
+                                      <p:cBhvr>
+                                        <p:cTn id="40" dur="1" fill="hold">
+                                          <p:stCondLst>
+                                            <p:cond delay="0"/>
+                                          </p:stCondLst>
+                                        </p:cTn>
+                                        <p:tgtEl>
+                                          <p:spTgt spid="6">
+                                            <p:txEl>
+                                              <p:pRg st="6" end="6"/>
+                                            </p:txEl>
+                                          </p:spTgt>
+                                        </p:tgtEl>
+                                        <p:attrNameLst>
+                                          <p:attrName>style.visibility</p:attrName>
+                                        </p:attrNameLst>
+                                      </p:cBhvr>
+                                      <p:to>
+                                        <p:strVal val="visible"/>
+                                      </p:to>
+                                    </p:set>
+                                  </p:childTnLst>
+                                </p:cTn>
+                              </p:par>
+                              <p:par>
+                                <p:cTn id="41" presetID="1" presetClass="entr" presetSubtype="0" fill="hold" grpId="0" nodeType="withEffect">
+                                  <p:stCondLst>
+                                    <p:cond delay="0"/>
+                                  </p:stCondLst>
+                                  <p:childTnLst>
+                                    <p:set>
+                                      <p:cBhvr>
+                                        <p:cTn id="42" dur="1" fill="hold">
+                                          <p:stCondLst>
+                                            <p:cond delay="0"/>
+                                          </p:stCondLst>
+                                        </p:cTn>
+                                        <p:tgtEl>
+                                          <p:spTgt spid="6">
+                                            <p:txEl>
+                                              <p:pRg st="7" end="7"/>
+                                            </p:txEl>
+                                          </p:spTgt>
+                                        </p:tgtEl>
+                                        <p:attrNameLst>
+                                          <p:attrName>style.visibility</p:attrName>
+                                        </p:attrNameLst>
+                                      </p:cBhvr>
+                                      <p:to>
+                                        <p:strVal val="visible"/>
+                                      </p:to>
+                                    </p:set>
+                                  </p:childTnLst>
+                                </p:cTn>
+                              </p:par>
+                            </p:childTnLst>
+                          </p:cTn>
+                        </p:par>
+                      </p:childTnLst>
+                    </p:cTn>
+                  </p:par>
+                </p:childTnLst>
+              </p:cTn>
+              <p:prevCondLst>
+                <p:cond evt="onPrev" delay="0">
+                  <p:tgtEl>
+                    <p:sldTgt/>
+                  </p:tgtEl>
+                </p:cond>
+              </p:prevCondLst>
+              <p:nextCondLst>
+                <p:cond evt="onNext" delay="0">
+                  <p:tgtEl>
+                    <p:sldTgt/>
+                  </p:tgtEl>
+                </p:cond>
+              </p:nextCondLst>
+            </p:seq>
+          </p:childTnLst>
+        </p:cTn>
+      </p:par>
+    </p:tnLst>
+    <p:bldLst>
+      <p:bldP spid="6" grpId="0" uiExpand="1" build="p"/>
+      <p:bldP spid="7" grpId="0" animBg="1"/>
+      <p:bldP spid="16" grpId="0" animBg="1"/>
+      <p:bldP spid="17" grpId="0" animBg="1"/>
+      <p:bldP spid="18" grpId="0"/>
+      <p:bldP spid="19" grpId="0"/>
+    </p:bldLst>
+  </p:timing>
+</p:sld>
+</file>
+
+<file path=ppt/slides/slide14.xml><?xml version="1.0" encoding="utf-8"?>
+<p:sld xmlns:a="http://schemas.openxmlformats.org/drawingml/2006/main" xmlns:r="http://schemas.openxmlformats.org/officeDocument/2006/relationships" xmlns:p="http://schemas.openxmlformats.org/presentationml/2006/main">
+  <p:cSld>
+    <p:spTree>
+      <p:nvGrpSpPr>
+        <p:cNvPr id="1" name=""/>
+        <p:cNvGrpSpPr/>
+        <p:nvPr/>
+      </p:nvGrpSpPr>
+      <p:grpSpPr>
+        <a:xfrm>
+          <a:off x="0" y="0"/>
+          <a:ext cx="0" cy="0"/>
+          <a:chOff x="0" y="0"/>
+          <a:chExt cx="0" cy="0"/>
+        </a:xfrm>
+      </p:grpSpPr>
+      <p:sp>
+        <p:nvSpPr>
           <p:cNvPr id="2" name="Title 1"/>
           <p:cNvSpPr>
             <a:spLocks noGrp="1"/>
@@ -5694,7 +6982,7 @@
             <a:fld id="{B6F15528-21DE-4FAA-801E-634DDDAF4B2B}" type="slidenum">
               <a:rPr lang="en-US" smtClean="0"/>
               <a:pPr/>
-              <a:t>13</a:t>
+              <a:t>14</a:t>
             </a:fld>
             <a:endParaRPr lang="en-US"/>
           </a:p>
@@ -6358,7 +7646,7 @@
 </p:sld>
 </file>
 
-<file path=ppt/slides/slide14.xml><?xml version="1.0" encoding="utf-8"?>
+<file path=ppt/slides/slide15.xml><?xml version="1.0" encoding="utf-8"?>
 <p:sld xmlns:a="http://schemas.openxmlformats.org/drawingml/2006/main" xmlns:r="http://schemas.openxmlformats.org/officeDocument/2006/relationships" xmlns:p="http://schemas.openxmlformats.org/presentationml/2006/main">
   <p:cSld>
     <p:spTree>
@@ -6451,7 +7739,7 @@
             <a:fld id="{B6F15528-21DE-4FAA-801E-634DDDAF4B2B}" type="slidenum">
               <a:rPr lang="en-US" smtClean="0"/>
               <a:pPr/>
-              <a:t>14</a:t>
+              <a:t>15</a:t>
             </a:fld>
             <a:endParaRPr lang="en-US"/>
           </a:p>
@@ -6466,9 +7754,9 @@
         <p:grpSpPr>
           <a:xfrm>
             <a:off x="618226" y="2362200"/>
-            <a:ext cx="5990392" cy="3293209"/>
+            <a:ext cx="5990392" cy="3298594"/>
             <a:chOff x="304800" y="1371600"/>
-            <a:chExt cx="5990392" cy="3293209"/>
+            <a:chExt cx="5990392" cy="3298594"/>
           </a:xfrm>
           <a:solidFill>
             <a:schemeClr val="bg1">
@@ -6886,7 +8174,7 @@
           </p:nvSpPr>
           <p:spPr>
             <a:xfrm>
-              <a:off x="5041194" y="4353791"/>
+              <a:off x="5041194" y="4362417"/>
               <a:ext cx="1253998" cy="307777"/>
             </a:xfrm>
             <a:prstGeom prst="rect">
@@ -7120,7 +8408,7 @@
 </p:sld>
 </file>
 
-<file path=ppt/slides/slide15.xml><?xml version="1.0" encoding="utf-8"?>
+<file path=ppt/slides/slide16.xml><?xml version="1.0" encoding="utf-8"?>
 <p:sld xmlns:a="http://schemas.openxmlformats.org/drawingml/2006/main" xmlns:r="http://schemas.openxmlformats.org/officeDocument/2006/relationships" xmlns:p="http://schemas.openxmlformats.org/presentationml/2006/main">
   <p:cSld>
     <p:spTree>
@@ -7280,19 +8568,8 @@
                 <a:latin typeface="Courier New" panose="02070309020205020404" pitchFamily="49" charset="0"/>
                 <a:cs typeface="Courier New" panose="02070309020205020404" pitchFamily="49" charset="0"/>
               </a:rPr>
-              <a:t> == </a:t>
-            </a:r>
-            <a:r>
-              <a:rPr lang="en-US" dirty="0" smtClean="0">
-                <a:latin typeface="Courier New" panose="02070309020205020404" pitchFamily="49" charset="0"/>
-                <a:cs typeface="Courier New" panose="02070309020205020404" pitchFamily="49" charset="0"/>
-              </a:rPr>
-              <a:t>4*7*8</a:t>
-            </a:r>
-            <a:endParaRPr lang="en-US" dirty="0" smtClean="0">
-              <a:latin typeface="Courier New" panose="02070309020205020404" pitchFamily="49" charset="0"/>
-              <a:cs typeface="Courier New" panose="02070309020205020404" pitchFamily="49" charset="0"/>
-            </a:endParaRPr>
+              <a:t> == 4*7*8</a:t>
+            </a:r>
           </a:p>
           <a:p>
             <a:r>
@@ -7360,7 +8637,7 @@
             <a:fld id="{B6F15528-21DE-4FAA-801E-634DDDAF4B2B}" type="slidenum">
               <a:rPr lang="en-US" smtClean="0"/>
               <a:pPr/>
-              <a:t>15</a:t>
+              <a:t>16</a:t>
             </a:fld>
             <a:endParaRPr lang="en-US"/>
           </a:p>
@@ -7895,109 +9172,6 @@
 </p:sld>
 </file>
 
-<file path=ppt/slides/slide16.xml><?xml version="1.0" encoding="utf-8"?>
-<p:sld xmlns:a="http://schemas.openxmlformats.org/drawingml/2006/main" xmlns:r="http://schemas.openxmlformats.org/officeDocument/2006/relationships" xmlns:p="http://schemas.openxmlformats.org/presentationml/2006/main">
-  <p:cSld>
-    <p:spTree>
-      <p:nvGrpSpPr>
-        <p:cNvPr id="1" name=""/>
-        <p:cNvGrpSpPr/>
-        <p:nvPr/>
-      </p:nvGrpSpPr>
-      <p:grpSpPr>
-        <a:xfrm>
-          <a:off x="0" y="0"/>
-          <a:ext cx="0" cy="0"/>
-          <a:chOff x="0" y="0"/>
-          <a:chExt cx="0" cy="0"/>
-        </a:xfrm>
-      </p:grpSpPr>
-      <p:sp>
-        <p:nvSpPr>
-          <p:cNvPr id="2" name="Title 1"/>
-          <p:cNvSpPr>
-            <a:spLocks noGrp="1"/>
-          </p:cNvSpPr>
-          <p:nvPr>
-            <p:ph type="title"/>
-          </p:nvPr>
-        </p:nvSpPr>
-        <p:spPr/>
-        <p:txBody>
-          <a:bodyPr/>
-          <a:lstStyle/>
-          <a:p>
-            <a:r>
-              <a:rPr lang="en-US" dirty="0" smtClean="0"/>
-              <a:t>Functions</a:t>
-            </a:r>
-            <a:endParaRPr lang="nl-BE" dirty="0"/>
-          </a:p>
-        </p:txBody>
-      </p:sp>
-      <p:sp>
-        <p:nvSpPr>
-          <p:cNvPr id="3" name="Text Placeholder 2"/>
-          <p:cNvSpPr>
-            <a:spLocks noGrp="1"/>
-          </p:cNvSpPr>
-          <p:nvPr>
-            <p:ph type="body" idx="1"/>
-          </p:nvPr>
-        </p:nvSpPr>
-        <p:spPr/>
-        <p:txBody>
-          <a:bodyPr/>
-          <a:lstStyle/>
-          <a:p>
-            <a:endParaRPr lang="nl-BE"/>
-          </a:p>
-        </p:txBody>
-      </p:sp>
-      <p:sp>
-        <p:nvSpPr>
-          <p:cNvPr id="4" name="Slide Number Placeholder 3"/>
-          <p:cNvSpPr>
-            <a:spLocks noGrp="1"/>
-          </p:cNvSpPr>
-          <p:nvPr>
-            <p:ph type="sldNum" sz="quarter" idx="12"/>
-          </p:nvPr>
-        </p:nvSpPr>
-        <p:spPr/>
-        <p:txBody>
-          <a:bodyPr/>
-          <a:lstStyle/>
-          <a:p>
-            <a:fld id="{B6F15528-21DE-4FAA-801E-634DDDAF4B2B}" type="slidenum">
-              <a:rPr lang="en-US" smtClean="0"/>
-              <a:pPr/>
-              <a:t>16</a:t>
-            </a:fld>
-            <a:endParaRPr lang="en-US"/>
-          </a:p>
-        </p:txBody>
-      </p:sp>
-    </p:spTree>
-    <p:extLst>
-      <p:ext uri="{BB962C8B-B14F-4D97-AF65-F5344CB8AC3E}">
-        <p14:creationId xmlns:p14="http://schemas.microsoft.com/office/powerpoint/2010/main" val="2592723755"/>
-      </p:ext>
-    </p:extLst>
-  </p:cSld>
-  <p:clrMapOvr>
-    <a:masterClrMapping/>
-  </p:clrMapOvr>
-  <p:timing>
-    <p:tnLst>
-      <p:par>
-        <p:cTn id="1" dur="indefinite" restart="never" nodeType="tmRoot"/>
-      </p:par>
-    </p:tnLst>
-  </p:timing>
-</p:sld>
-</file>
-
 <file path=ppt/slides/slide17.xml><?xml version="1.0" encoding="utf-8"?>
 <p:sld xmlns:a="http://schemas.openxmlformats.org/drawingml/2006/main" xmlns:r="http://schemas.openxmlformats.org/officeDocument/2006/relationships" xmlns:p="http://schemas.openxmlformats.org/presentationml/2006/main">
   <p:cSld>
@@ -8032,6 +9206,109 @@
           <a:p>
             <a:r>
               <a:rPr lang="en-US" dirty="0" smtClean="0"/>
+              <a:t>Functions</a:t>
+            </a:r>
+            <a:endParaRPr lang="nl-BE" dirty="0"/>
+          </a:p>
+        </p:txBody>
+      </p:sp>
+      <p:sp>
+        <p:nvSpPr>
+          <p:cNvPr id="3" name="Text Placeholder 2"/>
+          <p:cNvSpPr>
+            <a:spLocks noGrp="1"/>
+          </p:cNvSpPr>
+          <p:nvPr>
+            <p:ph type="body" idx="1"/>
+          </p:nvPr>
+        </p:nvSpPr>
+        <p:spPr/>
+        <p:txBody>
+          <a:bodyPr/>
+          <a:lstStyle/>
+          <a:p>
+            <a:endParaRPr lang="nl-BE"/>
+          </a:p>
+        </p:txBody>
+      </p:sp>
+      <p:sp>
+        <p:nvSpPr>
+          <p:cNvPr id="4" name="Slide Number Placeholder 3"/>
+          <p:cNvSpPr>
+            <a:spLocks noGrp="1"/>
+          </p:cNvSpPr>
+          <p:nvPr>
+            <p:ph type="sldNum" sz="quarter" idx="12"/>
+          </p:nvPr>
+        </p:nvSpPr>
+        <p:spPr/>
+        <p:txBody>
+          <a:bodyPr/>
+          <a:lstStyle/>
+          <a:p>
+            <a:fld id="{B6F15528-21DE-4FAA-801E-634DDDAF4B2B}" type="slidenum">
+              <a:rPr lang="en-US" smtClean="0"/>
+              <a:pPr/>
+              <a:t>17</a:t>
+            </a:fld>
+            <a:endParaRPr lang="en-US"/>
+          </a:p>
+        </p:txBody>
+      </p:sp>
+    </p:spTree>
+    <p:extLst>
+      <p:ext uri="{BB962C8B-B14F-4D97-AF65-F5344CB8AC3E}">
+        <p14:creationId xmlns:p14="http://schemas.microsoft.com/office/powerpoint/2010/main" val="2592723755"/>
+      </p:ext>
+    </p:extLst>
+  </p:cSld>
+  <p:clrMapOvr>
+    <a:masterClrMapping/>
+  </p:clrMapOvr>
+  <p:timing>
+    <p:tnLst>
+      <p:par>
+        <p:cTn id="1" dur="indefinite" restart="never" nodeType="tmRoot"/>
+      </p:par>
+    </p:tnLst>
+  </p:timing>
+</p:sld>
+</file>
+
+<file path=ppt/slides/slide18.xml><?xml version="1.0" encoding="utf-8"?>
+<p:sld xmlns:a="http://schemas.openxmlformats.org/drawingml/2006/main" xmlns:r="http://schemas.openxmlformats.org/officeDocument/2006/relationships" xmlns:p="http://schemas.openxmlformats.org/presentationml/2006/main">
+  <p:cSld>
+    <p:spTree>
+      <p:nvGrpSpPr>
+        <p:cNvPr id="1" name=""/>
+        <p:cNvGrpSpPr/>
+        <p:nvPr/>
+      </p:nvGrpSpPr>
+      <p:grpSpPr>
+        <a:xfrm>
+          <a:off x="0" y="0"/>
+          <a:ext cx="0" cy="0"/>
+          <a:chOff x="0" y="0"/>
+          <a:chExt cx="0" cy="0"/>
+        </a:xfrm>
+      </p:grpSpPr>
+      <p:sp>
+        <p:nvSpPr>
+          <p:cNvPr id="2" name="Title 1"/>
+          <p:cNvSpPr>
+            <a:spLocks noGrp="1"/>
+          </p:cNvSpPr>
+          <p:nvPr>
+            <p:ph type="title"/>
+          </p:nvPr>
+        </p:nvSpPr>
+        <p:spPr/>
+        <p:txBody>
+          <a:bodyPr/>
+          <a:lstStyle/>
+          <a:p>
+            <a:r>
+              <a:rPr lang="en-US" dirty="0" smtClean="0"/>
               <a:t>Three types of functions</a:t>
             </a:r>
             <a:endParaRPr lang="nl-BE" dirty="0"/>
@@ -8048,10 +9325,15 @@
             <p:ph idx="1"/>
           </p:nvPr>
         </p:nvSpPr>
-        <p:spPr/>
+        <p:spPr>
+          <a:xfrm>
+            <a:off x="457200" y="1600200"/>
+            <a:ext cx="3962400" cy="4525963"/>
+          </a:xfrm>
+        </p:spPr>
         <p:txBody>
           <a:bodyPr>
-            <a:normAutofit lnSpcReduction="10000"/>
+            <a:normAutofit fontScale="77500" lnSpcReduction="20000"/>
           </a:bodyPr>
           <a:lstStyle/>
           <a:p>
@@ -8064,14 +9346,18 @@
             <a:pPr lvl="1"/>
             <a:r>
               <a:rPr lang="en-US" dirty="0" smtClean="0"/>
-              <a:t>can be called anywhere</a:t>
+              <a:t>Can be called anywhere</a:t>
             </a:r>
           </a:p>
           <a:p>
             <a:pPr lvl="1"/>
             <a:r>
+              <a:rPr lang="en-US" dirty="0"/>
+              <a:t>S</a:t>
+            </a:r>
+            <a:r>
               <a:rPr lang="en-US" dirty="0" smtClean="0"/>
-              <a:t>slow</a:t>
+              <a:t>low</a:t>
             </a:r>
           </a:p>
           <a:p>
@@ -8088,8 +9374,12 @@
           <a:p>
             <a:pPr lvl="1"/>
             <a:r>
+              <a:rPr lang="en-US" dirty="0"/>
+              <a:t>C</a:t>
+            </a:r>
+            <a:r>
               <a:rPr lang="en-US" dirty="0" smtClean="0"/>
-              <a:t>can only be called from within </a:t>
+              <a:t>an only be called from within </a:t>
             </a:r>
             <a:r>
               <a:rPr lang="en-US" dirty="0" err="1" smtClean="0"/>
@@ -8101,7 +9391,15 @@
             <a:pPr lvl="1"/>
             <a:r>
               <a:rPr lang="en-US" dirty="0" smtClean="0"/>
-              <a:t>fast</a:t>
+              <a:t>Fast, </a:t>
+            </a:r>
+            <a:r>
+              <a:rPr lang="en-US" dirty="0" smtClean="0">
+                <a:solidFill>
+                  <a:srgbClr val="C00000"/>
+                </a:solidFill>
+              </a:rPr>
+              <a:t>C semantics</a:t>
             </a:r>
           </a:p>
           <a:p>
@@ -8118,15 +9416,30 @@
           <a:p>
             <a:pPr lvl="1"/>
             <a:r>
+              <a:rPr lang="en-US" dirty="0"/>
+              <a:t>C</a:t>
+            </a:r>
+            <a:r>
               <a:rPr lang="en-US" dirty="0" smtClean="0"/>
-              <a:t>can be called anywhere</a:t>
+              <a:t>an be called anywhere</a:t>
             </a:r>
           </a:p>
           <a:p>
             <a:pPr lvl="1"/>
             <a:r>
               <a:rPr lang="en-US" dirty="0" smtClean="0"/>
-              <a:t>still fast</a:t>
+              <a:t>Can have only Python or convertible return types (e.g., no pointers)</a:t>
+            </a:r>
+          </a:p>
+          <a:p>
+            <a:pPr lvl="1"/>
+            <a:r>
+              <a:rPr lang="en-US" dirty="0"/>
+              <a:t>S</a:t>
+            </a:r>
+            <a:r>
+              <a:rPr lang="en-US" dirty="0" smtClean="0"/>
+              <a:t>till fast</a:t>
             </a:r>
             <a:endParaRPr lang="nl-BE" dirty="0"/>
           </a:p>
@@ -8144,7 +9457,7 @@
         </p:nvSpPr>
         <p:spPr>
           <a:xfrm>
-            <a:off x="5789129" y="6754668"/>
+            <a:off x="6553200" y="6340475"/>
             <a:ext cx="2133600" cy="365125"/>
           </a:xfrm>
         </p:spPr>
@@ -8155,9 +9468,9 @@
             <a:fld id="{B6F15528-21DE-4FAA-801E-634DDDAF4B2B}" type="slidenum">
               <a:rPr lang="en-US" smtClean="0"/>
               <a:pPr/>
-              <a:t>17</a:t>
+              <a:t>18</a:t>
             </a:fld>
-            <a:endParaRPr lang="en-US"/>
+            <a:endParaRPr lang="en-US" dirty="0"/>
           </a:p>
         </p:txBody>
       </p:sp>
@@ -8169,7 +9482,7 @@
         </p:nvSpPr>
         <p:spPr>
           <a:xfrm>
-            <a:off x="4343400" y="2590800"/>
+            <a:off x="4541808" y="1766893"/>
             <a:ext cx="3581400" cy="646331"/>
           </a:xfrm>
           <a:prstGeom prst="rect">
@@ -8193,7 +9506,7 @@
           <a:lstStyle/>
           <a:p>
             <a:r>
-              <a:rPr lang="en-US" dirty="0" err="1" smtClean="0">
+              <a:rPr lang="en-US" b="1" dirty="0" err="1" smtClean="0">
                 <a:latin typeface="Courier New" panose="02070309020205020404" pitchFamily="49" charset="0"/>
                 <a:cs typeface="Courier New" panose="02070309020205020404" pitchFamily="49" charset="0"/>
               </a:rPr>
@@ -8244,7 +9557,7 @@
         </p:nvSpPr>
         <p:spPr>
           <a:xfrm>
-            <a:off x="4341329" y="4080356"/>
+            <a:off x="4541808" y="2916703"/>
             <a:ext cx="3581400" cy="646331"/>
           </a:xfrm>
           <a:prstGeom prst="rect">
@@ -8268,7 +9581,7 @@
           <a:lstStyle/>
           <a:p>
             <a:r>
-              <a:rPr lang="en-US" dirty="0" err="1" smtClean="0">
+              <a:rPr lang="en-US" b="1" dirty="0" err="1" smtClean="0">
                 <a:latin typeface="Courier New" panose="02070309020205020404" pitchFamily="49" charset="0"/>
                 <a:cs typeface="Courier New" panose="02070309020205020404" pitchFamily="49" charset="0"/>
               </a:rPr>
@@ -8333,7 +9646,7 @@
         </p:nvSpPr>
         <p:spPr>
           <a:xfrm>
-            <a:off x="4343400" y="5525869"/>
+            <a:off x="4541808" y="4382869"/>
             <a:ext cx="3581400" cy="646331"/>
           </a:xfrm>
           <a:prstGeom prst="rect">
@@ -8357,7 +9670,7 @@
           <a:lstStyle/>
           <a:p>
             <a:r>
-              <a:rPr lang="en-US" dirty="0" err="1" smtClean="0">
+              <a:rPr lang="en-US" b="1" dirty="0" err="1" smtClean="0">
                 <a:latin typeface="Courier New" panose="02070309020205020404" pitchFamily="49" charset="0"/>
                 <a:cs typeface="Courier New" panose="02070309020205020404" pitchFamily="49" charset="0"/>
               </a:rPr>
@@ -8830,6 +10143,37 @@
                                           </p:stCondLst>
                                         </p:cTn>
                                         <p:tgtEl>
+                                          <p:spTgt spid="3">
+                                            <p:txEl>
+                                              <p:pRg st="9" end="9"/>
+                                            </p:txEl>
+                                          </p:spTgt>
+                                        </p:tgtEl>
+                                        <p:attrNameLst>
+                                          <p:attrName>style.visibility</p:attrName>
+                                        </p:attrNameLst>
+                                      </p:cBhvr>
+                                      <p:to>
+                                        <p:strVal val="visible"/>
+                                      </p:to>
+                                    </p:set>
+                                  </p:childTnLst>
+                                </p:cTn>
+                              </p:par>
+                              <p:par>
+                                <p:cTn id="33" presetID="1" presetClass="entr" presetSubtype="0" fill="hold" grpId="0" nodeType="withEffect">
+                                  <p:stCondLst>
+                                    <p:cond delay="0"/>
+                                  </p:stCondLst>
+                                  <p:childTnLst>
+                                    <p:set>
+                                      <p:cBhvr>
+                                        <p:cTn id="34" dur="1" fill="hold">
+                                          <p:stCondLst>
+                                            <p:cond delay="0"/>
+                                          </p:stCondLst>
+                                        </p:cTn>
+                                        <p:tgtEl>
                                           <p:spTgt spid="7"/>
                                         </p:tgtEl>
                                         <p:attrNameLst>
@@ -8880,7 +10224,7 @@
 </p:sld>
 </file>
 
-<file path=ppt/slides/slide18.xml><?xml version="1.0" encoding="utf-8"?>
+<file path=ppt/slides/slide19.xml><?xml version="1.0" encoding="utf-8"?>
 <p:sld xmlns:a="http://schemas.openxmlformats.org/drawingml/2006/main" xmlns:r="http://schemas.openxmlformats.org/officeDocument/2006/relationships" xmlns:p="http://schemas.openxmlformats.org/presentationml/2006/main">
   <p:cSld>
     <p:spTree>
@@ -8967,22 +10311,34 @@
           <a:p>
             <a:pPr lvl="1"/>
             <a:r>
+              <a:rPr lang="en-US" dirty="0"/>
+              <a:t>O</a:t>
+            </a:r>
+            <a:r>
               <a:rPr lang="en-US" dirty="0" smtClean="0"/>
-              <a:t>only for simple functions</a:t>
+              <a:t>nly for simple functions</a:t>
             </a:r>
           </a:p>
           <a:p>
             <a:pPr lvl="1"/>
             <a:r>
+              <a:rPr lang="en-US" dirty="0"/>
+              <a:t>E</a:t>
+            </a:r>
+            <a:r>
               <a:rPr lang="en-US" dirty="0" smtClean="0"/>
-              <a:t>eliminates function call overhead</a:t>
+              <a:t>liminates function call overhead</a:t>
             </a:r>
           </a:p>
           <a:p>
             <a:pPr lvl="1"/>
             <a:r>
+              <a:rPr lang="en-US" dirty="0"/>
+              <a:t>M</a:t>
+            </a:r>
+            <a:r>
               <a:rPr lang="en-US" dirty="0" smtClean="0"/>
-              <a:t>may be ignored by C/C++ compiler</a:t>
+              <a:t>ay be ignored by C/C++ compiler</a:t>
             </a:r>
             <a:endParaRPr lang="nl-BE" dirty="0"/>
           </a:p>
@@ -9006,7 +10362,7 @@
             <a:fld id="{B6F15528-21DE-4FAA-801E-634DDDAF4B2B}" type="slidenum">
               <a:rPr lang="en-US" smtClean="0"/>
               <a:pPr/>
-              <a:t>18</a:t>
+              <a:t>19</a:t>
             </a:fld>
             <a:endParaRPr lang="en-US"/>
           </a:p>
@@ -9873,7 +11229,7 @@
 </p:sld>
 </file>
 
-<file path=ppt/slides/slide19.xml><?xml version="1.0" encoding="utf-8"?>
+<file path=ppt/slides/slide2.xml><?xml version="1.0" encoding="utf-8"?>
 <p:sld xmlns:a="http://schemas.openxmlformats.org/drawingml/2006/main" xmlns:r="http://schemas.openxmlformats.org/officeDocument/2006/relationships" xmlns:p="http://schemas.openxmlformats.org/presentationml/2006/main">
   <p:cSld>
     <p:spTree>
@@ -9907,6 +11263,109 @@
           <a:p>
             <a:r>
               <a:rPr lang="en-US" dirty="0" smtClean="0"/>
+              <a:t>Motivating example</a:t>
+            </a:r>
+            <a:endParaRPr lang="nl-BE" dirty="0"/>
+          </a:p>
+        </p:txBody>
+      </p:sp>
+      <p:sp>
+        <p:nvSpPr>
+          <p:cNvPr id="3" name="Text Placeholder 2"/>
+          <p:cNvSpPr>
+            <a:spLocks noGrp="1"/>
+          </p:cNvSpPr>
+          <p:nvPr>
+            <p:ph type="body" idx="1"/>
+          </p:nvPr>
+        </p:nvSpPr>
+        <p:spPr/>
+        <p:txBody>
+          <a:bodyPr/>
+          <a:lstStyle/>
+          <a:p>
+            <a:endParaRPr lang="nl-BE"/>
+          </a:p>
+        </p:txBody>
+      </p:sp>
+      <p:sp>
+        <p:nvSpPr>
+          <p:cNvPr id="4" name="Slide Number Placeholder 3"/>
+          <p:cNvSpPr>
+            <a:spLocks noGrp="1"/>
+          </p:cNvSpPr>
+          <p:nvPr>
+            <p:ph type="sldNum" sz="quarter" idx="12"/>
+          </p:nvPr>
+        </p:nvSpPr>
+        <p:spPr/>
+        <p:txBody>
+          <a:bodyPr/>
+          <a:lstStyle/>
+          <a:p>
+            <a:fld id="{B6F15528-21DE-4FAA-801E-634DDDAF4B2B}" type="slidenum">
+              <a:rPr lang="en-US" smtClean="0"/>
+              <a:pPr/>
+              <a:t>2</a:t>
+            </a:fld>
+            <a:endParaRPr lang="en-US"/>
+          </a:p>
+        </p:txBody>
+      </p:sp>
+    </p:spTree>
+    <p:extLst>
+      <p:ext uri="{BB962C8B-B14F-4D97-AF65-F5344CB8AC3E}">
+        <p14:creationId xmlns:p14="http://schemas.microsoft.com/office/powerpoint/2010/main" val="1688384380"/>
+      </p:ext>
+    </p:extLst>
+  </p:cSld>
+  <p:clrMapOvr>
+    <a:masterClrMapping/>
+  </p:clrMapOvr>
+  <p:timing>
+    <p:tnLst>
+      <p:par>
+        <p:cTn id="1" dur="indefinite" restart="never" nodeType="tmRoot"/>
+      </p:par>
+    </p:tnLst>
+  </p:timing>
+</p:sld>
+</file>
+
+<file path=ppt/slides/slide20.xml><?xml version="1.0" encoding="utf-8"?>
+<p:sld xmlns:a="http://schemas.openxmlformats.org/drawingml/2006/main" xmlns:r="http://schemas.openxmlformats.org/officeDocument/2006/relationships" xmlns:p="http://schemas.openxmlformats.org/presentationml/2006/main">
+  <p:cSld>
+    <p:spTree>
+      <p:nvGrpSpPr>
+        <p:cNvPr id="1" name=""/>
+        <p:cNvGrpSpPr/>
+        <p:nvPr/>
+      </p:nvGrpSpPr>
+      <p:grpSpPr>
+        <a:xfrm>
+          <a:off x="0" y="0"/>
+          <a:ext cx="0" cy="0"/>
+          <a:chOff x="0" y="0"/>
+          <a:chExt cx="0" cy="0"/>
+        </a:xfrm>
+      </p:grpSpPr>
+      <p:sp>
+        <p:nvSpPr>
+          <p:cNvPr id="2" name="Title 1"/>
+          <p:cNvSpPr>
+            <a:spLocks noGrp="1"/>
+          </p:cNvSpPr>
+          <p:nvPr>
+            <p:ph type="title"/>
+          </p:nvPr>
+        </p:nvSpPr>
+        <p:spPr/>
+        <p:txBody>
+          <a:bodyPr/>
+          <a:lstStyle/>
+          <a:p>
+            <a:r>
+              <a:rPr lang="en-US" dirty="0" smtClean="0"/>
               <a:t>Error handling</a:t>
             </a:r>
             <a:endParaRPr lang="nl-BE" dirty="0"/>
@@ -9944,8 +11403,12 @@
           <a:p>
             <a:pPr lvl="1"/>
             <a:r>
+              <a:rPr lang="en-US" dirty="0"/>
+              <a:t>N</a:t>
+            </a:r>
+            <a:r>
               <a:rPr lang="en-US" dirty="0" smtClean="0"/>
-              <a:t>not caught by </a:t>
+              <a:t>ot caught by </a:t>
             </a:r>
             <a:r>
               <a:rPr lang="en-US" dirty="0" smtClean="0">
@@ -9979,8 +11442,12 @@
           <a:p>
             <a:pPr lvl="1"/>
             <a:r>
+              <a:rPr lang="en-US" dirty="0"/>
+              <a:t>E</a:t>
+            </a:r>
+            <a:r>
               <a:rPr lang="en-US" dirty="0" smtClean="0"/>
-              <a:t>exceptions are propagated</a:t>
+              <a:t>xceptions are propagated</a:t>
             </a:r>
             <a:endParaRPr lang="nl-BE" dirty="0"/>
           </a:p>
@@ -10004,7 +11471,7 @@
             <a:fld id="{B6F15528-21DE-4FAA-801E-634DDDAF4B2B}" type="slidenum">
               <a:rPr lang="en-US" smtClean="0"/>
               <a:pPr/>
-              <a:t>19</a:t>
+              <a:t>20</a:t>
             </a:fld>
             <a:endParaRPr lang="en-US"/>
           </a:p>
@@ -10797,205 +12264,6 @@
 </p:sld>
 </file>
 
-<file path=ppt/slides/slide2.xml><?xml version="1.0" encoding="utf-8"?>
-<p:sld xmlns:a="http://schemas.openxmlformats.org/drawingml/2006/main" xmlns:r="http://schemas.openxmlformats.org/officeDocument/2006/relationships" xmlns:p="http://schemas.openxmlformats.org/presentationml/2006/main">
-  <p:cSld>
-    <p:spTree>
-      <p:nvGrpSpPr>
-        <p:cNvPr id="1" name=""/>
-        <p:cNvGrpSpPr/>
-        <p:nvPr/>
-      </p:nvGrpSpPr>
-      <p:grpSpPr>
-        <a:xfrm>
-          <a:off x="0" y="0"/>
-          <a:ext cx="0" cy="0"/>
-          <a:chOff x="0" y="0"/>
-          <a:chExt cx="0" cy="0"/>
-        </a:xfrm>
-      </p:grpSpPr>
-      <p:sp>
-        <p:nvSpPr>
-          <p:cNvPr id="2" name="Title 1"/>
-          <p:cNvSpPr>
-            <a:spLocks noGrp="1"/>
-          </p:cNvSpPr>
-          <p:nvPr>
-            <p:ph type="title"/>
-          </p:nvPr>
-        </p:nvSpPr>
-        <p:spPr/>
-        <p:txBody>
-          <a:bodyPr/>
-          <a:lstStyle/>
-          <a:p>
-            <a:r>
-              <a:rPr lang="en-US" dirty="0" smtClean="0"/>
-              <a:t>Motivating example</a:t>
-            </a:r>
-            <a:endParaRPr lang="nl-BE" dirty="0"/>
-          </a:p>
-        </p:txBody>
-      </p:sp>
-      <p:sp>
-        <p:nvSpPr>
-          <p:cNvPr id="3" name="Text Placeholder 2"/>
-          <p:cNvSpPr>
-            <a:spLocks noGrp="1"/>
-          </p:cNvSpPr>
-          <p:nvPr>
-            <p:ph type="body" idx="1"/>
-          </p:nvPr>
-        </p:nvSpPr>
-        <p:spPr/>
-        <p:txBody>
-          <a:bodyPr/>
-          <a:lstStyle/>
-          <a:p>
-            <a:endParaRPr lang="nl-BE"/>
-          </a:p>
-        </p:txBody>
-      </p:sp>
-      <p:sp>
-        <p:nvSpPr>
-          <p:cNvPr id="4" name="Slide Number Placeholder 3"/>
-          <p:cNvSpPr>
-            <a:spLocks noGrp="1"/>
-          </p:cNvSpPr>
-          <p:nvPr>
-            <p:ph type="sldNum" sz="quarter" idx="12"/>
-          </p:nvPr>
-        </p:nvSpPr>
-        <p:spPr/>
-        <p:txBody>
-          <a:bodyPr/>
-          <a:lstStyle/>
-          <a:p>
-            <a:fld id="{B6F15528-21DE-4FAA-801E-634DDDAF4B2B}" type="slidenum">
-              <a:rPr lang="en-US" smtClean="0"/>
-              <a:pPr/>
-              <a:t>2</a:t>
-            </a:fld>
-            <a:endParaRPr lang="en-US"/>
-          </a:p>
-        </p:txBody>
-      </p:sp>
-    </p:spTree>
-    <p:extLst>
-      <p:ext uri="{BB962C8B-B14F-4D97-AF65-F5344CB8AC3E}">
-        <p14:creationId xmlns:p14="http://schemas.microsoft.com/office/powerpoint/2010/main" val="1688384380"/>
-      </p:ext>
-    </p:extLst>
-  </p:cSld>
-  <p:clrMapOvr>
-    <a:masterClrMapping/>
-  </p:clrMapOvr>
-  <p:timing>
-    <p:tnLst>
-      <p:par>
-        <p:cTn id="1" dur="indefinite" restart="never" nodeType="tmRoot"/>
-      </p:par>
-    </p:tnLst>
-  </p:timing>
-</p:sld>
-</file>
-
-<file path=ppt/slides/slide20.xml><?xml version="1.0" encoding="utf-8"?>
-<p:sld xmlns:a="http://schemas.openxmlformats.org/drawingml/2006/main" xmlns:r="http://schemas.openxmlformats.org/officeDocument/2006/relationships" xmlns:p="http://schemas.openxmlformats.org/presentationml/2006/main">
-  <p:cSld>
-    <p:spTree>
-      <p:nvGrpSpPr>
-        <p:cNvPr id="1" name=""/>
-        <p:cNvGrpSpPr/>
-        <p:nvPr/>
-      </p:nvGrpSpPr>
-      <p:grpSpPr>
-        <a:xfrm>
-          <a:off x="0" y="0"/>
-          <a:ext cx="0" cy="0"/>
-          <a:chOff x="0" y="0"/>
-          <a:chExt cx="0" cy="0"/>
-        </a:xfrm>
-      </p:grpSpPr>
-      <p:sp>
-        <p:nvSpPr>
-          <p:cNvPr id="2" name="Title 1"/>
-          <p:cNvSpPr>
-            <a:spLocks noGrp="1"/>
-          </p:cNvSpPr>
-          <p:nvPr>
-            <p:ph type="title"/>
-          </p:nvPr>
-        </p:nvSpPr>
-        <p:spPr/>
-        <p:txBody>
-          <a:bodyPr/>
-          <a:lstStyle/>
-          <a:p>
-            <a:r>
-              <a:rPr lang="en-US" dirty="0" smtClean="0"/>
-              <a:t>Pointers</a:t>
-            </a:r>
-            <a:endParaRPr lang="nl-BE" dirty="0"/>
-          </a:p>
-        </p:txBody>
-      </p:sp>
-      <p:sp>
-        <p:nvSpPr>
-          <p:cNvPr id="3" name="Text Placeholder 2"/>
-          <p:cNvSpPr>
-            <a:spLocks noGrp="1"/>
-          </p:cNvSpPr>
-          <p:nvPr>
-            <p:ph type="body" idx="1"/>
-          </p:nvPr>
-        </p:nvSpPr>
-        <p:spPr/>
-        <p:txBody>
-          <a:bodyPr/>
-          <a:lstStyle/>
-          <a:p>
-            <a:endParaRPr lang="nl-BE"/>
-          </a:p>
-        </p:txBody>
-      </p:sp>
-      <p:sp>
-        <p:nvSpPr>
-          <p:cNvPr id="4" name="Slide Number Placeholder 3"/>
-          <p:cNvSpPr>
-            <a:spLocks noGrp="1"/>
-          </p:cNvSpPr>
-          <p:nvPr>
-            <p:ph type="sldNum" sz="quarter" idx="12"/>
-          </p:nvPr>
-        </p:nvSpPr>
-        <p:spPr/>
-        <p:txBody>
-          <a:bodyPr/>
-          <a:lstStyle/>
-          <a:p>
-            <a:fld id="{B6F15528-21DE-4FAA-801E-634DDDAF4B2B}" type="slidenum">
-              <a:rPr lang="en-US" smtClean="0"/>
-              <a:pPr/>
-              <a:t>20</a:t>
-            </a:fld>
-            <a:endParaRPr lang="en-US"/>
-          </a:p>
-        </p:txBody>
-      </p:sp>
-    </p:spTree>
-    <p:extLst>
-      <p:ext uri="{BB962C8B-B14F-4D97-AF65-F5344CB8AC3E}">
-        <p14:creationId xmlns:p14="http://schemas.microsoft.com/office/powerpoint/2010/main" val="1498256543"/>
-      </p:ext>
-    </p:extLst>
-  </p:cSld>
-  <p:clrMapOvr>
-    <a:masterClrMapping/>
-  </p:clrMapOvr>
-</p:sld>
-</file>
-
 <file path=ppt/slides/slide21.xml><?xml version="1.0" encoding="utf-8"?>
 <p:sld xmlns:a="http://schemas.openxmlformats.org/drawingml/2006/main" xmlns:r="http://schemas.openxmlformats.org/officeDocument/2006/relationships" xmlns:p="http://schemas.openxmlformats.org/presentationml/2006/main">
   <p:cSld>
@@ -11031,6 +12299,21 @@
             <a:r>
               <a:rPr lang="en-US" dirty="0" smtClean="0"/>
               <a:t>Extension types</a:t>
+            </a:r>
+            <a:br>
+              <a:rPr lang="en-US" dirty="0" smtClean="0"/>
+            </a:br>
+            <a:r>
+              <a:rPr lang="en-US" dirty="0" smtClean="0"/>
+              <a:t>aka </a:t>
+            </a:r>
+            <a:r>
+              <a:rPr lang="en-US" dirty="0" err="1" smtClean="0"/>
+              <a:t>cdef</a:t>
+            </a:r>
+            <a:r>
+              <a:rPr lang="en-US" dirty="0" smtClean="0"/>
+              <a:t> classes</a:t>
             </a:r>
             <a:endParaRPr lang="nl-BE" dirty="0"/>
           </a:p>
@@ -11488,14 +12771,7 @@
                   <a:latin typeface="Courier New" panose="02070309020205020404" pitchFamily="49" charset="0"/>
                   <a:cs typeface="Courier New" panose="02070309020205020404" pitchFamily="49" charset="0"/>
                 </a:rPr>
-                <a:t>= </a:t>
-              </a:r>
-              <a:r>
-                <a:rPr lang="en-US" sz="1600" dirty="0" smtClean="0">
-                  <a:latin typeface="Courier New" panose="02070309020205020404" pitchFamily="49" charset="0"/>
-                  <a:cs typeface="Courier New" panose="02070309020205020404" pitchFamily="49" charset="0"/>
-                </a:rPr>
-                <a:t>v</a:t>
+                <a:t>= v</a:t>
               </a:r>
             </a:p>
             <a:p>
@@ -11614,11 +12890,7 @@
             <a:p>
               <a:r>
                 <a:rPr lang="en-US" sz="1400" dirty="0" smtClean="0"/>
-                <a:t>particle_p</a:t>
-              </a:r>
-              <a:r>
-                <a:rPr lang="en-US" sz="1400" dirty="0" smtClean="0"/>
-                <a:t>.py</a:t>
+                <a:t>particle_p.py</a:t>
               </a:r>
               <a:endParaRPr lang="nl-BE" sz="1400" dirty="0"/>
             </a:p>
@@ -11870,14 +13142,7 @@
                   <a:latin typeface="Courier New" panose="02070309020205020404" pitchFamily="49" charset="0"/>
                   <a:cs typeface="Courier New" panose="02070309020205020404" pitchFamily="49" charset="0"/>
                 </a:rPr>
-                <a:t>= </a:t>
-              </a:r>
-              <a:r>
-                <a:rPr lang="en-US" sz="1600" dirty="0" smtClean="0">
-                  <a:latin typeface="Courier New" panose="02070309020205020404" pitchFamily="49" charset="0"/>
-                  <a:cs typeface="Courier New" panose="02070309020205020404" pitchFamily="49" charset="0"/>
-                </a:rPr>
-                <a:t>v</a:t>
+                <a:t>= v</a:t>
               </a:r>
             </a:p>
             <a:p>
@@ -11996,11 +13261,7 @@
             <a:p>
               <a:r>
                 <a:rPr lang="en-US" sz="1400" dirty="0" err="1" smtClean="0"/>
-                <a:t>particle_c</a:t>
-              </a:r>
-              <a:r>
-                <a:rPr lang="en-US" sz="1400" dirty="0" err="1" smtClean="0"/>
-                <a:t>.pyx</a:t>
+                <a:t>particle_c.pyx</a:t>
               </a:r>
               <a:endParaRPr lang="nl-BE" sz="1400" dirty="0"/>
             </a:p>
@@ -12289,6 +13550,49 @@
           </p:style>
         </p:cxnSp>
       </p:grpSp>
+      <p:sp>
+        <p:nvSpPr>
+          <p:cNvPr id="12" name="TextBox 11"/>
+          <p:cNvSpPr txBox="1"/>
+          <p:nvPr/>
+        </p:nvSpPr>
+        <p:spPr>
+          <a:xfrm>
+            <a:off x="5638800" y="6248400"/>
+            <a:ext cx="2339936" cy="369332"/>
+          </a:xfrm>
+          <a:prstGeom prst="rect">
+            <a:avLst/>
+          </a:prstGeom>
+          <a:noFill/>
+          <a:ln>
+            <a:solidFill>
+              <a:schemeClr val="tx1"/>
+            </a:solidFill>
+          </a:ln>
+        </p:spPr>
+        <p:txBody>
+          <a:bodyPr wrap="none" rtlCol="0">
+            <a:spAutoFit/>
+          </a:bodyPr>
+          <a:lstStyle/>
+          <a:p>
+            <a:r>
+              <a:rPr lang="en-US" dirty="0" smtClean="0"/>
+              <a:t>Also called </a:t>
+            </a:r>
+            <a:r>
+              <a:rPr lang="en-US" dirty="0" err="1" smtClean="0"/>
+              <a:t>cdef</a:t>
+            </a:r>
+            <a:r>
+              <a:rPr lang="en-US" dirty="0" smtClean="0"/>
+              <a:t> classes</a:t>
+            </a:r>
+            <a:endParaRPr lang="nl-BE" dirty="0"/>
+          </a:p>
+        </p:txBody>
+      </p:sp>
     </p:spTree>
     <p:extLst>
       <p:ext uri="{BB962C8B-B14F-4D97-AF65-F5344CB8AC3E}">
@@ -12774,8 +14078,12 @@
           <a:p>
             <a:pPr lvl="1"/>
             <a:r>
+              <a:rPr lang="en-US" dirty="0"/>
+              <a:t>N</a:t>
+            </a:r>
+            <a:r>
               <a:rPr lang="en-US" dirty="0" smtClean="0"/>
-              <a:t>not accessible outside class scope</a:t>
+              <a:t>ot accessible outside class scope</a:t>
             </a:r>
           </a:p>
           <a:p>
@@ -12790,8 +14098,12 @@
           <a:p>
             <a:pPr lvl="1"/>
             <a:r>
+              <a:rPr lang="en-US" dirty="0"/>
+              <a:t>V</a:t>
+            </a:r>
+            <a:r>
               <a:rPr lang="en-US" dirty="0" smtClean="0"/>
-              <a:t>value can be used everywhere</a:t>
+              <a:t>alue can be used everywhere</a:t>
             </a:r>
           </a:p>
           <a:p>
@@ -12806,8 +14118,12 @@
           <a:p>
             <a:pPr lvl="1"/>
             <a:r>
+              <a:rPr lang="en-US" dirty="0"/>
+              <a:t>V</a:t>
+            </a:r>
+            <a:r>
               <a:rPr lang="en-US" dirty="0" smtClean="0"/>
-              <a:t>value can be modified everywhere</a:t>
+              <a:t>alue can be modified everywhere</a:t>
             </a:r>
             <a:endParaRPr lang="nl-BE" dirty="0"/>
           </a:p>
@@ -12880,19 +14196,8 @@
                 <a:latin typeface="Courier New" panose="02070309020205020404" pitchFamily="49" charset="0"/>
                 <a:cs typeface="Courier New" panose="02070309020205020404" pitchFamily="49" charset="0"/>
               </a:rPr>
-              <a:t> </a:t>
-            </a:r>
-            <a:r>
-              <a:rPr lang="en-US" dirty="0" smtClean="0">
-                <a:latin typeface="Courier New" panose="02070309020205020404" pitchFamily="49" charset="0"/>
-                <a:cs typeface="Courier New" panose="02070309020205020404" pitchFamily="49" charset="0"/>
-              </a:rPr>
-              <a:t>double m</a:t>
-            </a:r>
-            <a:endParaRPr lang="en-US" dirty="0" smtClean="0">
-              <a:latin typeface="Courier New" panose="02070309020205020404" pitchFamily="49" charset="0"/>
-              <a:cs typeface="Courier New" panose="02070309020205020404" pitchFamily="49" charset="0"/>
-            </a:endParaRPr>
+              <a:t> double m</a:t>
+            </a:r>
           </a:p>
         </p:txBody>
       </p:sp>
@@ -12953,19 +14258,8 @@
                 <a:latin typeface="Courier New" panose="02070309020205020404" pitchFamily="49" charset="0"/>
                 <a:cs typeface="Courier New" panose="02070309020205020404" pitchFamily="49" charset="0"/>
               </a:rPr>
-              <a:t> </a:t>
-            </a:r>
-            <a:r>
-              <a:rPr lang="en-US" dirty="0" smtClean="0">
-                <a:latin typeface="Courier New" panose="02070309020205020404" pitchFamily="49" charset="0"/>
-                <a:cs typeface="Courier New" panose="02070309020205020404" pitchFamily="49" charset="0"/>
-              </a:rPr>
-              <a:t>double m</a:t>
-            </a:r>
-            <a:endParaRPr lang="en-US" dirty="0" smtClean="0">
-              <a:latin typeface="Courier New" panose="02070309020205020404" pitchFamily="49" charset="0"/>
-              <a:cs typeface="Courier New" panose="02070309020205020404" pitchFamily="49" charset="0"/>
-            </a:endParaRPr>
+              <a:t> double m</a:t>
+            </a:r>
           </a:p>
         </p:txBody>
       </p:sp>
@@ -13026,19 +14320,8 @@
                 <a:latin typeface="Courier New" panose="02070309020205020404" pitchFamily="49" charset="0"/>
                 <a:cs typeface="Courier New" panose="02070309020205020404" pitchFamily="49" charset="0"/>
               </a:rPr>
-              <a:t> </a:t>
-            </a:r>
-            <a:r>
-              <a:rPr lang="en-US" dirty="0" smtClean="0">
-                <a:latin typeface="Courier New" panose="02070309020205020404" pitchFamily="49" charset="0"/>
-                <a:cs typeface="Courier New" panose="02070309020205020404" pitchFamily="49" charset="0"/>
-              </a:rPr>
-              <a:t>double m</a:t>
-            </a:r>
-            <a:endParaRPr lang="en-US" dirty="0" smtClean="0">
-              <a:latin typeface="Courier New" panose="02070309020205020404" pitchFamily="49" charset="0"/>
-              <a:cs typeface="Courier New" panose="02070309020205020404" pitchFamily="49" charset="0"/>
-            </a:endParaRPr>
+              <a:t> double m</a:t>
+            </a:r>
           </a:p>
         </p:txBody>
       </p:sp>
@@ -13410,6 +14693,1658 @@
       <p:bldP spid="7" grpId="0" animBg="1"/>
       <p:bldP spid="8" grpId="0" animBg="1"/>
       <p:bldP spid="9" grpId="0" animBg="1"/>
+    </p:bldLst>
+  </p:timing>
+</p:sld>
+</file>
+
+<file path=ppt/slides/slide24.xml><?xml version="1.0" encoding="utf-8"?>
+<p:sld xmlns:a="http://schemas.openxmlformats.org/drawingml/2006/main" xmlns:r="http://schemas.openxmlformats.org/officeDocument/2006/relationships" xmlns:p="http://schemas.openxmlformats.org/presentationml/2006/main">
+  <p:cSld>
+    <p:spTree>
+      <p:nvGrpSpPr>
+        <p:cNvPr id="1" name=""/>
+        <p:cNvGrpSpPr/>
+        <p:nvPr/>
+      </p:nvGrpSpPr>
+      <p:grpSpPr>
+        <a:xfrm>
+          <a:off x="0" y="0"/>
+          <a:ext cx="0" cy="0"/>
+          <a:chOff x="0" y="0"/>
+          <a:chExt cx="0" cy="0"/>
+        </a:xfrm>
+      </p:grpSpPr>
+      <p:sp>
+        <p:nvSpPr>
+          <p:cNvPr id="2" name="Title 1"/>
+          <p:cNvSpPr>
+            <a:spLocks noGrp="1"/>
+          </p:cNvSpPr>
+          <p:nvPr>
+            <p:ph type="title"/>
+          </p:nvPr>
+        </p:nvSpPr>
+        <p:spPr/>
+        <p:txBody>
+          <a:bodyPr/>
+          <a:lstStyle/>
+          <a:p>
+            <a:r>
+              <a:rPr lang="en-US" dirty="0" smtClean="0"/>
+              <a:t>Getter/setters</a:t>
+            </a:r>
+            <a:endParaRPr lang="nl-BE" dirty="0"/>
+          </a:p>
+        </p:txBody>
+      </p:sp>
+      <p:sp>
+        <p:nvSpPr>
+          <p:cNvPr id="3" name="Content Placeholder 2"/>
+          <p:cNvSpPr>
+            <a:spLocks noGrp="1"/>
+          </p:cNvSpPr>
+          <p:nvPr>
+            <p:ph idx="1"/>
+          </p:nvPr>
+        </p:nvSpPr>
+        <p:spPr/>
+        <p:txBody>
+          <a:bodyPr/>
+          <a:lstStyle/>
+          <a:p>
+            <a:r>
+              <a:rPr lang="en-US" dirty="0" smtClean="0"/>
+              <a:t>Python</a:t>
+            </a:r>
+          </a:p>
+          <a:p>
+            <a:pPr lvl="1"/>
+            <a:r>
+              <a:rPr lang="en-US" dirty="0" smtClean="0">
+                <a:latin typeface="Courier New" panose="02070309020205020404" pitchFamily="49" charset="0"/>
+                <a:cs typeface="Courier New" panose="02070309020205020404" pitchFamily="49" charset="0"/>
+              </a:rPr>
+              <a:t>@property</a:t>
+            </a:r>
+            <a:r>
+              <a:rPr lang="en-US" dirty="0" smtClean="0"/>
+              <a:t>: getter</a:t>
+            </a:r>
+          </a:p>
+          <a:p>
+            <a:pPr lvl="1"/>
+            <a:r>
+              <a:rPr lang="en-US" dirty="0" smtClean="0">
+                <a:latin typeface="Courier New" panose="02070309020205020404" pitchFamily="49" charset="0"/>
+                <a:cs typeface="Courier New" panose="02070309020205020404" pitchFamily="49" charset="0"/>
+              </a:rPr>
+              <a:t>@</a:t>
+            </a:r>
+            <a:r>
+              <a:rPr lang="en-US" dirty="0" err="1" smtClean="0">
+                <a:latin typeface="Courier New" panose="02070309020205020404" pitchFamily="49" charset="0"/>
+                <a:cs typeface="Courier New" panose="02070309020205020404" pitchFamily="49" charset="0"/>
+              </a:rPr>
+              <a:t>var.setter</a:t>
+            </a:r>
+            <a:r>
+              <a:rPr lang="en-US" dirty="0" smtClean="0"/>
+              <a:t>: setter</a:t>
+            </a:r>
+            <a:br>
+              <a:rPr lang="en-US" dirty="0" smtClean="0"/>
+            </a:br>
+            <a:r>
+              <a:rPr lang="en-US" dirty="0" smtClean="0"/>
+              <a:t>for </a:t>
+            </a:r>
+            <a:r>
+              <a:rPr lang="en-US" dirty="0" err="1" smtClean="0">
+                <a:latin typeface="Courier New" panose="02070309020205020404" pitchFamily="49" charset="0"/>
+                <a:cs typeface="Courier New" panose="02070309020205020404" pitchFamily="49" charset="0"/>
+              </a:rPr>
+              <a:t>var</a:t>
+            </a:r>
+            <a:endParaRPr lang="en-US" dirty="0" smtClean="0">
+              <a:latin typeface="Courier New" panose="02070309020205020404" pitchFamily="49" charset="0"/>
+              <a:cs typeface="Courier New" panose="02070309020205020404" pitchFamily="49" charset="0"/>
+            </a:endParaRPr>
+          </a:p>
+          <a:p>
+            <a:r>
+              <a:rPr lang="en-US" dirty="0" err="1" smtClean="0"/>
+              <a:t>Cython</a:t>
+            </a:r>
+            <a:endParaRPr lang="en-US" dirty="0" smtClean="0"/>
+          </a:p>
+          <a:p>
+            <a:pPr lvl="1"/>
+            <a:r>
+              <a:rPr lang="en-US" dirty="0" smtClean="0">
+                <a:latin typeface="Courier New" panose="02070309020205020404" pitchFamily="49" charset="0"/>
+                <a:cs typeface="Courier New" panose="02070309020205020404" pitchFamily="49" charset="0"/>
+              </a:rPr>
+              <a:t>__get__</a:t>
+            </a:r>
+            <a:r>
+              <a:rPr lang="en-US" dirty="0" smtClean="0"/>
+              <a:t>: getter</a:t>
+            </a:r>
+          </a:p>
+          <a:p>
+            <a:pPr lvl="1"/>
+            <a:r>
+              <a:rPr lang="en-US" dirty="0" smtClean="0">
+                <a:latin typeface="Courier New" panose="02070309020205020404" pitchFamily="49" charset="0"/>
+                <a:cs typeface="Courier New" panose="02070309020205020404" pitchFamily="49" charset="0"/>
+              </a:rPr>
+              <a:t>__set__</a:t>
+            </a:r>
+            <a:r>
+              <a:rPr lang="en-US" dirty="0" smtClean="0"/>
+              <a:t>: setter</a:t>
+            </a:r>
+          </a:p>
+          <a:p>
+            <a:pPr lvl="1"/>
+            <a:endParaRPr lang="en-US" dirty="0" smtClean="0"/>
+          </a:p>
+          <a:p>
+            <a:pPr lvl="1"/>
+            <a:endParaRPr lang="nl-BE" dirty="0"/>
+          </a:p>
+        </p:txBody>
+      </p:sp>
+      <p:sp>
+        <p:nvSpPr>
+          <p:cNvPr id="4" name="Slide Number Placeholder 3"/>
+          <p:cNvSpPr>
+            <a:spLocks noGrp="1"/>
+          </p:cNvSpPr>
+          <p:nvPr>
+            <p:ph type="sldNum" sz="quarter" idx="12"/>
+          </p:nvPr>
+        </p:nvSpPr>
+        <p:spPr/>
+        <p:txBody>
+          <a:bodyPr/>
+          <a:lstStyle/>
+          <a:p>
+            <a:fld id="{B6F15528-21DE-4FAA-801E-634DDDAF4B2B}" type="slidenum">
+              <a:rPr lang="en-US" smtClean="0"/>
+              <a:pPr/>
+              <a:t>24</a:t>
+            </a:fld>
+            <a:endParaRPr lang="en-US"/>
+          </a:p>
+        </p:txBody>
+      </p:sp>
+      <p:sp>
+        <p:nvSpPr>
+          <p:cNvPr id="6" name="TextBox 5"/>
+          <p:cNvSpPr txBox="1"/>
+          <p:nvPr/>
+        </p:nvSpPr>
+        <p:spPr>
+          <a:xfrm>
+            <a:off x="4800599" y="2257961"/>
+            <a:ext cx="4134465" cy="1323439"/>
+          </a:xfrm>
+          <a:prstGeom prst="rect">
+            <a:avLst/>
+          </a:prstGeom>
+          <a:solidFill>
+            <a:schemeClr val="bg1">
+              <a:lumMod val="85000"/>
+            </a:schemeClr>
+          </a:solidFill>
+          <a:ln>
+            <a:solidFill>
+              <a:schemeClr val="tx1"/>
+            </a:solidFill>
+          </a:ln>
+        </p:spPr>
+        <p:txBody>
+          <a:bodyPr wrap="square" rtlCol="0">
+            <a:spAutoFit/>
+          </a:bodyPr>
+          <a:lstStyle/>
+          <a:p>
+            <a:r>
+              <a:rPr lang="en-US" sz="1600" dirty="0" smtClean="0">
+                <a:latin typeface="Courier New" panose="02070309020205020404" pitchFamily="49" charset="0"/>
+                <a:cs typeface="Courier New" panose="02070309020205020404" pitchFamily="49" charset="0"/>
+              </a:rPr>
+              <a:t>…</a:t>
+            </a:r>
+          </a:p>
+          <a:p>
+            <a:r>
+              <a:rPr lang="en-US" sz="1600" dirty="0">
+                <a:latin typeface="Courier New" panose="02070309020205020404" pitchFamily="49" charset="0"/>
+                <a:cs typeface="Courier New" panose="02070309020205020404" pitchFamily="49" charset="0"/>
+              </a:rPr>
+              <a:t> </a:t>
+            </a:r>
+            <a:r>
+              <a:rPr lang="en-US" sz="1600" dirty="0" smtClean="0">
+                <a:latin typeface="Courier New" panose="02070309020205020404" pitchFamily="49" charset="0"/>
+                <a:cs typeface="Courier New" panose="02070309020205020404" pitchFamily="49" charset="0"/>
+              </a:rPr>
+              <a:t>   @property</a:t>
+            </a:r>
+          </a:p>
+          <a:p>
+            <a:r>
+              <a:rPr lang="en-US" sz="1600" dirty="0">
+                <a:latin typeface="Courier New" panose="02070309020205020404" pitchFamily="49" charset="0"/>
+                <a:cs typeface="Courier New" panose="02070309020205020404" pitchFamily="49" charset="0"/>
+              </a:rPr>
+              <a:t> </a:t>
+            </a:r>
+            <a:r>
+              <a:rPr lang="en-US" sz="1600" dirty="0" smtClean="0">
+                <a:latin typeface="Courier New" panose="02070309020205020404" pitchFamily="49" charset="0"/>
+                <a:cs typeface="Courier New" panose="02070309020205020404" pitchFamily="49" charset="0"/>
+              </a:rPr>
+              <a:t>   </a:t>
+            </a:r>
+            <a:r>
+              <a:rPr lang="en-US" sz="1600" dirty="0" err="1" smtClean="0">
+                <a:latin typeface="Courier New" panose="02070309020205020404" pitchFamily="49" charset="0"/>
+                <a:cs typeface="Courier New" panose="02070309020205020404" pitchFamily="49" charset="0"/>
+              </a:rPr>
+              <a:t>def</a:t>
+            </a:r>
+            <a:r>
+              <a:rPr lang="en-US" sz="1600" dirty="0" smtClean="0">
+                <a:latin typeface="Courier New" panose="02070309020205020404" pitchFamily="49" charset="0"/>
+                <a:cs typeface="Courier New" panose="02070309020205020404" pitchFamily="49" charset="0"/>
+              </a:rPr>
+              <a:t> momentum(self):</a:t>
+            </a:r>
+          </a:p>
+          <a:p>
+            <a:r>
+              <a:rPr lang="en-US" sz="1600" dirty="0">
+                <a:latin typeface="Courier New" panose="02070309020205020404" pitchFamily="49" charset="0"/>
+                <a:cs typeface="Courier New" panose="02070309020205020404" pitchFamily="49" charset="0"/>
+              </a:rPr>
+              <a:t> </a:t>
+            </a:r>
+            <a:r>
+              <a:rPr lang="en-US" sz="1600" dirty="0" smtClean="0">
+                <a:latin typeface="Courier New" panose="02070309020205020404" pitchFamily="49" charset="0"/>
+                <a:cs typeface="Courier New" panose="02070309020205020404" pitchFamily="49" charset="0"/>
+              </a:rPr>
+              <a:t>       return </a:t>
+            </a:r>
+            <a:r>
+              <a:rPr lang="en-US" sz="1600" dirty="0" err="1" smtClean="0">
+                <a:latin typeface="Courier New" panose="02070309020205020404" pitchFamily="49" charset="0"/>
+                <a:cs typeface="Courier New" panose="02070309020205020404" pitchFamily="49" charset="0"/>
+              </a:rPr>
+              <a:t>self.m</a:t>
+            </a:r>
+            <a:r>
+              <a:rPr lang="en-US" sz="1600" dirty="0" smtClean="0">
+                <a:latin typeface="Courier New" panose="02070309020205020404" pitchFamily="49" charset="0"/>
+                <a:cs typeface="Courier New" panose="02070309020205020404" pitchFamily="49" charset="0"/>
+              </a:rPr>
+              <a:t>*</a:t>
+            </a:r>
+            <a:r>
+              <a:rPr lang="en-US" sz="1600" dirty="0" err="1" smtClean="0">
+                <a:latin typeface="Courier New" panose="02070309020205020404" pitchFamily="49" charset="0"/>
+                <a:cs typeface="Courier New" panose="02070309020205020404" pitchFamily="49" charset="0"/>
+              </a:rPr>
+              <a:t>self.v</a:t>
+            </a:r>
+            <a:endParaRPr lang="en-US" sz="1600" dirty="0" smtClean="0">
+              <a:latin typeface="Courier New" panose="02070309020205020404" pitchFamily="49" charset="0"/>
+              <a:cs typeface="Courier New" panose="02070309020205020404" pitchFamily="49" charset="0"/>
+            </a:endParaRPr>
+          </a:p>
+          <a:p>
+            <a:r>
+              <a:rPr lang="en-US" sz="1600" dirty="0" smtClean="0">
+                <a:latin typeface="Courier New" panose="02070309020205020404" pitchFamily="49" charset="0"/>
+                <a:cs typeface="Courier New" panose="02070309020205020404" pitchFamily="49" charset="0"/>
+              </a:rPr>
+              <a:t>…</a:t>
+            </a:r>
+          </a:p>
+        </p:txBody>
+      </p:sp>
+      <p:sp>
+        <p:nvSpPr>
+          <p:cNvPr id="8" name="TextBox 7"/>
+          <p:cNvSpPr txBox="1"/>
+          <p:nvPr/>
+        </p:nvSpPr>
+        <p:spPr>
+          <a:xfrm>
+            <a:off x="4800600" y="4162961"/>
+            <a:ext cx="4134465" cy="1323439"/>
+          </a:xfrm>
+          <a:prstGeom prst="rect">
+            <a:avLst/>
+          </a:prstGeom>
+          <a:solidFill>
+            <a:schemeClr val="bg1">
+              <a:lumMod val="85000"/>
+            </a:schemeClr>
+          </a:solidFill>
+          <a:ln>
+            <a:solidFill>
+              <a:schemeClr val="tx1"/>
+            </a:solidFill>
+          </a:ln>
+        </p:spPr>
+        <p:txBody>
+          <a:bodyPr wrap="none" rtlCol="0">
+            <a:spAutoFit/>
+          </a:bodyPr>
+          <a:lstStyle/>
+          <a:p>
+            <a:r>
+              <a:rPr lang="en-US" sz="1600" dirty="0" smtClean="0">
+                <a:latin typeface="Courier New" panose="02070309020205020404" pitchFamily="49" charset="0"/>
+                <a:cs typeface="Courier New" panose="02070309020205020404" pitchFamily="49" charset="0"/>
+              </a:rPr>
+              <a:t>…</a:t>
+            </a:r>
+          </a:p>
+          <a:p>
+            <a:r>
+              <a:rPr lang="en-US" sz="1600" dirty="0">
+                <a:latin typeface="Courier New" panose="02070309020205020404" pitchFamily="49" charset="0"/>
+                <a:cs typeface="Courier New" panose="02070309020205020404" pitchFamily="49" charset="0"/>
+              </a:rPr>
+              <a:t> </a:t>
+            </a:r>
+            <a:r>
+              <a:rPr lang="en-US" sz="1600" dirty="0" smtClean="0">
+                <a:latin typeface="Courier New" panose="02070309020205020404" pitchFamily="49" charset="0"/>
+                <a:cs typeface="Courier New" panose="02070309020205020404" pitchFamily="49" charset="0"/>
+              </a:rPr>
+              <a:t>   property momentum:</a:t>
+            </a:r>
+            <a:br>
+              <a:rPr lang="en-US" sz="1600" dirty="0" smtClean="0">
+                <a:latin typeface="Courier New" panose="02070309020205020404" pitchFamily="49" charset="0"/>
+                <a:cs typeface="Courier New" panose="02070309020205020404" pitchFamily="49" charset="0"/>
+              </a:rPr>
+            </a:br>
+            <a:r>
+              <a:rPr lang="en-US" sz="1600" dirty="0" smtClean="0">
+                <a:latin typeface="Courier New" panose="02070309020205020404" pitchFamily="49" charset="0"/>
+                <a:cs typeface="Courier New" panose="02070309020205020404" pitchFamily="49" charset="0"/>
+              </a:rPr>
+              <a:t>        </a:t>
+            </a:r>
+            <a:r>
+              <a:rPr lang="en-US" sz="1600" dirty="0" err="1" smtClean="0">
+                <a:latin typeface="Courier New" panose="02070309020205020404" pitchFamily="49" charset="0"/>
+                <a:cs typeface="Courier New" panose="02070309020205020404" pitchFamily="49" charset="0"/>
+              </a:rPr>
+              <a:t>def</a:t>
+            </a:r>
+            <a:r>
+              <a:rPr lang="en-US" sz="1600" dirty="0" smtClean="0">
+                <a:latin typeface="Courier New" panose="02070309020205020404" pitchFamily="49" charset="0"/>
+                <a:cs typeface="Courier New" panose="02070309020205020404" pitchFamily="49" charset="0"/>
+              </a:rPr>
+              <a:t> __get__(self):</a:t>
+            </a:r>
+          </a:p>
+          <a:p>
+            <a:r>
+              <a:rPr lang="en-US" sz="1600" dirty="0">
+                <a:latin typeface="Courier New" panose="02070309020205020404" pitchFamily="49" charset="0"/>
+                <a:cs typeface="Courier New" panose="02070309020205020404" pitchFamily="49" charset="0"/>
+              </a:rPr>
+              <a:t> </a:t>
+            </a:r>
+            <a:r>
+              <a:rPr lang="en-US" sz="1600" dirty="0" smtClean="0">
+                <a:latin typeface="Courier New" panose="02070309020205020404" pitchFamily="49" charset="0"/>
+                <a:cs typeface="Courier New" panose="02070309020205020404" pitchFamily="49" charset="0"/>
+              </a:rPr>
+              <a:t>           return </a:t>
+            </a:r>
+            <a:r>
+              <a:rPr lang="en-US" sz="1600" dirty="0" err="1" smtClean="0">
+                <a:latin typeface="Courier New" panose="02070309020205020404" pitchFamily="49" charset="0"/>
+                <a:cs typeface="Courier New" panose="02070309020205020404" pitchFamily="49" charset="0"/>
+              </a:rPr>
+              <a:t>self.m</a:t>
+            </a:r>
+            <a:r>
+              <a:rPr lang="en-US" sz="1600" dirty="0" smtClean="0">
+                <a:latin typeface="Courier New" panose="02070309020205020404" pitchFamily="49" charset="0"/>
+                <a:cs typeface="Courier New" panose="02070309020205020404" pitchFamily="49" charset="0"/>
+              </a:rPr>
+              <a:t>*</a:t>
+            </a:r>
+            <a:r>
+              <a:rPr lang="en-US" sz="1600" dirty="0" err="1" smtClean="0">
+                <a:latin typeface="Courier New" panose="02070309020205020404" pitchFamily="49" charset="0"/>
+                <a:cs typeface="Courier New" panose="02070309020205020404" pitchFamily="49" charset="0"/>
+              </a:rPr>
+              <a:t>self.v</a:t>
+            </a:r>
+            <a:endParaRPr lang="en-US" sz="1600" dirty="0" smtClean="0">
+              <a:latin typeface="Courier New" panose="02070309020205020404" pitchFamily="49" charset="0"/>
+              <a:cs typeface="Courier New" panose="02070309020205020404" pitchFamily="49" charset="0"/>
+            </a:endParaRPr>
+          </a:p>
+          <a:p>
+            <a:r>
+              <a:rPr lang="en-US" sz="1600" dirty="0" smtClean="0">
+                <a:latin typeface="Courier New" panose="02070309020205020404" pitchFamily="49" charset="0"/>
+                <a:cs typeface="Courier New" panose="02070309020205020404" pitchFamily="49" charset="0"/>
+              </a:rPr>
+              <a:t>…</a:t>
+            </a:r>
+          </a:p>
+        </p:txBody>
+      </p:sp>
+    </p:spTree>
+    <p:extLst>
+      <p:ext uri="{BB962C8B-B14F-4D97-AF65-F5344CB8AC3E}">
+        <p14:creationId xmlns:p14="http://schemas.microsoft.com/office/powerpoint/2010/main" val="1404700431"/>
+      </p:ext>
+    </p:extLst>
+  </p:cSld>
+  <p:clrMapOvr>
+    <a:masterClrMapping/>
+  </p:clrMapOvr>
+  <p:timing>
+    <p:tnLst>
+      <p:par>
+        <p:cTn id="1" dur="indefinite" restart="never" nodeType="tmRoot"/>
+      </p:par>
+    </p:tnLst>
+  </p:timing>
+</p:sld>
+</file>
+
+<file path=ppt/slides/slide25.xml><?xml version="1.0" encoding="utf-8"?>
+<p:sld xmlns:a="http://schemas.openxmlformats.org/drawingml/2006/main" xmlns:r="http://schemas.openxmlformats.org/officeDocument/2006/relationships" xmlns:p="http://schemas.openxmlformats.org/presentationml/2006/main">
+  <p:cSld>
+    <p:spTree>
+      <p:nvGrpSpPr>
+        <p:cNvPr id="1" name=""/>
+        <p:cNvGrpSpPr/>
+        <p:nvPr/>
+      </p:nvGrpSpPr>
+      <p:grpSpPr>
+        <a:xfrm>
+          <a:off x="0" y="0"/>
+          <a:ext cx="0" cy="0"/>
+          <a:chOff x="0" y="0"/>
+          <a:chExt cx="0" cy="0"/>
+        </a:xfrm>
+      </p:grpSpPr>
+      <p:sp>
+        <p:nvSpPr>
+          <p:cNvPr id="2" name="Title 1"/>
+          <p:cNvSpPr>
+            <a:spLocks noGrp="1"/>
+          </p:cNvSpPr>
+          <p:nvPr>
+            <p:ph type="title"/>
+          </p:nvPr>
+        </p:nvSpPr>
+        <p:spPr/>
+        <p:txBody>
+          <a:bodyPr/>
+          <a:lstStyle/>
+          <a:p>
+            <a:r>
+              <a:rPr lang="en-US" dirty="0" smtClean="0"/>
+              <a:t>Allocating/deallocating memory</a:t>
+            </a:r>
+            <a:endParaRPr lang="nl-BE" dirty="0"/>
+          </a:p>
+        </p:txBody>
+      </p:sp>
+      <p:sp>
+        <p:nvSpPr>
+          <p:cNvPr id="3" name="Content Placeholder 2"/>
+          <p:cNvSpPr>
+            <a:spLocks noGrp="1"/>
+          </p:cNvSpPr>
+          <p:nvPr>
+            <p:ph idx="1"/>
+          </p:nvPr>
+        </p:nvSpPr>
+        <p:spPr/>
+        <p:txBody>
+          <a:bodyPr>
+            <a:normAutofit lnSpcReduction="10000"/>
+          </a:bodyPr>
+          <a:lstStyle/>
+          <a:p>
+            <a:r>
+              <a:rPr lang="en-US" dirty="0" smtClean="0"/>
+              <a:t>Use </a:t>
+            </a:r>
+            <a:r>
+              <a:rPr lang="en-US" dirty="0" smtClean="0">
+                <a:latin typeface="Courier New" panose="02070309020205020404" pitchFamily="49" charset="0"/>
+                <a:cs typeface="Courier New" panose="02070309020205020404" pitchFamily="49" charset="0"/>
+              </a:rPr>
+              <a:t>__</a:t>
+            </a:r>
+            <a:r>
+              <a:rPr lang="en-US" dirty="0" err="1" smtClean="0">
+                <a:latin typeface="Courier New" panose="02070309020205020404" pitchFamily="49" charset="0"/>
+                <a:cs typeface="Courier New" panose="02070309020205020404" pitchFamily="49" charset="0"/>
+              </a:rPr>
+              <a:t>cinit</a:t>
+            </a:r>
+            <a:r>
+              <a:rPr lang="en-US" dirty="0" smtClean="0">
+                <a:latin typeface="Courier New" panose="02070309020205020404" pitchFamily="49" charset="0"/>
+                <a:cs typeface="Courier New" panose="02070309020205020404" pitchFamily="49" charset="0"/>
+              </a:rPr>
+              <a:t>__</a:t>
+            </a:r>
+            <a:r>
+              <a:rPr lang="en-US" dirty="0" smtClean="0"/>
+              <a:t> method for dynamic memory allocation (e.g., </a:t>
+            </a:r>
+            <a:r>
+              <a:rPr lang="en-US" dirty="0" err="1" smtClean="0">
+                <a:latin typeface="Courier New" panose="02070309020205020404" pitchFamily="49" charset="0"/>
+                <a:cs typeface="Courier New" panose="02070309020205020404" pitchFamily="49" charset="0"/>
+              </a:rPr>
+              <a:t>malloc</a:t>
+            </a:r>
+            <a:r>
+              <a:rPr lang="en-US" dirty="0" smtClean="0"/>
+              <a:t>)</a:t>
+            </a:r>
+          </a:p>
+          <a:p>
+            <a:pPr lvl="1"/>
+            <a:r>
+              <a:rPr lang="en-US" dirty="0" smtClean="0"/>
+              <a:t>Guaranteed to be called exactly once during construction</a:t>
+            </a:r>
+          </a:p>
+          <a:p>
+            <a:pPr lvl="1"/>
+            <a:r>
+              <a:rPr lang="en-US" i="1" dirty="0" smtClean="0"/>
+              <a:t>Don't </a:t>
+            </a:r>
+            <a:r>
+              <a:rPr lang="en-US" dirty="0" smtClean="0"/>
+              <a:t>allocate memory in </a:t>
+            </a:r>
+            <a:r>
+              <a:rPr lang="en-US" dirty="0" smtClean="0">
+                <a:latin typeface="Courier New" panose="02070309020205020404" pitchFamily="49" charset="0"/>
+                <a:cs typeface="Courier New" panose="02070309020205020404" pitchFamily="49" charset="0"/>
+              </a:rPr>
+              <a:t>__</a:t>
+            </a:r>
+            <a:r>
+              <a:rPr lang="en-US" dirty="0" err="1" smtClean="0">
+                <a:latin typeface="Courier New" panose="02070309020205020404" pitchFamily="49" charset="0"/>
+                <a:cs typeface="Courier New" panose="02070309020205020404" pitchFamily="49" charset="0"/>
+              </a:rPr>
+              <a:t>init</a:t>
+            </a:r>
+            <a:r>
+              <a:rPr lang="en-US" dirty="0" smtClean="0">
+                <a:latin typeface="Courier New" panose="02070309020205020404" pitchFamily="49" charset="0"/>
+                <a:cs typeface="Courier New" panose="02070309020205020404" pitchFamily="49" charset="0"/>
+              </a:rPr>
+              <a:t>__</a:t>
+            </a:r>
+            <a:r>
+              <a:rPr lang="en-US" dirty="0" smtClean="0"/>
+              <a:t>!</a:t>
+            </a:r>
+          </a:p>
+          <a:p>
+            <a:r>
+              <a:rPr lang="en-US" dirty="0" smtClean="0"/>
+              <a:t>Use </a:t>
+            </a:r>
+            <a:r>
+              <a:rPr lang="en-US" dirty="0" smtClean="0">
+                <a:latin typeface="Courier New" panose="02070309020205020404" pitchFamily="49" charset="0"/>
+                <a:cs typeface="Courier New" panose="02070309020205020404" pitchFamily="49" charset="0"/>
+              </a:rPr>
+              <a:t>__</a:t>
+            </a:r>
+            <a:r>
+              <a:rPr lang="en-US" dirty="0" err="1" smtClean="0">
+                <a:latin typeface="Courier New" panose="02070309020205020404" pitchFamily="49" charset="0"/>
+                <a:cs typeface="Courier New" panose="02070309020205020404" pitchFamily="49" charset="0"/>
+              </a:rPr>
+              <a:t>dealloc</a:t>
+            </a:r>
+            <a:r>
+              <a:rPr lang="en-US" dirty="0" smtClean="0">
+                <a:latin typeface="Courier New" panose="02070309020205020404" pitchFamily="49" charset="0"/>
+                <a:cs typeface="Courier New" panose="02070309020205020404" pitchFamily="49" charset="0"/>
+              </a:rPr>
+              <a:t>__</a:t>
+            </a:r>
+            <a:r>
+              <a:rPr lang="en-US" dirty="0" smtClean="0"/>
+              <a:t> method for memory deallocation (e.g., </a:t>
+            </a:r>
+            <a:r>
+              <a:rPr lang="en-US" dirty="0" smtClean="0">
+                <a:latin typeface="Courier New" panose="02070309020205020404" pitchFamily="49" charset="0"/>
+                <a:cs typeface="Courier New" panose="02070309020205020404" pitchFamily="49" charset="0"/>
+              </a:rPr>
+              <a:t>free</a:t>
+            </a:r>
+            <a:r>
+              <a:rPr lang="en-US" dirty="0" smtClean="0"/>
+              <a:t>)</a:t>
+            </a:r>
+          </a:p>
+          <a:p>
+            <a:pPr lvl="1"/>
+            <a:r>
+              <a:rPr lang="en-US" dirty="0" smtClean="0"/>
+              <a:t>Guaranteed to be called exactly once during destruction</a:t>
+            </a:r>
+            <a:endParaRPr lang="nl-BE" dirty="0"/>
+          </a:p>
+        </p:txBody>
+      </p:sp>
+      <p:sp>
+        <p:nvSpPr>
+          <p:cNvPr id="4" name="Slide Number Placeholder 3"/>
+          <p:cNvSpPr>
+            <a:spLocks noGrp="1"/>
+          </p:cNvSpPr>
+          <p:nvPr>
+            <p:ph type="sldNum" sz="quarter" idx="12"/>
+          </p:nvPr>
+        </p:nvSpPr>
+        <p:spPr/>
+        <p:txBody>
+          <a:bodyPr/>
+          <a:lstStyle/>
+          <a:p>
+            <a:fld id="{B6F15528-21DE-4FAA-801E-634DDDAF4B2B}" type="slidenum">
+              <a:rPr lang="en-US" smtClean="0"/>
+              <a:pPr/>
+              <a:t>25</a:t>
+            </a:fld>
+            <a:endParaRPr lang="en-US"/>
+          </a:p>
+        </p:txBody>
+      </p:sp>
+    </p:spTree>
+    <p:extLst>
+      <p:ext uri="{BB962C8B-B14F-4D97-AF65-F5344CB8AC3E}">
+        <p14:creationId xmlns:p14="http://schemas.microsoft.com/office/powerpoint/2010/main" val="2550179540"/>
+      </p:ext>
+    </p:extLst>
+  </p:cSld>
+  <p:clrMapOvr>
+    <a:masterClrMapping/>
+  </p:clrMapOvr>
+  <p:timing>
+    <p:tnLst>
+      <p:par>
+        <p:cTn id="1" dur="indefinite" restart="never" nodeType="tmRoot"/>
+      </p:par>
+    </p:tnLst>
+  </p:timing>
+</p:sld>
+</file>
+
+<file path=ppt/slides/slide26.xml><?xml version="1.0" encoding="utf-8"?>
+<p:sld xmlns:a="http://schemas.openxmlformats.org/drawingml/2006/main" xmlns:r="http://schemas.openxmlformats.org/officeDocument/2006/relationships" xmlns:p="http://schemas.openxmlformats.org/presentationml/2006/main">
+  <p:cSld>
+    <p:spTree>
+      <p:nvGrpSpPr>
+        <p:cNvPr id="1" name=""/>
+        <p:cNvGrpSpPr/>
+        <p:nvPr/>
+      </p:nvGrpSpPr>
+      <p:grpSpPr>
+        <a:xfrm>
+          <a:off x="0" y="0"/>
+          <a:ext cx="0" cy="0"/>
+          <a:chOff x="0" y="0"/>
+          <a:chExt cx="0" cy="0"/>
+        </a:xfrm>
+      </p:grpSpPr>
+      <p:sp>
+        <p:nvSpPr>
+          <p:cNvPr id="2" name="Title 1"/>
+          <p:cNvSpPr>
+            <a:spLocks noGrp="1"/>
+          </p:cNvSpPr>
+          <p:nvPr>
+            <p:ph type="title"/>
+          </p:nvPr>
+        </p:nvSpPr>
+        <p:spPr/>
+        <p:txBody>
+          <a:bodyPr/>
+          <a:lstStyle/>
+          <a:p>
+            <a:r>
+              <a:rPr lang="en-US" dirty="0" smtClean="0"/>
+              <a:t>Inheritance</a:t>
+            </a:r>
+            <a:endParaRPr lang="nl-BE" dirty="0"/>
+          </a:p>
+        </p:txBody>
+      </p:sp>
+      <p:sp>
+        <p:nvSpPr>
+          <p:cNvPr id="3" name="Content Placeholder 2"/>
+          <p:cNvSpPr>
+            <a:spLocks noGrp="1"/>
+          </p:cNvSpPr>
+          <p:nvPr>
+            <p:ph idx="1"/>
+          </p:nvPr>
+        </p:nvSpPr>
+        <p:spPr/>
+        <p:txBody>
+          <a:bodyPr>
+            <a:normAutofit lnSpcReduction="10000"/>
+          </a:bodyPr>
+          <a:lstStyle/>
+          <a:p>
+            <a:r>
+              <a:rPr lang="en-US" dirty="0" smtClean="0"/>
+              <a:t>Extension types can inherit from</a:t>
+            </a:r>
+          </a:p>
+          <a:p>
+            <a:pPr lvl="1"/>
+            <a:r>
+              <a:rPr lang="en-US" dirty="0" smtClean="0"/>
+              <a:t>Single superclass only</a:t>
+            </a:r>
+          </a:p>
+          <a:p>
+            <a:pPr lvl="1"/>
+            <a:r>
+              <a:rPr lang="en-US" dirty="0" smtClean="0"/>
+              <a:t>Superclass is build-in class (e.g., </a:t>
+            </a:r>
+            <a:r>
+              <a:rPr lang="en-US" dirty="0" smtClean="0">
+                <a:latin typeface="Courier New" panose="02070309020205020404" pitchFamily="49" charset="0"/>
+                <a:cs typeface="Courier New" panose="02070309020205020404" pitchFamily="49" charset="0"/>
+              </a:rPr>
+              <a:t>object</a:t>
+            </a:r>
+            <a:r>
+              <a:rPr lang="en-US" dirty="0" smtClean="0"/>
+              <a:t>), or extension type</a:t>
+            </a:r>
+          </a:p>
+          <a:p>
+            <a:pPr lvl="1"/>
+            <a:r>
+              <a:rPr lang="en-US" dirty="0" smtClean="0"/>
+              <a:t>Superclass can not be regular Python class</a:t>
+            </a:r>
+          </a:p>
+          <a:p>
+            <a:r>
+              <a:rPr lang="en-US" dirty="0" smtClean="0"/>
+              <a:t>Python classes can inherit from extension types</a:t>
+            </a:r>
+          </a:p>
+          <a:p>
+            <a:pPr lvl="1"/>
+            <a:r>
+              <a:rPr lang="en-US" dirty="0" smtClean="0"/>
+              <a:t>Can not use </a:t>
+            </a:r>
+            <a:r>
+              <a:rPr lang="en-US" dirty="0" err="1" smtClean="0">
+                <a:latin typeface="Courier New" panose="02070309020205020404" pitchFamily="49" charset="0"/>
+                <a:cs typeface="Courier New" panose="02070309020205020404" pitchFamily="49" charset="0"/>
+              </a:rPr>
+              <a:t>cdef</a:t>
+            </a:r>
+            <a:r>
+              <a:rPr lang="en-US" dirty="0" smtClean="0"/>
+              <a:t> methods from superclass</a:t>
+            </a:r>
+          </a:p>
+          <a:p>
+            <a:pPr lvl="1"/>
+            <a:r>
+              <a:rPr lang="en-US" dirty="0" smtClean="0"/>
+              <a:t>Can not override </a:t>
+            </a:r>
+            <a:r>
+              <a:rPr lang="en-US" dirty="0" err="1" smtClean="0">
+                <a:latin typeface="Courier New" panose="02070309020205020404" pitchFamily="49" charset="0"/>
+                <a:cs typeface="Courier New" panose="02070309020205020404" pitchFamily="49" charset="0"/>
+              </a:rPr>
+              <a:t>cdef</a:t>
+            </a:r>
+            <a:r>
+              <a:rPr lang="en-US" dirty="0" smtClean="0"/>
+              <a:t> methods from superclass</a:t>
+            </a:r>
+            <a:endParaRPr lang="nl-BE" dirty="0"/>
+          </a:p>
+        </p:txBody>
+      </p:sp>
+      <p:sp>
+        <p:nvSpPr>
+          <p:cNvPr id="4" name="Slide Number Placeholder 3"/>
+          <p:cNvSpPr>
+            <a:spLocks noGrp="1"/>
+          </p:cNvSpPr>
+          <p:nvPr>
+            <p:ph type="sldNum" sz="quarter" idx="12"/>
+          </p:nvPr>
+        </p:nvSpPr>
+        <p:spPr/>
+        <p:txBody>
+          <a:bodyPr/>
+          <a:lstStyle/>
+          <a:p>
+            <a:fld id="{B6F15528-21DE-4FAA-801E-634DDDAF4B2B}" type="slidenum">
+              <a:rPr lang="en-US" smtClean="0"/>
+              <a:pPr/>
+              <a:t>26</a:t>
+            </a:fld>
+            <a:endParaRPr lang="en-US"/>
+          </a:p>
+        </p:txBody>
+      </p:sp>
+    </p:spTree>
+    <p:extLst>
+      <p:ext uri="{BB962C8B-B14F-4D97-AF65-F5344CB8AC3E}">
+        <p14:creationId xmlns:p14="http://schemas.microsoft.com/office/powerpoint/2010/main" val="770544777"/>
+      </p:ext>
+    </p:extLst>
+  </p:cSld>
+  <p:clrMapOvr>
+    <a:masterClrMapping/>
+  </p:clrMapOvr>
+  <p:timing>
+    <p:tnLst>
+      <p:par>
+        <p:cTn id="1" dur="indefinite" restart="never" nodeType="tmRoot"/>
+      </p:par>
+    </p:tnLst>
+  </p:timing>
+</p:sld>
+</file>
+
+<file path=ppt/slides/slide27.xml><?xml version="1.0" encoding="utf-8"?>
+<p:sld xmlns:a="http://schemas.openxmlformats.org/drawingml/2006/main" xmlns:r="http://schemas.openxmlformats.org/officeDocument/2006/relationships" xmlns:p="http://schemas.openxmlformats.org/presentationml/2006/main">
+  <p:cSld>
+    <p:spTree>
+      <p:nvGrpSpPr>
+        <p:cNvPr id="1" name=""/>
+        <p:cNvGrpSpPr/>
+        <p:nvPr/>
+      </p:nvGrpSpPr>
+      <p:grpSpPr>
+        <a:xfrm>
+          <a:off x="0" y="0"/>
+          <a:ext cx="0" cy="0"/>
+          <a:chOff x="0" y="0"/>
+          <a:chExt cx="0" cy="0"/>
+        </a:xfrm>
+      </p:grpSpPr>
+      <p:sp>
+        <p:nvSpPr>
+          <p:cNvPr id="2" name="Title 1"/>
+          <p:cNvSpPr>
+            <a:spLocks noGrp="1"/>
+          </p:cNvSpPr>
+          <p:nvPr>
+            <p:ph type="title"/>
+          </p:nvPr>
+        </p:nvSpPr>
+        <p:spPr/>
+        <p:txBody>
+          <a:bodyPr/>
+          <a:lstStyle/>
+          <a:p>
+            <a:r>
+              <a:rPr lang="en-US" dirty="0" smtClean="0"/>
+              <a:t>Code organization</a:t>
+            </a:r>
+            <a:endParaRPr lang="nl-BE" dirty="0"/>
+          </a:p>
+        </p:txBody>
+      </p:sp>
+      <p:sp>
+        <p:nvSpPr>
+          <p:cNvPr id="3" name="Text Placeholder 2"/>
+          <p:cNvSpPr>
+            <a:spLocks noGrp="1"/>
+          </p:cNvSpPr>
+          <p:nvPr>
+            <p:ph type="body" idx="1"/>
+          </p:nvPr>
+        </p:nvSpPr>
+        <p:spPr/>
+        <p:txBody>
+          <a:bodyPr/>
+          <a:lstStyle/>
+          <a:p>
+            <a:endParaRPr lang="nl-BE"/>
+          </a:p>
+        </p:txBody>
+      </p:sp>
+      <p:sp>
+        <p:nvSpPr>
+          <p:cNvPr id="4" name="Slide Number Placeholder 3"/>
+          <p:cNvSpPr>
+            <a:spLocks noGrp="1"/>
+          </p:cNvSpPr>
+          <p:nvPr>
+            <p:ph type="sldNum" sz="quarter" idx="12"/>
+          </p:nvPr>
+        </p:nvSpPr>
+        <p:spPr/>
+        <p:txBody>
+          <a:bodyPr/>
+          <a:lstStyle/>
+          <a:p>
+            <a:fld id="{B6F15528-21DE-4FAA-801E-634DDDAF4B2B}" type="slidenum">
+              <a:rPr lang="en-US" smtClean="0"/>
+              <a:pPr/>
+              <a:t>27</a:t>
+            </a:fld>
+            <a:endParaRPr lang="en-US"/>
+          </a:p>
+        </p:txBody>
+      </p:sp>
+    </p:spTree>
+    <p:extLst>
+      <p:ext uri="{BB962C8B-B14F-4D97-AF65-F5344CB8AC3E}">
+        <p14:creationId xmlns:p14="http://schemas.microsoft.com/office/powerpoint/2010/main" val="3948177120"/>
+      </p:ext>
+    </p:extLst>
+  </p:cSld>
+  <p:clrMapOvr>
+    <a:masterClrMapping/>
+  </p:clrMapOvr>
+  <p:timing>
+    <p:tnLst>
+      <p:par>
+        <p:cTn id="1" dur="indefinite" restart="never" nodeType="tmRoot"/>
+      </p:par>
+    </p:tnLst>
+  </p:timing>
+</p:sld>
+</file>
+
+<file path=ppt/slides/slide28.xml><?xml version="1.0" encoding="utf-8"?>
+<p:sld xmlns:a="http://schemas.openxmlformats.org/drawingml/2006/main" xmlns:r="http://schemas.openxmlformats.org/officeDocument/2006/relationships" xmlns:p="http://schemas.openxmlformats.org/presentationml/2006/main">
+  <p:cSld>
+    <p:spTree>
+      <p:nvGrpSpPr>
+        <p:cNvPr id="1" name=""/>
+        <p:cNvGrpSpPr/>
+        <p:nvPr/>
+      </p:nvGrpSpPr>
+      <p:grpSpPr>
+        <a:xfrm>
+          <a:off x="0" y="0"/>
+          <a:ext cx="0" cy="0"/>
+          <a:chOff x="0" y="0"/>
+          <a:chExt cx="0" cy="0"/>
+        </a:xfrm>
+      </p:grpSpPr>
+      <p:sp>
+        <p:nvSpPr>
+          <p:cNvPr id="2" name="Title 1"/>
+          <p:cNvSpPr>
+            <a:spLocks noGrp="1"/>
+          </p:cNvSpPr>
+          <p:nvPr>
+            <p:ph type="title"/>
+          </p:nvPr>
+        </p:nvSpPr>
+        <p:spPr/>
+        <p:txBody>
+          <a:bodyPr/>
+          <a:lstStyle/>
+          <a:p>
+            <a:r>
+              <a:rPr lang="en-US" dirty="0" smtClean="0"/>
+              <a:t>Conclusions</a:t>
+            </a:r>
+            <a:endParaRPr lang="nl-BE" dirty="0"/>
+          </a:p>
+        </p:txBody>
+      </p:sp>
+      <p:sp>
+        <p:nvSpPr>
+          <p:cNvPr id="3" name="Text Placeholder 2"/>
+          <p:cNvSpPr>
+            <a:spLocks noGrp="1"/>
+          </p:cNvSpPr>
+          <p:nvPr>
+            <p:ph type="body" idx="1"/>
+          </p:nvPr>
+        </p:nvSpPr>
+        <p:spPr/>
+        <p:txBody>
+          <a:bodyPr/>
+          <a:lstStyle/>
+          <a:p>
+            <a:endParaRPr lang="nl-BE"/>
+          </a:p>
+        </p:txBody>
+      </p:sp>
+      <p:sp>
+        <p:nvSpPr>
+          <p:cNvPr id="4" name="Slide Number Placeholder 3"/>
+          <p:cNvSpPr>
+            <a:spLocks noGrp="1"/>
+          </p:cNvSpPr>
+          <p:nvPr>
+            <p:ph type="sldNum" sz="quarter" idx="12"/>
+          </p:nvPr>
+        </p:nvSpPr>
+        <p:spPr/>
+        <p:txBody>
+          <a:bodyPr/>
+          <a:lstStyle/>
+          <a:p>
+            <a:fld id="{B6F15528-21DE-4FAA-801E-634DDDAF4B2B}" type="slidenum">
+              <a:rPr lang="en-US" smtClean="0"/>
+              <a:pPr/>
+              <a:t>28</a:t>
+            </a:fld>
+            <a:endParaRPr lang="en-US"/>
+          </a:p>
+        </p:txBody>
+      </p:sp>
+    </p:spTree>
+    <p:extLst>
+      <p:ext uri="{BB962C8B-B14F-4D97-AF65-F5344CB8AC3E}">
+        <p14:creationId xmlns:p14="http://schemas.microsoft.com/office/powerpoint/2010/main" val="75062823"/>
+      </p:ext>
+    </p:extLst>
+  </p:cSld>
+  <p:clrMapOvr>
+    <a:masterClrMapping/>
+  </p:clrMapOvr>
+  <p:timing>
+    <p:tnLst>
+      <p:par>
+        <p:cTn id="1" dur="indefinite" restart="never" nodeType="tmRoot"/>
+      </p:par>
+    </p:tnLst>
+  </p:timing>
+</p:sld>
+</file>
+
+<file path=ppt/slides/slide29.xml><?xml version="1.0" encoding="utf-8"?>
+<p:sld xmlns:a="http://schemas.openxmlformats.org/drawingml/2006/main" xmlns:r="http://schemas.openxmlformats.org/officeDocument/2006/relationships" xmlns:p="http://schemas.openxmlformats.org/presentationml/2006/main">
+  <p:cSld>
+    <p:spTree>
+      <p:nvGrpSpPr>
+        <p:cNvPr id="1" name=""/>
+        <p:cNvGrpSpPr/>
+        <p:nvPr/>
+      </p:nvGrpSpPr>
+      <p:grpSpPr>
+        <a:xfrm>
+          <a:off x="0" y="0"/>
+          <a:ext cx="0" cy="0"/>
+          <a:chOff x="0" y="0"/>
+          <a:chExt cx="0" cy="0"/>
+        </a:xfrm>
+      </p:grpSpPr>
+      <p:sp>
+        <p:nvSpPr>
+          <p:cNvPr id="2" name="Title 1"/>
+          <p:cNvSpPr>
+            <a:spLocks noGrp="1"/>
+          </p:cNvSpPr>
+          <p:nvPr>
+            <p:ph type="title"/>
+          </p:nvPr>
+        </p:nvSpPr>
+        <p:spPr/>
+        <p:txBody>
+          <a:bodyPr/>
+          <a:lstStyle/>
+          <a:p>
+            <a:r>
+              <a:rPr lang="en-US" dirty="0" smtClean="0"/>
+              <a:t>Conclusions</a:t>
+            </a:r>
+            <a:endParaRPr lang="nl-BE" dirty="0"/>
+          </a:p>
+        </p:txBody>
+      </p:sp>
+      <p:sp>
+        <p:nvSpPr>
+          <p:cNvPr id="3" name="Content Placeholder 2"/>
+          <p:cNvSpPr>
+            <a:spLocks noGrp="1"/>
+          </p:cNvSpPr>
+          <p:nvPr>
+            <p:ph idx="1"/>
+          </p:nvPr>
+        </p:nvSpPr>
+        <p:spPr/>
+        <p:txBody>
+          <a:bodyPr>
+            <a:normAutofit fontScale="92500"/>
+          </a:bodyPr>
+          <a:lstStyle/>
+          <a:p>
+            <a:r>
+              <a:rPr lang="en-US" dirty="0" err="1" smtClean="0"/>
+              <a:t>Cython</a:t>
+            </a:r>
+            <a:endParaRPr lang="en-US" dirty="0" smtClean="0"/>
+          </a:p>
+          <a:p>
+            <a:pPr lvl="1"/>
+            <a:r>
+              <a:rPr lang="en-US" dirty="0" smtClean="0"/>
+              <a:t>Pros</a:t>
+            </a:r>
+          </a:p>
+          <a:p>
+            <a:pPr lvl="2"/>
+            <a:r>
+              <a:rPr lang="en-US" dirty="0" smtClean="0"/>
+              <a:t>Fairly simple to use</a:t>
+            </a:r>
+          </a:p>
+          <a:p>
+            <a:pPr lvl="2"/>
+            <a:r>
+              <a:rPr lang="en-US" dirty="0" smtClean="0"/>
+              <a:t>Offers </a:t>
+            </a:r>
+            <a:r>
+              <a:rPr lang="en-US" dirty="0" err="1" smtClean="0"/>
+              <a:t>execellent</a:t>
+            </a:r>
+            <a:r>
+              <a:rPr lang="en-US" dirty="0" smtClean="0"/>
+              <a:t> speedups when use wisely</a:t>
+            </a:r>
+          </a:p>
+          <a:p>
+            <a:pPr lvl="1"/>
+            <a:r>
+              <a:rPr lang="en-US" dirty="0" smtClean="0"/>
+              <a:t>Cons</a:t>
+            </a:r>
+          </a:p>
+          <a:p>
+            <a:pPr lvl="2"/>
+            <a:r>
+              <a:rPr lang="en-US" dirty="0" smtClean="0"/>
+              <a:t>Good understanding of Python and C/C++</a:t>
+            </a:r>
+          </a:p>
+          <a:p>
+            <a:r>
+              <a:rPr lang="en-US" dirty="0" smtClean="0"/>
+              <a:t>Features not covered here: wrapping C/C++ code</a:t>
+            </a:r>
+          </a:p>
+          <a:p>
+            <a:pPr lvl="1"/>
+            <a:r>
+              <a:rPr lang="en-US" dirty="0" smtClean="0"/>
+              <a:t>Pro: low overhead compared to, e.g., SWIG</a:t>
+            </a:r>
+          </a:p>
+          <a:p>
+            <a:pPr lvl="1"/>
+            <a:r>
+              <a:rPr lang="en-US" dirty="0" smtClean="0"/>
+              <a:t>Con: quite some code to write manually</a:t>
+            </a:r>
+            <a:endParaRPr lang="nl-BE" dirty="0"/>
+          </a:p>
+        </p:txBody>
+      </p:sp>
+      <p:sp>
+        <p:nvSpPr>
+          <p:cNvPr id="4" name="Slide Number Placeholder 3"/>
+          <p:cNvSpPr>
+            <a:spLocks noGrp="1"/>
+          </p:cNvSpPr>
+          <p:nvPr>
+            <p:ph type="sldNum" sz="quarter" idx="12"/>
+          </p:nvPr>
+        </p:nvSpPr>
+        <p:spPr/>
+        <p:txBody>
+          <a:bodyPr/>
+          <a:lstStyle/>
+          <a:p>
+            <a:fld id="{B6F15528-21DE-4FAA-801E-634DDDAF4B2B}" type="slidenum">
+              <a:rPr lang="en-US" smtClean="0"/>
+              <a:pPr/>
+              <a:t>29</a:t>
+            </a:fld>
+            <a:endParaRPr lang="en-US"/>
+          </a:p>
+        </p:txBody>
+      </p:sp>
+    </p:spTree>
+    <p:extLst>
+      <p:ext uri="{BB962C8B-B14F-4D97-AF65-F5344CB8AC3E}">
+        <p14:creationId xmlns:p14="http://schemas.microsoft.com/office/powerpoint/2010/main" val="3524984196"/>
+      </p:ext>
+    </p:extLst>
+  </p:cSld>
+  <p:clrMapOvr>
+    <a:masterClrMapping/>
+  </p:clrMapOvr>
+  <p:timing>
+    <p:tnLst>
+      <p:par>
+        <p:cTn id="1" dur="indefinite" restart="never" nodeType="tmRoot">
+          <p:childTnLst>
+            <p:seq concurrent="1" nextAc="seek">
+              <p:cTn id="2" dur="indefinite" nodeType="mainSeq">
+                <p:childTnLst>
+                  <p:par>
+                    <p:cTn id="3" fill="hold">
+                      <p:stCondLst>
+                        <p:cond delay="indefinite"/>
+                        <p:cond evt="onBegin" delay="0">
+                          <p:tn val="2"/>
+                        </p:cond>
+                      </p:stCondLst>
+                      <p:childTnLst>
+                        <p:par>
+                          <p:cTn id="4" fill="hold">
+                            <p:stCondLst>
+                              <p:cond delay="0"/>
+                            </p:stCondLst>
+                            <p:childTnLst>
+                              <p:par>
+                                <p:cTn id="5" presetID="1" presetClass="entr" presetSubtype="0" fill="hold" grpId="0" nodeType="withEffect">
+                                  <p:stCondLst>
+                                    <p:cond delay="0"/>
+                                  </p:stCondLst>
+                                  <p:childTnLst>
+                                    <p:set>
+                                      <p:cBhvr>
+                                        <p:cTn id="6" dur="1" fill="hold">
+                                          <p:stCondLst>
+                                            <p:cond delay="0"/>
+                                          </p:stCondLst>
+                                        </p:cTn>
+                                        <p:tgtEl>
+                                          <p:spTgt spid="3">
+                                            <p:txEl>
+                                              <p:pRg st="0" end="0"/>
+                                            </p:txEl>
+                                          </p:spTgt>
+                                        </p:tgtEl>
+                                        <p:attrNameLst>
+                                          <p:attrName>style.visibility</p:attrName>
+                                        </p:attrNameLst>
+                                      </p:cBhvr>
+                                      <p:to>
+                                        <p:strVal val="visible"/>
+                                      </p:to>
+                                    </p:set>
+                                  </p:childTnLst>
+                                </p:cTn>
+                              </p:par>
+                              <p:par>
+                                <p:cTn id="7" presetID="1" presetClass="entr" presetSubtype="0" fill="hold" grpId="0" nodeType="withEffect">
+                                  <p:stCondLst>
+                                    <p:cond delay="0"/>
+                                  </p:stCondLst>
+                                  <p:childTnLst>
+                                    <p:set>
+                                      <p:cBhvr>
+                                        <p:cTn id="8" dur="1" fill="hold">
+                                          <p:stCondLst>
+                                            <p:cond delay="0"/>
+                                          </p:stCondLst>
+                                        </p:cTn>
+                                        <p:tgtEl>
+                                          <p:spTgt spid="3">
+                                            <p:txEl>
+                                              <p:pRg st="1" end="1"/>
+                                            </p:txEl>
+                                          </p:spTgt>
+                                        </p:tgtEl>
+                                        <p:attrNameLst>
+                                          <p:attrName>style.visibility</p:attrName>
+                                        </p:attrNameLst>
+                                      </p:cBhvr>
+                                      <p:to>
+                                        <p:strVal val="visible"/>
+                                      </p:to>
+                                    </p:set>
+                                  </p:childTnLst>
+                                </p:cTn>
+                              </p:par>
+                              <p:par>
+                                <p:cTn id="9" presetID="1" presetClass="entr" presetSubtype="0" fill="hold" grpId="0" nodeType="withEffect">
+                                  <p:stCondLst>
+                                    <p:cond delay="0"/>
+                                  </p:stCondLst>
+                                  <p:childTnLst>
+                                    <p:set>
+                                      <p:cBhvr>
+                                        <p:cTn id="10" dur="1" fill="hold">
+                                          <p:stCondLst>
+                                            <p:cond delay="0"/>
+                                          </p:stCondLst>
+                                        </p:cTn>
+                                        <p:tgtEl>
+                                          <p:spTgt spid="3">
+                                            <p:txEl>
+                                              <p:pRg st="2" end="2"/>
+                                            </p:txEl>
+                                          </p:spTgt>
+                                        </p:tgtEl>
+                                        <p:attrNameLst>
+                                          <p:attrName>style.visibility</p:attrName>
+                                        </p:attrNameLst>
+                                      </p:cBhvr>
+                                      <p:to>
+                                        <p:strVal val="visible"/>
+                                      </p:to>
+                                    </p:set>
+                                  </p:childTnLst>
+                                </p:cTn>
+                              </p:par>
+                              <p:par>
+                                <p:cTn id="11" presetID="1" presetClass="entr" presetSubtype="0" fill="hold" grpId="0" nodeType="withEffect">
+                                  <p:stCondLst>
+                                    <p:cond delay="0"/>
+                                  </p:stCondLst>
+                                  <p:childTnLst>
+                                    <p:set>
+                                      <p:cBhvr>
+                                        <p:cTn id="12" dur="1" fill="hold">
+                                          <p:stCondLst>
+                                            <p:cond delay="0"/>
+                                          </p:stCondLst>
+                                        </p:cTn>
+                                        <p:tgtEl>
+                                          <p:spTgt spid="3">
+                                            <p:txEl>
+                                              <p:pRg st="3" end="3"/>
+                                            </p:txEl>
+                                          </p:spTgt>
+                                        </p:tgtEl>
+                                        <p:attrNameLst>
+                                          <p:attrName>style.visibility</p:attrName>
+                                        </p:attrNameLst>
+                                      </p:cBhvr>
+                                      <p:to>
+                                        <p:strVal val="visible"/>
+                                      </p:to>
+                                    </p:set>
+                                  </p:childTnLst>
+                                </p:cTn>
+                              </p:par>
+                            </p:childTnLst>
+                          </p:cTn>
+                        </p:par>
+                      </p:childTnLst>
+                    </p:cTn>
+                  </p:par>
+                  <p:par>
+                    <p:cTn id="13" fill="hold">
+                      <p:stCondLst>
+                        <p:cond delay="indefinite"/>
+                      </p:stCondLst>
+                      <p:childTnLst>
+                        <p:par>
+                          <p:cTn id="14" fill="hold">
+                            <p:stCondLst>
+                              <p:cond delay="0"/>
+                            </p:stCondLst>
+                            <p:childTnLst>
+                              <p:par>
+                                <p:cTn id="15" presetID="1" presetClass="entr" presetSubtype="0" fill="hold" grpId="0" nodeType="clickEffect">
+                                  <p:stCondLst>
+                                    <p:cond delay="0"/>
+                                  </p:stCondLst>
+                                  <p:childTnLst>
+                                    <p:set>
+                                      <p:cBhvr>
+                                        <p:cTn id="16" dur="1" fill="hold">
+                                          <p:stCondLst>
+                                            <p:cond delay="0"/>
+                                          </p:stCondLst>
+                                        </p:cTn>
+                                        <p:tgtEl>
+                                          <p:spTgt spid="3">
+                                            <p:txEl>
+                                              <p:pRg st="4" end="4"/>
+                                            </p:txEl>
+                                          </p:spTgt>
+                                        </p:tgtEl>
+                                        <p:attrNameLst>
+                                          <p:attrName>style.visibility</p:attrName>
+                                        </p:attrNameLst>
+                                      </p:cBhvr>
+                                      <p:to>
+                                        <p:strVal val="visible"/>
+                                      </p:to>
+                                    </p:set>
+                                  </p:childTnLst>
+                                </p:cTn>
+                              </p:par>
+                              <p:par>
+                                <p:cTn id="17" presetID="1" presetClass="entr" presetSubtype="0" fill="hold" grpId="0" nodeType="withEffect">
+                                  <p:stCondLst>
+                                    <p:cond delay="0"/>
+                                  </p:stCondLst>
+                                  <p:childTnLst>
+                                    <p:set>
+                                      <p:cBhvr>
+                                        <p:cTn id="18" dur="1" fill="hold">
+                                          <p:stCondLst>
+                                            <p:cond delay="0"/>
+                                          </p:stCondLst>
+                                        </p:cTn>
+                                        <p:tgtEl>
+                                          <p:spTgt spid="3">
+                                            <p:txEl>
+                                              <p:pRg st="5" end="5"/>
+                                            </p:txEl>
+                                          </p:spTgt>
+                                        </p:tgtEl>
+                                        <p:attrNameLst>
+                                          <p:attrName>style.visibility</p:attrName>
+                                        </p:attrNameLst>
+                                      </p:cBhvr>
+                                      <p:to>
+                                        <p:strVal val="visible"/>
+                                      </p:to>
+                                    </p:set>
+                                  </p:childTnLst>
+                                </p:cTn>
+                              </p:par>
+                            </p:childTnLst>
+                          </p:cTn>
+                        </p:par>
+                      </p:childTnLst>
+                    </p:cTn>
+                  </p:par>
+                  <p:par>
+                    <p:cTn id="19" fill="hold">
+                      <p:stCondLst>
+                        <p:cond delay="indefinite"/>
+                      </p:stCondLst>
+                      <p:childTnLst>
+                        <p:par>
+                          <p:cTn id="20" fill="hold">
+                            <p:stCondLst>
+                              <p:cond delay="0"/>
+                            </p:stCondLst>
+                            <p:childTnLst>
+                              <p:par>
+                                <p:cTn id="21" presetID="1" presetClass="entr" presetSubtype="0" fill="hold" grpId="0" nodeType="clickEffect">
+                                  <p:stCondLst>
+                                    <p:cond delay="0"/>
+                                  </p:stCondLst>
+                                  <p:childTnLst>
+                                    <p:set>
+                                      <p:cBhvr>
+                                        <p:cTn id="22" dur="1" fill="hold">
+                                          <p:stCondLst>
+                                            <p:cond delay="0"/>
+                                          </p:stCondLst>
+                                        </p:cTn>
+                                        <p:tgtEl>
+                                          <p:spTgt spid="3">
+                                            <p:txEl>
+                                              <p:pRg st="6" end="6"/>
+                                            </p:txEl>
+                                          </p:spTgt>
+                                        </p:tgtEl>
+                                        <p:attrNameLst>
+                                          <p:attrName>style.visibility</p:attrName>
+                                        </p:attrNameLst>
+                                      </p:cBhvr>
+                                      <p:to>
+                                        <p:strVal val="visible"/>
+                                      </p:to>
+                                    </p:set>
+                                  </p:childTnLst>
+                                </p:cTn>
+                              </p:par>
+                              <p:par>
+                                <p:cTn id="23" presetID="1" presetClass="entr" presetSubtype="0" fill="hold" grpId="0" nodeType="withEffect">
+                                  <p:stCondLst>
+                                    <p:cond delay="0"/>
+                                  </p:stCondLst>
+                                  <p:childTnLst>
+                                    <p:set>
+                                      <p:cBhvr>
+                                        <p:cTn id="24" dur="1" fill="hold">
+                                          <p:stCondLst>
+                                            <p:cond delay="0"/>
+                                          </p:stCondLst>
+                                        </p:cTn>
+                                        <p:tgtEl>
+                                          <p:spTgt spid="3">
+                                            <p:txEl>
+                                              <p:pRg st="7" end="7"/>
+                                            </p:txEl>
+                                          </p:spTgt>
+                                        </p:tgtEl>
+                                        <p:attrNameLst>
+                                          <p:attrName>style.visibility</p:attrName>
+                                        </p:attrNameLst>
+                                      </p:cBhvr>
+                                      <p:to>
+                                        <p:strVal val="visible"/>
+                                      </p:to>
+                                    </p:set>
+                                  </p:childTnLst>
+                                </p:cTn>
+                              </p:par>
+                            </p:childTnLst>
+                          </p:cTn>
+                        </p:par>
+                      </p:childTnLst>
+                    </p:cTn>
+                  </p:par>
+                  <p:par>
+                    <p:cTn id="25" fill="hold">
+                      <p:stCondLst>
+                        <p:cond delay="indefinite"/>
+                      </p:stCondLst>
+                      <p:childTnLst>
+                        <p:par>
+                          <p:cTn id="26" fill="hold">
+                            <p:stCondLst>
+                              <p:cond delay="0"/>
+                            </p:stCondLst>
+                            <p:childTnLst>
+                              <p:par>
+                                <p:cTn id="27" presetID="1" presetClass="entr" presetSubtype="0" fill="hold" grpId="0" nodeType="clickEffect">
+                                  <p:stCondLst>
+                                    <p:cond delay="0"/>
+                                  </p:stCondLst>
+                                  <p:childTnLst>
+                                    <p:set>
+                                      <p:cBhvr>
+                                        <p:cTn id="28" dur="1" fill="hold">
+                                          <p:stCondLst>
+                                            <p:cond delay="0"/>
+                                          </p:stCondLst>
+                                        </p:cTn>
+                                        <p:tgtEl>
+                                          <p:spTgt spid="3">
+                                            <p:txEl>
+                                              <p:pRg st="8" end="8"/>
+                                            </p:txEl>
+                                          </p:spTgt>
+                                        </p:tgtEl>
+                                        <p:attrNameLst>
+                                          <p:attrName>style.visibility</p:attrName>
+                                        </p:attrNameLst>
+                                      </p:cBhvr>
+                                      <p:to>
+                                        <p:strVal val="visible"/>
+                                      </p:to>
+                                    </p:set>
+                                  </p:childTnLst>
+                                </p:cTn>
+                              </p:par>
+                            </p:childTnLst>
+                          </p:cTn>
+                        </p:par>
+                      </p:childTnLst>
+                    </p:cTn>
+                  </p:par>
+                </p:childTnLst>
+              </p:cTn>
+              <p:prevCondLst>
+                <p:cond evt="onPrev" delay="0">
+                  <p:tgtEl>
+                    <p:sldTgt/>
+                  </p:tgtEl>
+                </p:cond>
+              </p:prevCondLst>
+              <p:nextCondLst>
+                <p:cond evt="onNext" delay="0">
+                  <p:tgtEl>
+                    <p:sldTgt/>
+                  </p:tgtEl>
+                </p:cond>
+              </p:nextCondLst>
+            </p:seq>
+          </p:childTnLst>
+        </p:cTn>
+      </p:par>
+    </p:tnLst>
+    <p:bldLst>
+      <p:bldP spid="3" grpId="0" uiExpand="1" build="p" bldLvl="2"/>
     </p:bldLst>
   </p:timing>
 </p:sld>
@@ -14275,6 +17210,372 @@
     <p:bldLst>
       <p:bldP spid="3" grpId="0" uiExpand="1" build="p" bldLvl="2"/>
       <p:bldP spid="4" grpId="0" animBg="1"/>
+    </p:bldLst>
+  </p:timing>
+</p:sld>
+</file>
+
+<file path=ppt/slides/slide30.xml><?xml version="1.0" encoding="utf-8"?>
+<p:sld xmlns:a="http://schemas.openxmlformats.org/drawingml/2006/main" xmlns:r="http://schemas.openxmlformats.org/officeDocument/2006/relationships" xmlns:p="http://schemas.openxmlformats.org/presentationml/2006/main">
+  <p:cSld>
+    <p:spTree>
+      <p:nvGrpSpPr>
+        <p:cNvPr id="1" name=""/>
+        <p:cNvGrpSpPr/>
+        <p:nvPr/>
+      </p:nvGrpSpPr>
+      <p:grpSpPr>
+        <a:xfrm>
+          <a:off x="0" y="0"/>
+          <a:ext cx="0" cy="0"/>
+          <a:chOff x="0" y="0"/>
+          <a:chExt cx="0" cy="0"/>
+        </a:xfrm>
+      </p:grpSpPr>
+      <p:sp>
+        <p:nvSpPr>
+          <p:cNvPr id="2" name="Title 1"/>
+          <p:cNvSpPr>
+            <a:spLocks noGrp="1"/>
+          </p:cNvSpPr>
+          <p:nvPr>
+            <p:ph type="title"/>
+          </p:nvPr>
+        </p:nvSpPr>
+        <p:spPr/>
+        <p:txBody>
+          <a:bodyPr/>
+          <a:lstStyle/>
+          <a:p>
+            <a:r>
+              <a:rPr lang="en-US" dirty="0" smtClean="0"/>
+              <a:t>References</a:t>
+            </a:r>
+            <a:endParaRPr lang="nl-BE" dirty="0"/>
+          </a:p>
+        </p:txBody>
+      </p:sp>
+      <p:sp>
+        <p:nvSpPr>
+          <p:cNvPr id="3" name="Content Placeholder 2"/>
+          <p:cNvSpPr>
+            <a:spLocks noGrp="1"/>
+          </p:cNvSpPr>
+          <p:nvPr>
+            <p:ph idx="1"/>
+          </p:nvPr>
+        </p:nvSpPr>
+        <p:spPr/>
+        <p:txBody>
+          <a:bodyPr/>
+          <a:lstStyle/>
+          <a:p>
+            <a:r>
+              <a:rPr lang="en-US" dirty="0" err="1" smtClean="0"/>
+              <a:t>Cython</a:t>
+            </a:r>
+            <a:r>
+              <a:rPr lang="en-US" dirty="0"/>
+              <a:t> </a:t>
+            </a:r>
+            <a:r>
+              <a:rPr lang="en-US" dirty="0" smtClean="0"/>
+              <a:t>website:</a:t>
+            </a:r>
+            <a:br>
+              <a:rPr lang="en-US" dirty="0" smtClean="0"/>
+            </a:br>
+            <a:r>
+              <a:rPr lang="en-US" dirty="0" smtClean="0">
+                <a:hlinkClick r:id="rId2"/>
+              </a:rPr>
+              <a:t>http</a:t>
+            </a:r>
+            <a:r>
+              <a:rPr lang="en-US" dirty="0">
+                <a:hlinkClick r:id="rId2"/>
+              </a:rPr>
+              <a:t>://cython.org</a:t>
+            </a:r>
+            <a:r>
+              <a:rPr lang="en-US" dirty="0" smtClean="0">
+                <a:hlinkClick r:id="rId2"/>
+              </a:rPr>
+              <a:t>/</a:t>
+            </a:r>
+            <a:r>
+              <a:rPr lang="en-US" dirty="0" smtClean="0"/>
+              <a:t> </a:t>
+            </a:r>
+          </a:p>
+          <a:p>
+            <a:r>
+              <a:rPr lang="en-US" dirty="0" err="1" smtClean="0"/>
+              <a:t>Cython</a:t>
+            </a:r>
+            <a:r>
+              <a:rPr lang="en-US" dirty="0" smtClean="0"/>
+              <a:t> </a:t>
+            </a:r>
+            <a:r>
+              <a:rPr lang="en-US" dirty="0"/>
+              <a:t>documentation:</a:t>
+            </a:r>
+            <a:br>
+              <a:rPr lang="en-US" dirty="0"/>
+            </a:br>
+            <a:r>
+              <a:rPr lang="en-US" dirty="0">
+                <a:hlinkClick r:id="rId3"/>
+              </a:rPr>
+              <a:t>http://docs.cython.org</a:t>
+            </a:r>
+            <a:r>
+              <a:rPr lang="en-US" dirty="0" smtClean="0">
+                <a:hlinkClick r:id="rId3"/>
+              </a:rPr>
+              <a:t>/</a:t>
+            </a:r>
+            <a:r>
+              <a:rPr lang="en-US" dirty="0" smtClean="0"/>
+              <a:t> </a:t>
+            </a:r>
+          </a:p>
+          <a:p>
+            <a:r>
+              <a:rPr lang="en-US" dirty="0" smtClean="0"/>
+              <a:t>Smith, Kurt (2015) </a:t>
+            </a:r>
+            <a:r>
+              <a:rPr lang="en-US" i="1" dirty="0" err="1" smtClean="0"/>
+              <a:t>Cython</a:t>
+            </a:r>
+            <a:r>
+              <a:rPr lang="en-US" dirty="0" smtClean="0"/>
+              <a:t>, O'Reilly Media, ISBN </a:t>
+            </a:r>
+            <a:r>
+              <a:rPr lang="nl-BE" dirty="0"/>
+              <a:t> 978-1491901557</a:t>
+            </a:r>
+          </a:p>
+        </p:txBody>
+      </p:sp>
+      <p:sp>
+        <p:nvSpPr>
+          <p:cNvPr id="4" name="Slide Number Placeholder 3"/>
+          <p:cNvSpPr>
+            <a:spLocks noGrp="1"/>
+          </p:cNvSpPr>
+          <p:nvPr>
+            <p:ph type="sldNum" sz="quarter" idx="12"/>
+          </p:nvPr>
+        </p:nvSpPr>
+        <p:spPr/>
+        <p:txBody>
+          <a:bodyPr/>
+          <a:lstStyle/>
+          <a:p>
+            <a:fld id="{B6F15528-21DE-4FAA-801E-634DDDAF4B2B}" type="slidenum">
+              <a:rPr lang="en-US" smtClean="0"/>
+              <a:pPr/>
+              <a:t>30</a:t>
+            </a:fld>
+            <a:endParaRPr lang="en-US"/>
+          </a:p>
+        </p:txBody>
+      </p:sp>
+    </p:spTree>
+    <p:extLst>
+      <p:ext uri="{BB962C8B-B14F-4D97-AF65-F5344CB8AC3E}">
+        <p14:creationId xmlns:p14="http://schemas.microsoft.com/office/powerpoint/2010/main" val="587289948"/>
+      </p:ext>
+    </p:extLst>
+  </p:cSld>
+  <p:clrMapOvr>
+    <a:masterClrMapping/>
+  </p:clrMapOvr>
+  <p:timing>
+    <p:tnLst>
+      <p:par>
+        <p:cTn id="1" dur="indefinite" restart="never" nodeType="tmRoot">
+          <p:childTnLst>
+            <p:seq concurrent="1" nextAc="seek">
+              <p:cTn id="2" dur="indefinite" nodeType="mainSeq">
+                <p:childTnLst>
+                  <p:par>
+                    <p:cTn id="3" fill="hold">
+                      <p:stCondLst>
+                        <p:cond delay="indefinite"/>
+                        <p:cond evt="onBegin" delay="0">
+                          <p:tn val="2"/>
+                        </p:cond>
+                      </p:stCondLst>
+                      <p:childTnLst>
+                        <p:par>
+                          <p:cTn id="4" fill="hold">
+                            <p:stCondLst>
+                              <p:cond delay="0"/>
+                            </p:stCondLst>
+                            <p:childTnLst>
+                              <p:par>
+                                <p:cTn id="5" presetID="1" presetClass="entr" presetSubtype="0" fill="hold" grpId="0" nodeType="withEffect">
+                                  <p:stCondLst>
+                                    <p:cond delay="0"/>
+                                  </p:stCondLst>
+                                  <p:childTnLst>
+                                    <p:set>
+                                      <p:cBhvr>
+                                        <p:cTn id="6" dur="1" fill="hold">
+                                          <p:stCondLst>
+                                            <p:cond delay="0"/>
+                                          </p:stCondLst>
+                                        </p:cTn>
+                                        <p:tgtEl>
+                                          <p:spTgt spid="3">
+                                            <p:txEl>
+                                              <p:pRg st="0" end="0"/>
+                                            </p:txEl>
+                                          </p:spTgt>
+                                        </p:tgtEl>
+                                        <p:attrNameLst>
+                                          <p:attrName>style.visibility</p:attrName>
+                                        </p:attrNameLst>
+                                      </p:cBhvr>
+                                      <p:to>
+                                        <p:strVal val="visible"/>
+                                      </p:to>
+                                    </p:set>
+                                  </p:childTnLst>
+                                </p:cTn>
+                              </p:par>
+                            </p:childTnLst>
+                          </p:cTn>
+                        </p:par>
+                      </p:childTnLst>
+                    </p:cTn>
+                  </p:par>
+                  <p:par>
+                    <p:cTn id="7" fill="hold">
+                      <p:stCondLst>
+                        <p:cond delay="indefinite"/>
+                      </p:stCondLst>
+                      <p:childTnLst>
+                        <p:par>
+                          <p:cTn id="8" fill="hold">
+                            <p:stCondLst>
+                              <p:cond delay="0"/>
+                            </p:stCondLst>
+                            <p:childTnLst>
+                              <p:par>
+                                <p:cTn id="9" presetID="1" presetClass="entr" presetSubtype="0" fill="hold" grpId="0" nodeType="clickEffect">
+                                  <p:stCondLst>
+                                    <p:cond delay="0"/>
+                                  </p:stCondLst>
+                                  <p:childTnLst>
+                                    <p:set>
+                                      <p:cBhvr>
+                                        <p:cTn id="10" dur="1" fill="hold">
+                                          <p:stCondLst>
+                                            <p:cond delay="0"/>
+                                          </p:stCondLst>
+                                        </p:cTn>
+                                        <p:tgtEl>
+                                          <p:spTgt spid="3">
+                                            <p:txEl>
+                                              <p:pRg st="1" end="1"/>
+                                            </p:txEl>
+                                          </p:spTgt>
+                                        </p:tgtEl>
+                                        <p:attrNameLst>
+                                          <p:attrName>style.visibility</p:attrName>
+                                        </p:attrNameLst>
+                                      </p:cBhvr>
+                                      <p:to>
+                                        <p:strVal val="visible"/>
+                                      </p:to>
+                                    </p:set>
+                                  </p:childTnLst>
+                                </p:cTn>
+                              </p:par>
+                            </p:childTnLst>
+                          </p:cTn>
+                        </p:par>
+                      </p:childTnLst>
+                    </p:cTn>
+                  </p:par>
+                  <p:par>
+                    <p:cTn id="11" fill="hold">
+                      <p:stCondLst>
+                        <p:cond delay="indefinite"/>
+                      </p:stCondLst>
+                      <p:childTnLst>
+                        <p:par>
+                          <p:cTn id="12" fill="hold">
+                            <p:stCondLst>
+                              <p:cond delay="0"/>
+                            </p:stCondLst>
+                            <p:childTnLst>
+                              <p:par>
+                                <p:cTn id="13" presetID="1" presetClass="entr" presetSubtype="0" fill="hold" grpId="0" nodeType="clickEffect">
+                                  <p:stCondLst>
+                                    <p:cond delay="0"/>
+                                  </p:stCondLst>
+                                  <p:childTnLst>
+                                    <p:set>
+                                      <p:cBhvr>
+                                        <p:cTn id="14" dur="1" fill="hold">
+                                          <p:stCondLst>
+                                            <p:cond delay="0"/>
+                                          </p:stCondLst>
+                                        </p:cTn>
+                                        <p:tgtEl>
+                                          <p:spTgt spid="3">
+                                            <p:txEl>
+                                              <p:pRg st="2" end="2"/>
+                                            </p:txEl>
+                                          </p:spTgt>
+                                        </p:tgtEl>
+                                        <p:attrNameLst>
+                                          <p:attrName>style.visibility</p:attrName>
+                                        </p:attrNameLst>
+                                      </p:cBhvr>
+                                      <p:to>
+                                        <p:strVal val="visible"/>
+                                      </p:to>
+                                    </p:set>
+                                  </p:childTnLst>
+                                </p:cTn>
+                              </p:par>
+                            </p:childTnLst>
+                          </p:cTn>
+                        </p:par>
+                      </p:childTnLst>
+                    </p:cTn>
+                  </p:par>
+                </p:childTnLst>
+              </p:cTn>
+              <p:prevCondLst>
+                <p:cond evt="onPrev" delay="0">
+                  <p:tgtEl>
+                    <p:sldTgt/>
+                  </p:tgtEl>
+                </p:cond>
+              </p:prevCondLst>
+              <p:nextCondLst>
+                <p:cond evt="onNext" delay="0">
+                  <p:tgtEl>
+                    <p:sldTgt/>
+                  </p:tgtEl>
+                </p:cond>
+              </p:nextCondLst>
+            </p:seq>
+          </p:childTnLst>
+        </p:cTn>
+      </p:par>
+    </p:tnLst>
+    <p:bldLst>
+      <p:bldP spid="3" grpId="0" uiExpand="1" build="p"/>
     </p:bldLst>
   </p:timing>
 </p:sld>

</xml_diff>

<commit_message>
Added slides on code organization
</commit_message>
<xml_diff>
--- a/Python/Cython/cython.pptx
+++ b/Python/Cython/cython.pptx
@@ -5,7 +5,7 @@
     <p:sldMasterId id="2147483648" r:id="rId1"/>
   </p:sldMasterIdLst>
   <p:notesMasterIdLst>
-    <p:notesMasterId r:id="rId32"/>
+    <p:notesMasterId r:id="rId34"/>
   </p:notesMasterIdLst>
   <p:sldIdLst>
     <p:sldId id="256" r:id="rId2"/>
@@ -35,9 +35,11 @@
     <p:sldId id="280" r:id="rId26"/>
     <p:sldId id="281" r:id="rId27"/>
     <p:sldId id="287" r:id="rId28"/>
-    <p:sldId id="284" r:id="rId29"/>
-    <p:sldId id="285" r:id="rId30"/>
-    <p:sldId id="286" r:id="rId31"/>
+    <p:sldId id="288" r:id="rId29"/>
+    <p:sldId id="289" r:id="rId30"/>
+    <p:sldId id="284" r:id="rId31"/>
+    <p:sldId id="285" r:id="rId32"/>
+    <p:sldId id="286" r:id="rId33"/>
   </p:sldIdLst>
   <p:sldSz cx="9144000" cy="6858000" type="screen4x3"/>
   <p:notesSz cx="6858000" cy="9144000"/>
@@ -172,6 +174,8 @@
             <p14:sldId id="280"/>
             <p14:sldId id="281"/>
             <p14:sldId id="287"/>
+            <p14:sldId id="288"/>
+            <p14:sldId id="289"/>
             <p14:sldId id="284"/>
             <p14:sldId id="285"/>
             <p14:sldId id="286"/>
@@ -180,7 +184,7 @@
       </p14:sectionLst>
     </p:ext>
     <p:ext uri="{EFAFB233-063F-42B5-8137-9DF3F51BA10A}">
-      <p15:sldGuideLst xmlns:p15="http://schemas.microsoft.com/office/powerpoint/2012/main">
+      <p15:sldGuideLst xmlns:p15="http://schemas.microsoft.com/office/powerpoint/2012/main" xmlns="">
         <p15:guide id="1" orient="horz" pos="2160">
           <p15:clr>
             <a:srgbClr val="A4A3A4"/>
@@ -279,7 +283,7 @@
           <a:p>
             <a:fld id="{16B045E4-7DA3-41B9-B0DA-4BEE0876FA88}" type="datetimeFigureOut">
               <a:rPr lang="nl-BE" smtClean="0"/>
-              <a:t>2016-02-25</a:t>
+              <a:t>25/02/2016</a:t>
             </a:fld>
             <a:endParaRPr lang="nl-BE"/>
           </a:p>
@@ -728,7 +732,7 @@
           <a:p>
             <a:fld id="{53B2420D-148A-400F-B88D-527DF6E13622}" type="datetime1">
               <a:rPr lang="en-US" smtClean="0"/>
-              <a:t>2/25/2016</a:t>
+              <a:t>2016-02-25</a:t>
             </a:fld>
             <a:endParaRPr lang="en-US"/>
           </a:p>
@@ -894,7 +898,7 @@
           <a:p>
             <a:fld id="{52A01B9A-6787-4B63-BAEF-E3CF67589D82}" type="datetime1">
               <a:rPr lang="en-US" smtClean="0"/>
-              <a:t>2/25/2016</a:t>
+              <a:t>2016-02-25</a:t>
             </a:fld>
             <a:endParaRPr lang="en-US"/>
           </a:p>
@@ -1070,7 +1074,7 @@
           <a:p>
             <a:fld id="{6E982D42-2071-4A3D-B614-2380183202E1}" type="datetime1">
               <a:rPr lang="en-US" smtClean="0"/>
-              <a:t>2/25/2016</a:t>
+              <a:t>2016-02-25</a:t>
             </a:fld>
             <a:endParaRPr lang="en-US"/>
           </a:p>
@@ -1236,7 +1240,7 @@
           <a:p>
             <a:fld id="{2E90E067-04B9-40C0-BFE6-53BAD2F7119C}" type="datetime1">
               <a:rPr lang="en-US" smtClean="0"/>
-              <a:t>2/25/2016</a:t>
+              <a:t>2016-02-25</a:t>
             </a:fld>
             <a:endParaRPr lang="en-US"/>
           </a:p>
@@ -1478,7 +1482,7 @@
           <a:p>
             <a:fld id="{D7CB2E72-949E-4479-B957-DBA32EC1FAB9}" type="datetime1">
               <a:rPr lang="en-US" smtClean="0"/>
-              <a:t>2/25/2016</a:t>
+              <a:t>2016-02-25</a:t>
             </a:fld>
             <a:endParaRPr lang="en-US"/>
           </a:p>
@@ -1762,7 +1766,7 @@
           <a:p>
             <a:fld id="{A06819D6-C5C8-405A-96EE-DAC9728267C0}" type="datetime1">
               <a:rPr lang="en-US" smtClean="0"/>
-              <a:t>2/25/2016</a:t>
+              <a:t>2016-02-25</a:t>
             </a:fld>
             <a:endParaRPr lang="en-US"/>
           </a:p>
@@ -2180,7 +2184,7 @@
           <a:p>
             <a:fld id="{476A766D-F1AD-47B2-B323-71C0AAEFC468}" type="datetime1">
               <a:rPr lang="en-US" smtClean="0"/>
-              <a:t>2/25/2016</a:t>
+              <a:t>2016-02-25</a:t>
             </a:fld>
             <a:endParaRPr lang="en-US"/>
           </a:p>
@@ -2294,7 +2298,7 @@
           <a:p>
             <a:fld id="{E8021487-0835-4E27-A96A-FE7FCF3265BD}" type="datetime1">
               <a:rPr lang="en-US" smtClean="0"/>
-              <a:t>2/25/2016</a:t>
+              <a:t>2016-02-25</a:t>
             </a:fld>
             <a:endParaRPr lang="en-US"/>
           </a:p>
@@ -2385,7 +2389,7 @@
           <a:p>
             <a:fld id="{D8423321-723F-439B-A2FC-3D1497BCF824}" type="datetime1">
               <a:rPr lang="en-US" smtClean="0"/>
-              <a:t>2/25/2016</a:t>
+              <a:t>2016-02-25</a:t>
             </a:fld>
             <a:endParaRPr lang="en-US"/>
           </a:p>
@@ -2658,7 +2662,7 @@
           <a:p>
             <a:fld id="{C23318F9-3CB8-42B9-8393-7570C1C1A70D}" type="datetime1">
               <a:rPr lang="en-US" smtClean="0"/>
-              <a:t>2/25/2016</a:t>
+              <a:t>2016-02-25</a:t>
             </a:fld>
             <a:endParaRPr lang="en-US"/>
           </a:p>
@@ -2907,7 +2911,7 @@
           <a:p>
             <a:fld id="{6867E127-D066-4A1C-B918-F70FF61E725D}" type="datetime1">
               <a:rPr lang="en-US" smtClean="0"/>
-              <a:t>2/25/2016</a:t>
+              <a:t>2016-02-25</a:t>
             </a:fld>
             <a:endParaRPr lang="en-US"/>
           </a:p>
@@ -3116,7 +3120,7 @@
           <a:p>
             <a:fld id="{E6FF7314-6885-4B6E-804E-F9FE9C155D78}" type="datetime1">
               <a:rPr lang="en-US" smtClean="0"/>
-              <a:t>2/25/2016</a:t>
+              <a:t>2016-02-25</a:t>
             </a:fld>
             <a:endParaRPr lang="en-US"/>
           </a:p>
@@ -15728,7 +15732,7 @@
           <a:p>
             <a:r>
               <a:rPr lang="en-US" dirty="0" smtClean="0"/>
-              <a:t>Conclusions</a:t>
+              <a:t>File types and import</a:t>
             </a:r>
             <a:endParaRPr lang="nl-BE" dirty="0"/>
           </a:p>
@@ -15736,20 +15740,194 @@
       </p:sp>
       <p:sp>
         <p:nvSpPr>
-          <p:cNvPr id="3" name="Text Placeholder 2"/>
+          <p:cNvPr id="3" name="Content Placeholder 2"/>
           <p:cNvSpPr>
             <a:spLocks noGrp="1"/>
           </p:cNvSpPr>
           <p:nvPr>
-            <p:ph type="body" idx="1"/>
+            <p:ph idx="1"/>
           </p:nvPr>
         </p:nvSpPr>
         <p:spPr/>
         <p:txBody>
-          <a:bodyPr/>
+          <a:bodyPr>
+            <a:normAutofit fontScale="92500" lnSpcReduction="20000"/>
+          </a:bodyPr>
           <a:lstStyle/>
           <a:p>
-            <a:endParaRPr lang="nl-BE"/>
+            <a:r>
+              <a:rPr lang="en-US" dirty="0" smtClean="0"/>
+              <a:t>Only needed when C-level access is required!</a:t>
+            </a:r>
+          </a:p>
+          <a:p>
+            <a:r>
+              <a:rPr lang="en-US" dirty="0" smtClean="0"/>
+              <a:t>Implementation files: </a:t>
+            </a:r>
+            <a:r>
+              <a:rPr lang="en-US" dirty="0" smtClean="0">
+                <a:latin typeface="Courier New" panose="02070309020205020404" pitchFamily="49" charset="0"/>
+                <a:cs typeface="Courier New" panose="02070309020205020404" pitchFamily="49" charset="0"/>
+              </a:rPr>
+              <a:t>.</a:t>
+            </a:r>
+            <a:r>
+              <a:rPr lang="en-US" dirty="0" err="1" smtClean="0">
+                <a:latin typeface="Courier New" panose="02070309020205020404" pitchFamily="49" charset="0"/>
+                <a:cs typeface="Courier New" panose="02070309020205020404" pitchFamily="49" charset="0"/>
+              </a:rPr>
+              <a:t>pyx</a:t>
+            </a:r>
+            <a:endParaRPr lang="en-US" dirty="0" smtClean="0">
+              <a:latin typeface="Courier New" panose="02070309020205020404" pitchFamily="49" charset="0"/>
+              <a:cs typeface="Courier New" panose="02070309020205020404" pitchFamily="49" charset="0"/>
+            </a:endParaRPr>
+          </a:p>
+          <a:p>
+            <a:pPr lvl="1"/>
+            <a:r>
+              <a:rPr lang="en-US" dirty="0" smtClean="0"/>
+              <a:t>Implementation of all functions, except </a:t>
+            </a:r>
+            <a:r>
+              <a:rPr lang="en-US" dirty="0" smtClean="0">
+                <a:latin typeface="Courier New" panose="02070309020205020404" pitchFamily="49" charset="0"/>
+                <a:cs typeface="Courier New" panose="02070309020205020404" pitchFamily="49" charset="0"/>
+              </a:rPr>
+              <a:t>inline</a:t>
+            </a:r>
+          </a:p>
+          <a:p>
+            <a:pPr lvl="1"/>
+            <a:r>
+              <a:rPr lang="en-US" dirty="0" smtClean="0"/>
+              <a:t>Class definitions, but not </a:t>
+            </a:r>
+            <a:r>
+              <a:rPr lang="en-US" dirty="0" err="1" smtClean="0">
+                <a:latin typeface="Courier New" panose="02070309020205020404" pitchFamily="49" charset="0"/>
+                <a:cs typeface="Courier New" panose="02070309020205020404" pitchFamily="49" charset="0"/>
+              </a:rPr>
+              <a:t>cdef</a:t>
+            </a:r>
+            <a:r>
+              <a:rPr lang="en-US" dirty="0" smtClean="0"/>
+              <a:t> attributes</a:t>
+            </a:r>
+            <a:endParaRPr lang="en-US" dirty="0"/>
+          </a:p>
+          <a:p>
+            <a:r>
+              <a:rPr lang="en-US" dirty="0" smtClean="0"/>
+              <a:t>Declarations files: </a:t>
+            </a:r>
+            <a:r>
+              <a:rPr lang="en-US" dirty="0" smtClean="0">
+                <a:latin typeface="Courier New" panose="02070309020205020404" pitchFamily="49" charset="0"/>
+                <a:cs typeface="Courier New" panose="02070309020205020404" pitchFamily="49" charset="0"/>
+              </a:rPr>
+              <a:t>.</a:t>
+            </a:r>
+            <a:r>
+              <a:rPr lang="en-US" dirty="0" err="1" smtClean="0">
+                <a:latin typeface="Courier New" panose="02070309020205020404" pitchFamily="49" charset="0"/>
+                <a:cs typeface="Courier New" panose="02070309020205020404" pitchFamily="49" charset="0"/>
+              </a:rPr>
+              <a:t>pxd</a:t>
+            </a:r>
+            <a:endParaRPr lang="en-US" dirty="0" smtClean="0">
+              <a:latin typeface="Courier New" panose="02070309020205020404" pitchFamily="49" charset="0"/>
+              <a:cs typeface="Courier New" panose="02070309020205020404" pitchFamily="49" charset="0"/>
+            </a:endParaRPr>
+          </a:p>
+          <a:p>
+            <a:pPr lvl="1"/>
+            <a:r>
+              <a:rPr lang="en-US" dirty="0" smtClean="0"/>
+              <a:t>C-level declarations: </a:t>
+            </a:r>
+            <a:r>
+              <a:rPr lang="en-US" dirty="0" err="1" smtClean="0">
+                <a:latin typeface="Courier New" panose="02070309020205020404" pitchFamily="49" charset="0"/>
+                <a:cs typeface="Courier New" panose="02070309020205020404" pitchFamily="49" charset="0"/>
+              </a:rPr>
+              <a:t>cdef</a:t>
+            </a:r>
+            <a:r>
+              <a:rPr lang="en-US" dirty="0" smtClean="0"/>
+              <a:t>, </a:t>
+            </a:r>
+            <a:r>
+              <a:rPr lang="en-US" dirty="0" err="1" smtClean="0">
+                <a:latin typeface="Courier New" panose="02070309020205020404" pitchFamily="49" charset="0"/>
+                <a:cs typeface="Courier New" panose="02070309020205020404" pitchFamily="49" charset="0"/>
+              </a:rPr>
+              <a:t>cpdef</a:t>
+            </a:r>
+            <a:r>
+              <a:rPr lang="en-US" dirty="0" smtClean="0"/>
+              <a:t>, </a:t>
+            </a:r>
+            <a:r>
+              <a:rPr lang="en-US" dirty="0" err="1" smtClean="0">
+                <a:latin typeface="Courier New" panose="02070309020205020404" pitchFamily="49" charset="0"/>
+                <a:cs typeface="Courier New" panose="02070309020205020404" pitchFamily="49" charset="0"/>
+              </a:rPr>
+              <a:t>ctypedef</a:t>
+            </a:r>
+            <a:r>
+              <a:rPr lang="en-US" dirty="0" smtClean="0"/>
+              <a:t>,…</a:t>
+            </a:r>
+          </a:p>
+          <a:p>
+            <a:pPr lvl="1"/>
+            <a:r>
+              <a:rPr lang="en-US" dirty="0" smtClean="0"/>
+              <a:t>Implementation of </a:t>
+            </a:r>
+            <a:r>
+              <a:rPr lang="en-US" dirty="0" smtClean="0">
+                <a:latin typeface="Courier New" panose="02070309020205020404" pitchFamily="49" charset="0"/>
+                <a:cs typeface="Courier New" panose="02070309020205020404" pitchFamily="49" charset="0"/>
+              </a:rPr>
+              <a:t>inline</a:t>
+            </a:r>
+            <a:r>
+              <a:rPr lang="en-US" dirty="0" smtClean="0"/>
+              <a:t> functions</a:t>
+            </a:r>
+          </a:p>
+          <a:p>
+            <a:r>
+              <a:rPr lang="en-US" dirty="0" smtClean="0"/>
+              <a:t>Declaration file + implementation file</a:t>
+            </a:r>
+            <a:br>
+              <a:rPr lang="en-US" dirty="0" smtClean="0"/>
+            </a:br>
+            <a:r>
+              <a:rPr lang="en-US" dirty="0" smtClean="0"/>
+              <a:t>              = one namespace!</a:t>
+            </a:r>
+          </a:p>
+          <a:p>
+            <a:r>
+              <a:rPr lang="en-US" dirty="0" smtClean="0"/>
+              <a:t>Use </a:t>
+            </a:r>
+            <a:r>
+              <a:rPr lang="en-US" dirty="0" err="1" smtClean="0">
+                <a:latin typeface="Courier New" panose="02070309020205020404" pitchFamily="49" charset="0"/>
+                <a:cs typeface="Courier New" panose="02070309020205020404" pitchFamily="49" charset="0"/>
+              </a:rPr>
+              <a:t>cimport</a:t>
+            </a:r>
+            <a:endParaRPr lang="nl-BE" dirty="0">
+              <a:latin typeface="Courier New" panose="02070309020205020404" pitchFamily="49" charset="0"/>
+              <a:cs typeface="Courier New" panose="02070309020205020404" pitchFamily="49" charset="0"/>
+            </a:endParaRPr>
           </a:p>
         </p:txBody>
       </p:sp>
@@ -15780,180 +15958,7 @@
     </p:spTree>
     <p:extLst>
       <p:ext uri="{BB962C8B-B14F-4D97-AF65-F5344CB8AC3E}">
-        <p14:creationId xmlns:p14="http://schemas.microsoft.com/office/powerpoint/2010/main" val="75062823"/>
-      </p:ext>
-    </p:extLst>
-  </p:cSld>
-  <p:clrMapOvr>
-    <a:masterClrMapping/>
-  </p:clrMapOvr>
-  <p:timing>
-    <p:tnLst>
-      <p:par>
-        <p:cTn id="1" dur="indefinite" restart="never" nodeType="tmRoot"/>
-      </p:par>
-    </p:tnLst>
-  </p:timing>
-</p:sld>
-</file>
-
-<file path=ppt/slides/slide29.xml><?xml version="1.0" encoding="utf-8"?>
-<p:sld xmlns:a="http://schemas.openxmlformats.org/drawingml/2006/main" xmlns:r="http://schemas.openxmlformats.org/officeDocument/2006/relationships" xmlns:p="http://schemas.openxmlformats.org/presentationml/2006/main">
-  <p:cSld>
-    <p:spTree>
-      <p:nvGrpSpPr>
-        <p:cNvPr id="1" name=""/>
-        <p:cNvGrpSpPr/>
-        <p:nvPr/>
-      </p:nvGrpSpPr>
-      <p:grpSpPr>
-        <a:xfrm>
-          <a:off x="0" y="0"/>
-          <a:ext cx="0" cy="0"/>
-          <a:chOff x="0" y="0"/>
-          <a:chExt cx="0" cy="0"/>
-        </a:xfrm>
-      </p:grpSpPr>
-      <p:sp>
-        <p:nvSpPr>
-          <p:cNvPr id="2" name="Title 1"/>
-          <p:cNvSpPr>
-            <a:spLocks noGrp="1"/>
-          </p:cNvSpPr>
-          <p:nvPr>
-            <p:ph type="title"/>
-          </p:nvPr>
-        </p:nvSpPr>
-        <p:spPr/>
-        <p:txBody>
-          <a:bodyPr/>
-          <a:lstStyle/>
-          <a:p>
-            <a:r>
-              <a:rPr lang="en-US" dirty="0" smtClean="0"/>
-              <a:t>Conclusions</a:t>
-            </a:r>
-            <a:endParaRPr lang="nl-BE" dirty="0"/>
-          </a:p>
-        </p:txBody>
-      </p:sp>
-      <p:sp>
-        <p:nvSpPr>
-          <p:cNvPr id="3" name="Content Placeholder 2"/>
-          <p:cNvSpPr>
-            <a:spLocks noGrp="1"/>
-          </p:cNvSpPr>
-          <p:nvPr>
-            <p:ph idx="1"/>
-          </p:nvPr>
-        </p:nvSpPr>
-        <p:spPr/>
-        <p:txBody>
-          <a:bodyPr>
-            <a:normAutofit fontScale="92500"/>
-          </a:bodyPr>
-          <a:lstStyle/>
-          <a:p>
-            <a:r>
-              <a:rPr lang="en-US" dirty="0" err="1" smtClean="0"/>
-              <a:t>Cython</a:t>
-            </a:r>
-            <a:endParaRPr lang="en-US" dirty="0" smtClean="0"/>
-          </a:p>
-          <a:p>
-            <a:pPr lvl="1"/>
-            <a:r>
-              <a:rPr lang="en-US" dirty="0" smtClean="0"/>
-              <a:t>Pros</a:t>
-            </a:r>
-          </a:p>
-          <a:p>
-            <a:pPr lvl="2"/>
-            <a:r>
-              <a:rPr lang="en-US" dirty="0" smtClean="0"/>
-              <a:t>Fairly simple to use</a:t>
-            </a:r>
-          </a:p>
-          <a:p>
-            <a:pPr lvl="2"/>
-            <a:r>
-              <a:rPr lang="en-US" dirty="0" smtClean="0"/>
-              <a:t>Offers </a:t>
-            </a:r>
-            <a:r>
-              <a:rPr lang="en-US" dirty="0" err="1" smtClean="0"/>
-              <a:t>execellent</a:t>
-            </a:r>
-            <a:r>
-              <a:rPr lang="en-US" dirty="0" smtClean="0"/>
-              <a:t> speedups when use wisely</a:t>
-            </a:r>
-          </a:p>
-          <a:p>
-            <a:pPr lvl="1"/>
-            <a:r>
-              <a:rPr lang="en-US" dirty="0" smtClean="0"/>
-              <a:t>Cons</a:t>
-            </a:r>
-          </a:p>
-          <a:p>
-            <a:pPr lvl="2"/>
-            <a:r>
-              <a:rPr lang="en-US" dirty="0" smtClean="0"/>
-              <a:t>Good understanding of Python and C/C++</a:t>
-            </a:r>
-          </a:p>
-          <a:p>
-            <a:r>
-              <a:rPr lang="en-US" dirty="0" smtClean="0"/>
-              <a:t>Features not covered here: wrapping C/C++ code</a:t>
-            </a:r>
-          </a:p>
-          <a:p>
-            <a:pPr lvl="1"/>
-            <a:r>
-              <a:rPr lang="en-US" dirty="0" smtClean="0"/>
-              <a:t>Pro: low overhead compared to, e.g., SWIG</a:t>
-            </a:r>
-          </a:p>
-          <a:p>
-            <a:pPr lvl="1"/>
-            <a:r>
-              <a:rPr lang="en-US" dirty="0" smtClean="0"/>
-              <a:t>Con: quite some code to write manually</a:t>
-            </a:r>
-            <a:endParaRPr lang="nl-BE" dirty="0"/>
-          </a:p>
-        </p:txBody>
-      </p:sp>
-      <p:sp>
-        <p:nvSpPr>
-          <p:cNvPr id="4" name="Slide Number Placeholder 3"/>
-          <p:cNvSpPr>
-            <a:spLocks noGrp="1"/>
-          </p:cNvSpPr>
-          <p:nvPr>
-            <p:ph type="sldNum" sz="quarter" idx="12"/>
-          </p:nvPr>
-        </p:nvSpPr>
-        <p:spPr/>
-        <p:txBody>
-          <a:bodyPr/>
-          <a:lstStyle/>
-          <a:p>
-            <a:fld id="{B6F15528-21DE-4FAA-801E-634DDDAF4B2B}" type="slidenum">
-              <a:rPr lang="en-US" smtClean="0"/>
-              <a:pPr/>
-              <a:t>29</a:t>
-            </a:fld>
-            <a:endParaRPr lang="en-US"/>
-          </a:p>
-        </p:txBody>
-      </p:sp>
-    </p:spTree>
-    <p:extLst>
-      <p:ext uri="{BB962C8B-B14F-4D97-AF65-F5344CB8AC3E}">
-        <p14:creationId xmlns:p14="http://schemas.microsoft.com/office/powerpoint/2010/main" val="3524984196"/>
+        <p14:creationId xmlns:p14="http://schemas.microsoft.com/office/powerpoint/2010/main" val="172730094"/>
       </p:ext>
     </p:extLst>
   </p:cSld>
@@ -16014,39 +16019,26 @@
                                   </p:childTnLst>
                                 </p:cTn>
                               </p:par>
+                            </p:childTnLst>
+                          </p:cTn>
+                        </p:par>
+                      </p:childTnLst>
+                    </p:cTn>
+                  </p:par>
+                  <p:par>
+                    <p:cTn id="7" fill="hold">
+                      <p:stCondLst>
+                        <p:cond delay="indefinite"/>
+                      </p:stCondLst>
+                      <p:childTnLst>
+                        <p:par>
+                          <p:cTn id="8" fill="hold">
+                            <p:stCondLst>
+                              <p:cond delay="0"/>
+                            </p:stCondLst>
+                            <p:childTnLst>
                               <p:par>
-                                <p:cTn id="7" presetID="1" presetClass="entr" presetSubtype="0" fill="hold" grpId="0" nodeType="withEffect">
-                                  <p:stCondLst>
-                                    <p:cond delay="0"/>
-                                  </p:stCondLst>
-                                  <p:childTnLst>
-                                    <p:set>
-                                      <p:cBhvr>
-                                        <p:cTn id="8" dur="1" fill="hold">
-                                          <p:stCondLst>
-                                            <p:cond delay="0"/>
-                                          </p:stCondLst>
-                                        </p:cTn>
-                                        <p:tgtEl>
-                                          <p:spTgt spid="3">
-                                            <p:txEl>
-                                              <p:pRg st="1" end="1"/>
-                                            </p:txEl>
-                                          </p:spTgt>
-                                        </p:tgtEl>
-                                        <p:attrNameLst>
-                                          <p:attrName>style.visibility</p:attrName>
-                                        </p:attrNameLst>
-                                      </p:cBhvr>
-                                      <p:to>
-                                        <p:strVal val="visible"/>
-                                      </p:to>
-                                    </p:set>
-                                  </p:childTnLst>
-                                </p:cTn>
-                              </p:par>
-                              <p:par>
-                                <p:cTn id="9" presetID="1" presetClass="entr" presetSubtype="0" fill="hold" grpId="0" nodeType="withEffect">
+                                <p:cTn id="9" presetID="1" presetClass="entr" presetSubtype="0" fill="hold" grpId="0" nodeType="clickEffect">
                                   <p:stCondLst>
                                     <p:cond delay="0"/>
                                   </p:stCondLst>
@@ -16061,7 +16053,7 @@
                                         <p:tgtEl>
                                           <p:spTgt spid="3">
                                             <p:txEl>
-                                              <p:pRg st="2" end="2"/>
+                                              <p:pRg st="1" end="1"/>
                                             </p:txEl>
                                           </p:spTgt>
                                         </p:tgtEl>
@@ -16092,6 +16084,37 @@
                                         <p:tgtEl>
                                           <p:spTgt spid="3">
                                             <p:txEl>
+                                              <p:pRg st="2" end="2"/>
+                                            </p:txEl>
+                                          </p:spTgt>
+                                        </p:tgtEl>
+                                        <p:attrNameLst>
+                                          <p:attrName>style.visibility</p:attrName>
+                                        </p:attrNameLst>
+                                      </p:cBhvr>
+                                      <p:to>
+                                        <p:strVal val="visible"/>
+                                      </p:to>
+                                    </p:set>
+                                  </p:childTnLst>
+                                </p:cTn>
+                              </p:par>
+                              <p:par>
+                                <p:cTn id="13" presetID="1" presetClass="entr" presetSubtype="0" fill="hold" grpId="0" nodeType="withEffect">
+                                  <p:stCondLst>
+                                    <p:cond delay="0"/>
+                                  </p:stCondLst>
+                                  <p:childTnLst>
+                                    <p:set>
+                                      <p:cBhvr>
+                                        <p:cTn id="14" dur="1" fill="hold">
+                                          <p:stCondLst>
+                                            <p:cond delay="0"/>
+                                          </p:stCondLst>
+                                        </p:cTn>
+                                        <p:tgtEl>
+                                          <p:spTgt spid="3">
+                                            <p:txEl>
                                               <p:pRg st="3" end="3"/>
                                             </p:txEl>
                                           </p:spTgt>
@@ -16114,26 +16137,26 @@
                     </p:cTn>
                   </p:par>
                   <p:par>
-                    <p:cTn id="13" fill="hold">
+                    <p:cTn id="15" fill="hold">
                       <p:stCondLst>
                         <p:cond delay="indefinite"/>
                       </p:stCondLst>
                       <p:childTnLst>
                         <p:par>
-                          <p:cTn id="14" fill="hold">
+                          <p:cTn id="16" fill="hold">
                             <p:stCondLst>
                               <p:cond delay="0"/>
                             </p:stCondLst>
                             <p:childTnLst>
                               <p:par>
-                                <p:cTn id="15" presetID="1" presetClass="entr" presetSubtype="0" fill="hold" grpId="0" nodeType="clickEffect">
+                                <p:cTn id="17" presetID="1" presetClass="entr" presetSubtype="0" fill="hold" grpId="0" nodeType="clickEffect">
                                   <p:stCondLst>
                                     <p:cond delay="0"/>
                                   </p:stCondLst>
                                   <p:childTnLst>
                                     <p:set>
                                       <p:cBhvr>
-                                        <p:cTn id="16" dur="1" fill="hold">
+                                        <p:cTn id="18" dur="1" fill="hold">
                                           <p:stCondLst>
                                             <p:cond delay="0"/>
                                           </p:stCondLst>
@@ -16157,14 +16180,14 @@
                                 </p:cTn>
                               </p:par>
                               <p:par>
-                                <p:cTn id="17" presetID="1" presetClass="entr" presetSubtype="0" fill="hold" grpId="0" nodeType="withEffect">
+                                <p:cTn id="19" presetID="1" presetClass="entr" presetSubtype="0" fill="hold" grpId="0" nodeType="withEffect">
                                   <p:stCondLst>
                                     <p:cond delay="0"/>
                                   </p:stCondLst>
                                   <p:childTnLst>
                                     <p:set>
                                       <p:cBhvr>
-                                        <p:cTn id="18" dur="1" fill="hold">
+                                        <p:cTn id="20" dur="1" fill="hold">
                                           <p:stCondLst>
                                             <p:cond delay="0"/>
                                           </p:stCondLst>
@@ -16187,26 +16210,8 @@
                                   </p:childTnLst>
                                 </p:cTn>
                               </p:par>
-                            </p:childTnLst>
-                          </p:cTn>
-                        </p:par>
-                      </p:childTnLst>
-                    </p:cTn>
-                  </p:par>
-                  <p:par>
-                    <p:cTn id="19" fill="hold">
-                      <p:stCondLst>
-                        <p:cond delay="indefinite"/>
-                      </p:stCondLst>
-                      <p:childTnLst>
-                        <p:par>
-                          <p:cTn id="20" fill="hold">
-                            <p:stCondLst>
-                              <p:cond delay="0"/>
-                            </p:stCondLst>
-                            <p:childTnLst>
                               <p:par>
-                                <p:cTn id="21" presetID="1" presetClass="entr" presetSubtype="0" fill="hold" grpId="0" nodeType="clickEffect">
+                                <p:cTn id="21" presetID="1" presetClass="entr" presetSubtype="0" fill="hold" grpId="0" nodeType="withEffect">
                                   <p:stCondLst>
                                     <p:cond delay="0"/>
                                   </p:stCondLst>
@@ -16236,15 +16241,33 @@
                                   </p:childTnLst>
                                 </p:cTn>
                               </p:par>
+                            </p:childTnLst>
+                          </p:cTn>
+                        </p:par>
+                      </p:childTnLst>
+                    </p:cTn>
+                  </p:par>
+                  <p:par>
+                    <p:cTn id="23" fill="hold">
+                      <p:stCondLst>
+                        <p:cond delay="indefinite"/>
+                      </p:stCondLst>
+                      <p:childTnLst>
+                        <p:par>
+                          <p:cTn id="24" fill="hold">
+                            <p:stCondLst>
+                              <p:cond delay="0"/>
+                            </p:stCondLst>
+                            <p:childTnLst>
                               <p:par>
-                                <p:cTn id="23" presetID="1" presetClass="entr" presetSubtype="0" fill="hold" grpId="0" nodeType="withEffect">
+                                <p:cTn id="25" presetID="1" presetClass="entr" presetSubtype="0" fill="hold" grpId="0" nodeType="clickEffect">
                                   <p:stCondLst>
                                     <p:cond delay="0"/>
                                   </p:stCondLst>
                                   <p:childTnLst>
                                     <p:set>
                                       <p:cBhvr>
-                                        <p:cTn id="24" dur="1" fill="hold">
+                                        <p:cTn id="26" dur="1" fill="hold">
                                           <p:stCondLst>
                                             <p:cond delay="0"/>
                                           </p:stCondLst>
@@ -16274,26 +16297,26 @@
                     </p:cTn>
                   </p:par>
                   <p:par>
-                    <p:cTn id="25" fill="hold">
+                    <p:cTn id="27" fill="hold">
                       <p:stCondLst>
                         <p:cond delay="indefinite"/>
                       </p:stCondLst>
                       <p:childTnLst>
                         <p:par>
-                          <p:cTn id="26" fill="hold">
+                          <p:cTn id="28" fill="hold">
                             <p:stCondLst>
                               <p:cond delay="0"/>
                             </p:stCondLst>
                             <p:childTnLst>
                               <p:par>
-                                <p:cTn id="27" presetID="1" presetClass="entr" presetSubtype="0" fill="hold" grpId="0" nodeType="clickEffect">
+                                <p:cTn id="29" presetID="1" presetClass="entr" presetSubtype="0" fill="hold" grpId="0" nodeType="clickEffect">
                                   <p:stCondLst>
                                     <p:cond delay="0"/>
                                   </p:stCondLst>
                                   <p:childTnLst>
                                     <p:set>
                                       <p:cBhvr>
-                                        <p:cTn id="28" dur="1" fill="hold">
+                                        <p:cTn id="30" dur="1" fill="hold">
                                           <p:stCondLst>
                                             <p:cond delay="0"/>
                                           </p:stCondLst>
@@ -16344,8 +16367,1209 @@
       </p:par>
     </p:tnLst>
     <p:bldLst>
-      <p:bldP spid="3" grpId="0" uiExpand="1" build="p" bldLvl="2"/>
+      <p:bldP spid="3" grpId="0" uiExpand="1" build="p"/>
     </p:bldLst>
+  </p:timing>
+</p:sld>
+</file>
+
+<file path=ppt/slides/slide29.xml><?xml version="1.0" encoding="utf-8"?>
+<p:sld xmlns:a="http://schemas.openxmlformats.org/drawingml/2006/main" xmlns:r="http://schemas.openxmlformats.org/officeDocument/2006/relationships" xmlns:p="http://schemas.openxmlformats.org/presentationml/2006/main">
+  <p:cSld>
+    <p:spTree>
+      <p:nvGrpSpPr>
+        <p:cNvPr id="1" name=""/>
+        <p:cNvGrpSpPr/>
+        <p:nvPr/>
+      </p:nvGrpSpPr>
+      <p:grpSpPr>
+        <a:xfrm>
+          <a:off x="0" y="0"/>
+          <a:ext cx="0" cy="0"/>
+          <a:chOff x="0" y="0"/>
+          <a:chExt cx="0" cy="0"/>
+        </a:xfrm>
+      </p:grpSpPr>
+      <p:sp>
+        <p:nvSpPr>
+          <p:cNvPr id="5" name="Title 4"/>
+          <p:cNvSpPr>
+            <a:spLocks noGrp="1"/>
+          </p:cNvSpPr>
+          <p:nvPr>
+            <p:ph type="title"/>
+          </p:nvPr>
+        </p:nvSpPr>
+        <p:spPr/>
+        <p:txBody>
+          <a:bodyPr>
+            <a:normAutofit/>
+          </a:bodyPr>
+          <a:lstStyle/>
+          <a:p>
+            <a:r>
+              <a:rPr lang="en-US" dirty="0"/>
+              <a:t>D</a:t>
+            </a:r>
+            <a:r>
+              <a:rPr lang="en-US" dirty="0" smtClean="0"/>
+              <a:t>eclaration/implementation</a:t>
+            </a:r>
+            <a:endParaRPr lang="nl-BE" dirty="0"/>
+          </a:p>
+        </p:txBody>
+      </p:sp>
+      <p:sp>
+        <p:nvSpPr>
+          <p:cNvPr id="4" name="Slide Number Placeholder 3"/>
+          <p:cNvSpPr>
+            <a:spLocks noGrp="1"/>
+          </p:cNvSpPr>
+          <p:nvPr>
+            <p:ph type="sldNum" sz="quarter" idx="12"/>
+          </p:nvPr>
+        </p:nvSpPr>
+        <p:spPr/>
+        <p:txBody>
+          <a:bodyPr/>
+          <a:lstStyle/>
+          <a:p>
+            <a:fld id="{B6F15528-21DE-4FAA-801E-634DDDAF4B2B}" type="slidenum">
+              <a:rPr lang="en-US" smtClean="0"/>
+              <a:pPr/>
+              <a:t>29</a:t>
+            </a:fld>
+            <a:endParaRPr lang="en-US"/>
+          </a:p>
+        </p:txBody>
+      </p:sp>
+      <p:grpSp>
+        <p:nvGrpSpPr>
+          <p:cNvPr id="6" name="Group 5"/>
+          <p:cNvGrpSpPr/>
+          <p:nvPr/>
+        </p:nvGrpSpPr>
+        <p:grpSpPr>
+          <a:xfrm>
+            <a:off x="228600" y="1676400"/>
+            <a:ext cx="4751622" cy="4278094"/>
+            <a:chOff x="304800" y="1371600"/>
+            <a:chExt cx="4751622" cy="4278094"/>
+          </a:xfrm>
+          <a:solidFill>
+            <a:schemeClr val="bg1">
+              <a:lumMod val="85000"/>
+            </a:schemeClr>
+          </a:solidFill>
+        </p:grpSpPr>
+        <p:sp>
+          <p:nvSpPr>
+            <p:cNvPr id="7" name="TextBox 6"/>
+            <p:cNvSpPr txBox="1"/>
+            <p:nvPr/>
+          </p:nvSpPr>
+          <p:spPr>
+            <a:xfrm>
+              <a:off x="304800" y="1371600"/>
+              <a:ext cx="4751622" cy="4278094"/>
+            </a:xfrm>
+            <a:prstGeom prst="rect">
+              <a:avLst/>
+            </a:prstGeom>
+            <a:grpFill/>
+            <a:ln>
+              <a:solidFill>
+                <a:schemeClr val="tx1"/>
+              </a:solidFill>
+            </a:ln>
+          </p:spPr>
+          <p:txBody>
+            <a:bodyPr wrap="none" rtlCol="0">
+              <a:spAutoFit/>
+            </a:bodyPr>
+            <a:lstStyle/>
+            <a:p>
+              <a:r>
+                <a:rPr lang="en-US" sz="1600" dirty="0" err="1" smtClean="0">
+                  <a:latin typeface="Courier New" panose="02070309020205020404" pitchFamily="49" charset="0"/>
+                  <a:cs typeface="Courier New" panose="02070309020205020404" pitchFamily="49" charset="0"/>
+                </a:rPr>
+                <a:t>cdef</a:t>
+              </a:r>
+              <a:r>
+                <a:rPr lang="en-US" sz="1600" dirty="0" smtClean="0">
+                  <a:latin typeface="Courier New" panose="02070309020205020404" pitchFamily="49" charset="0"/>
+                  <a:cs typeface="Courier New" panose="02070309020205020404" pitchFamily="49" charset="0"/>
+                </a:rPr>
+                <a:t> double </a:t>
+              </a:r>
+              <a:r>
+                <a:rPr lang="en-US" sz="1600" dirty="0" err="1" smtClean="0">
+                  <a:latin typeface="Courier New" panose="02070309020205020404" pitchFamily="49" charset="0"/>
+                  <a:cs typeface="Courier New" panose="02070309020205020404" pitchFamily="49" charset="0"/>
+                </a:rPr>
+                <a:t>total_mass</a:t>
+              </a:r>
+              <a:r>
+                <a:rPr lang="en-US" sz="1600" dirty="0" smtClean="0">
+                  <a:latin typeface="Courier New" panose="02070309020205020404" pitchFamily="49" charset="0"/>
+                  <a:cs typeface="Courier New" panose="02070309020205020404" pitchFamily="49" charset="0"/>
+                </a:rPr>
+                <a:t>(Particles p[],</a:t>
+              </a:r>
+            </a:p>
+            <a:p>
+              <a:r>
+                <a:rPr lang="en-US" sz="1600" dirty="0">
+                  <a:latin typeface="Courier New" panose="02070309020205020404" pitchFamily="49" charset="0"/>
+                  <a:cs typeface="Courier New" panose="02070309020205020404" pitchFamily="49" charset="0"/>
+                </a:rPr>
+                <a:t> </a:t>
+              </a:r>
+              <a:r>
+                <a:rPr lang="en-US" sz="1600" dirty="0" smtClean="0">
+                  <a:latin typeface="Courier New" panose="02070309020205020404" pitchFamily="49" charset="0"/>
+                  <a:cs typeface="Courier New" panose="02070309020205020404" pitchFamily="49" charset="0"/>
+                </a:rPr>
+                <a:t>                      </a:t>
+              </a:r>
+              <a:r>
+                <a:rPr lang="en-US" sz="1600" dirty="0" err="1" smtClean="0">
+                  <a:latin typeface="Courier New" panose="02070309020205020404" pitchFamily="49" charset="0"/>
+                  <a:cs typeface="Courier New" panose="02070309020205020404" pitchFamily="49" charset="0"/>
+                </a:rPr>
+                <a:t>int</a:t>
+              </a:r>
+              <a:r>
+                <a:rPr lang="en-US" sz="1600" dirty="0" smtClean="0">
+                  <a:latin typeface="Courier New" panose="02070309020205020404" pitchFamily="49" charset="0"/>
+                  <a:cs typeface="Courier New" panose="02070309020205020404" pitchFamily="49" charset="0"/>
+                </a:rPr>
+                <a:t> n</a:t>
+              </a:r>
+              <a:r>
+                <a:rPr lang="en-US" sz="1600" dirty="0" smtClean="0">
+                  <a:latin typeface="Courier New" panose="02070309020205020404" pitchFamily="49" charset="0"/>
+                  <a:cs typeface="Courier New" panose="02070309020205020404" pitchFamily="49" charset="0"/>
+                </a:rPr>
+                <a:t>):</a:t>
+              </a:r>
+            </a:p>
+            <a:p>
+              <a:r>
+                <a:rPr lang="en-US" sz="1600" dirty="0">
+                  <a:latin typeface="Courier New" panose="02070309020205020404" pitchFamily="49" charset="0"/>
+                  <a:cs typeface="Courier New" panose="02070309020205020404" pitchFamily="49" charset="0"/>
+                </a:rPr>
+                <a:t> </a:t>
+              </a:r>
+              <a:r>
+                <a:rPr lang="en-US" sz="1600" dirty="0" smtClean="0">
+                  <a:latin typeface="Courier New" panose="02070309020205020404" pitchFamily="49" charset="0"/>
+                  <a:cs typeface="Courier New" panose="02070309020205020404" pitchFamily="49" charset="0"/>
+                </a:rPr>
+                <a:t>   …</a:t>
+              </a:r>
+            </a:p>
+            <a:p>
+              <a:endParaRPr lang="nl-BE" sz="1600" dirty="0" smtClean="0">
+                <a:latin typeface="Courier New" panose="02070309020205020404" pitchFamily="49" charset="0"/>
+                <a:cs typeface="Courier New" panose="02070309020205020404" pitchFamily="49" charset="0"/>
+              </a:endParaRPr>
+            </a:p>
+            <a:p>
+              <a:r>
+                <a:rPr lang="nl-BE" sz="1600" dirty="0" err="1" smtClean="0">
+                  <a:latin typeface="Courier New" panose="02070309020205020404" pitchFamily="49" charset="0"/>
+                  <a:cs typeface="Courier New" panose="02070309020205020404" pitchFamily="49" charset="0"/>
+                </a:rPr>
+                <a:t>cdef</a:t>
+              </a:r>
+              <a:r>
+                <a:rPr lang="nl-BE" sz="1600" dirty="0" smtClean="0">
+                  <a:latin typeface="Courier New" panose="02070309020205020404" pitchFamily="49" charset="0"/>
+                  <a:cs typeface="Courier New" panose="02070309020205020404" pitchFamily="49" charset="0"/>
+                </a:rPr>
+                <a:t> </a:t>
+              </a:r>
+              <a:r>
+                <a:rPr lang="nl-BE" sz="1600" dirty="0" smtClean="0">
+                  <a:latin typeface="Courier New" panose="02070309020205020404" pitchFamily="49" charset="0"/>
+                  <a:cs typeface="Courier New" panose="02070309020205020404" pitchFamily="49" charset="0"/>
+                </a:rPr>
+                <a:t>class </a:t>
+              </a:r>
+              <a:r>
+                <a:rPr lang="nl-BE" sz="1600" dirty="0" err="1" smtClean="0">
+                  <a:latin typeface="Courier New" panose="02070309020205020404" pitchFamily="49" charset="0"/>
+                  <a:cs typeface="Courier New" panose="02070309020205020404" pitchFamily="49" charset="0"/>
+                </a:rPr>
+                <a:t>Particle</a:t>
+              </a:r>
+              <a:r>
+                <a:rPr lang="nl-BE" sz="1600" dirty="0" smtClean="0">
+                  <a:latin typeface="Courier New" panose="02070309020205020404" pitchFamily="49" charset="0"/>
+                  <a:cs typeface="Courier New" panose="02070309020205020404" pitchFamily="49" charset="0"/>
+                </a:rPr>
+                <a:t>(object):</a:t>
+              </a:r>
+            </a:p>
+            <a:p>
+              <a:endParaRPr lang="en-US" sz="1600" dirty="0" smtClean="0">
+                <a:latin typeface="Courier New" panose="02070309020205020404" pitchFamily="49" charset="0"/>
+                <a:cs typeface="Courier New" panose="02070309020205020404" pitchFamily="49" charset="0"/>
+              </a:endParaRPr>
+            </a:p>
+            <a:p>
+              <a:r>
+                <a:rPr lang="en-US" sz="1600" dirty="0">
+                  <a:latin typeface="Courier New" panose="02070309020205020404" pitchFamily="49" charset="0"/>
+                  <a:cs typeface="Courier New" panose="02070309020205020404" pitchFamily="49" charset="0"/>
+                </a:rPr>
+                <a:t> </a:t>
+              </a:r>
+              <a:r>
+                <a:rPr lang="en-US" sz="1600" dirty="0" smtClean="0">
+                  <a:latin typeface="Courier New" panose="02070309020205020404" pitchFamily="49" charset="0"/>
+                  <a:cs typeface="Courier New" panose="02070309020205020404" pitchFamily="49" charset="0"/>
+                </a:rPr>
+                <a:t>   </a:t>
+              </a:r>
+              <a:r>
+                <a:rPr lang="en-US" sz="1600" dirty="0" err="1" smtClean="0">
+                  <a:latin typeface="Courier New" panose="02070309020205020404" pitchFamily="49" charset="0"/>
+                  <a:cs typeface="Courier New" panose="02070309020205020404" pitchFamily="49" charset="0"/>
+                </a:rPr>
+                <a:t>cdef</a:t>
+              </a:r>
+              <a:r>
+                <a:rPr lang="en-US" sz="1600" dirty="0" smtClean="0">
+                  <a:latin typeface="Courier New" panose="02070309020205020404" pitchFamily="49" charset="0"/>
+                  <a:cs typeface="Courier New" panose="02070309020205020404" pitchFamily="49" charset="0"/>
+                </a:rPr>
+                <a:t> double m, x, v</a:t>
+              </a:r>
+            </a:p>
+            <a:p>
+              <a:endParaRPr lang="en-US" sz="1600" dirty="0">
+                <a:latin typeface="Courier New" panose="02070309020205020404" pitchFamily="49" charset="0"/>
+                <a:cs typeface="Courier New" panose="02070309020205020404" pitchFamily="49" charset="0"/>
+              </a:endParaRPr>
+            </a:p>
+            <a:p>
+              <a:r>
+                <a:rPr lang="en-US" sz="1600" dirty="0" smtClean="0">
+                  <a:latin typeface="Courier New" panose="02070309020205020404" pitchFamily="49" charset="0"/>
+                  <a:cs typeface="Courier New" panose="02070309020205020404" pitchFamily="49" charset="0"/>
+                </a:rPr>
+                <a:t>    </a:t>
+              </a:r>
+              <a:r>
+                <a:rPr lang="en-US" sz="1600" dirty="0" err="1" smtClean="0">
+                  <a:latin typeface="Courier New" panose="02070309020205020404" pitchFamily="49" charset="0"/>
+                  <a:cs typeface="Courier New" panose="02070309020205020404" pitchFamily="49" charset="0"/>
+                </a:rPr>
+                <a:t>def</a:t>
+              </a:r>
+              <a:r>
+                <a:rPr lang="en-US" sz="1600" dirty="0" smtClean="0">
+                  <a:latin typeface="Courier New" panose="02070309020205020404" pitchFamily="49" charset="0"/>
+                  <a:cs typeface="Courier New" panose="02070309020205020404" pitchFamily="49" charset="0"/>
+                </a:rPr>
+                <a:t> __</a:t>
+              </a:r>
+              <a:r>
+                <a:rPr lang="en-US" sz="1600" dirty="0" err="1" smtClean="0">
+                  <a:latin typeface="Courier New" panose="02070309020205020404" pitchFamily="49" charset="0"/>
+                  <a:cs typeface="Courier New" panose="02070309020205020404" pitchFamily="49" charset="0"/>
+                </a:rPr>
+                <a:t>init</a:t>
+              </a:r>
+              <a:r>
+                <a:rPr lang="en-US" sz="1600" dirty="0" smtClean="0">
+                  <a:latin typeface="Courier New" panose="02070309020205020404" pitchFamily="49" charset="0"/>
+                  <a:cs typeface="Courier New" panose="02070309020205020404" pitchFamily="49" charset="0"/>
+                </a:rPr>
+                <a:t>__(m, x, v):</a:t>
+              </a:r>
+              <a:endParaRPr lang="nl-BE" sz="1600" dirty="0" smtClean="0">
+                <a:latin typeface="Courier New" panose="02070309020205020404" pitchFamily="49" charset="0"/>
+                <a:cs typeface="Courier New" panose="02070309020205020404" pitchFamily="49" charset="0"/>
+              </a:endParaRPr>
+            </a:p>
+            <a:p>
+              <a:r>
+                <a:rPr lang="en-US" sz="1600" dirty="0" smtClean="0">
+                  <a:latin typeface="Courier New" panose="02070309020205020404" pitchFamily="49" charset="0"/>
+                  <a:cs typeface="Courier New" panose="02070309020205020404" pitchFamily="49" charset="0"/>
+                </a:rPr>
+                <a:t>        ….</a:t>
+              </a:r>
+              <a:endParaRPr lang="en-US" sz="1600" dirty="0" smtClean="0">
+                <a:latin typeface="Courier New" panose="02070309020205020404" pitchFamily="49" charset="0"/>
+                <a:cs typeface="Courier New" panose="02070309020205020404" pitchFamily="49" charset="0"/>
+              </a:endParaRPr>
+            </a:p>
+            <a:p>
+              <a:endParaRPr lang="en-US" sz="1600" dirty="0" smtClean="0">
+                <a:latin typeface="Courier New" panose="02070309020205020404" pitchFamily="49" charset="0"/>
+                <a:cs typeface="Courier New" panose="02070309020205020404" pitchFamily="49" charset="0"/>
+              </a:endParaRPr>
+            </a:p>
+            <a:p>
+              <a:r>
+                <a:rPr lang="en-US" sz="1600" dirty="0">
+                  <a:latin typeface="Courier New" panose="02070309020205020404" pitchFamily="49" charset="0"/>
+                  <a:cs typeface="Courier New" panose="02070309020205020404" pitchFamily="49" charset="0"/>
+                </a:rPr>
+                <a:t> </a:t>
+              </a:r>
+              <a:r>
+                <a:rPr lang="en-US" sz="1600" dirty="0" smtClean="0">
+                  <a:latin typeface="Courier New" panose="02070309020205020404" pitchFamily="49" charset="0"/>
+                  <a:cs typeface="Courier New" panose="02070309020205020404" pitchFamily="49" charset="0"/>
+                </a:rPr>
+                <a:t>   </a:t>
+              </a:r>
+              <a:r>
+                <a:rPr lang="en-US" sz="1600" dirty="0" err="1" smtClean="0">
+                  <a:latin typeface="Courier New" panose="02070309020205020404" pitchFamily="49" charset="0"/>
+                  <a:cs typeface="Courier New" panose="02070309020205020404" pitchFamily="49" charset="0"/>
+                </a:rPr>
+                <a:t>def</a:t>
+              </a:r>
+              <a:r>
+                <a:rPr lang="en-US" sz="1600" dirty="0" smtClean="0">
+                  <a:latin typeface="Courier New" panose="02070309020205020404" pitchFamily="49" charset="0"/>
+                  <a:cs typeface="Courier New" panose="02070309020205020404" pitchFamily="49" charset="0"/>
+                </a:rPr>
+                <a:t> momentum(self):</a:t>
+              </a:r>
+            </a:p>
+            <a:p>
+              <a:r>
+                <a:rPr lang="en-US" sz="1600" dirty="0">
+                  <a:latin typeface="Courier New" panose="02070309020205020404" pitchFamily="49" charset="0"/>
+                  <a:cs typeface="Courier New" panose="02070309020205020404" pitchFamily="49" charset="0"/>
+                </a:rPr>
+                <a:t> </a:t>
+              </a:r>
+              <a:r>
+                <a:rPr lang="en-US" sz="1600" dirty="0" smtClean="0">
+                  <a:latin typeface="Courier New" panose="02070309020205020404" pitchFamily="49" charset="0"/>
+                  <a:cs typeface="Courier New" panose="02070309020205020404" pitchFamily="49" charset="0"/>
+                </a:rPr>
+                <a:t>       </a:t>
+              </a:r>
+              <a:r>
+                <a:rPr lang="en-US" sz="1600" dirty="0" smtClean="0">
+                  <a:latin typeface="Courier New" panose="02070309020205020404" pitchFamily="49" charset="0"/>
+                  <a:cs typeface="Courier New" panose="02070309020205020404" pitchFamily="49" charset="0"/>
+                </a:rPr>
+                <a:t>…</a:t>
+              </a:r>
+            </a:p>
+            <a:p>
+              <a:endParaRPr lang="en-US" sz="1600" dirty="0">
+                <a:latin typeface="Courier New" panose="02070309020205020404" pitchFamily="49" charset="0"/>
+                <a:cs typeface="Courier New" panose="02070309020205020404" pitchFamily="49" charset="0"/>
+              </a:endParaRPr>
+            </a:p>
+            <a:p>
+              <a:r>
+                <a:rPr lang="en-US" sz="1600" dirty="0">
+                  <a:latin typeface="Courier New" panose="02070309020205020404" pitchFamily="49" charset="0"/>
+                  <a:cs typeface="Courier New" panose="02070309020205020404" pitchFamily="49" charset="0"/>
+                </a:rPr>
+                <a:t> </a:t>
+              </a:r>
+              <a:r>
+                <a:rPr lang="en-US" sz="1600" dirty="0" smtClean="0">
+                  <a:latin typeface="Courier New" panose="02070309020205020404" pitchFamily="49" charset="0"/>
+                  <a:cs typeface="Courier New" panose="02070309020205020404" pitchFamily="49" charset="0"/>
+                </a:rPr>
+                <a:t>   </a:t>
+              </a:r>
+              <a:r>
+                <a:rPr lang="en-US" sz="1600" dirty="0" err="1" smtClean="0">
+                  <a:latin typeface="Courier New" panose="02070309020205020404" pitchFamily="49" charset="0"/>
+                  <a:cs typeface="Courier New" panose="02070309020205020404" pitchFamily="49" charset="0"/>
+                </a:rPr>
+                <a:t>cdef</a:t>
+              </a:r>
+              <a:r>
+                <a:rPr lang="en-US" sz="1600" dirty="0" smtClean="0">
+                  <a:latin typeface="Courier New" panose="02070309020205020404" pitchFamily="49" charset="0"/>
+                  <a:cs typeface="Courier New" panose="02070309020205020404" pitchFamily="49" charset="0"/>
+                </a:rPr>
+                <a:t> move(self):</a:t>
+              </a:r>
+            </a:p>
+            <a:p>
+              <a:r>
+                <a:rPr lang="en-US" sz="1600" dirty="0">
+                  <a:latin typeface="Courier New" panose="02070309020205020404" pitchFamily="49" charset="0"/>
+                  <a:cs typeface="Courier New" panose="02070309020205020404" pitchFamily="49" charset="0"/>
+                </a:rPr>
+                <a:t> </a:t>
+              </a:r>
+              <a:r>
+                <a:rPr lang="en-US" sz="1600" dirty="0" smtClean="0">
+                  <a:latin typeface="Courier New" panose="02070309020205020404" pitchFamily="49" charset="0"/>
+                  <a:cs typeface="Courier New" panose="02070309020205020404" pitchFamily="49" charset="0"/>
+                </a:rPr>
+                <a:t>       …</a:t>
+              </a:r>
+              <a:endParaRPr lang="en-US" sz="1600" dirty="0">
+                <a:latin typeface="Courier New" panose="02070309020205020404" pitchFamily="49" charset="0"/>
+                <a:cs typeface="Courier New" panose="02070309020205020404" pitchFamily="49" charset="0"/>
+              </a:endParaRPr>
+            </a:p>
+            <a:p>
+              <a:endParaRPr lang="en-US" sz="1600" dirty="0" smtClean="0">
+                <a:latin typeface="Courier New" panose="02070309020205020404" pitchFamily="49" charset="0"/>
+                <a:cs typeface="Courier New" panose="02070309020205020404" pitchFamily="49" charset="0"/>
+              </a:endParaRPr>
+            </a:p>
+          </p:txBody>
+        </p:sp>
+        <p:sp>
+          <p:nvSpPr>
+            <p:cNvPr id="8" name="TextBox 7"/>
+            <p:cNvSpPr txBox="1"/>
+            <p:nvPr/>
+          </p:nvSpPr>
+          <p:spPr>
+            <a:xfrm>
+              <a:off x="304800" y="5341414"/>
+              <a:ext cx="1201676" cy="307777"/>
+            </a:xfrm>
+            <a:prstGeom prst="rect">
+              <a:avLst/>
+            </a:prstGeom>
+            <a:solidFill>
+              <a:schemeClr val="bg1"/>
+            </a:solidFill>
+            <a:ln>
+              <a:solidFill>
+                <a:schemeClr val="tx1"/>
+              </a:solidFill>
+            </a:ln>
+          </p:spPr>
+          <p:txBody>
+            <a:bodyPr wrap="none" rtlCol="0">
+              <a:spAutoFit/>
+            </a:bodyPr>
+            <a:lstStyle/>
+            <a:p>
+              <a:r>
+                <a:rPr lang="en-US" sz="1400" dirty="0" err="1" smtClean="0"/>
+                <a:t>particle_c.pyx</a:t>
+              </a:r>
+              <a:endParaRPr lang="nl-BE" sz="1400" dirty="0"/>
+            </a:p>
+          </p:txBody>
+        </p:sp>
+      </p:grpSp>
+      <p:grpSp>
+        <p:nvGrpSpPr>
+          <p:cNvPr id="9" name="Group 8"/>
+          <p:cNvGrpSpPr/>
+          <p:nvPr/>
+        </p:nvGrpSpPr>
+        <p:grpSpPr>
+          <a:xfrm>
+            <a:off x="4114800" y="2322255"/>
+            <a:ext cx="4751622" cy="2554545"/>
+            <a:chOff x="304800" y="1371600"/>
+            <a:chExt cx="4751622" cy="2554545"/>
+          </a:xfrm>
+          <a:solidFill>
+            <a:schemeClr val="bg1">
+              <a:lumMod val="85000"/>
+            </a:schemeClr>
+          </a:solidFill>
+        </p:grpSpPr>
+        <p:sp>
+          <p:nvSpPr>
+            <p:cNvPr id="10" name="TextBox 9"/>
+            <p:cNvSpPr txBox="1"/>
+            <p:nvPr/>
+          </p:nvSpPr>
+          <p:spPr>
+            <a:xfrm>
+              <a:off x="304800" y="1371600"/>
+              <a:ext cx="4751622" cy="2554545"/>
+            </a:xfrm>
+            <a:prstGeom prst="rect">
+              <a:avLst/>
+            </a:prstGeom>
+            <a:grpFill/>
+            <a:ln>
+              <a:solidFill>
+                <a:schemeClr val="tx1"/>
+              </a:solidFill>
+            </a:ln>
+          </p:spPr>
+          <p:txBody>
+            <a:bodyPr wrap="none" rtlCol="0">
+              <a:spAutoFit/>
+            </a:bodyPr>
+            <a:lstStyle/>
+            <a:p>
+              <a:r>
+                <a:rPr lang="en-US" sz="1600" dirty="0" err="1" smtClean="0">
+                  <a:latin typeface="Courier New" panose="02070309020205020404" pitchFamily="49" charset="0"/>
+                  <a:cs typeface="Courier New" panose="02070309020205020404" pitchFamily="49" charset="0"/>
+                </a:rPr>
+                <a:t>cdef</a:t>
+              </a:r>
+              <a:r>
+                <a:rPr lang="en-US" sz="1600" dirty="0" smtClean="0">
+                  <a:latin typeface="Courier New" panose="02070309020205020404" pitchFamily="49" charset="0"/>
+                  <a:cs typeface="Courier New" panose="02070309020205020404" pitchFamily="49" charset="0"/>
+                </a:rPr>
+                <a:t> double </a:t>
+              </a:r>
+              <a:r>
+                <a:rPr lang="en-US" sz="1600" dirty="0" err="1" smtClean="0">
+                  <a:latin typeface="Courier New" panose="02070309020205020404" pitchFamily="49" charset="0"/>
+                  <a:cs typeface="Courier New" panose="02070309020205020404" pitchFamily="49" charset="0"/>
+                </a:rPr>
+                <a:t>total_mass</a:t>
+              </a:r>
+              <a:r>
+                <a:rPr lang="en-US" sz="1600" dirty="0" smtClean="0">
+                  <a:latin typeface="Courier New" panose="02070309020205020404" pitchFamily="49" charset="0"/>
+                  <a:cs typeface="Courier New" panose="02070309020205020404" pitchFamily="49" charset="0"/>
+                </a:rPr>
+                <a:t>(Particles p[],</a:t>
+              </a:r>
+            </a:p>
+            <a:p>
+              <a:r>
+                <a:rPr lang="en-US" sz="1600" dirty="0">
+                  <a:latin typeface="Courier New" panose="02070309020205020404" pitchFamily="49" charset="0"/>
+                  <a:cs typeface="Courier New" panose="02070309020205020404" pitchFamily="49" charset="0"/>
+                </a:rPr>
+                <a:t> </a:t>
+              </a:r>
+              <a:r>
+                <a:rPr lang="en-US" sz="1600" dirty="0" smtClean="0">
+                  <a:latin typeface="Courier New" panose="02070309020205020404" pitchFamily="49" charset="0"/>
+                  <a:cs typeface="Courier New" panose="02070309020205020404" pitchFamily="49" charset="0"/>
+                </a:rPr>
+                <a:t>                      </a:t>
+              </a:r>
+              <a:r>
+                <a:rPr lang="en-US" sz="1600" dirty="0" err="1" smtClean="0">
+                  <a:latin typeface="Courier New" panose="02070309020205020404" pitchFamily="49" charset="0"/>
+                  <a:cs typeface="Courier New" panose="02070309020205020404" pitchFamily="49" charset="0"/>
+                </a:rPr>
+                <a:t>int</a:t>
+              </a:r>
+              <a:r>
+                <a:rPr lang="en-US" sz="1600" dirty="0" smtClean="0">
+                  <a:latin typeface="Courier New" panose="02070309020205020404" pitchFamily="49" charset="0"/>
+                  <a:cs typeface="Courier New" panose="02070309020205020404" pitchFamily="49" charset="0"/>
+                </a:rPr>
+                <a:t> n</a:t>
+              </a:r>
+              <a:r>
+                <a:rPr lang="en-US" sz="1600" dirty="0" smtClean="0">
+                  <a:latin typeface="Courier New" panose="02070309020205020404" pitchFamily="49" charset="0"/>
+                  <a:cs typeface="Courier New" panose="02070309020205020404" pitchFamily="49" charset="0"/>
+                </a:rPr>
+                <a:t>)</a:t>
+              </a:r>
+            </a:p>
+            <a:p>
+              <a:r>
+                <a:rPr lang="en-US" sz="1600" dirty="0">
+                  <a:latin typeface="Courier New" panose="02070309020205020404" pitchFamily="49" charset="0"/>
+                  <a:cs typeface="Courier New" panose="02070309020205020404" pitchFamily="49" charset="0"/>
+                </a:rPr>
+                <a:t> </a:t>
+              </a:r>
+              <a:r>
+                <a:rPr lang="en-US" sz="1600" dirty="0" smtClean="0">
+                  <a:latin typeface="Courier New" panose="02070309020205020404" pitchFamily="49" charset="0"/>
+                  <a:cs typeface="Courier New" panose="02070309020205020404" pitchFamily="49" charset="0"/>
+                </a:rPr>
+                <a:t>   …</a:t>
+              </a:r>
+              <a:endParaRPr lang="nl-BE" sz="1600" dirty="0" smtClean="0">
+                <a:latin typeface="Courier New" panose="02070309020205020404" pitchFamily="49" charset="0"/>
+                <a:cs typeface="Courier New" panose="02070309020205020404" pitchFamily="49" charset="0"/>
+              </a:endParaRPr>
+            </a:p>
+            <a:p>
+              <a:r>
+                <a:rPr lang="nl-BE" sz="1600" dirty="0" err="1" smtClean="0">
+                  <a:latin typeface="Courier New" panose="02070309020205020404" pitchFamily="49" charset="0"/>
+                  <a:cs typeface="Courier New" panose="02070309020205020404" pitchFamily="49" charset="0"/>
+                </a:rPr>
+                <a:t>cdef</a:t>
+              </a:r>
+              <a:r>
+                <a:rPr lang="nl-BE" sz="1600" dirty="0" smtClean="0">
+                  <a:latin typeface="Courier New" panose="02070309020205020404" pitchFamily="49" charset="0"/>
+                  <a:cs typeface="Courier New" panose="02070309020205020404" pitchFamily="49" charset="0"/>
+                </a:rPr>
+                <a:t> </a:t>
+              </a:r>
+              <a:r>
+                <a:rPr lang="nl-BE" sz="1600" dirty="0" smtClean="0">
+                  <a:latin typeface="Courier New" panose="02070309020205020404" pitchFamily="49" charset="0"/>
+                  <a:cs typeface="Courier New" panose="02070309020205020404" pitchFamily="49" charset="0"/>
+                </a:rPr>
+                <a:t>class </a:t>
+              </a:r>
+              <a:r>
+                <a:rPr lang="nl-BE" sz="1600" dirty="0" err="1" smtClean="0">
+                  <a:latin typeface="Courier New" panose="02070309020205020404" pitchFamily="49" charset="0"/>
+                  <a:cs typeface="Courier New" panose="02070309020205020404" pitchFamily="49" charset="0"/>
+                </a:rPr>
+                <a:t>Particle</a:t>
+              </a:r>
+              <a:r>
+                <a:rPr lang="nl-BE" sz="1600" dirty="0" smtClean="0">
+                  <a:latin typeface="Courier New" panose="02070309020205020404" pitchFamily="49" charset="0"/>
+                  <a:cs typeface="Courier New" panose="02070309020205020404" pitchFamily="49" charset="0"/>
+                </a:rPr>
+                <a:t>(object):</a:t>
+              </a:r>
+            </a:p>
+            <a:p>
+              <a:endParaRPr lang="en-US" sz="1600" dirty="0" smtClean="0">
+                <a:latin typeface="Courier New" panose="02070309020205020404" pitchFamily="49" charset="0"/>
+                <a:cs typeface="Courier New" panose="02070309020205020404" pitchFamily="49" charset="0"/>
+              </a:endParaRPr>
+            </a:p>
+            <a:p>
+              <a:r>
+                <a:rPr lang="en-US" sz="1600" dirty="0">
+                  <a:latin typeface="Courier New" panose="02070309020205020404" pitchFamily="49" charset="0"/>
+                  <a:cs typeface="Courier New" panose="02070309020205020404" pitchFamily="49" charset="0"/>
+                </a:rPr>
+                <a:t> </a:t>
+              </a:r>
+              <a:r>
+                <a:rPr lang="en-US" sz="1600" dirty="0" smtClean="0">
+                  <a:latin typeface="Courier New" panose="02070309020205020404" pitchFamily="49" charset="0"/>
+                  <a:cs typeface="Courier New" panose="02070309020205020404" pitchFamily="49" charset="0"/>
+                </a:rPr>
+                <a:t>   </a:t>
+              </a:r>
+              <a:r>
+                <a:rPr lang="en-US" sz="1600" dirty="0" err="1" smtClean="0">
+                  <a:latin typeface="Courier New" panose="02070309020205020404" pitchFamily="49" charset="0"/>
+                  <a:cs typeface="Courier New" panose="02070309020205020404" pitchFamily="49" charset="0"/>
+                </a:rPr>
+                <a:t>cdef</a:t>
+              </a:r>
+              <a:r>
+                <a:rPr lang="en-US" sz="1600" dirty="0" smtClean="0">
+                  <a:latin typeface="Courier New" panose="02070309020205020404" pitchFamily="49" charset="0"/>
+                  <a:cs typeface="Courier New" panose="02070309020205020404" pitchFamily="49" charset="0"/>
+                </a:rPr>
+                <a:t> double m, x, v</a:t>
+              </a:r>
+            </a:p>
+            <a:p>
+              <a:endParaRPr lang="en-US" sz="1600" dirty="0" smtClean="0">
+                <a:latin typeface="Courier New" panose="02070309020205020404" pitchFamily="49" charset="0"/>
+                <a:cs typeface="Courier New" panose="02070309020205020404" pitchFamily="49" charset="0"/>
+              </a:endParaRPr>
+            </a:p>
+            <a:p>
+              <a:r>
+                <a:rPr lang="en-US" sz="1600" dirty="0">
+                  <a:latin typeface="Courier New" panose="02070309020205020404" pitchFamily="49" charset="0"/>
+                  <a:cs typeface="Courier New" panose="02070309020205020404" pitchFamily="49" charset="0"/>
+                </a:rPr>
+                <a:t> </a:t>
+              </a:r>
+              <a:r>
+                <a:rPr lang="en-US" sz="1600" dirty="0" smtClean="0">
+                  <a:latin typeface="Courier New" panose="02070309020205020404" pitchFamily="49" charset="0"/>
+                  <a:cs typeface="Courier New" panose="02070309020205020404" pitchFamily="49" charset="0"/>
+                </a:rPr>
+                <a:t>   </a:t>
+              </a:r>
+              <a:r>
+                <a:rPr lang="en-US" sz="1600" dirty="0" err="1" smtClean="0">
+                  <a:latin typeface="Courier New" panose="02070309020205020404" pitchFamily="49" charset="0"/>
+                  <a:cs typeface="Courier New" panose="02070309020205020404" pitchFamily="49" charset="0"/>
+                </a:rPr>
+                <a:t>cdef</a:t>
+              </a:r>
+              <a:r>
+                <a:rPr lang="en-US" sz="1600" dirty="0" smtClean="0">
+                  <a:latin typeface="Courier New" panose="02070309020205020404" pitchFamily="49" charset="0"/>
+                  <a:cs typeface="Courier New" panose="02070309020205020404" pitchFamily="49" charset="0"/>
+                </a:rPr>
+                <a:t> move(self)</a:t>
+              </a:r>
+              <a:endParaRPr lang="en-US" sz="1600" dirty="0" smtClean="0">
+                <a:latin typeface="Courier New" panose="02070309020205020404" pitchFamily="49" charset="0"/>
+                <a:cs typeface="Courier New" panose="02070309020205020404" pitchFamily="49" charset="0"/>
+              </a:endParaRPr>
+            </a:p>
+            <a:p>
+              <a:endParaRPr lang="en-US" sz="1600" dirty="0" smtClean="0">
+                <a:latin typeface="Courier New" panose="02070309020205020404" pitchFamily="49" charset="0"/>
+                <a:cs typeface="Courier New" panose="02070309020205020404" pitchFamily="49" charset="0"/>
+              </a:endParaRPr>
+            </a:p>
+            <a:p>
+              <a:endParaRPr lang="en-US" sz="1600" dirty="0" smtClean="0">
+                <a:latin typeface="Courier New" panose="02070309020205020404" pitchFamily="49" charset="0"/>
+                <a:cs typeface="Courier New" panose="02070309020205020404" pitchFamily="49" charset="0"/>
+              </a:endParaRPr>
+            </a:p>
+          </p:txBody>
+        </p:sp>
+        <p:sp>
+          <p:nvSpPr>
+            <p:cNvPr id="11" name="TextBox 10"/>
+            <p:cNvSpPr txBox="1"/>
+            <p:nvPr/>
+          </p:nvSpPr>
+          <p:spPr>
+            <a:xfrm>
+              <a:off x="304800" y="3612573"/>
+              <a:ext cx="1207959" cy="307777"/>
+            </a:xfrm>
+            <a:prstGeom prst="rect">
+              <a:avLst/>
+            </a:prstGeom>
+            <a:solidFill>
+              <a:schemeClr val="bg1"/>
+            </a:solidFill>
+            <a:ln>
+              <a:solidFill>
+                <a:schemeClr val="tx1"/>
+              </a:solidFill>
+            </a:ln>
+          </p:spPr>
+          <p:txBody>
+            <a:bodyPr wrap="none" rtlCol="0">
+              <a:spAutoFit/>
+            </a:bodyPr>
+            <a:lstStyle/>
+            <a:p>
+              <a:r>
+                <a:rPr lang="en-US" sz="1400" dirty="0" err="1" smtClean="0"/>
+                <a:t>particle_c.pxd</a:t>
+              </a:r>
+              <a:endParaRPr lang="nl-BE" sz="1400" dirty="0"/>
+            </a:p>
+          </p:txBody>
+        </p:sp>
+      </p:grpSp>
+      <p:cxnSp>
+        <p:nvCxnSpPr>
+          <p:cNvPr id="14" name="Straight Connector 13"/>
+          <p:cNvCxnSpPr/>
+          <p:nvPr/>
+        </p:nvCxnSpPr>
+        <p:spPr>
+          <a:xfrm>
+            <a:off x="762000" y="3091669"/>
+            <a:ext cx="2514600" cy="413531"/>
+          </a:xfrm>
+          <a:prstGeom prst="line">
+            <a:avLst/>
+          </a:prstGeom>
+          <a:ln w="38100">
+            <a:solidFill>
+              <a:srgbClr val="C00000">
+                <a:alpha val="60000"/>
+              </a:srgbClr>
+            </a:solidFill>
+          </a:ln>
+        </p:spPr>
+        <p:style>
+          <a:lnRef idx="1">
+            <a:schemeClr val="accent1"/>
+          </a:lnRef>
+          <a:fillRef idx="0">
+            <a:schemeClr val="accent1"/>
+          </a:fillRef>
+          <a:effectRef idx="0">
+            <a:schemeClr val="accent1"/>
+          </a:effectRef>
+          <a:fontRef idx="minor">
+            <a:schemeClr val="tx1"/>
+          </a:fontRef>
+        </p:style>
+      </p:cxnSp>
+      <p:grpSp>
+        <p:nvGrpSpPr>
+          <p:cNvPr id="15" name="Group 14"/>
+          <p:cNvGrpSpPr/>
+          <p:nvPr/>
+        </p:nvGrpSpPr>
+        <p:grpSpPr>
+          <a:xfrm>
+            <a:off x="3200400" y="5247409"/>
+            <a:ext cx="5368777" cy="1081787"/>
+            <a:chOff x="304800" y="2848954"/>
+            <a:chExt cx="5368777" cy="1081787"/>
+          </a:xfrm>
+          <a:solidFill>
+            <a:schemeClr val="bg1">
+              <a:lumMod val="85000"/>
+            </a:schemeClr>
+          </a:solidFill>
+        </p:grpSpPr>
+        <p:sp>
+          <p:nvSpPr>
+            <p:cNvPr id="16" name="TextBox 15"/>
+            <p:cNvSpPr txBox="1"/>
+            <p:nvPr/>
+          </p:nvSpPr>
+          <p:spPr>
+            <a:xfrm>
+              <a:off x="304800" y="2848954"/>
+              <a:ext cx="5368777" cy="1077218"/>
+            </a:xfrm>
+            <a:prstGeom prst="rect">
+              <a:avLst/>
+            </a:prstGeom>
+            <a:grpFill/>
+            <a:ln>
+              <a:solidFill>
+                <a:schemeClr val="tx1"/>
+              </a:solidFill>
+            </a:ln>
+          </p:spPr>
+          <p:txBody>
+            <a:bodyPr wrap="none" rtlCol="0">
+              <a:spAutoFit/>
+            </a:bodyPr>
+            <a:lstStyle/>
+            <a:p>
+              <a:r>
+                <a:rPr lang="en-US" sz="1600" dirty="0" smtClean="0">
+                  <a:latin typeface="Courier New" panose="02070309020205020404" pitchFamily="49" charset="0"/>
+                  <a:cs typeface="Courier New" panose="02070309020205020404" pitchFamily="49" charset="0"/>
+                </a:rPr>
+                <a:t>…</a:t>
+              </a:r>
+            </a:p>
+            <a:p>
+              <a:r>
+                <a:rPr lang="en-US" sz="1600" dirty="0" smtClean="0">
+                  <a:latin typeface="Courier New" panose="02070309020205020404" pitchFamily="49" charset="0"/>
+                  <a:cs typeface="Courier New" panose="02070309020205020404" pitchFamily="49" charset="0"/>
+                </a:rPr>
+                <a:t>from particle </a:t>
+              </a:r>
+              <a:r>
+                <a:rPr lang="en-US" sz="1600" b="1" dirty="0" err="1" smtClean="0">
+                  <a:latin typeface="Courier New" panose="02070309020205020404" pitchFamily="49" charset="0"/>
+                  <a:cs typeface="Courier New" panose="02070309020205020404" pitchFamily="49" charset="0"/>
+                </a:rPr>
+                <a:t>cimport</a:t>
+              </a:r>
+              <a:r>
+                <a:rPr lang="en-US" sz="1600" dirty="0" smtClean="0">
+                  <a:latin typeface="Courier New" panose="02070309020205020404" pitchFamily="49" charset="0"/>
+                  <a:cs typeface="Courier New" panose="02070309020205020404" pitchFamily="49" charset="0"/>
+                </a:rPr>
+                <a:t> Particle, </a:t>
+              </a:r>
+              <a:r>
+                <a:rPr lang="en-US" sz="1600" dirty="0" err="1" smtClean="0">
+                  <a:latin typeface="Courier New" panose="02070309020205020404" pitchFamily="49" charset="0"/>
+                  <a:cs typeface="Courier New" panose="02070309020205020404" pitchFamily="49" charset="0"/>
+                </a:rPr>
+                <a:t>total_mass</a:t>
+              </a:r>
+              <a:endParaRPr lang="en-US" sz="1600" dirty="0" smtClean="0">
+                <a:latin typeface="Courier New" panose="02070309020205020404" pitchFamily="49" charset="0"/>
+                <a:cs typeface="Courier New" panose="02070309020205020404" pitchFamily="49" charset="0"/>
+              </a:endParaRPr>
+            </a:p>
+            <a:p>
+              <a:r>
+                <a:rPr lang="en-US" sz="1600" dirty="0" smtClean="0">
+                  <a:latin typeface="Courier New" panose="02070309020205020404" pitchFamily="49" charset="0"/>
+                  <a:cs typeface="Courier New" panose="02070309020205020404" pitchFamily="49" charset="0"/>
+                </a:rPr>
+                <a:t>…</a:t>
+              </a:r>
+            </a:p>
+            <a:p>
+              <a:endParaRPr lang="en-US" sz="1600" dirty="0" smtClean="0">
+                <a:latin typeface="Courier New" panose="02070309020205020404" pitchFamily="49" charset="0"/>
+                <a:cs typeface="Courier New" panose="02070309020205020404" pitchFamily="49" charset="0"/>
+              </a:endParaRPr>
+            </a:p>
+          </p:txBody>
+        </p:sp>
+        <p:sp>
+          <p:nvSpPr>
+            <p:cNvPr id="17" name="TextBox 16"/>
+            <p:cNvSpPr txBox="1"/>
+            <p:nvPr/>
+          </p:nvSpPr>
+          <p:spPr>
+            <a:xfrm>
+              <a:off x="304800" y="3622964"/>
+              <a:ext cx="1251305" cy="307777"/>
+            </a:xfrm>
+            <a:prstGeom prst="rect">
+              <a:avLst/>
+            </a:prstGeom>
+            <a:solidFill>
+              <a:schemeClr val="bg1"/>
+            </a:solidFill>
+            <a:ln>
+              <a:solidFill>
+                <a:schemeClr val="tx1"/>
+              </a:solidFill>
+            </a:ln>
+          </p:spPr>
+          <p:txBody>
+            <a:bodyPr wrap="none" rtlCol="0">
+              <a:spAutoFit/>
+            </a:bodyPr>
+            <a:lstStyle/>
+            <a:p>
+              <a:r>
+                <a:rPr lang="en-US" sz="1400" dirty="0" err="1" smtClean="0"/>
+                <a:t>simulation.pyx</a:t>
+              </a:r>
+              <a:endParaRPr lang="nl-BE" sz="1400" dirty="0"/>
+            </a:p>
+          </p:txBody>
+        </p:sp>
+      </p:grpSp>
+    </p:spTree>
+    <p:extLst>
+      <p:ext uri="{BB962C8B-B14F-4D97-AF65-F5344CB8AC3E}">
+        <p14:creationId xmlns:p14="http://schemas.microsoft.com/office/powerpoint/2010/main" val="2866012692"/>
+      </p:ext>
+    </p:extLst>
+  </p:cSld>
+  <p:clrMapOvr>
+    <a:masterClrMapping/>
+  </p:clrMapOvr>
+  <p:timing>
+    <p:tnLst>
+      <p:par>
+        <p:cTn id="1" dur="indefinite" restart="never" nodeType="tmRoot">
+          <p:childTnLst>
+            <p:seq concurrent="1" nextAc="seek">
+              <p:cTn id="2" dur="indefinite" nodeType="mainSeq">
+                <p:childTnLst>
+                  <p:par>
+                    <p:cTn id="3" fill="hold">
+                      <p:stCondLst>
+                        <p:cond delay="indefinite"/>
+                        <p:cond evt="onBegin" delay="0">
+                          <p:tn val="2"/>
+                        </p:cond>
+                      </p:stCondLst>
+                      <p:childTnLst>
+                        <p:par>
+                          <p:cTn id="4" fill="hold">
+                            <p:stCondLst>
+                              <p:cond delay="0"/>
+                            </p:stCondLst>
+                            <p:childTnLst>
+                              <p:par>
+                                <p:cTn id="5" presetID="1" presetClass="entr" presetSubtype="0" fill="hold" nodeType="withEffect">
+                                  <p:stCondLst>
+                                    <p:cond delay="0"/>
+                                  </p:stCondLst>
+                                  <p:childTnLst>
+                                    <p:set>
+                                      <p:cBhvr>
+                                        <p:cTn id="6" dur="1" fill="hold">
+                                          <p:stCondLst>
+                                            <p:cond delay="0"/>
+                                          </p:stCondLst>
+                                        </p:cTn>
+                                        <p:tgtEl>
+                                          <p:spTgt spid="6"/>
+                                        </p:tgtEl>
+                                        <p:attrNameLst>
+                                          <p:attrName>style.visibility</p:attrName>
+                                        </p:attrNameLst>
+                                      </p:cBhvr>
+                                      <p:to>
+                                        <p:strVal val="visible"/>
+                                      </p:to>
+                                    </p:set>
+                                  </p:childTnLst>
+                                </p:cTn>
+                              </p:par>
+                            </p:childTnLst>
+                          </p:cTn>
+                        </p:par>
+                      </p:childTnLst>
+                    </p:cTn>
+                  </p:par>
+                  <p:par>
+                    <p:cTn id="7" fill="hold">
+                      <p:stCondLst>
+                        <p:cond delay="indefinite"/>
+                      </p:stCondLst>
+                      <p:childTnLst>
+                        <p:par>
+                          <p:cTn id="8" fill="hold">
+                            <p:stCondLst>
+                              <p:cond delay="0"/>
+                            </p:stCondLst>
+                            <p:childTnLst>
+                              <p:par>
+                                <p:cTn id="9" presetID="1" presetClass="entr" presetSubtype="0" fill="hold" nodeType="clickEffect">
+                                  <p:stCondLst>
+                                    <p:cond delay="0"/>
+                                  </p:stCondLst>
+                                  <p:childTnLst>
+                                    <p:set>
+                                      <p:cBhvr>
+                                        <p:cTn id="10" dur="1" fill="hold">
+                                          <p:stCondLst>
+                                            <p:cond delay="0"/>
+                                          </p:stCondLst>
+                                        </p:cTn>
+                                        <p:tgtEl>
+                                          <p:spTgt spid="9"/>
+                                        </p:tgtEl>
+                                        <p:attrNameLst>
+                                          <p:attrName>style.visibility</p:attrName>
+                                        </p:attrNameLst>
+                                      </p:cBhvr>
+                                      <p:to>
+                                        <p:strVal val="visible"/>
+                                      </p:to>
+                                    </p:set>
+                                  </p:childTnLst>
+                                </p:cTn>
+                              </p:par>
+                            </p:childTnLst>
+                          </p:cTn>
+                        </p:par>
+                      </p:childTnLst>
+                    </p:cTn>
+                  </p:par>
+                  <p:par>
+                    <p:cTn id="11" fill="hold">
+                      <p:stCondLst>
+                        <p:cond delay="indefinite"/>
+                      </p:stCondLst>
+                      <p:childTnLst>
+                        <p:par>
+                          <p:cTn id="12" fill="hold">
+                            <p:stCondLst>
+                              <p:cond delay="0"/>
+                            </p:stCondLst>
+                            <p:childTnLst>
+                              <p:par>
+                                <p:cTn id="13" presetID="1" presetClass="entr" presetSubtype="0" fill="hold" nodeType="clickEffect">
+                                  <p:stCondLst>
+                                    <p:cond delay="0"/>
+                                  </p:stCondLst>
+                                  <p:childTnLst>
+                                    <p:set>
+                                      <p:cBhvr>
+                                        <p:cTn id="14" dur="1" fill="hold">
+                                          <p:stCondLst>
+                                            <p:cond delay="0"/>
+                                          </p:stCondLst>
+                                        </p:cTn>
+                                        <p:tgtEl>
+                                          <p:spTgt spid="14"/>
+                                        </p:tgtEl>
+                                        <p:attrNameLst>
+                                          <p:attrName>style.visibility</p:attrName>
+                                        </p:attrNameLst>
+                                      </p:cBhvr>
+                                      <p:to>
+                                        <p:strVal val="visible"/>
+                                      </p:to>
+                                    </p:set>
+                                  </p:childTnLst>
+                                </p:cTn>
+                              </p:par>
+                            </p:childTnLst>
+                          </p:cTn>
+                        </p:par>
+                      </p:childTnLst>
+                    </p:cTn>
+                  </p:par>
+                  <p:par>
+                    <p:cTn id="15" fill="hold">
+                      <p:stCondLst>
+                        <p:cond delay="indefinite"/>
+                      </p:stCondLst>
+                      <p:childTnLst>
+                        <p:par>
+                          <p:cTn id="16" fill="hold">
+                            <p:stCondLst>
+                              <p:cond delay="0"/>
+                            </p:stCondLst>
+                            <p:childTnLst>
+                              <p:par>
+                                <p:cTn id="17" presetID="1" presetClass="entr" presetSubtype="0" fill="hold" nodeType="clickEffect">
+                                  <p:stCondLst>
+                                    <p:cond delay="0"/>
+                                  </p:stCondLst>
+                                  <p:childTnLst>
+                                    <p:set>
+                                      <p:cBhvr>
+                                        <p:cTn id="18" dur="1" fill="hold">
+                                          <p:stCondLst>
+                                            <p:cond delay="0"/>
+                                          </p:stCondLst>
+                                        </p:cTn>
+                                        <p:tgtEl>
+                                          <p:spTgt spid="15"/>
+                                        </p:tgtEl>
+                                        <p:attrNameLst>
+                                          <p:attrName>style.visibility</p:attrName>
+                                        </p:attrNameLst>
+                                      </p:cBhvr>
+                                      <p:to>
+                                        <p:strVal val="visible"/>
+                                      </p:to>
+                                    </p:set>
+                                  </p:childTnLst>
+                                </p:cTn>
+                              </p:par>
+                            </p:childTnLst>
+                          </p:cTn>
+                        </p:par>
+                      </p:childTnLst>
+                    </p:cTn>
+                  </p:par>
+                </p:childTnLst>
+              </p:cTn>
+              <p:prevCondLst>
+                <p:cond evt="onPrev" delay="0">
+                  <p:tgtEl>
+                    <p:sldTgt/>
+                  </p:tgtEl>
+                </p:cond>
+              </p:prevCondLst>
+              <p:nextCondLst>
+                <p:cond evt="onNext" delay="0">
+                  <p:tgtEl>
+                    <p:sldTgt/>
+                  </p:tgtEl>
+                </p:cond>
+              </p:nextCondLst>
+            </p:seq>
+          </p:childTnLst>
+        </p:cTn>
+      </p:par>
+    </p:tnLst>
   </p:timing>
 </p:sld>
 </file>
@@ -17249,6 +18473,662 @@
           <a:p>
             <a:r>
               <a:rPr lang="en-US" dirty="0" smtClean="0"/>
+              <a:t>Conclusions</a:t>
+            </a:r>
+            <a:endParaRPr lang="nl-BE" dirty="0"/>
+          </a:p>
+        </p:txBody>
+      </p:sp>
+      <p:sp>
+        <p:nvSpPr>
+          <p:cNvPr id="3" name="Text Placeholder 2"/>
+          <p:cNvSpPr>
+            <a:spLocks noGrp="1"/>
+          </p:cNvSpPr>
+          <p:nvPr>
+            <p:ph type="body" idx="1"/>
+          </p:nvPr>
+        </p:nvSpPr>
+        <p:spPr/>
+        <p:txBody>
+          <a:bodyPr/>
+          <a:lstStyle/>
+          <a:p>
+            <a:endParaRPr lang="nl-BE"/>
+          </a:p>
+        </p:txBody>
+      </p:sp>
+      <p:sp>
+        <p:nvSpPr>
+          <p:cNvPr id="4" name="Slide Number Placeholder 3"/>
+          <p:cNvSpPr>
+            <a:spLocks noGrp="1"/>
+          </p:cNvSpPr>
+          <p:nvPr>
+            <p:ph type="sldNum" sz="quarter" idx="12"/>
+          </p:nvPr>
+        </p:nvSpPr>
+        <p:spPr/>
+        <p:txBody>
+          <a:bodyPr/>
+          <a:lstStyle/>
+          <a:p>
+            <a:fld id="{B6F15528-21DE-4FAA-801E-634DDDAF4B2B}" type="slidenum">
+              <a:rPr lang="en-US" smtClean="0"/>
+              <a:pPr/>
+              <a:t>30</a:t>
+            </a:fld>
+            <a:endParaRPr lang="en-US"/>
+          </a:p>
+        </p:txBody>
+      </p:sp>
+    </p:spTree>
+    <p:extLst>
+      <p:ext uri="{BB962C8B-B14F-4D97-AF65-F5344CB8AC3E}">
+        <p14:creationId xmlns:p14="http://schemas.microsoft.com/office/powerpoint/2010/main" val="75062823"/>
+      </p:ext>
+    </p:extLst>
+  </p:cSld>
+  <p:clrMapOvr>
+    <a:masterClrMapping/>
+  </p:clrMapOvr>
+  <p:timing>
+    <p:tnLst>
+      <p:par>
+        <p:cTn id="1" dur="indefinite" restart="never" nodeType="tmRoot"/>
+      </p:par>
+    </p:tnLst>
+  </p:timing>
+</p:sld>
+</file>
+
+<file path=ppt/slides/slide31.xml><?xml version="1.0" encoding="utf-8"?>
+<p:sld xmlns:a="http://schemas.openxmlformats.org/drawingml/2006/main" xmlns:r="http://schemas.openxmlformats.org/officeDocument/2006/relationships" xmlns:p="http://schemas.openxmlformats.org/presentationml/2006/main">
+  <p:cSld>
+    <p:spTree>
+      <p:nvGrpSpPr>
+        <p:cNvPr id="1" name=""/>
+        <p:cNvGrpSpPr/>
+        <p:nvPr/>
+      </p:nvGrpSpPr>
+      <p:grpSpPr>
+        <a:xfrm>
+          <a:off x="0" y="0"/>
+          <a:ext cx="0" cy="0"/>
+          <a:chOff x="0" y="0"/>
+          <a:chExt cx="0" cy="0"/>
+        </a:xfrm>
+      </p:grpSpPr>
+      <p:sp>
+        <p:nvSpPr>
+          <p:cNvPr id="2" name="Title 1"/>
+          <p:cNvSpPr>
+            <a:spLocks noGrp="1"/>
+          </p:cNvSpPr>
+          <p:nvPr>
+            <p:ph type="title"/>
+          </p:nvPr>
+        </p:nvSpPr>
+        <p:spPr/>
+        <p:txBody>
+          <a:bodyPr/>
+          <a:lstStyle/>
+          <a:p>
+            <a:r>
+              <a:rPr lang="en-US" dirty="0" smtClean="0"/>
+              <a:t>Conclusions</a:t>
+            </a:r>
+            <a:endParaRPr lang="nl-BE" dirty="0"/>
+          </a:p>
+        </p:txBody>
+      </p:sp>
+      <p:sp>
+        <p:nvSpPr>
+          <p:cNvPr id="3" name="Content Placeholder 2"/>
+          <p:cNvSpPr>
+            <a:spLocks noGrp="1"/>
+          </p:cNvSpPr>
+          <p:nvPr>
+            <p:ph idx="1"/>
+          </p:nvPr>
+        </p:nvSpPr>
+        <p:spPr/>
+        <p:txBody>
+          <a:bodyPr>
+            <a:normAutofit fontScale="92500"/>
+          </a:bodyPr>
+          <a:lstStyle/>
+          <a:p>
+            <a:r>
+              <a:rPr lang="en-US" dirty="0" err="1" smtClean="0"/>
+              <a:t>Cython</a:t>
+            </a:r>
+            <a:endParaRPr lang="en-US" dirty="0" smtClean="0"/>
+          </a:p>
+          <a:p>
+            <a:pPr lvl="1"/>
+            <a:r>
+              <a:rPr lang="en-US" dirty="0" smtClean="0"/>
+              <a:t>Pros</a:t>
+            </a:r>
+          </a:p>
+          <a:p>
+            <a:pPr lvl="2"/>
+            <a:r>
+              <a:rPr lang="en-US" dirty="0" smtClean="0"/>
+              <a:t>Fairly simple to use</a:t>
+            </a:r>
+          </a:p>
+          <a:p>
+            <a:pPr lvl="2"/>
+            <a:r>
+              <a:rPr lang="en-US" dirty="0" smtClean="0"/>
+              <a:t>Offers </a:t>
+            </a:r>
+            <a:r>
+              <a:rPr lang="en-US" dirty="0" err="1" smtClean="0"/>
+              <a:t>execellent</a:t>
+            </a:r>
+            <a:r>
+              <a:rPr lang="en-US" dirty="0" smtClean="0"/>
+              <a:t> speedups when use wisely</a:t>
+            </a:r>
+          </a:p>
+          <a:p>
+            <a:pPr lvl="1"/>
+            <a:r>
+              <a:rPr lang="en-US" dirty="0" smtClean="0"/>
+              <a:t>Cons</a:t>
+            </a:r>
+          </a:p>
+          <a:p>
+            <a:pPr lvl="2"/>
+            <a:r>
+              <a:rPr lang="en-US" dirty="0" smtClean="0"/>
+              <a:t>Good understanding of Python and C/C++</a:t>
+            </a:r>
+          </a:p>
+          <a:p>
+            <a:r>
+              <a:rPr lang="en-US" dirty="0" smtClean="0"/>
+              <a:t>Features not covered here: wrapping C/C++ code</a:t>
+            </a:r>
+          </a:p>
+          <a:p>
+            <a:pPr lvl="1"/>
+            <a:r>
+              <a:rPr lang="en-US" dirty="0" smtClean="0"/>
+              <a:t>Pro: low overhead compared to, e.g., SWIG</a:t>
+            </a:r>
+          </a:p>
+          <a:p>
+            <a:pPr lvl="1"/>
+            <a:r>
+              <a:rPr lang="en-US" dirty="0" smtClean="0"/>
+              <a:t>Con: quite some code to write manually</a:t>
+            </a:r>
+            <a:endParaRPr lang="nl-BE" dirty="0"/>
+          </a:p>
+        </p:txBody>
+      </p:sp>
+      <p:sp>
+        <p:nvSpPr>
+          <p:cNvPr id="4" name="Slide Number Placeholder 3"/>
+          <p:cNvSpPr>
+            <a:spLocks noGrp="1"/>
+          </p:cNvSpPr>
+          <p:nvPr>
+            <p:ph type="sldNum" sz="quarter" idx="12"/>
+          </p:nvPr>
+        </p:nvSpPr>
+        <p:spPr/>
+        <p:txBody>
+          <a:bodyPr/>
+          <a:lstStyle/>
+          <a:p>
+            <a:fld id="{B6F15528-21DE-4FAA-801E-634DDDAF4B2B}" type="slidenum">
+              <a:rPr lang="en-US" smtClean="0"/>
+              <a:pPr/>
+              <a:t>31</a:t>
+            </a:fld>
+            <a:endParaRPr lang="en-US"/>
+          </a:p>
+        </p:txBody>
+      </p:sp>
+    </p:spTree>
+    <p:extLst>
+      <p:ext uri="{BB962C8B-B14F-4D97-AF65-F5344CB8AC3E}">
+        <p14:creationId xmlns:p14="http://schemas.microsoft.com/office/powerpoint/2010/main" val="3524984196"/>
+      </p:ext>
+    </p:extLst>
+  </p:cSld>
+  <p:clrMapOvr>
+    <a:masterClrMapping/>
+  </p:clrMapOvr>
+  <p:timing>
+    <p:tnLst>
+      <p:par>
+        <p:cTn id="1" dur="indefinite" restart="never" nodeType="tmRoot">
+          <p:childTnLst>
+            <p:seq concurrent="1" nextAc="seek">
+              <p:cTn id="2" dur="indefinite" nodeType="mainSeq">
+                <p:childTnLst>
+                  <p:par>
+                    <p:cTn id="3" fill="hold">
+                      <p:stCondLst>
+                        <p:cond delay="indefinite"/>
+                        <p:cond evt="onBegin" delay="0">
+                          <p:tn val="2"/>
+                        </p:cond>
+                      </p:stCondLst>
+                      <p:childTnLst>
+                        <p:par>
+                          <p:cTn id="4" fill="hold">
+                            <p:stCondLst>
+                              <p:cond delay="0"/>
+                            </p:stCondLst>
+                            <p:childTnLst>
+                              <p:par>
+                                <p:cTn id="5" presetID="1" presetClass="entr" presetSubtype="0" fill="hold" grpId="0" nodeType="withEffect">
+                                  <p:stCondLst>
+                                    <p:cond delay="0"/>
+                                  </p:stCondLst>
+                                  <p:childTnLst>
+                                    <p:set>
+                                      <p:cBhvr>
+                                        <p:cTn id="6" dur="1" fill="hold">
+                                          <p:stCondLst>
+                                            <p:cond delay="0"/>
+                                          </p:stCondLst>
+                                        </p:cTn>
+                                        <p:tgtEl>
+                                          <p:spTgt spid="3">
+                                            <p:txEl>
+                                              <p:pRg st="0" end="0"/>
+                                            </p:txEl>
+                                          </p:spTgt>
+                                        </p:tgtEl>
+                                        <p:attrNameLst>
+                                          <p:attrName>style.visibility</p:attrName>
+                                        </p:attrNameLst>
+                                      </p:cBhvr>
+                                      <p:to>
+                                        <p:strVal val="visible"/>
+                                      </p:to>
+                                    </p:set>
+                                  </p:childTnLst>
+                                </p:cTn>
+                              </p:par>
+                              <p:par>
+                                <p:cTn id="7" presetID="1" presetClass="entr" presetSubtype="0" fill="hold" grpId="0" nodeType="withEffect">
+                                  <p:stCondLst>
+                                    <p:cond delay="0"/>
+                                  </p:stCondLst>
+                                  <p:childTnLst>
+                                    <p:set>
+                                      <p:cBhvr>
+                                        <p:cTn id="8" dur="1" fill="hold">
+                                          <p:stCondLst>
+                                            <p:cond delay="0"/>
+                                          </p:stCondLst>
+                                        </p:cTn>
+                                        <p:tgtEl>
+                                          <p:spTgt spid="3">
+                                            <p:txEl>
+                                              <p:pRg st="1" end="1"/>
+                                            </p:txEl>
+                                          </p:spTgt>
+                                        </p:tgtEl>
+                                        <p:attrNameLst>
+                                          <p:attrName>style.visibility</p:attrName>
+                                        </p:attrNameLst>
+                                      </p:cBhvr>
+                                      <p:to>
+                                        <p:strVal val="visible"/>
+                                      </p:to>
+                                    </p:set>
+                                  </p:childTnLst>
+                                </p:cTn>
+                              </p:par>
+                              <p:par>
+                                <p:cTn id="9" presetID="1" presetClass="entr" presetSubtype="0" fill="hold" grpId="0" nodeType="withEffect">
+                                  <p:stCondLst>
+                                    <p:cond delay="0"/>
+                                  </p:stCondLst>
+                                  <p:childTnLst>
+                                    <p:set>
+                                      <p:cBhvr>
+                                        <p:cTn id="10" dur="1" fill="hold">
+                                          <p:stCondLst>
+                                            <p:cond delay="0"/>
+                                          </p:stCondLst>
+                                        </p:cTn>
+                                        <p:tgtEl>
+                                          <p:spTgt spid="3">
+                                            <p:txEl>
+                                              <p:pRg st="2" end="2"/>
+                                            </p:txEl>
+                                          </p:spTgt>
+                                        </p:tgtEl>
+                                        <p:attrNameLst>
+                                          <p:attrName>style.visibility</p:attrName>
+                                        </p:attrNameLst>
+                                      </p:cBhvr>
+                                      <p:to>
+                                        <p:strVal val="visible"/>
+                                      </p:to>
+                                    </p:set>
+                                  </p:childTnLst>
+                                </p:cTn>
+                              </p:par>
+                              <p:par>
+                                <p:cTn id="11" presetID="1" presetClass="entr" presetSubtype="0" fill="hold" grpId="0" nodeType="withEffect">
+                                  <p:stCondLst>
+                                    <p:cond delay="0"/>
+                                  </p:stCondLst>
+                                  <p:childTnLst>
+                                    <p:set>
+                                      <p:cBhvr>
+                                        <p:cTn id="12" dur="1" fill="hold">
+                                          <p:stCondLst>
+                                            <p:cond delay="0"/>
+                                          </p:stCondLst>
+                                        </p:cTn>
+                                        <p:tgtEl>
+                                          <p:spTgt spid="3">
+                                            <p:txEl>
+                                              <p:pRg st="3" end="3"/>
+                                            </p:txEl>
+                                          </p:spTgt>
+                                        </p:tgtEl>
+                                        <p:attrNameLst>
+                                          <p:attrName>style.visibility</p:attrName>
+                                        </p:attrNameLst>
+                                      </p:cBhvr>
+                                      <p:to>
+                                        <p:strVal val="visible"/>
+                                      </p:to>
+                                    </p:set>
+                                  </p:childTnLst>
+                                </p:cTn>
+                              </p:par>
+                            </p:childTnLst>
+                          </p:cTn>
+                        </p:par>
+                      </p:childTnLst>
+                    </p:cTn>
+                  </p:par>
+                  <p:par>
+                    <p:cTn id="13" fill="hold">
+                      <p:stCondLst>
+                        <p:cond delay="indefinite"/>
+                      </p:stCondLst>
+                      <p:childTnLst>
+                        <p:par>
+                          <p:cTn id="14" fill="hold">
+                            <p:stCondLst>
+                              <p:cond delay="0"/>
+                            </p:stCondLst>
+                            <p:childTnLst>
+                              <p:par>
+                                <p:cTn id="15" presetID="1" presetClass="entr" presetSubtype="0" fill="hold" grpId="0" nodeType="clickEffect">
+                                  <p:stCondLst>
+                                    <p:cond delay="0"/>
+                                  </p:stCondLst>
+                                  <p:childTnLst>
+                                    <p:set>
+                                      <p:cBhvr>
+                                        <p:cTn id="16" dur="1" fill="hold">
+                                          <p:stCondLst>
+                                            <p:cond delay="0"/>
+                                          </p:stCondLst>
+                                        </p:cTn>
+                                        <p:tgtEl>
+                                          <p:spTgt spid="3">
+                                            <p:txEl>
+                                              <p:pRg st="4" end="4"/>
+                                            </p:txEl>
+                                          </p:spTgt>
+                                        </p:tgtEl>
+                                        <p:attrNameLst>
+                                          <p:attrName>style.visibility</p:attrName>
+                                        </p:attrNameLst>
+                                      </p:cBhvr>
+                                      <p:to>
+                                        <p:strVal val="visible"/>
+                                      </p:to>
+                                    </p:set>
+                                  </p:childTnLst>
+                                </p:cTn>
+                              </p:par>
+                              <p:par>
+                                <p:cTn id="17" presetID="1" presetClass="entr" presetSubtype="0" fill="hold" grpId="0" nodeType="withEffect">
+                                  <p:stCondLst>
+                                    <p:cond delay="0"/>
+                                  </p:stCondLst>
+                                  <p:childTnLst>
+                                    <p:set>
+                                      <p:cBhvr>
+                                        <p:cTn id="18" dur="1" fill="hold">
+                                          <p:stCondLst>
+                                            <p:cond delay="0"/>
+                                          </p:stCondLst>
+                                        </p:cTn>
+                                        <p:tgtEl>
+                                          <p:spTgt spid="3">
+                                            <p:txEl>
+                                              <p:pRg st="5" end="5"/>
+                                            </p:txEl>
+                                          </p:spTgt>
+                                        </p:tgtEl>
+                                        <p:attrNameLst>
+                                          <p:attrName>style.visibility</p:attrName>
+                                        </p:attrNameLst>
+                                      </p:cBhvr>
+                                      <p:to>
+                                        <p:strVal val="visible"/>
+                                      </p:to>
+                                    </p:set>
+                                  </p:childTnLst>
+                                </p:cTn>
+                              </p:par>
+                            </p:childTnLst>
+                          </p:cTn>
+                        </p:par>
+                      </p:childTnLst>
+                    </p:cTn>
+                  </p:par>
+                  <p:par>
+                    <p:cTn id="19" fill="hold">
+                      <p:stCondLst>
+                        <p:cond delay="indefinite"/>
+                      </p:stCondLst>
+                      <p:childTnLst>
+                        <p:par>
+                          <p:cTn id="20" fill="hold">
+                            <p:stCondLst>
+                              <p:cond delay="0"/>
+                            </p:stCondLst>
+                            <p:childTnLst>
+                              <p:par>
+                                <p:cTn id="21" presetID="1" presetClass="entr" presetSubtype="0" fill="hold" grpId="0" nodeType="clickEffect">
+                                  <p:stCondLst>
+                                    <p:cond delay="0"/>
+                                  </p:stCondLst>
+                                  <p:childTnLst>
+                                    <p:set>
+                                      <p:cBhvr>
+                                        <p:cTn id="22" dur="1" fill="hold">
+                                          <p:stCondLst>
+                                            <p:cond delay="0"/>
+                                          </p:stCondLst>
+                                        </p:cTn>
+                                        <p:tgtEl>
+                                          <p:spTgt spid="3">
+                                            <p:txEl>
+                                              <p:pRg st="6" end="6"/>
+                                            </p:txEl>
+                                          </p:spTgt>
+                                        </p:tgtEl>
+                                        <p:attrNameLst>
+                                          <p:attrName>style.visibility</p:attrName>
+                                        </p:attrNameLst>
+                                      </p:cBhvr>
+                                      <p:to>
+                                        <p:strVal val="visible"/>
+                                      </p:to>
+                                    </p:set>
+                                  </p:childTnLst>
+                                </p:cTn>
+                              </p:par>
+                              <p:par>
+                                <p:cTn id="23" presetID="1" presetClass="entr" presetSubtype="0" fill="hold" grpId="0" nodeType="withEffect">
+                                  <p:stCondLst>
+                                    <p:cond delay="0"/>
+                                  </p:stCondLst>
+                                  <p:childTnLst>
+                                    <p:set>
+                                      <p:cBhvr>
+                                        <p:cTn id="24" dur="1" fill="hold">
+                                          <p:stCondLst>
+                                            <p:cond delay="0"/>
+                                          </p:stCondLst>
+                                        </p:cTn>
+                                        <p:tgtEl>
+                                          <p:spTgt spid="3">
+                                            <p:txEl>
+                                              <p:pRg st="7" end="7"/>
+                                            </p:txEl>
+                                          </p:spTgt>
+                                        </p:tgtEl>
+                                        <p:attrNameLst>
+                                          <p:attrName>style.visibility</p:attrName>
+                                        </p:attrNameLst>
+                                      </p:cBhvr>
+                                      <p:to>
+                                        <p:strVal val="visible"/>
+                                      </p:to>
+                                    </p:set>
+                                  </p:childTnLst>
+                                </p:cTn>
+                              </p:par>
+                            </p:childTnLst>
+                          </p:cTn>
+                        </p:par>
+                      </p:childTnLst>
+                    </p:cTn>
+                  </p:par>
+                  <p:par>
+                    <p:cTn id="25" fill="hold">
+                      <p:stCondLst>
+                        <p:cond delay="indefinite"/>
+                      </p:stCondLst>
+                      <p:childTnLst>
+                        <p:par>
+                          <p:cTn id="26" fill="hold">
+                            <p:stCondLst>
+                              <p:cond delay="0"/>
+                            </p:stCondLst>
+                            <p:childTnLst>
+                              <p:par>
+                                <p:cTn id="27" presetID="1" presetClass="entr" presetSubtype="0" fill="hold" grpId="0" nodeType="clickEffect">
+                                  <p:stCondLst>
+                                    <p:cond delay="0"/>
+                                  </p:stCondLst>
+                                  <p:childTnLst>
+                                    <p:set>
+                                      <p:cBhvr>
+                                        <p:cTn id="28" dur="1" fill="hold">
+                                          <p:stCondLst>
+                                            <p:cond delay="0"/>
+                                          </p:stCondLst>
+                                        </p:cTn>
+                                        <p:tgtEl>
+                                          <p:spTgt spid="3">
+                                            <p:txEl>
+                                              <p:pRg st="8" end="8"/>
+                                            </p:txEl>
+                                          </p:spTgt>
+                                        </p:tgtEl>
+                                        <p:attrNameLst>
+                                          <p:attrName>style.visibility</p:attrName>
+                                        </p:attrNameLst>
+                                      </p:cBhvr>
+                                      <p:to>
+                                        <p:strVal val="visible"/>
+                                      </p:to>
+                                    </p:set>
+                                  </p:childTnLst>
+                                </p:cTn>
+                              </p:par>
+                            </p:childTnLst>
+                          </p:cTn>
+                        </p:par>
+                      </p:childTnLst>
+                    </p:cTn>
+                  </p:par>
+                </p:childTnLst>
+              </p:cTn>
+              <p:prevCondLst>
+                <p:cond evt="onPrev" delay="0">
+                  <p:tgtEl>
+                    <p:sldTgt/>
+                  </p:tgtEl>
+                </p:cond>
+              </p:prevCondLst>
+              <p:nextCondLst>
+                <p:cond evt="onNext" delay="0">
+                  <p:tgtEl>
+                    <p:sldTgt/>
+                  </p:tgtEl>
+                </p:cond>
+              </p:nextCondLst>
+            </p:seq>
+          </p:childTnLst>
+        </p:cTn>
+      </p:par>
+    </p:tnLst>
+    <p:bldLst>
+      <p:bldP spid="3" grpId="0" uiExpand="1" build="p" bldLvl="2"/>
+    </p:bldLst>
+  </p:timing>
+</p:sld>
+</file>
+
+<file path=ppt/slides/slide32.xml><?xml version="1.0" encoding="utf-8"?>
+<p:sld xmlns:a="http://schemas.openxmlformats.org/drawingml/2006/main" xmlns:r="http://schemas.openxmlformats.org/officeDocument/2006/relationships" xmlns:p="http://schemas.openxmlformats.org/presentationml/2006/main">
+  <p:cSld>
+    <p:spTree>
+      <p:nvGrpSpPr>
+        <p:cNvPr id="1" name=""/>
+        <p:cNvGrpSpPr/>
+        <p:nvPr/>
+      </p:nvGrpSpPr>
+      <p:grpSpPr>
+        <a:xfrm>
+          <a:off x="0" y="0"/>
+          <a:ext cx="0" cy="0"/>
+          <a:chOff x="0" y="0"/>
+          <a:chExt cx="0" cy="0"/>
+        </a:xfrm>
+      </p:grpSpPr>
+      <p:sp>
+        <p:nvSpPr>
+          <p:cNvPr id="2" name="Title 1"/>
+          <p:cNvSpPr>
+            <a:spLocks noGrp="1"/>
+          </p:cNvSpPr>
+          <p:nvPr>
+            <p:ph type="title"/>
+          </p:nvPr>
+        </p:nvSpPr>
+        <p:spPr/>
+        <p:txBody>
+          <a:bodyPr/>
+          <a:lstStyle/>
+          <a:p>
+            <a:r>
+              <a:rPr lang="en-US" dirty="0" smtClean="0"/>
               <a:t>References</a:t>
             </a:r>
             <a:endParaRPr lang="nl-BE" dirty="0"/>
@@ -17379,7 +19259,7 @@
             <a:fld id="{B6F15528-21DE-4FAA-801E-634DDDAF4B2B}" type="slidenum">
               <a:rPr lang="en-US" smtClean="0"/>
               <a:pPr/>
-              <a:t>30</a:t>
+              <a:t>32</a:t>
             </a:fld>
             <a:endParaRPr lang="en-US"/>
           </a:p>

</xml_diff>

<commit_message>
Added sections to Cython slides
</commit_message>
<xml_diff>
--- a/Python/Cython/cython.pptx
+++ b/Python/Cython/cython.pptx
@@ -154,6 +154,10 @@
             <p14:sldId id="260"/>
             <p14:sldId id="259"/>
             <p14:sldId id="261"/>
+          </p14:sldIdLst>
+        </p14:section>
+        <p14:section name="Types" id="{79158FBE-AF63-46A5-BD56-E0C212DE3278}">
+          <p14:sldIdLst>
             <p14:sldId id="263"/>
             <p14:sldId id="265"/>
             <p14:sldId id="264"/>
@@ -163,19 +167,35 @@
             <p14:sldId id="268"/>
             <p14:sldId id="267"/>
             <p14:sldId id="272"/>
+          </p14:sldIdLst>
+        </p14:section>
+        <p14:section name="Functions" id="{8E454B9C-50A1-4A1F-BC93-10DA031B147D}">
+          <p14:sldIdLst>
             <p14:sldId id="269"/>
             <p14:sldId id="270"/>
             <p14:sldId id="271"/>
             <p14:sldId id="273"/>
+          </p14:sldIdLst>
+        </p14:section>
+        <p14:section name="Classes" id="{58370CDA-34AB-4AE3-B699-2FF35F819038}">
+          <p14:sldIdLst>
             <p14:sldId id="275"/>
             <p14:sldId id="277"/>
             <p14:sldId id="278"/>
             <p14:sldId id="282"/>
             <p14:sldId id="280"/>
             <p14:sldId id="281"/>
+          </p14:sldIdLst>
+        </p14:section>
+        <p14:section name="Code organization" id="{093EB03F-2021-4823-9483-0318DAF0447F}">
+          <p14:sldIdLst>
             <p14:sldId id="287"/>
             <p14:sldId id="288"/>
             <p14:sldId id="289"/>
+          </p14:sldIdLst>
+        </p14:section>
+        <p14:section name="Conclusions" id="{AE89997E-9A6D-41C8-8C29-BECABDA77C76}">
+          <p14:sldIdLst>
             <p14:sldId id="284"/>
             <p14:sldId id="285"/>
             <p14:sldId id="286"/>
@@ -184,7 +204,7 @@
       </p14:sectionLst>
     </p:ext>
     <p:ext uri="{EFAFB233-063F-42B5-8137-9DF3F51BA10A}">
-      <p15:sldGuideLst xmlns:p15="http://schemas.microsoft.com/office/powerpoint/2012/main" xmlns="">
+      <p15:sldGuideLst xmlns="" xmlns:p15="http://schemas.microsoft.com/office/powerpoint/2012/main">
         <p15:guide id="1" orient="horz" pos="2160">
           <p15:clr>
             <a:srgbClr val="A4A3A4"/>
@@ -283,7 +303,7 @@
           <a:p>
             <a:fld id="{16B045E4-7DA3-41B9-B0DA-4BEE0876FA88}" type="datetimeFigureOut">
               <a:rPr lang="nl-BE" smtClean="0"/>
-              <a:t>25/02/2016</a:t>
+              <a:t>10/03/2016</a:t>
             </a:fld>
             <a:endParaRPr lang="nl-BE"/>
           </a:p>
@@ -732,7 +752,7 @@
           <a:p>
             <a:fld id="{53B2420D-148A-400F-B88D-527DF6E13622}" type="datetime1">
               <a:rPr lang="en-US" smtClean="0"/>
-              <a:t>2016-02-25</a:t>
+              <a:t>2016-03-10</a:t>
             </a:fld>
             <a:endParaRPr lang="en-US"/>
           </a:p>
@@ -898,7 +918,7 @@
           <a:p>
             <a:fld id="{52A01B9A-6787-4B63-BAEF-E3CF67589D82}" type="datetime1">
               <a:rPr lang="en-US" smtClean="0"/>
-              <a:t>2016-02-25</a:t>
+              <a:t>2016-03-10</a:t>
             </a:fld>
             <a:endParaRPr lang="en-US"/>
           </a:p>
@@ -1074,7 +1094,7 @@
           <a:p>
             <a:fld id="{6E982D42-2071-4A3D-B614-2380183202E1}" type="datetime1">
               <a:rPr lang="en-US" smtClean="0"/>
-              <a:t>2016-02-25</a:t>
+              <a:t>2016-03-10</a:t>
             </a:fld>
             <a:endParaRPr lang="en-US"/>
           </a:p>
@@ -1240,7 +1260,7 @@
           <a:p>
             <a:fld id="{2E90E067-04B9-40C0-BFE6-53BAD2F7119C}" type="datetime1">
               <a:rPr lang="en-US" smtClean="0"/>
-              <a:t>2016-02-25</a:t>
+              <a:t>2016-03-10</a:t>
             </a:fld>
             <a:endParaRPr lang="en-US"/>
           </a:p>
@@ -1482,7 +1502,7 @@
           <a:p>
             <a:fld id="{D7CB2E72-949E-4479-B957-DBA32EC1FAB9}" type="datetime1">
               <a:rPr lang="en-US" smtClean="0"/>
-              <a:t>2016-02-25</a:t>
+              <a:t>2016-03-10</a:t>
             </a:fld>
             <a:endParaRPr lang="en-US"/>
           </a:p>
@@ -1766,7 +1786,7 @@
           <a:p>
             <a:fld id="{A06819D6-C5C8-405A-96EE-DAC9728267C0}" type="datetime1">
               <a:rPr lang="en-US" smtClean="0"/>
-              <a:t>2016-02-25</a:t>
+              <a:t>2016-03-10</a:t>
             </a:fld>
             <a:endParaRPr lang="en-US"/>
           </a:p>
@@ -2184,7 +2204,7 @@
           <a:p>
             <a:fld id="{476A766D-F1AD-47B2-B323-71C0AAEFC468}" type="datetime1">
               <a:rPr lang="en-US" smtClean="0"/>
-              <a:t>2016-02-25</a:t>
+              <a:t>2016-03-10</a:t>
             </a:fld>
             <a:endParaRPr lang="en-US"/>
           </a:p>
@@ -2298,7 +2318,7 @@
           <a:p>
             <a:fld id="{E8021487-0835-4E27-A96A-FE7FCF3265BD}" type="datetime1">
               <a:rPr lang="en-US" smtClean="0"/>
-              <a:t>2016-02-25</a:t>
+              <a:t>2016-03-10</a:t>
             </a:fld>
             <a:endParaRPr lang="en-US"/>
           </a:p>
@@ -2389,7 +2409,7 @@
           <a:p>
             <a:fld id="{D8423321-723F-439B-A2FC-3D1497BCF824}" type="datetime1">
               <a:rPr lang="en-US" smtClean="0"/>
-              <a:t>2016-02-25</a:t>
+              <a:t>2016-03-10</a:t>
             </a:fld>
             <a:endParaRPr lang="en-US"/>
           </a:p>
@@ -2662,7 +2682,7 @@
           <a:p>
             <a:fld id="{C23318F9-3CB8-42B9-8393-7570C1C1A70D}" type="datetime1">
               <a:rPr lang="en-US" smtClean="0"/>
-              <a:t>2016-02-25</a:t>
+              <a:t>2016-03-10</a:t>
             </a:fld>
             <a:endParaRPr lang="en-US"/>
           </a:p>
@@ -2911,7 +2931,7 @@
           <a:p>
             <a:fld id="{6867E127-D066-4A1C-B918-F70FF61E725D}" type="datetime1">
               <a:rPr lang="en-US" smtClean="0"/>
-              <a:t>2016-02-25</a:t>
+              <a:t>2016-03-10</a:t>
             </a:fld>
             <a:endParaRPr lang="en-US"/>
           </a:p>
@@ -3120,7 +3140,7 @@
           <a:p>
             <a:fld id="{E6FF7314-6885-4B6E-804E-F9FE9C155D78}" type="datetime1">
               <a:rPr lang="en-US" smtClean="0"/>
-              <a:t>2016-02-25</a:t>
+              <a:t>2016-03-10</a:t>
             </a:fld>
             <a:endParaRPr lang="en-US"/>
           </a:p>
@@ -16545,14 +16565,7 @@
                   <a:latin typeface="Courier New" panose="02070309020205020404" pitchFamily="49" charset="0"/>
                   <a:cs typeface="Courier New" panose="02070309020205020404" pitchFamily="49" charset="0"/>
                 </a:rPr>
-                <a:t> n</a:t>
-              </a:r>
-              <a:r>
-                <a:rPr lang="en-US" sz="1600" dirty="0" smtClean="0">
-                  <a:latin typeface="Courier New" panose="02070309020205020404" pitchFamily="49" charset="0"/>
-                  <a:cs typeface="Courier New" panose="02070309020205020404" pitchFamily="49" charset="0"/>
-                </a:rPr>
-                <a:t>):</a:t>
+                <a:t> n):</a:t>
               </a:r>
             </a:p>
             <a:p>
@@ -16590,14 +16603,7 @@
                   <a:latin typeface="Courier New" panose="02070309020205020404" pitchFamily="49" charset="0"/>
                   <a:cs typeface="Courier New" panose="02070309020205020404" pitchFamily="49" charset="0"/>
                 </a:rPr>
-                <a:t> </a:t>
-              </a:r>
-              <a:r>
-                <a:rPr lang="nl-BE" sz="1600" dirty="0" smtClean="0">
-                  <a:latin typeface="Courier New" panose="02070309020205020404" pitchFamily="49" charset="0"/>
-                  <a:cs typeface="Courier New" panose="02070309020205020404" pitchFamily="49" charset="0"/>
-                </a:rPr>
-                <a:t>class </a:t>
+                <a:t> class </a:t>
               </a:r>
               <a:r>
                 <a:rPr lang="nl-BE" sz="1600" dirty="0" err="1" smtClean="0">
@@ -16705,16 +16711,42 @@
                 </a:rPr>
                 <a:t>        ….</a:t>
               </a:r>
+            </a:p>
+            <a:p>
               <a:endParaRPr lang="en-US" sz="1600" dirty="0" smtClean="0">
                 <a:latin typeface="Courier New" panose="02070309020205020404" pitchFamily="49" charset="0"/>
                 <a:cs typeface="Courier New" panose="02070309020205020404" pitchFamily="49" charset="0"/>
               </a:endParaRPr>
             </a:p>
             <a:p>
-              <a:endParaRPr lang="en-US" sz="1600" dirty="0" smtClean="0">
-                <a:latin typeface="Courier New" panose="02070309020205020404" pitchFamily="49" charset="0"/>
-                <a:cs typeface="Courier New" panose="02070309020205020404" pitchFamily="49" charset="0"/>
-              </a:endParaRPr>
+              <a:r>
+                <a:rPr lang="en-US" sz="1600" dirty="0">
+                  <a:latin typeface="Courier New" panose="02070309020205020404" pitchFamily="49" charset="0"/>
+                  <a:cs typeface="Courier New" panose="02070309020205020404" pitchFamily="49" charset="0"/>
+                </a:rPr>
+                <a:t> </a:t>
+              </a:r>
+              <a:r>
+                <a:rPr lang="en-US" sz="1600" dirty="0" smtClean="0">
+                  <a:latin typeface="Courier New" panose="02070309020205020404" pitchFamily="49" charset="0"/>
+                  <a:cs typeface="Courier New" panose="02070309020205020404" pitchFamily="49" charset="0"/>
+                </a:rPr>
+                <a:t>   </a:t>
+              </a:r>
+              <a:r>
+                <a:rPr lang="en-US" sz="1600" dirty="0" err="1" smtClean="0">
+                  <a:latin typeface="Courier New" panose="02070309020205020404" pitchFamily="49" charset="0"/>
+                  <a:cs typeface="Courier New" panose="02070309020205020404" pitchFamily="49" charset="0"/>
+                </a:rPr>
+                <a:t>def</a:t>
+              </a:r>
+              <a:r>
+                <a:rPr lang="en-US" sz="1600" dirty="0" smtClean="0">
+                  <a:latin typeface="Courier New" panose="02070309020205020404" pitchFamily="49" charset="0"/>
+                  <a:cs typeface="Courier New" panose="02070309020205020404" pitchFamily="49" charset="0"/>
+                </a:rPr>
+                <a:t> momentum(self):</a:t>
+              </a:r>
             </a:p>
             <a:p>
               <a:r>
@@ -16729,44 +16761,7 @@
                   <a:latin typeface="Courier New" panose="02070309020205020404" pitchFamily="49" charset="0"/>
                   <a:cs typeface="Courier New" panose="02070309020205020404" pitchFamily="49" charset="0"/>
                 </a:rPr>
-                <a:t>   </a:t>
-              </a:r>
-              <a:r>
-                <a:rPr lang="en-US" sz="1600" dirty="0" err="1" smtClean="0">
-                  <a:latin typeface="Courier New" panose="02070309020205020404" pitchFamily="49" charset="0"/>
-                  <a:cs typeface="Courier New" panose="02070309020205020404" pitchFamily="49" charset="0"/>
-                </a:rPr>
-                <a:t>def</a:t>
-              </a:r>
-              <a:r>
-                <a:rPr lang="en-US" sz="1600" dirty="0" smtClean="0">
-                  <a:latin typeface="Courier New" panose="02070309020205020404" pitchFamily="49" charset="0"/>
-                  <a:cs typeface="Courier New" panose="02070309020205020404" pitchFamily="49" charset="0"/>
-                </a:rPr>
-                <a:t> momentum(self):</a:t>
-              </a:r>
-            </a:p>
-            <a:p>
-              <a:r>
-                <a:rPr lang="en-US" sz="1600" dirty="0">
-                  <a:latin typeface="Courier New" panose="02070309020205020404" pitchFamily="49" charset="0"/>
-                  <a:cs typeface="Courier New" panose="02070309020205020404" pitchFamily="49" charset="0"/>
-                </a:rPr>
-                <a:t> </a:t>
-              </a:r>
-              <a:r>
-                <a:rPr lang="en-US" sz="1600" dirty="0" smtClean="0">
-                  <a:latin typeface="Courier New" panose="02070309020205020404" pitchFamily="49" charset="0"/>
-                  <a:cs typeface="Courier New" panose="02070309020205020404" pitchFamily="49" charset="0"/>
-                </a:rPr>
-                <a:t>       </a:t>
-              </a:r>
-              <a:r>
-                <a:rPr lang="en-US" sz="1600" dirty="0" smtClean="0">
-                  <a:latin typeface="Courier New" panose="02070309020205020404" pitchFamily="49" charset="0"/>
-                  <a:cs typeface="Courier New" panose="02070309020205020404" pitchFamily="49" charset="0"/>
-                </a:rPr>
-                <a:t>…</a:t>
+                <a:t>       …</a:t>
               </a:r>
             </a:p>
             <a:p>
@@ -16973,14 +16968,7 @@
                   <a:latin typeface="Courier New" panose="02070309020205020404" pitchFamily="49" charset="0"/>
                   <a:cs typeface="Courier New" panose="02070309020205020404" pitchFamily="49" charset="0"/>
                 </a:rPr>
-                <a:t> n</a:t>
-              </a:r>
-              <a:r>
-                <a:rPr lang="en-US" sz="1600" dirty="0" smtClean="0">
-                  <a:latin typeface="Courier New" panose="02070309020205020404" pitchFamily="49" charset="0"/>
-                  <a:cs typeface="Courier New" panose="02070309020205020404" pitchFamily="49" charset="0"/>
-                </a:rPr>
-                <a:t>)</a:t>
+                <a:t> n)</a:t>
               </a:r>
             </a:p>
             <a:p>
@@ -17016,14 +17004,7 @@
                   <a:latin typeface="Courier New" panose="02070309020205020404" pitchFamily="49" charset="0"/>
                   <a:cs typeface="Courier New" panose="02070309020205020404" pitchFamily="49" charset="0"/>
                 </a:rPr>
-                <a:t> </a:t>
-              </a:r>
-              <a:r>
-                <a:rPr lang="nl-BE" sz="1600" dirty="0" smtClean="0">
-                  <a:latin typeface="Courier New" panose="02070309020205020404" pitchFamily="49" charset="0"/>
-                  <a:cs typeface="Courier New" panose="02070309020205020404" pitchFamily="49" charset="0"/>
-                </a:rPr>
-                <a:t>class </a:t>
+                <a:t> class </a:t>
               </a:r>
               <a:r>
                 <a:rPr lang="nl-BE" sz="1600" dirty="0" err="1" smtClean="0">
@@ -17111,10 +17092,6 @@
                 </a:rPr>
                 <a:t> move(self)</a:t>
               </a:r>
-              <a:endParaRPr lang="en-US" sz="1600" dirty="0" smtClean="0">
-                <a:latin typeface="Courier New" panose="02070309020205020404" pitchFamily="49" charset="0"/>
-                <a:cs typeface="Courier New" panose="02070309020205020404" pitchFamily="49" charset="0"/>
-              </a:endParaRPr>
             </a:p>
             <a:p>
               <a:endParaRPr lang="en-US" sz="1600" dirty="0" smtClean="0">

</xml_diff>